<commit_message>
(+)    outline notes add & proc notes
</commit_message>
<xml_diff>
--- a/Suppl/Pivotal Presentation - DTECTS.pptx
+++ b/Suppl/Pivotal Presentation - DTECTS.pptx
@@ -5,7 +5,7 @@
     <p:sldMasterId id="2147483648" r:id="rId1"/>
   </p:sldMasterIdLst>
   <p:notesMasterIdLst>
-    <p:notesMasterId r:id="rId12"/>
+    <p:notesMasterId r:id="rId13"/>
   </p:notesMasterIdLst>
   <p:sldIdLst>
     <p:sldId id="256" r:id="rId2"/>
@@ -18,6 +18,7 @@
     <p:sldId id="263" r:id="rId9"/>
     <p:sldId id="264" r:id="rId10"/>
     <p:sldId id="265" r:id="rId11"/>
+    <p:sldId id="266" r:id="rId12"/>
   </p:sldIdLst>
   <p:sldSz cx="12192000" cy="6858000"/>
   <p:notesSz cx="6858000" cy="9144000"/>
@@ -564,7 +565,22 @@
                 <a:ea typeface="+mn-ea"/>
                 <a:cs typeface="+mn-cs"/>
               </a:rPr>
-              <a:t>  1 Challenges &amp; Needs                (1)</a:t>
+              <a:t>  1 Challenges &amp; </a:t>
+            </a:r>
+            <a:r>
+              <a:rPr lang="en-US" dirty="0"/>
+              <a:t>Needs                (</a:t>
+            </a:r>
+            <a:r>
+              <a:rPr lang="en-US" sz="1200" b="0" i="0" u="none" strike="noStrike" kern="1200" baseline="0" dirty="0">
+                <a:solidFill>
+                  <a:schemeClr val="tx1"/>
+                </a:solidFill>
+                <a:latin typeface="+mn-lt"/>
+                <a:ea typeface="+mn-ea"/>
+                <a:cs typeface="+mn-cs"/>
+              </a:rPr>
+              <a:t>1)</a:t>
             </a:r>
           </a:p>
           <a:p>
@@ -642,7 +658,7 @@
                 <a:ea typeface="+mn-ea"/>
                 <a:cs typeface="+mn-cs"/>
               </a:rPr>
-              <a:t>  7 Outcomes                               (1)</a:t>
+              <a:t>  7 Outcomes                                 (1)</a:t>
             </a:r>
           </a:p>
           <a:p>
@@ -655,7 +671,7 @@
                 <a:ea typeface="+mn-ea"/>
                 <a:cs typeface="+mn-cs"/>
               </a:rPr>
-              <a:t>  8 Procedure (M)                        (1)</a:t>
+              <a:t>  8 Procedure (M)                          (1)</a:t>
             </a:r>
           </a:p>
           <a:p>
@@ -681,7 +697,7 @@
                 <a:ea typeface="+mn-ea"/>
                 <a:cs typeface="+mn-cs"/>
               </a:rPr>
-              <a:t>                                        Total  (13)</a:t>
+              <a:t>                                             Total  (13)</a:t>
             </a:r>
             <a:endParaRPr lang="en-US" dirty="0"/>
           </a:p>
@@ -714,6 +730,960 @@
     <p:extLst>
       <p:ext uri="{BB962C8B-B14F-4D97-AF65-F5344CB8AC3E}">
         <p14:creationId xmlns:p14="http://schemas.microsoft.com/office/powerpoint/2010/main" val="4276758708"/>
+      </p:ext>
+    </p:extLst>
+  </p:cSld>
+  <p:clrMapOvr>
+    <a:masterClrMapping/>
+  </p:clrMapOvr>
+</p:notes>
+</file>
+
+<file path=ppt/notesSlides/notesSlide10.xml><?xml version="1.0" encoding="utf-8"?>
+<p:notes xmlns:a="http://schemas.openxmlformats.org/drawingml/2006/main" xmlns:r="http://schemas.openxmlformats.org/officeDocument/2006/relationships" xmlns:p="http://schemas.openxmlformats.org/presentationml/2006/main">
+  <p:cSld>
+    <p:spTree>
+      <p:nvGrpSpPr>
+        <p:cNvPr id="1" name=""/>
+        <p:cNvGrpSpPr/>
+        <p:nvPr/>
+      </p:nvGrpSpPr>
+      <p:grpSpPr>
+        <a:xfrm>
+          <a:off x="0" y="0"/>
+          <a:ext cx="0" cy="0"/>
+          <a:chOff x="0" y="0"/>
+          <a:chExt cx="0" cy="0"/>
+        </a:xfrm>
+      </p:grpSpPr>
+      <p:sp>
+        <p:nvSpPr>
+          <p:cNvPr id="2" name="Slide Image Placeholder 1"/>
+          <p:cNvSpPr>
+            <a:spLocks noGrp="1" noRot="1" noChangeAspect="1"/>
+          </p:cNvSpPr>
+          <p:nvPr>
+            <p:ph type="sldImg"/>
+          </p:nvPr>
+        </p:nvSpPr>
+        <p:spPr/>
+      </p:sp>
+      <p:sp>
+        <p:nvSpPr>
+          <p:cNvPr id="3" name="Notes Placeholder 2"/>
+          <p:cNvSpPr>
+            <a:spLocks noGrp="1"/>
+          </p:cNvSpPr>
+          <p:nvPr>
+            <p:ph type="body" idx="1"/>
+          </p:nvPr>
+        </p:nvSpPr>
+        <p:spPr/>
+        <p:txBody>
+          <a:bodyPr/>
+          <a:lstStyle/>
+          <a:p>
+            <a:endParaRPr lang="en-US"/>
+          </a:p>
+        </p:txBody>
+      </p:sp>
+      <p:sp>
+        <p:nvSpPr>
+          <p:cNvPr id="4" name="Slide Number Placeholder 3"/>
+          <p:cNvSpPr>
+            <a:spLocks noGrp="1"/>
+          </p:cNvSpPr>
+          <p:nvPr>
+            <p:ph type="sldNum" sz="quarter" idx="10"/>
+          </p:nvPr>
+        </p:nvSpPr>
+        <p:spPr/>
+        <p:txBody>
+          <a:bodyPr/>
+          <a:lstStyle/>
+          <a:p>
+            <a:fld id="{4AC65D0B-F732-4E21-9A8D-1C6A15A6A84B}" type="slidenum">
+              <a:rPr lang="en-US" smtClean="0"/>
+              <a:t>10</a:t>
+            </a:fld>
+            <a:endParaRPr lang="en-US" dirty="0"/>
+          </a:p>
+        </p:txBody>
+      </p:sp>
+    </p:spTree>
+    <p:extLst>
+      <p:ext uri="{BB962C8B-B14F-4D97-AF65-F5344CB8AC3E}">
+        <p14:creationId xmlns:p14="http://schemas.microsoft.com/office/powerpoint/2010/main" val="3872874621"/>
+      </p:ext>
+    </p:extLst>
+  </p:cSld>
+  <p:clrMapOvr>
+    <a:masterClrMapping/>
+  </p:clrMapOvr>
+</p:notes>
+</file>
+
+<file path=ppt/notesSlides/notesSlide11.xml><?xml version="1.0" encoding="utf-8"?>
+<p:notes xmlns:a="http://schemas.openxmlformats.org/drawingml/2006/main" xmlns:r="http://schemas.openxmlformats.org/officeDocument/2006/relationships" xmlns:p="http://schemas.openxmlformats.org/presentationml/2006/main">
+  <p:cSld>
+    <p:spTree>
+      <p:nvGrpSpPr>
+        <p:cNvPr id="1" name=""/>
+        <p:cNvGrpSpPr/>
+        <p:nvPr/>
+      </p:nvGrpSpPr>
+      <p:grpSpPr>
+        <a:xfrm>
+          <a:off x="0" y="0"/>
+          <a:ext cx="0" cy="0"/>
+          <a:chOff x="0" y="0"/>
+          <a:chExt cx="0" cy="0"/>
+        </a:xfrm>
+      </p:grpSpPr>
+      <p:sp>
+        <p:nvSpPr>
+          <p:cNvPr id="2" name="Slide Image Placeholder 1"/>
+          <p:cNvSpPr>
+            <a:spLocks noGrp="1" noRot="1" noChangeAspect="1"/>
+          </p:cNvSpPr>
+          <p:nvPr>
+            <p:ph type="sldImg"/>
+          </p:nvPr>
+        </p:nvSpPr>
+        <p:spPr/>
+      </p:sp>
+      <p:sp>
+        <p:nvSpPr>
+          <p:cNvPr id="3" name="Notes Placeholder 2"/>
+          <p:cNvSpPr>
+            <a:spLocks noGrp="1"/>
+          </p:cNvSpPr>
+          <p:nvPr>
+            <p:ph type="body" idx="1"/>
+          </p:nvPr>
+        </p:nvSpPr>
+        <p:spPr/>
+        <p:txBody>
+          <a:bodyPr/>
+          <a:lstStyle/>
+          <a:p>
+            <a:r>
+              <a:rPr lang="en-US" dirty="0"/>
+              <a:t>*Integrate Tomm Notes</a:t>
+            </a:r>
+          </a:p>
+          <a:p>
+            <a:r>
+              <a:rPr lang="en-US" dirty="0"/>
+              <a:t>*Form</a:t>
+            </a:r>
+            <a:r>
+              <a:rPr lang="en-US" baseline="0" dirty="0"/>
+              <a:t> rules &amp; presentation target</a:t>
+            </a:r>
+            <a:endParaRPr lang="en-US" dirty="0"/>
+          </a:p>
+        </p:txBody>
+      </p:sp>
+      <p:sp>
+        <p:nvSpPr>
+          <p:cNvPr id="4" name="Slide Number Placeholder 3"/>
+          <p:cNvSpPr>
+            <a:spLocks noGrp="1"/>
+          </p:cNvSpPr>
+          <p:nvPr>
+            <p:ph type="sldNum" sz="quarter" idx="10"/>
+          </p:nvPr>
+        </p:nvSpPr>
+        <p:spPr/>
+        <p:txBody>
+          <a:bodyPr/>
+          <a:lstStyle/>
+          <a:p>
+            <a:fld id="{4AC65D0B-F732-4E21-9A8D-1C6A15A6A84B}" type="slidenum">
+              <a:rPr lang="en-US" smtClean="0"/>
+              <a:t>11</a:t>
+            </a:fld>
+            <a:endParaRPr lang="en-US" dirty="0"/>
+          </a:p>
+        </p:txBody>
+      </p:sp>
+    </p:spTree>
+    <p:extLst>
+      <p:ext uri="{BB962C8B-B14F-4D97-AF65-F5344CB8AC3E}">
+        <p14:creationId xmlns:p14="http://schemas.microsoft.com/office/powerpoint/2010/main" val="1742817908"/>
+      </p:ext>
+    </p:extLst>
+  </p:cSld>
+  <p:clrMapOvr>
+    <a:masterClrMapping/>
+  </p:clrMapOvr>
+</p:notes>
+</file>
+
+<file path=ppt/notesSlides/notesSlide2.xml><?xml version="1.0" encoding="utf-8"?>
+<p:notes xmlns:a="http://schemas.openxmlformats.org/drawingml/2006/main" xmlns:r="http://schemas.openxmlformats.org/officeDocument/2006/relationships" xmlns:p="http://schemas.openxmlformats.org/presentationml/2006/main">
+  <p:cSld>
+    <p:spTree>
+      <p:nvGrpSpPr>
+        <p:cNvPr id="1" name=""/>
+        <p:cNvGrpSpPr/>
+        <p:nvPr/>
+      </p:nvGrpSpPr>
+      <p:grpSpPr>
+        <a:xfrm>
+          <a:off x="0" y="0"/>
+          <a:ext cx="0" cy="0"/>
+          <a:chOff x="0" y="0"/>
+          <a:chExt cx="0" cy="0"/>
+        </a:xfrm>
+      </p:grpSpPr>
+      <p:sp>
+        <p:nvSpPr>
+          <p:cNvPr id="2" name="Slide Image Placeholder 1"/>
+          <p:cNvSpPr>
+            <a:spLocks noGrp="1" noRot="1" noChangeAspect="1"/>
+          </p:cNvSpPr>
+          <p:nvPr>
+            <p:ph type="sldImg"/>
+          </p:nvPr>
+        </p:nvSpPr>
+        <p:spPr/>
+      </p:sp>
+      <p:sp>
+        <p:nvSpPr>
+          <p:cNvPr id="3" name="Notes Placeholder 2"/>
+          <p:cNvSpPr>
+            <a:spLocks noGrp="1"/>
+          </p:cNvSpPr>
+          <p:nvPr>
+            <p:ph type="body" idx="1"/>
+          </p:nvPr>
+        </p:nvSpPr>
+        <p:spPr/>
+        <p:txBody>
+          <a:bodyPr/>
+          <a:lstStyle/>
+          <a:p>
+            <a:endParaRPr lang="en-US"/>
+          </a:p>
+        </p:txBody>
+      </p:sp>
+      <p:sp>
+        <p:nvSpPr>
+          <p:cNvPr id="4" name="Slide Number Placeholder 3"/>
+          <p:cNvSpPr>
+            <a:spLocks noGrp="1"/>
+          </p:cNvSpPr>
+          <p:nvPr>
+            <p:ph type="sldNum" sz="quarter" idx="10"/>
+          </p:nvPr>
+        </p:nvSpPr>
+        <p:spPr/>
+        <p:txBody>
+          <a:bodyPr/>
+          <a:lstStyle/>
+          <a:p>
+            <a:fld id="{4AC65D0B-F732-4E21-9A8D-1C6A15A6A84B}" type="slidenum">
+              <a:rPr lang="en-US" smtClean="0"/>
+              <a:t>2</a:t>
+            </a:fld>
+            <a:endParaRPr lang="en-US" dirty="0"/>
+          </a:p>
+        </p:txBody>
+      </p:sp>
+    </p:spTree>
+    <p:extLst>
+      <p:ext uri="{BB962C8B-B14F-4D97-AF65-F5344CB8AC3E}">
+        <p14:creationId xmlns:p14="http://schemas.microsoft.com/office/powerpoint/2010/main" val="3206697118"/>
+      </p:ext>
+    </p:extLst>
+  </p:cSld>
+  <p:clrMapOvr>
+    <a:masterClrMapping/>
+  </p:clrMapOvr>
+</p:notes>
+</file>
+
+<file path=ppt/notesSlides/notesSlide3.xml><?xml version="1.0" encoding="utf-8"?>
+<p:notes xmlns:a="http://schemas.openxmlformats.org/drawingml/2006/main" xmlns:r="http://schemas.openxmlformats.org/officeDocument/2006/relationships" xmlns:p="http://schemas.openxmlformats.org/presentationml/2006/main">
+  <p:cSld>
+    <p:spTree>
+      <p:nvGrpSpPr>
+        <p:cNvPr id="1" name=""/>
+        <p:cNvGrpSpPr/>
+        <p:nvPr/>
+      </p:nvGrpSpPr>
+      <p:grpSpPr>
+        <a:xfrm>
+          <a:off x="0" y="0"/>
+          <a:ext cx="0" cy="0"/>
+          <a:chOff x="0" y="0"/>
+          <a:chExt cx="0" cy="0"/>
+        </a:xfrm>
+      </p:grpSpPr>
+      <p:sp>
+        <p:nvSpPr>
+          <p:cNvPr id="2" name="Slide Image Placeholder 1"/>
+          <p:cNvSpPr>
+            <a:spLocks noGrp="1" noRot="1" noChangeAspect="1"/>
+          </p:cNvSpPr>
+          <p:nvPr>
+            <p:ph type="sldImg"/>
+          </p:nvPr>
+        </p:nvSpPr>
+        <p:spPr/>
+      </p:sp>
+      <p:sp>
+        <p:nvSpPr>
+          <p:cNvPr id="3" name="Notes Placeholder 2"/>
+          <p:cNvSpPr>
+            <a:spLocks noGrp="1"/>
+          </p:cNvSpPr>
+          <p:nvPr>
+            <p:ph type="body" idx="1"/>
+          </p:nvPr>
+        </p:nvSpPr>
+        <p:spPr/>
+        <p:txBody>
+          <a:bodyPr/>
+          <a:lstStyle/>
+          <a:p>
+            <a:endParaRPr lang="en-US"/>
+          </a:p>
+        </p:txBody>
+      </p:sp>
+      <p:sp>
+        <p:nvSpPr>
+          <p:cNvPr id="4" name="Slide Number Placeholder 3"/>
+          <p:cNvSpPr>
+            <a:spLocks noGrp="1"/>
+          </p:cNvSpPr>
+          <p:nvPr>
+            <p:ph type="sldNum" sz="quarter" idx="10"/>
+          </p:nvPr>
+        </p:nvSpPr>
+        <p:spPr/>
+        <p:txBody>
+          <a:bodyPr/>
+          <a:lstStyle/>
+          <a:p>
+            <a:fld id="{4AC65D0B-F732-4E21-9A8D-1C6A15A6A84B}" type="slidenum">
+              <a:rPr lang="en-US" smtClean="0"/>
+              <a:t>3</a:t>
+            </a:fld>
+            <a:endParaRPr lang="en-US" dirty="0"/>
+          </a:p>
+        </p:txBody>
+      </p:sp>
+    </p:spTree>
+    <p:extLst>
+      <p:ext uri="{BB962C8B-B14F-4D97-AF65-F5344CB8AC3E}">
+        <p14:creationId xmlns:p14="http://schemas.microsoft.com/office/powerpoint/2010/main" val="3333099726"/>
+      </p:ext>
+    </p:extLst>
+  </p:cSld>
+  <p:clrMapOvr>
+    <a:masterClrMapping/>
+  </p:clrMapOvr>
+</p:notes>
+</file>
+
+<file path=ppt/notesSlides/notesSlide4.xml><?xml version="1.0" encoding="utf-8"?>
+<p:notes xmlns:a="http://schemas.openxmlformats.org/drawingml/2006/main" xmlns:r="http://schemas.openxmlformats.org/officeDocument/2006/relationships" xmlns:p="http://schemas.openxmlformats.org/presentationml/2006/main">
+  <p:cSld>
+    <p:spTree>
+      <p:nvGrpSpPr>
+        <p:cNvPr id="1" name=""/>
+        <p:cNvGrpSpPr/>
+        <p:nvPr/>
+      </p:nvGrpSpPr>
+      <p:grpSpPr>
+        <a:xfrm>
+          <a:off x="0" y="0"/>
+          <a:ext cx="0" cy="0"/>
+          <a:chOff x="0" y="0"/>
+          <a:chExt cx="0" cy="0"/>
+        </a:xfrm>
+      </p:grpSpPr>
+      <p:sp>
+        <p:nvSpPr>
+          <p:cNvPr id="2" name="Slide Image Placeholder 1"/>
+          <p:cNvSpPr>
+            <a:spLocks noGrp="1" noRot="1" noChangeAspect="1"/>
+          </p:cNvSpPr>
+          <p:nvPr>
+            <p:ph type="sldImg"/>
+          </p:nvPr>
+        </p:nvSpPr>
+        <p:spPr/>
+      </p:sp>
+      <p:sp>
+        <p:nvSpPr>
+          <p:cNvPr id="3" name="Notes Placeholder 2"/>
+          <p:cNvSpPr>
+            <a:spLocks noGrp="1"/>
+          </p:cNvSpPr>
+          <p:nvPr>
+            <p:ph type="body" idx="1"/>
+          </p:nvPr>
+        </p:nvSpPr>
+        <p:spPr/>
+        <p:txBody>
+          <a:bodyPr/>
+          <a:lstStyle/>
+          <a:p>
+            <a:endParaRPr lang="en-US"/>
+          </a:p>
+        </p:txBody>
+      </p:sp>
+      <p:sp>
+        <p:nvSpPr>
+          <p:cNvPr id="4" name="Slide Number Placeholder 3"/>
+          <p:cNvSpPr>
+            <a:spLocks noGrp="1"/>
+          </p:cNvSpPr>
+          <p:nvPr>
+            <p:ph type="sldNum" sz="quarter" idx="10"/>
+          </p:nvPr>
+        </p:nvSpPr>
+        <p:spPr/>
+        <p:txBody>
+          <a:bodyPr/>
+          <a:lstStyle/>
+          <a:p>
+            <a:fld id="{4AC65D0B-F732-4E21-9A8D-1C6A15A6A84B}" type="slidenum">
+              <a:rPr lang="en-US" smtClean="0"/>
+              <a:t>4</a:t>
+            </a:fld>
+            <a:endParaRPr lang="en-US" dirty="0"/>
+          </a:p>
+        </p:txBody>
+      </p:sp>
+    </p:spTree>
+    <p:extLst>
+      <p:ext uri="{BB962C8B-B14F-4D97-AF65-F5344CB8AC3E}">
+        <p14:creationId xmlns:p14="http://schemas.microsoft.com/office/powerpoint/2010/main" val="204800194"/>
+      </p:ext>
+    </p:extLst>
+  </p:cSld>
+  <p:clrMapOvr>
+    <a:masterClrMapping/>
+  </p:clrMapOvr>
+</p:notes>
+</file>
+
+<file path=ppt/notesSlides/notesSlide5.xml><?xml version="1.0" encoding="utf-8"?>
+<p:notes xmlns:a="http://schemas.openxmlformats.org/drawingml/2006/main" xmlns:r="http://schemas.openxmlformats.org/officeDocument/2006/relationships" xmlns:p="http://schemas.openxmlformats.org/presentationml/2006/main">
+  <p:cSld>
+    <p:spTree>
+      <p:nvGrpSpPr>
+        <p:cNvPr id="1" name=""/>
+        <p:cNvGrpSpPr/>
+        <p:nvPr/>
+      </p:nvGrpSpPr>
+      <p:grpSpPr>
+        <a:xfrm>
+          <a:off x="0" y="0"/>
+          <a:ext cx="0" cy="0"/>
+          <a:chOff x="0" y="0"/>
+          <a:chExt cx="0" cy="0"/>
+        </a:xfrm>
+      </p:grpSpPr>
+      <p:sp>
+        <p:nvSpPr>
+          <p:cNvPr id="2" name="Slide Image Placeholder 1"/>
+          <p:cNvSpPr>
+            <a:spLocks noGrp="1" noRot="1" noChangeAspect="1"/>
+          </p:cNvSpPr>
+          <p:nvPr>
+            <p:ph type="sldImg"/>
+          </p:nvPr>
+        </p:nvSpPr>
+        <p:spPr/>
+      </p:sp>
+      <p:sp>
+        <p:nvSpPr>
+          <p:cNvPr id="3" name="Notes Placeholder 2"/>
+          <p:cNvSpPr>
+            <a:spLocks noGrp="1"/>
+          </p:cNvSpPr>
+          <p:nvPr>
+            <p:ph type="body" idx="1"/>
+          </p:nvPr>
+        </p:nvSpPr>
+        <p:spPr/>
+        <p:txBody>
+          <a:bodyPr/>
+          <a:lstStyle/>
+          <a:p>
+            <a:endParaRPr lang="en-US"/>
+          </a:p>
+        </p:txBody>
+      </p:sp>
+      <p:sp>
+        <p:nvSpPr>
+          <p:cNvPr id="4" name="Slide Number Placeholder 3"/>
+          <p:cNvSpPr>
+            <a:spLocks noGrp="1"/>
+          </p:cNvSpPr>
+          <p:nvPr>
+            <p:ph type="sldNum" sz="quarter" idx="10"/>
+          </p:nvPr>
+        </p:nvSpPr>
+        <p:spPr/>
+        <p:txBody>
+          <a:bodyPr/>
+          <a:lstStyle/>
+          <a:p>
+            <a:fld id="{4AC65D0B-F732-4E21-9A8D-1C6A15A6A84B}" type="slidenum">
+              <a:rPr lang="en-US" smtClean="0"/>
+              <a:t>5</a:t>
+            </a:fld>
+            <a:endParaRPr lang="en-US" dirty="0"/>
+          </a:p>
+        </p:txBody>
+      </p:sp>
+    </p:spTree>
+    <p:extLst>
+      <p:ext uri="{BB962C8B-B14F-4D97-AF65-F5344CB8AC3E}">
+        <p14:creationId xmlns:p14="http://schemas.microsoft.com/office/powerpoint/2010/main" val="3454095090"/>
+      </p:ext>
+    </p:extLst>
+  </p:cSld>
+  <p:clrMapOvr>
+    <a:masterClrMapping/>
+  </p:clrMapOvr>
+</p:notes>
+</file>
+
+<file path=ppt/notesSlides/notesSlide6.xml><?xml version="1.0" encoding="utf-8"?>
+<p:notes xmlns:a="http://schemas.openxmlformats.org/drawingml/2006/main" xmlns:r="http://schemas.openxmlformats.org/officeDocument/2006/relationships" xmlns:p="http://schemas.openxmlformats.org/presentationml/2006/main">
+  <p:cSld>
+    <p:spTree>
+      <p:nvGrpSpPr>
+        <p:cNvPr id="1" name=""/>
+        <p:cNvGrpSpPr/>
+        <p:nvPr/>
+      </p:nvGrpSpPr>
+      <p:grpSpPr>
+        <a:xfrm>
+          <a:off x="0" y="0"/>
+          <a:ext cx="0" cy="0"/>
+          <a:chOff x="0" y="0"/>
+          <a:chExt cx="0" cy="0"/>
+        </a:xfrm>
+      </p:grpSpPr>
+      <p:sp>
+        <p:nvSpPr>
+          <p:cNvPr id="2" name="Slide Image Placeholder 1"/>
+          <p:cNvSpPr>
+            <a:spLocks noGrp="1" noRot="1" noChangeAspect="1"/>
+          </p:cNvSpPr>
+          <p:nvPr>
+            <p:ph type="sldImg"/>
+          </p:nvPr>
+        </p:nvSpPr>
+        <p:spPr/>
+      </p:sp>
+      <p:sp>
+        <p:nvSpPr>
+          <p:cNvPr id="3" name="Notes Placeholder 2"/>
+          <p:cNvSpPr>
+            <a:spLocks noGrp="1"/>
+          </p:cNvSpPr>
+          <p:nvPr>
+            <p:ph type="body" idx="1"/>
+          </p:nvPr>
+        </p:nvSpPr>
+        <p:spPr/>
+        <p:txBody>
+          <a:bodyPr/>
+          <a:lstStyle/>
+          <a:p>
+            <a:endParaRPr lang="en-US"/>
+          </a:p>
+        </p:txBody>
+      </p:sp>
+      <p:sp>
+        <p:nvSpPr>
+          <p:cNvPr id="4" name="Slide Number Placeholder 3"/>
+          <p:cNvSpPr>
+            <a:spLocks noGrp="1"/>
+          </p:cNvSpPr>
+          <p:nvPr>
+            <p:ph type="sldNum" sz="quarter" idx="10"/>
+          </p:nvPr>
+        </p:nvSpPr>
+        <p:spPr/>
+        <p:txBody>
+          <a:bodyPr/>
+          <a:lstStyle/>
+          <a:p>
+            <a:fld id="{4AC65D0B-F732-4E21-9A8D-1C6A15A6A84B}" type="slidenum">
+              <a:rPr lang="en-US" smtClean="0"/>
+              <a:t>6</a:t>
+            </a:fld>
+            <a:endParaRPr lang="en-US" dirty="0"/>
+          </a:p>
+        </p:txBody>
+      </p:sp>
+    </p:spTree>
+    <p:extLst>
+      <p:ext uri="{BB962C8B-B14F-4D97-AF65-F5344CB8AC3E}">
+        <p14:creationId xmlns:p14="http://schemas.microsoft.com/office/powerpoint/2010/main" val="2781359423"/>
+      </p:ext>
+    </p:extLst>
+  </p:cSld>
+  <p:clrMapOvr>
+    <a:masterClrMapping/>
+  </p:clrMapOvr>
+</p:notes>
+</file>
+
+<file path=ppt/notesSlides/notesSlide7.xml><?xml version="1.0" encoding="utf-8"?>
+<p:notes xmlns:a="http://schemas.openxmlformats.org/drawingml/2006/main" xmlns:r="http://schemas.openxmlformats.org/officeDocument/2006/relationships" xmlns:p="http://schemas.openxmlformats.org/presentationml/2006/main">
+  <p:cSld>
+    <p:spTree>
+      <p:nvGrpSpPr>
+        <p:cNvPr id="1" name=""/>
+        <p:cNvGrpSpPr/>
+        <p:nvPr/>
+      </p:nvGrpSpPr>
+      <p:grpSpPr>
+        <a:xfrm>
+          <a:off x="0" y="0"/>
+          <a:ext cx="0" cy="0"/>
+          <a:chOff x="0" y="0"/>
+          <a:chExt cx="0" cy="0"/>
+        </a:xfrm>
+      </p:grpSpPr>
+      <p:sp>
+        <p:nvSpPr>
+          <p:cNvPr id="2" name="Slide Image Placeholder 1"/>
+          <p:cNvSpPr>
+            <a:spLocks noGrp="1" noRot="1" noChangeAspect="1"/>
+          </p:cNvSpPr>
+          <p:nvPr>
+            <p:ph type="sldImg"/>
+          </p:nvPr>
+        </p:nvSpPr>
+        <p:spPr/>
+      </p:sp>
+      <p:sp>
+        <p:nvSpPr>
+          <p:cNvPr id="3" name="Notes Placeholder 2"/>
+          <p:cNvSpPr>
+            <a:spLocks noGrp="1"/>
+          </p:cNvSpPr>
+          <p:nvPr>
+            <p:ph type="body" idx="1"/>
+          </p:nvPr>
+        </p:nvSpPr>
+        <p:spPr/>
+        <p:txBody>
+          <a:bodyPr/>
+          <a:lstStyle/>
+          <a:p>
+            <a:endParaRPr lang="en-US"/>
+          </a:p>
+        </p:txBody>
+      </p:sp>
+      <p:sp>
+        <p:nvSpPr>
+          <p:cNvPr id="4" name="Slide Number Placeholder 3"/>
+          <p:cNvSpPr>
+            <a:spLocks noGrp="1"/>
+          </p:cNvSpPr>
+          <p:nvPr>
+            <p:ph type="sldNum" sz="quarter" idx="10"/>
+          </p:nvPr>
+        </p:nvSpPr>
+        <p:spPr/>
+        <p:txBody>
+          <a:bodyPr/>
+          <a:lstStyle/>
+          <a:p>
+            <a:fld id="{4AC65D0B-F732-4E21-9A8D-1C6A15A6A84B}" type="slidenum">
+              <a:rPr lang="en-US" smtClean="0"/>
+              <a:t>7</a:t>
+            </a:fld>
+            <a:endParaRPr lang="en-US" dirty="0"/>
+          </a:p>
+        </p:txBody>
+      </p:sp>
+    </p:spTree>
+    <p:extLst>
+      <p:ext uri="{BB962C8B-B14F-4D97-AF65-F5344CB8AC3E}">
+        <p14:creationId xmlns:p14="http://schemas.microsoft.com/office/powerpoint/2010/main" val="2003587252"/>
+      </p:ext>
+    </p:extLst>
+  </p:cSld>
+  <p:clrMapOvr>
+    <a:masterClrMapping/>
+  </p:clrMapOvr>
+</p:notes>
+</file>
+
+<file path=ppt/notesSlides/notesSlide8.xml><?xml version="1.0" encoding="utf-8"?>
+<p:notes xmlns:a="http://schemas.openxmlformats.org/drawingml/2006/main" xmlns:r="http://schemas.openxmlformats.org/officeDocument/2006/relationships" xmlns:p="http://schemas.openxmlformats.org/presentationml/2006/main">
+  <p:cSld>
+    <p:spTree>
+      <p:nvGrpSpPr>
+        <p:cNvPr id="1" name=""/>
+        <p:cNvGrpSpPr/>
+        <p:nvPr/>
+      </p:nvGrpSpPr>
+      <p:grpSpPr>
+        <a:xfrm>
+          <a:off x="0" y="0"/>
+          <a:ext cx="0" cy="0"/>
+          <a:chOff x="0" y="0"/>
+          <a:chExt cx="0" cy="0"/>
+        </a:xfrm>
+      </p:grpSpPr>
+      <p:sp>
+        <p:nvSpPr>
+          <p:cNvPr id="2" name="Slide Image Placeholder 1"/>
+          <p:cNvSpPr>
+            <a:spLocks noGrp="1" noRot="1" noChangeAspect="1"/>
+          </p:cNvSpPr>
+          <p:nvPr>
+            <p:ph type="sldImg"/>
+          </p:nvPr>
+        </p:nvSpPr>
+        <p:spPr/>
+      </p:sp>
+      <p:sp>
+        <p:nvSpPr>
+          <p:cNvPr id="3" name="Notes Placeholder 2"/>
+          <p:cNvSpPr>
+            <a:spLocks noGrp="1"/>
+          </p:cNvSpPr>
+          <p:nvPr>
+            <p:ph type="body" idx="1"/>
+          </p:nvPr>
+        </p:nvSpPr>
+        <p:spPr/>
+        <p:txBody>
+          <a:bodyPr/>
+          <a:lstStyle/>
+          <a:p>
+            <a:endParaRPr lang="en-US"/>
+          </a:p>
+        </p:txBody>
+      </p:sp>
+      <p:sp>
+        <p:nvSpPr>
+          <p:cNvPr id="4" name="Slide Number Placeholder 3"/>
+          <p:cNvSpPr>
+            <a:spLocks noGrp="1"/>
+          </p:cNvSpPr>
+          <p:nvPr>
+            <p:ph type="sldNum" sz="quarter" idx="10"/>
+          </p:nvPr>
+        </p:nvSpPr>
+        <p:spPr/>
+        <p:txBody>
+          <a:bodyPr/>
+          <a:lstStyle/>
+          <a:p>
+            <a:fld id="{4AC65D0B-F732-4E21-9A8D-1C6A15A6A84B}" type="slidenum">
+              <a:rPr lang="en-US" smtClean="0"/>
+              <a:t>8</a:t>
+            </a:fld>
+            <a:endParaRPr lang="en-US" dirty="0"/>
+          </a:p>
+        </p:txBody>
+      </p:sp>
+    </p:spTree>
+    <p:extLst>
+      <p:ext uri="{BB962C8B-B14F-4D97-AF65-F5344CB8AC3E}">
+        <p14:creationId xmlns:p14="http://schemas.microsoft.com/office/powerpoint/2010/main" val="3412337435"/>
+      </p:ext>
+    </p:extLst>
+  </p:cSld>
+  <p:clrMapOvr>
+    <a:masterClrMapping/>
+  </p:clrMapOvr>
+</p:notes>
+</file>
+
+<file path=ppt/notesSlides/notesSlide9.xml><?xml version="1.0" encoding="utf-8"?>
+<p:notes xmlns:a="http://schemas.openxmlformats.org/drawingml/2006/main" xmlns:r="http://schemas.openxmlformats.org/officeDocument/2006/relationships" xmlns:p="http://schemas.openxmlformats.org/presentationml/2006/main">
+  <p:cSld>
+    <p:spTree>
+      <p:nvGrpSpPr>
+        <p:cNvPr id="1" name=""/>
+        <p:cNvGrpSpPr/>
+        <p:nvPr/>
+      </p:nvGrpSpPr>
+      <p:grpSpPr>
+        <a:xfrm>
+          <a:off x="0" y="0"/>
+          <a:ext cx="0" cy="0"/>
+          <a:chOff x="0" y="0"/>
+          <a:chExt cx="0" cy="0"/>
+        </a:xfrm>
+      </p:grpSpPr>
+      <p:sp>
+        <p:nvSpPr>
+          <p:cNvPr id="2" name="Slide Image Placeholder 1"/>
+          <p:cNvSpPr>
+            <a:spLocks noGrp="1" noRot="1" noChangeAspect="1"/>
+          </p:cNvSpPr>
+          <p:nvPr>
+            <p:ph type="sldImg"/>
+          </p:nvPr>
+        </p:nvSpPr>
+        <p:spPr/>
+      </p:sp>
+      <p:sp>
+        <p:nvSpPr>
+          <p:cNvPr id="3" name="Notes Placeholder 2"/>
+          <p:cNvSpPr>
+            <a:spLocks noGrp="1"/>
+          </p:cNvSpPr>
+          <p:nvPr>
+            <p:ph type="body" idx="1"/>
+          </p:nvPr>
+        </p:nvSpPr>
+        <p:spPr/>
+        <p:txBody>
+          <a:bodyPr/>
+          <a:lstStyle/>
+          <a:p>
+            <a:pPr marL="171450" indent="-171450">
+              <a:buFontTx/>
+              <a:buChar char="-"/>
+            </a:pPr>
+            <a:r>
+              <a:rPr lang="en-US" dirty="0"/>
+              <a:t>Frame, sketch w/vision</a:t>
+            </a:r>
+            <a:r>
+              <a:rPr lang="en-US" baseline="0" dirty="0"/>
+              <a:t> &amp; intent, draft</a:t>
+            </a:r>
+          </a:p>
+          <a:p>
+            <a:pPr marL="171450" indent="-171450">
+              <a:buFontTx/>
+              <a:buChar char="-"/>
+            </a:pPr>
+            <a:r>
+              <a:rPr lang="en-US" baseline="0" dirty="0"/>
+              <a:t>Source control &amp; procedure!</a:t>
+            </a:r>
+          </a:p>
+          <a:p>
+            <a:pPr marL="171450" indent="-171450">
+              <a:buFontTx/>
+              <a:buChar char="-"/>
+            </a:pPr>
+            <a:r>
+              <a:rPr lang="en-US" baseline="0" dirty="0"/>
+              <a:t>Help from experience (Tomm, Terry, Father)</a:t>
+            </a:r>
+          </a:p>
+          <a:p>
+            <a:pPr marL="171450" indent="-171450">
+              <a:buFontTx/>
+              <a:buChar char="-"/>
+            </a:pPr>
+            <a:r>
+              <a:rPr lang="en-US" dirty="0"/>
+              <a:t>Describe</a:t>
+            </a:r>
+            <a:r>
+              <a:rPr lang="en-US" baseline="0" dirty="0"/>
+              <a:t> procedure of PPT Generation</a:t>
+            </a:r>
+          </a:p>
+          <a:p>
+            <a:pPr marL="171450" indent="-171450">
+              <a:buFontTx/>
+              <a:buChar char="-"/>
+            </a:pPr>
+            <a:r>
+              <a:rPr lang="en-US" baseline="0" dirty="0"/>
+              <a:t>    selection &amp; outline</a:t>
+            </a:r>
+          </a:p>
+          <a:p>
+            <a:pPr marL="171450" indent="-171450">
+              <a:buFontTx/>
+              <a:buChar char="-"/>
+            </a:pPr>
+            <a:r>
+              <a:rPr lang="en-US" baseline="0" dirty="0"/>
+              <a:t>    customer meeting (Tomm)</a:t>
+            </a:r>
+          </a:p>
+          <a:p>
+            <a:pPr marL="171450" indent="-171450">
+              <a:buFontTx/>
+              <a:buChar char="-"/>
+            </a:pPr>
+            <a:r>
+              <a:rPr lang="en-US" baseline="0" dirty="0"/>
+              <a:t>    mentor advise (Tom, Father)</a:t>
+            </a:r>
+          </a:p>
+          <a:p>
+            <a:pPr marL="171450" indent="-171450">
+              <a:buFontTx/>
+              <a:buChar char="-"/>
+            </a:pPr>
+            <a:r>
+              <a:rPr lang="en-US" baseline="0" dirty="0"/>
+              <a:t>    outline</a:t>
+            </a:r>
+          </a:p>
+          <a:p>
+            <a:pPr marL="171450" indent="-171450">
+              <a:buFontTx/>
+              <a:buChar char="-"/>
+            </a:pPr>
+            <a:r>
+              <a:rPr lang="en-US" baseline="0" dirty="0"/>
+              <a:t>    </a:t>
+            </a:r>
+            <a:r>
+              <a:rPr lang="en-US" baseline="0"/>
+              <a:t>find template</a:t>
+            </a:r>
+            <a:endParaRPr lang="en-US" baseline="0" dirty="0"/>
+          </a:p>
+        </p:txBody>
+      </p:sp>
+      <p:sp>
+        <p:nvSpPr>
+          <p:cNvPr id="4" name="Slide Number Placeholder 3"/>
+          <p:cNvSpPr>
+            <a:spLocks noGrp="1"/>
+          </p:cNvSpPr>
+          <p:nvPr>
+            <p:ph type="sldNum" sz="quarter" idx="10"/>
+          </p:nvPr>
+        </p:nvSpPr>
+        <p:spPr/>
+        <p:txBody>
+          <a:bodyPr/>
+          <a:lstStyle/>
+          <a:p>
+            <a:fld id="{4AC65D0B-F732-4E21-9A8D-1C6A15A6A84B}" type="slidenum">
+              <a:rPr lang="en-US" smtClean="0"/>
+              <a:t>9</a:t>
+            </a:fld>
+            <a:endParaRPr lang="en-US" dirty="0"/>
+          </a:p>
+        </p:txBody>
+      </p:sp>
+    </p:spTree>
+    <p:extLst>
+      <p:ext uri="{BB962C8B-B14F-4D97-AF65-F5344CB8AC3E}">
+        <p14:creationId xmlns:p14="http://schemas.microsoft.com/office/powerpoint/2010/main" val="2892680826"/>
       </p:ext>
     </p:extLst>
   </p:cSld>
@@ -4100,6 +5070,89 @@
 </p:sld>
 </file>
 
+<file path=ppt/slides/slide11.xml><?xml version="1.0" encoding="utf-8"?>
+<p:sld xmlns:a="http://schemas.openxmlformats.org/drawingml/2006/main" xmlns:r="http://schemas.openxmlformats.org/officeDocument/2006/relationships" xmlns:p="http://schemas.openxmlformats.org/presentationml/2006/main">
+  <p:cSld>
+    <p:spTree>
+      <p:nvGrpSpPr>
+        <p:cNvPr id="1" name=""/>
+        <p:cNvGrpSpPr/>
+        <p:nvPr/>
+      </p:nvGrpSpPr>
+      <p:grpSpPr>
+        <a:xfrm>
+          <a:off x="0" y="0"/>
+          <a:ext cx="0" cy="0"/>
+          <a:chOff x="0" y="0"/>
+          <a:chExt cx="0" cy="0"/>
+        </a:xfrm>
+      </p:grpSpPr>
+      <p:sp>
+        <p:nvSpPr>
+          <p:cNvPr id="2" name="Title 1">
+            <a:extLst>
+              <a:ext uri="{FF2B5EF4-FFF2-40B4-BE49-F238E27FC236}">
+                <a16:creationId xmlns:a16="http://schemas.microsoft.com/office/drawing/2014/main" id="{30D8BA34-68B4-477E-AA56-8A4413D45AC9}"/>
+              </a:ext>
+            </a:extLst>
+          </p:cNvPr>
+          <p:cNvSpPr>
+            <a:spLocks noGrp="1"/>
+          </p:cNvSpPr>
+          <p:nvPr>
+            <p:ph type="title"/>
+          </p:nvPr>
+        </p:nvSpPr>
+        <p:spPr/>
+        <p:txBody>
+          <a:bodyPr/>
+          <a:lstStyle/>
+          <a:p>
+            <a:r>
+              <a:rPr lang="en-US" dirty="0"/>
+              <a:t>_Notes_</a:t>
+            </a:r>
+          </a:p>
+        </p:txBody>
+      </p:sp>
+      <p:sp>
+        <p:nvSpPr>
+          <p:cNvPr id="3" name="Content Placeholder 2">
+            <a:extLst>
+              <a:ext uri="{FF2B5EF4-FFF2-40B4-BE49-F238E27FC236}">
+                <a16:creationId xmlns:a16="http://schemas.microsoft.com/office/drawing/2014/main" id="{F80EC028-51B1-4DE2-B579-B7B5745BC933}"/>
+              </a:ext>
+            </a:extLst>
+          </p:cNvPr>
+          <p:cNvSpPr>
+            <a:spLocks noGrp="1"/>
+          </p:cNvSpPr>
+          <p:nvPr>
+            <p:ph idx="1"/>
+          </p:nvPr>
+        </p:nvSpPr>
+        <p:spPr/>
+        <p:txBody>
+          <a:bodyPr/>
+          <a:lstStyle/>
+          <a:p>
+            <a:endParaRPr lang="en-US"/>
+          </a:p>
+        </p:txBody>
+      </p:sp>
+    </p:spTree>
+    <p:extLst>
+      <p:ext uri="{BB962C8B-B14F-4D97-AF65-F5344CB8AC3E}">
+        <p14:creationId xmlns:p14="http://schemas.microsoft.com/office/powerpoint/2010/main" val="2109186630"/>
+      </p:ext>
+    </p:extLst>
+  </p:cSld>
+  <p:clrMapOvr>
+    <a:masterClrMapping/>
+  </p:clrMapOvr>
+</p:sld>
+</file>
+
 <file path=ppt/slides/slide2.xml><?xml version="1.0" encoding="utf-8"?>
 <p:sld xmlns:a="http://schemas.openxmlformats.org/drawingml/2006/main" xmlns:r="http://schemas.openxmlformats.org/officeDocument/2006/relationships" xmlns:p="http://schemas.openxmlformats.org/presentationml/2006/main">
   <p:cSld>
@@ -4147,34 +5200,61 @@
                 <a:ea typeface="+mj-ea"/>
                 <a:cs typeface="+mj-cs"/>
               </a:rPr>
-              <a:t>Challenges &amp; Needs</a:t>
-            </a:r>
+              <a:t>Customer Request,</a:t>
+            </a:r>
+            <a:r>
+              <a:rPr lang="en-US" sz="4400" b="0" i="0" u="none" strike="noStrike" kern="1200" dirty="0">
+                <a:solidFill>
+                  <a:schemeClr val="tx1"/>
+                </a:solidFill>
+                <a:latin typeface="+mj-lt"/>
+                <a:ea typeface="+mj-ea"/>
+                <a:cs typeface="+mj-cs"/>
+              </a:rPr>
+              <a:t> </a:t>
+            </a:r>
+            <a:r>
+              <a:rPr lang="en-US" sz="2800" b="0" i="0" u="none" strike="noStrike" kern="1200" dirty="0">
+                <a:solidFill>
+                  <a:schemeClr val="tx1"/>
+                </a:solidFill>
+              </a:rPr>
+              <a:t>Needs &amp; </a:t>
+            </a:r>
+            <a:r>
+              <a:rPr lang="en-US" sz="2800" b="0" i="0" u="none" strike="noStrike" kern="1200" baseline="0" dirty="0">
+                <a:solidFill>
+                  <a:schemeClr val="tx1"/>
+                </a:solidFill>
+              </a:rPr>
+              <a:t>Challenges</a:t>
+            </a:r>
+            <a:endParaRPr lang="en-US" sz="2800" dirty="0"/>
+          </a:p>
+        </p:txBody>
+      </p:sp>
+      <p:sp>
+        <p:nvSpPr>
+          <p:cNvPr id="3" name="Content Placeholder 2">
+            <a:extLst>
+              <a:ext uri="{FF2B5EF4-FFF2-40B4-BE49-F238E27FC236}">
+                <a16:creationId xmlns:a16="http://schemas.microsoft.com/office/drawing/2014/main" id="{044B4F6E-A639-47F4-91A5-68807265D618}"/>
+              </a:ext>
+            </a:extLst>
+          </p:cNvPr>
+          <p:cNvSpPr>
+            <a:spLocks noGrp="1"/>
+          </p:cNvSpPr>
+          <p:nvPr>
+            <p:ph idx="1"/>
+          </p:nvPr>
+        </p:nvSpPr>
+        <p:spPr/>
+        <p:txBody>
+          <a:bodyPr/>
+          <a:lstStyle/>
+          <a:p>
             <a:endParaRPr lang="en-US" dirty="0"/>
-          </a:p>
-        </p:txBody>
-      </p:sp>
-      <p:sp>
-        <p:nvSpPr>
-          <p:cNvPr id="3" name="Content Placeholder 2">
-            <a:extLst>
-              <a:ext uri="{FF2B5EF4-FFF2-40B4-BE49-F238E27FC236}">
-                <a16:creationId xmlns:a16="http://schemas.microsoft.com/office/drawing/2014/main" id="{044B4F6E-A639-47F4-91A5-68807265D618}"/>
-              </a:ext>
-            </a:extLst>
-          </p:cNvPr>
-          <p:cNvSpPr>
-            <a:spLocks noGrp="1"/>
-          </p:cNvSpPr>
-          <p:nvPr>
-            <p:ph idx="1"/>
-          </p:nvPr>
-        </p:nvSpPr>
-        <p:spPr/>
-        <p:txBody>
-          <a:bodyPr/>
-          <a:lstStyle/>
-          <a:p>
-            <a:endParaRPr lang="en-US"/>
           </a:p>
         </p:txBody>
       </p:sp>

</xml_diff>

<commit_message>
(C)    outline notes for all slides
</commit_message>
<xml_diff>
--- a/Suppl/Pivotal Presentation - DTECTS.pptx
+++ b/Suppl/Pivotal Presentation - DTECTS.pptx
@@ -5,20 +5,21 @@
     <p:sldMasterId id="2147483648" r:id="rId1"/>
   </p:sldMasterIdLst>
   <p:notesMasterIdLst>
-    <p:notesMasterId r:id="rId13"/>
+    <p:notesMasterId r:id="rId14"/>
   </p:notesMasterIdLst>
   <p:sldIdLst>
     <p:sldId id="257" r:id="rId2"/>
     <p:sldId id="259" r:id="rId3"/>
-    <p:sldId id="261" r:id="rId4"/>
-    <p:sldId id="263" r:id="rId5"/>
-    <p:sldId id="265" r:id="rId6"/>
-    <p:sldId id="267" r:id="rId7"/>
-    <p:sldId id="262" r:id="rId8"/>
-    <p:sldId id="273" r:id="rId9"/>
-    <p:sldId id="274" r:id="rId10"/>
-    <p:sldId id="276" r:id="rId11"/>
-    <p:sldId id="278" r:id="rId12"/>
+    <p:sldId id="279" r:id="rId4"/>
+    <p:sldId id="261" r:id="rId5"/>
+    <p:sldId id="263" r:id="rId6"/>
+    <p:sldId id="265" r:id="rId7"/>
+    <p:sldId id="267" r:id="rId8"/>
+    <p:sldId id="262" r:id="rId9"/>
+    <p:sldId id="273" r:id="rId10"/>
+    <p:sldId id="274" r:id="rId11"/>
+    <p:sldId id="276" r:id="rId12"/>
+    <p:sldId id="278" r:id="rId13"/>
   </p:sldIdLst>
   <p:sldSz cx="12192000" cy="6858000"/>
   <p:notesSz cx="6858000" cy="9144000"/>
@@ -555,7 +556,7 @@
             </a:r>
             <a:r>
               <a:rPr lang="en-US" dirty="0"/>
-              <a:t>Needs                (</a:t>
+              <a:t>Needs                 (</a:t>
             </a:r>
             <a:r>
               <a:rPr lang="en-US" sz="1200" b="0" i="0" u="none" strike="noStrike" kern="1200" baseline="0" dirty="0">
@@ -579,7 +580,7 @@
                 <a:ea typeface="+mn-ea"/>
                 <a:cs typeface="+mn-cs"/>
               </a:rPr>
-              <a:t>  2 Design Procedure                    (2)</a:t>
+              <a:t>  2 Design Procedure                     (2)</a:t>
             </a:r>
           </a:p>
           <a:p>
@@ -592,7 +593,7 @@
                 <a:ea typeface="+mn-ea"/>
                 <a:cs typeface="+mn-cs"/>
               </a:rPr>
-              <a:t>  3 Development Methodology    (3)</a:t>
+              <a:t>  3 Development Methodology     (3)</a:t>
             </a:r>
           </a:p>
           <a:p>
@@ -605,7 +606,7 @@
                 <a:ea typeface="+mn-ea"/>
                 <a:cs typeface="+mn-cs"/>
               </a:rPr>
-              <a:t>  4 Overcome Challenges             (1)</a:t>
+              <a:t>  4 Overcome Challenges              (1)</a:t>
             </a:r>
           </a:p>
           <a:p>
@@ -618,7 +619,7 @@
                 <a:ea typeface="+mn-ea"/>
                 <a:cs typeface="+mn-cs"/>
               </a:rPr>
-              <a:t>  5 Deliverable &amp; Results              (2)</a:t>
+              <a:t>  5 Deliverable &amp; Results               (2)</a:t>
             </a:r>
           </a:p>
           <a:p>
@@ -631,7 +632,7 @@
                 <a:ea typeface="+mn-ea"/>
                 <a:cs typeface="+mn-cs"/>
               </a:rPr>
-              <a:t>  6 Learnings &amp; Growths              (1)</a:t>
+              <a:t>  6 Learnings &amp; Growths	      (1)</a:t>
             </a:r>
           </a:p>
           <a:p>
@@ -670,7 +671,7 @@
                 <a:ea typeface="+mn-ea"/>
                 <a:cs typeface="+mn-cs"/>
               </a:rPr>
-              <a:t>  9 Pivotal Value Statement (M)  (1)</a:t>
+              <a:t>  9 Pivotal Value Statement (M)    (1)</a:t>
             </a:r>
           </a:p>
           <a:p>
@@ -683,7 +684,56 @@
                 <a:ea typeface="+mn-ea"/>
                 <a:cs typeface="+mn-cs"/>
               </a:rPr>
-              <a:t>                                             Total  (13)</a:t>
+              <a:t>                                          Total  (13)</a:t>
+            </a:r>
+          </a:p>
+          <a:p>
+            <a:endParaRPr lang="en-US" sz="1200" b="0" i="0" u="none" strike="noStrike" kern="1200" baseline="0" dirty="0">
+              <a:solidFill>
+                <a:schemeClr val="tx1"/>
+              </a:solidFill>
+              <a:latin typeface="+mn-lt"/>
+              <a:ea typeface="+mn-ea"/>
+              <a:cs typeface="+mn-cs"/>
+            </a:endParaRPr>
+          </a:p>
+          <a:p>
+            <a:r>
+              <a:rPr lang="en-US" sz="1200" b="0" i="0" u="none" strike="noStrike" kern="1200" baseline="0" dirty="0">
+                <a:solidFill>
+                  <a:schemeClr val="tx1"/>
+                </a:solidFill>
+                <a:latin typeface="+mn-lt"/>
+                <a:ea typeface="+mn-ea"/>
+                <a:cs typeface="+mn-cs"/>
+              </a:rPr>
+              <a:t>Rules</a:t>
+            </a:r>
+          </a:p>
+          <a:p>
+            <a:r>
+              <a:rPr lang="en-US" sz="1200" b="0" i="0" u="none" strike="noStrike" kern="1200" baseline="0" dirty="0">
+                <a:solidFill>
+                  <a:schemeClr val="tx1"/>
+                </a:solidFill>
+                <a:latin typeface="+mn-lt"/>
+                <a:ea typeface="+mn-ea"/>
+                <a:cs typeface="+mn-cs"/>
+              </a:rPr>
+              <a:t>3 min / slide</a:t>
+            </a:r>
+          </a:p>
+          <a:p>
+            <a:r>
+              <a:rPr lang="en-US" sz="1200" b="0" i="0" u="none" strike="noStrike" kern="1200" baseline="0" dirty="0">
+                <a:solidFill>
+                  <a:schemeClr val="tx1"/>
+                </a:solidFill>
+                <a:latin typeface="+mn-lt"/>
+                <a:ea typeface="+mn-ea"/>
+                <a:cs typeface="+mn-cs"/>
+              </a:rPr>
+              <a:t>45 min presentation -&gt; 15 slides max</a:t>
             </a:r>
             <a:endParaRPr lang="en-US" dirty="0"/>
           </a:p>
@@ -769,21 +819,226 @@
           <a:bodyPr/>
           <a:lstStyle/>
           <a:p>
+            <a:pPr marL="171450" indent="-171450">
+              <a:buFontTx/>
+              <a:buChar char="-"/>
+            </a:pPr>
             <a:r>
               <a:rPr lang="en-US" dirty="0"/>
-              <a:t>*Integrate Tomm Notes</a:t>
-            </a:r>
-          </a:p>
-          <a:p>
+              <a:t>Frame, sketch w/vision</a:t>
+            </a:r>
+            <a:r>
+              <a:rPr lang="en-US" baseline="0" dirty="0"/>
+              <a:t> &amp; intent, draft</a:t>
+            </a:r>
+          </a:p>
+          <a:p>
+            <a:pPr marL="171450" indent="-171450">
+              <a:buFontTx/>
+              <a:buChar char="-"/>
+            </a:pPr>
+            <a:r>
+              <a:rPr lang="en-US" baseline="0" dirty="0"/>
+              <a:t>Source control &amp; procedure!</a:t>
+            </a:r>
+          </a:p>
+          <a:p>
+            <a:pPr marL="171450" indent="-171450">
+              <a:buFontTx/>
+              <a:buChar char="-"/>
+            </a:pPr>
+            <a:r>
+              <a:rPr lang="en-US" baseline="0" dirty="0"/>
+              <a:t>Help from experience (Tomm, Terry, Father)</a:t>
+            </a:r>
+          </a:p>
+          <a:p>
+            <a:pPr marL="171450" indent="-171450">
+              <a:buFontTx/>
+              <a:buChar char="-"/>
+            </a:pPr>
             <a:r>
               <a:rPr lang="en-US" dirty="0"/>
-              <a:t>*Form</a:t>
+              <a:t>Describe</a:t>
             </a:r>
             <a:r>
               <a:rPr lang="en-US" baseline="0" dirty="0"/>
-              <a:t> rules &amp; presentation target</a:t>
-            </a:r>
+              <a:t> procedure of PPT Generation</a:t>
+            </a:r>
+          </a:p>
+          <a:p>
+            <a:pPr marL="171450" indent="-171450">
+              <a:buFontTx/>
+              <a:buChar char="-"/>
+            </a:pPr>
+            <a:r>
+              <a:rPr lang="en-US" baseline="0" dirty="0"/>
+              <a:t>    selection &amp; outline</a:t>
+            </a:r>
+          </a:p>
+          <a:p>
+            <a:pPr marL="171450" indent="-171450">
+              <a:buFontTx/>
+              <a:buChar char="-"/>
+            </a:pPr>
+            <a:r>
+              <a:rPr lang="en-US" baseline="0" dirty="0"/>
+              <a:t>    customer meeting (Tomm)</a:t>
+            </a:r>
+          </a:p>
+          <a:p>
+            <a:pPr marL="171450" indent="-171450">
+              <a:buFontTx/>
+              <a:buChar char="-"/>
+            </a:pPr>
+            <a:r>
+              <a:rPr lang="en-US" baseline="0" dirty="0"/>
+              <a:t>    mentor advise (Tom, Father)</a:t>
+            </a:r>
+          </a:p>
+          <a:p>
+            <a:pPr marL="171450" indent="-171450">
+              <a:buFontTx/>
+              <a:buChar char="-"/>
+            </a:pPr>
+            <a:r>
+              <a:rPr lang="en-US" baseline="0" dirty="0"/>
+              <a:t>    outline</a:t>
+            </a:r>
+          </a:p>
+          <a:p>
+            <a:pPr marL="171450" indent="-171450">
+              <a:buFontTx/>
+              <a:buChar char="-"/>
+            </a:pPr>
+            <a:r>
+              <a:rPr lang="en-US" baseline="0" dirty="0"/>
+              <a:t>    find template</a:t>
+            </a:r>
+          </a:p>
+          <a:p>
             <a:endParaRPr lang="en-US" dirty="0"/>
+          </a:p>
+        </p:txBody>
+      </p:sp>
+      <p:sp>
+        <p:nvSpPr>
+          <p:cNvPr id="4" name="Slide Number Placeholder 3"/>
+          <p:cNvSpPr>
+            <a:spLocks noGrp="1"/>
+          </p:cNvSpPr>
+          <p:nvPr>
+            <p:ph type="sldNum" sz="quarter" idx="10"/>
+          </p:nvPr>
+        </p:nvSpPr>
+        <p:spPr/>
+        <p:txBody>
+          <a:bodyPr/>
+          <a:lstStyle/>
+          <a:p>
+            <a:fld id="{6361AABB-628C-496F-B0CB-A3FDC087FD3D}" type="slidenum">
+              <a:rPr lang="en-US" smtClean="0"/>
+              <a:t>10</a:t>
+            </a:fld>
+            <a:endParaRPr lang="en-US"/>
+          </a:p>
+        </p:txBody>
+      </p:sp>
+    </p:spTree>
+    <p:extLst>
+      <p:ext uri="{BB962C8B-B14F-4D97-AF65-F5344CB8AC3E}">
+        <p14:creationId xmlns:p14="http://schemas.microsoft.com/office/powerpoint/2010/main" val="2520438497"/>
+      </p:ext>
+    </p:extLst>
+  </p:cSld>
+  <p:clrMapOvr>
+    <a:masterClrMapping/>
+  </p:clrMapOvr>
+</p:notes>
+</file>
+
+<file path=ppt/notesSlides/notesSlide11.xml><?xml version="1.0" encoding="utf-8"?>
+<p:notes xmlns:a="http://schemas.openxmlformats.org/drawingml/2006/main" xmlns:r="http://schemas.openxmlformats.org/officeDocument/2006/relationships" xmlns:p="http://schemas.openxmlformats.org/presentationml/2006/main">
+  <p:cSld>
+    <p:spTree>
+      <p:nvGrpSpPr>
+        <p:cNvPr id="1" name=""/>
+        <p:cNvGrpSpPr/>
+        <p:nvPr/>
+      </p:nvGrpSpPr>
+      <p:grpSpPr>
+        <a:xfrm>
+          <a:off x="0" y="0"/>
+          <a:ext cx="0" cy="0"/>
+          <a:chOff x="0" y="0"/>
+          <a:chExt cx="0" cy="0"/>
+        </a:xfrm>
+      </p:grpSpPr>
+      <p:sp>
+        <p:nvSpPr>
+          <p:cNvPr id="2" name="Slide Image Placeholder 1"/>
+          <p:cNvSpPr>
+            <a:spLocks noGrp="1" noRot="1" noChangeAspect="1"/>
+          </p:cNvSpPr>
+          <p:nvPr>
+            <p:ph type="sldImg"/>
+          </p:nvPr>
+        </p:nvSpPr>
+        <p:spPr/>
+      </p:sp>
+      <p:sp>
+        <p:nvSpPr>
+          <p:cNvPr id="3" name="Notes Placeholder 2"/>
+          <p:cNvSpPr>
+            <a:spLocks noGrp="1"/>
+          </p:cNvSpPr>
+          <p:nvPr>
+            <p:ph type="body" idx="1"/>
+          </p:nvPr>
+        </p:nvSpPr>
+        <p:spPr/>
+        <p:txBody>
+          <a:bodyPr/>
+          <a:lstStyle/>
+          <a:p>
+            <a:pPr marL="171450" indent="-171450">
+              <a:buFontTx/>
+              <a:buChar char="-"/>
+            </a:pPr>
+            <a:r>
+              <a:rPr lang="en-US" dirty="0"/>
+              <a:t>Board Design</a:t>
+            </a:r>
+          </a:p>
+          <a:p>
+            <a:pPr marL="171450" indent="-171450">
+              <a:buFontTx/>
+              <a:buChar char="-"/>
+            </a:pPr>
+            <a:r>
+              <a:rPr lang="en-US" dirty="0"/>
+              <a:t>Board Fab &amp; Validate</a:t>
+            </a:r>
+          </a:p>
+          <a:p>
+            <a:pPr marL="171450" indent="-171450">
+              <a:buFontTx/>
+              <a:buChar char="-"/>
+            </a:pPr>
+            <a:r>
+              <a:rPr lang="en-US" dirty="0"/>
+              <a:t>Firmware</a:t>
+            </a:r>
+          </a:p>
+          <a:p>
+            <a:pPr marL="171450" indent="-171450">
+              <a:buFontTx/>
+              <a:buChar char="-"/>
+            </a:pPr>
+            <a:r>
+              <a:rPr lang="en-US" dirty="0"/>
+              <a:t>Rapid Prototyping</a:t>
+            </a:r>
           </a:p>
         </p:txBody>
       </p:sp>
@@ -805,6 +1060,104 @@
             <a:fld id="{4AC65D0B-F732-4E21-9A8D-1C6A15A6A84B}" type="slidenum">
               <a:rPr lang="en-US" smtClean="0"/>
               <a:t>11</a:t>
+            </a:fld>
+            <a:endParaRPr lang="en-US" dirty="0"/>
+          </a:p>
+        </p:txBody>
+      </p:sp>
+    </p:spTree>
+    <p:extLst>
+      <p:ext uri="{BB962C8B-B14F-4D97-AF65-F5344CB8AC3E}">
+        <p14:creationId xmlns:p14="http://schemas.microsoft.com/office/powerpoint/2010/main" val="3872874621"/>
+      </p:ext>
+    </p:extLst>
+  </p:cSld>
+  <p:clrMapOvr>
+    <a:masterClrMapping/>
+  </p:clrMapOvr>
+</p:notes>
+</file>
+
+<file path=ppt/notesSlides/notesSlide12.xml><?xml version="1.0" encoding="utf-8"?>
+<p:notes xmlns:a="http://schemas.openxmlformats.org/drawingml/2006/main" xmlns:r="http://schemas.openxmlformats.org/officeDocument/2006/relationships" xmlns:p="http://schemas.openxmlformats.org/presentationml/2006/main">
+  <p:cSld>
+    <p:spTree>
+      <p:nvGrpSpPr>
+        <p:cNvPr id="1" name=""/>
+        <p:cNvGrpSpPr/>
+        <p:nvPr/>
+      </p:nvGrpSpPr>
+      <p:grpSpPr>
+        <a:xfrm>
+          <a:off x="0" y="0"/>
+          <a:ext cx="0" cy="0"/>
+          <a:chOff x="0" y="0"/>
+          <a:chExt cx="0" cy="0"/>
+        </a:xfrm>
+      </p:grpSpPr>
+      <p:sp>
+        <p:nvSpPr>
+          <p:cNvPr id="2" name="Slide Image Placeholder 1"/>
+          <p:cNvSpPr>
+            <a:spLocks noGrp="1" noRot="1" noChangeAspect="1"/>
+          </p:cNvSpPr>
+          <p:nvPr>
+            <p:ph type="sldImg"/>
+          </p:nvPr>
+        </p:nvSpPr>
+        <p:spPr/>
+      </p:sp>
+      <p:sp>
+        <p:nvSpPr>
+          <p:cNvPr id="3" name="Notes Placeholder 2"/>
+          <p:cNvSpPr>
+            <a:spLocks noGrp="1"/>
+          </p:cNvSpPr>
+          <p:nvPr>
+            <p:ph type="body" idx="1"/>
+          </p:nvPr>
+        </p:nvSpPr>
+        <p:spPr/>
+        <p:txBody>
+          <a:bodyPr/>
+          <a:lstStyle/>
+          <a:p>
+            <a:r>
+              <a:rPr lang="en-US" dirty="0"/>
+              <a:t>*Integrate Tomm Notes</a:t>
+            </a:r>
+          </a:p>
+          <a:p>
+            <a:r>
+              <a:rPr lang="en-US" dirty="0"/>
+              <a:t>*Form</a:t>
+            </a:r>
+            <a:r>
+              <a:rPr lang="en-US" baseline="0" dirty="0"/>
+              <a:t> rules &amp; presentation target</a:t>
+            </a:r>
+            <a:endParaRPr lang="en-US" dirty="0"/>
+          </a:p>
+        </p:txBody>
+      </p:sp>
+      <p:sp>
+        <p:nvSpPr>
+          <p:cNvPr id="4" name="Slide Number Placeholder 3"/>
+          <p:cNvSpPr>
+            <a:spLocks noGrp="1"/>
+          </p:cNvSpPr>
+          <p:nvPr>
+            <p:ph type="sldNum" sz="quarter" idx="10"/>
+          </p:nvPr>
+        </p:nvSpPr>
+        <p:spPr/>
+        <p:txBody>
+          <a:bodyPr/>
+          <a:lstStyle/>
+          <a:p>
+            <a:fld id="{4AC65D0B-F732-4E21-9A8D-1C6A15A6A84B}" type="slidenum">
+              <a:rPr lang="en-US" smtClean="0"/>
+              <a:t>12</a:t>
             </a:fld>
             <a:endParaRPr lang="en-US" dirty="0"/>
           </a:p>
@@ -867,7 +1220,210 @@
           <a:bodyPr/>
           <a:lstStyle/>
           <a:p>
-            <a:endParaRPr lang="en-US"/>
+            <a:pPr marL="0" indent="0">
+              <a:buFontTx/>
+              <a:buNone/>
+            </a:pPr>
+            <a:r>
+              <a:rPr lang="en-US" dirty="0"/>
+              <a:t>Topics</a:t>
+            </a:r>
+          </a:p>
+          <a:p>
+            <a:pPr marL="171450" indent="-171450">
+              <a:buFontTx/>
+              <a:buChar char="-"/>
+            </a:pPr>
+            <a:r>
+              <a:rPr lang="en-US" dirty="0"/>
+              <a:t>Stabilized Firmware Architecture</a:t>
+            </a:r>
+          </a:p>
+          <a:p>
+            <a:pPr marL="628650" lvl="1" indent="-171450">
+              <a:buFontTx/>
+              <a:buChar char="-"/>
+            </a:pPr>
+            <a:r>
+              <a:rPr lang="en-US" dirty="0"/>
+              <a:t>OTM evaluate, path option identifications (Arduino, Python, OTM(C/C++), Lua, JavaScript)</a:t>
+            </a:r>
+          </a:p>
+          <a:p>
+            <a:pPr marL="171450" indent="-171450">
+              <a:buFontTx/>
+              <a:buChar char="-"/>
+            </a:pPr>
+            <a:r>
+              <a:rPr lang="en-US" dirty="0"/>
+              <a:t>Board Revisions</a:t>
+            </a:r>
+          </a:p>
+          <a:p>
+            <a:pPr marL="171450" indent="-171450">
+              <a:buFontTx/>
+              <a:buChar char="-"/>
+            </a:pPr>
+            <a:r>
+              <a:rPr lang="en-US" dirty="0"/>
+              <a:t>PoC Progression, Arduino towards release</a:t>
+            </a:r>
+          </a:p>
+          <a:p>
+            <a:pPr marL="171450" indent="-171450">
+              <a:buFontTx/>
+              <a:buChar char="-"/>
+            </a:pPr>
+            <a:r>
+              <a:rPr lang="en-US" dirty="0"/>
+              <a:t>Feature Integration</a:t>
+            </a:r>
+          </a:p>
+          <a:p>
+            <a:endParaRPr lang="en-US" dirty="0"/>
+          </a:p>
+          <a:p>
+            <a:pPr marL="0" indent="0">
+              <a:buFontTx/>
+              <a:buNone/>
+            </a:pPr>
+            <a:r>
+              <a:rPr lang="en-US" dirty="0"/>
+              <a:t>Features Proposed</a:t>
+            </a:r>
+          </a:p>
+          <a:p>
+            <a:pPr marL="171450" indent="-171450">
+              <a:buFontTx/>
+              <a:buChar char="-"/>
+            </a:pPr>
+            <a:r>
+              <a:rPr lang="en-US" dirty="0"/>
+              <a:t>Debug Port</a:t>
+            </a:r>
+          </a:p>
+          <a:p>
+            <a:pPr marL="171450" indent="-171450">
+              <a:buFontTx/>
+              <a:buChar char="-"/>
+            </a:pPr>
+            <a:r>
+              <a:rPr lang="en-US" dirty="0"/>
+              <a:t>Serial Port &amp; Module</a:t>
+            </a:r>
+          </a:p>
+          <a:p>
+            <a:pPr marL="171450" indent="-171450">
+              <a:buFontTx/>
+              <a:buChar char="-"/>
+            </a:pPr>
+            <a:r>
+              <a:rPr lang="en-US" dirty="0"/>
+              <a:t>Jumpers</a:t>
+            </a:r>
+          </a:p>
+          <a:p>
+            <a:pPr marL="171450" indent="-171450">
+              <a:buFontTx/>
+              <a:buChar char="-"/>
+            </a:pPr>
+            <a:r>
+              <a:rPr lang="en-US" dirty="0"/>
+              <a:t>JTAG</a:t>
+            </a:r>
+          </a:p>
+          <a:p>
+            <a:endParaRPr lang="en-US" dirty="0"/>
+          </a:p>
+          <a:p>
+            <a:r>
+              <a:rPr lang="en-US" dirty="0"/>
+              <a:t>Presentation Focus Points</a:t>
+            </a:r>
+          </a:p>
+          <a:p>
+            <a:pPr marL="171450" indent="-171450">
+              <a:buFontTx/>
+              <a:buChar char="-"/>
+            </a:pPr>
+            <a:r>
+              <a:rPr lang="en-US" dirty="0"/>
+              <a:t>Opportunity</a:t>
+            </a:r>
+          </a:p>
+          <a:p>
+            <a:pPr marL="171450" indent="-171450">
+              <a:buFontTx/>
+              <a:buChar char="-"/>
+            </a:pPr>
+            <a:r>
+              <a:rPr lang="en-US" dirty="0"/>
+              <a:t>Success &amp; Deliverable</a:t>
+            </a:r>
+          </a:p>
+          <a:p>
+            <a:pPr marL="171450" indent="-171450">
+              <a:buFontTx/>
+              <a:buChar char="-"/>
+            </a:pPr>
+            <a:r>
+              <a:rPr lang="en-US" dirty="0"/>
+              <a:t>Network &amp; Relationships</a:t>
+            </a:r>
+          </a:p>
+          <a:p>
+            <a:pPr marL="171450" indent="-171450">
+              <a:buFontTx/>
+              <a:buChar char="-"/>
+            </a:pPr>
+            <a:r>
+              <a:rPr lang="en-US" dirty="0"/>
+              <a:t>Learnings and Growth</a:t>
+            </a:r>
+          </a:p>
+          <a:p>
+            <a:pPr marL="171450" indent="-171450">
+              <a:buFontTx/>
+              <a:buChar char="-"/>
+            </a:pPr>
+            <a:endParaRPr lang="en-US" dirty="0"/>
+          </a:p>
+          <a:p>
+            <a:pPr marL="0" indent="0">
+              <a:buFontTx/>
+              <a:buNone/>
+            </a:pPr>
+            <a:r>
+              <a:rPr lang="en-US" dirty="0"/>
+              <a:t>Points to Share</a:t>
+            </a:r>
+          </a:p>
+          <a:p>
+            <a:pPr marL="171450" indent="-171450">
+              <a:buFontTx/>
+              <a:buChar char="-"/>
+            </a:pPr>
+            <a:r>
+              <a:rPr lang="en-US" dirty="0"/>
+              <a:t>Success of work</a:t>
+            </a:r>
+          </a:p>
+          <a:p>
+            <a:pPr marL="171450" indent="-171450">
+              <a:buFontTx/>
+              <a:buChar char="-"/>
+            </a:pPr>
+            <a:r>
+              <a:rPr lang="en-US" dirty="0"/>
+              <a:t>Highlight Hardware Experience</a:t>
+            </a:r>
+            <a:br>
+              <a:rPr lang="en-US" dirty="0"/>
+            </a:br>
+            <a:r>
+              <a:rPr lang="en-US" dirty="0"/>
+              <a:t>Show direct value to team, by example</a:t>
+            </a:r>
           </a:p>
         </p:txBody>
       </p:sp>
@@ -951,7 +1507,54 @@
           <a:bodyPr/>
           <a:lstStyle/>
           <a:p>
-            <a:endParaRPr lang="en-US"/>
+            <a:pPr marL="171450" indent="-171450">
+              <a:buFontTx/>
+              <a:buChar char="-"/>
+            </a:pPr>
+            <a:r>
+              <a:rPr lang="en-US" dirty="0"/>
+              <a:t>What it is</a:t>
+            </a:r>
+          </a:p>
+          <a:p>
+            <a:pPr marL="171450" indent="-171450">
+              <a:buFontTx/>
+              <a:buChar char="-"/>
+            </a:pPr>
+            <a:r>
+              <a:rPr lang="en-US" dirty="0"/>
+              <a:t>Who uses it</a:t>
+            </a:r>
+          </a:p>
+          <a:p>
+            <a:pPr marL="171450" indent="-171450">
+              <a:buFontTx/>
+              <a:buChar char="-"/>
+            </a:pPr>
+            <a:r>
+              <a:rPr lang="en-US" dirty="0"/>
+              <a:t>Where it is going</a:t>
+            </a:r>
+          </a:p>
+          <a:p>
+            <a:pPr marL="171450" indent="-171450">
+              <a:buFontTx/>
+              <a:buChar char="-"/>
+            </a:pPr>
+            <a:r>
+              <a:rPr lang="en-US" dirty="0"/>
+              <a:t>Why Tomm picked on &amp; motion established</a:t>
+            </a:r>
+          </a:p>
+          <a:p>
+            <a:pPr marL="171450" indent="-171450">
+              <a:buFontTx/>
+              <a:buChar char="-"/>
+            </a:pPr>
+            <a:r>
+              <a:rPr lang="en-US" dirty="0"/>
+              <a:t>What it brought to Tomm’s project</a:t>
+            </a:r>
           </a:p>
         </p:txBody>
       </p:sp>
@@ -970,18 +1573,18 @@
           <a:bodyPr/>
           <a:lstStyle/>
           <a:p>
-            <a:fld id="{4AC65D0B-F732-4E21-9A8D-1C6A15A6A84B}" type="slidenum">
+            <a:fld id="{6361AABB-628C-496F-B0CB-A3FDC087FD3D}" type="slidenum">
               <a:rPr lang="en-US" smtClean="0"/>
               <a:t>3</a:t>
             </a:fld>
-            <a:endParaRPr lang="en-US" dirty="0"/>
+            <a:endParaRPr lang="en-US"/>
           </a:p>
         </p:txBody>
       </p:sp>
     </p:spTree>
     <p:extLst>
       <p:ext uri="{BB962C8B-B14F-4D97-AF65-F5344CB8AC3E}">
-        <p14:creationId xmlns:p14="http://schemas.microsoft.com/office/powerpoint/2010/main" val="3333099726"/>
+        <p14:creationId xmlns:p14="http://schemas.microsoft.com/office/powerpoint/2010/main" val="2194817254"/>
       </p:ext>
     </p:extLst>
   </p:cSld>
@@ -1035,7 +1638,44 @@
           <a:bodyPr/>
           <a:lstStyle/>
           <a:p>
-            <a:endParaRPr lang="en-US"/>
+            <a:pPr marL="171450" indent="-171450">
+              <a:buFontTx/>
+              <a:buChar char="-"/>
+            </a:pPr>
+            <a:r>
+              <a:rPr lang="en-US" dirty="0"/>
+              <a:t>Needs Identification</a:t>
+            </a:r>
+          </a:p>
+          <a:p>
+            <a:pPr marL="171450" indent="-171450">
+              <a:buFontTx/>
+              <a:buChar char="-"/>
+            </a:pPr>
+            <a:r>
+              <a:rPr lang="en-US" dirty="0"/>
+              <a:t>Firmware Development</a:t>
+            </a:r>
+          </a:p>
+          <a:p>
+            <a:pPr marL="171450" indent="-171450">
+              <a:buFontTx/>
+              <a:buChar char="-"/>
+            </a:pPr>
+            <a:r>
+              <a:rPr lang="en-US" dirty="0"/>
+              <a:t>Board Development</a:t>
+            </a:r>
+          </a:p>
+          <a:p>
+            <a:pPr marL="171450" indent="-171450">
+              <a:buFontTx/>
+              <a:buChar char="-"/>
+            </a:pPr>
+            <a:r>
+              <a:rPr lang="en-US" dirty="0"/>
+              <a:t>Contract Completion &amp; Transfer</a:t>
+            </a:r>
           </a:p>
         </p:txBody>
       </p:sp>
@@ -1065,7 +1705,7 @@
     </p:spTree>
     <p:extLst>
       <p:ext uri="{BB962C8B-B14F-4D97-AF65-F5344CB8AC3E}">
-        <p14:creationId xmlns:p14="http://schemas.microsoft.com/office/powerpoint/2010/main" val="204800194"/>
+        <p14:creationId xmlns:p14="http://schemas.microsoft.com/office/powerpoint/2010/main" val="3333099726"/>
       </p:ext>
     </p:extLst>
   </p:cSld>
@@ -1119,7 +1759,84 @@
           <a:bodyPr/>
           <a:lstStyle/>
           <a:p>
-            <a:endParaRPr lang="en-US"/>
+            <a:pPr marL="171450" indent="-171450">
+              <a:buFontTx/>
+              <a:buChar char="-"/>
+            </a:pPr>
+            <a:r>
+              <a:rPr lang="en-US" dirty="0"/>
+              <a:t>Documentation</a:t>
+            </a:r>
+          </a:p>
+          <a:p>
+            <a:pPr marL="171450" indent="-171450">
+              <a:buFontTx/>
+              <a:buChar char="-"/>
+            </a:pPr>
+            <a:r>
+              <a:rPr lang="en-US" dirty="0"/>
+              <a:t>Presentation</a:t>
+            </a:r>
+          </a:p>
+          <a:p>
+            <a:pPr marL="171450" indent="-171450">
+              <a:buFontTx/>
+              <a:buChar char="-"/>
+            </a:pPr>
+            <a:r>
+              <a:rPr lang="en-US" dirty="0"/>
+              <a:t>Code Syntax</a:t>
+            </a:r>
+          </a:p>
+          <a:p>
+            <a:pPr marL="171450" indent="-171450">
+              <a:buFontTx/>
+              <a:buChar char="-"/>
+            </a:pPr>
+            <a:r>
+              <a:rPr lang="en-US" dirty="0"/>
+              <a:t>Development Validation</a:t>
+            </a:r>
+          </a:p>
+          <a:p>
+            <a:pPr marL="171450" indent="-171450">
+              <a:buFontTx/>
+              <a:buChar char="-"/>
+            </a:pPr>
+            <a:r>
+              <a:rPr lang="en-US" dirty="0"/>
+              <a:t>PoC Form</a:t>
+            </a:r>
+          </a:p>
+          <a:p>
+            <a:pPr marL="171450" indent="-171450">
+              <a:buFontTx/>
+              <a:buChar char="-"/>
+            </a:pPr>
+            <a:r>
+              <a:rPr lang="en-US" dirty="0"/>
+              <a:t>Schematic Examples</a:t>
+            </a:r>
+          </a:p>
+          <a:p>
+            <a:pPr marL="171450" indent="-171450">
+              <a:buFontTx/>
+              <a:buChar char="-"/>
+            </a:pPr>
+            <a:r>
+              <a:rPr lang="en-US" dirty="0"/>
+              <a:t>Content Transfer to Ergsense</a:t>
+            </a:r>
+          </a:p>
+          <a:p>
+            <a:pPr marL="171450" indent="-171450">
+              <a:buFontTx/>
+              <a:buChar char="-"/>
+            </a:pPr>
+            <a:r>
+              <a:rPr lang="en-US" dirty="0"/>
+              <a:t>Revision Control</a:t>
+            </a:r>
           </a:p>
         </p:txBody>
       </p:sp>
@@ -1140,7 +1857,7 @@
           <a:p>
             <a:fld id="{4AC65D0B-F732-4E21-9A8D-1C6A15A6A84B}" type="slidenum">
               <a:rPr lang="en-US" smtClean="0"/>
-              <a:t>6</a:t>
+              <a:t>5</a:t>
             </a:fld>
             <a:endParaRPr lang="en-US" dirty="0"/>
           </a:p>
@@ -1149,7 +1866,7 @@
     </p:spTree>
     <p:extLst>
       <p:ext uri="{BB962C8B-B14F-4D97-AF65-F5344CB8AC3E}">
-        <p14:creationId xmlns:p14="http://schemas.microsoft.com/office/powerpoint/2010/main" val="2781359423"/>
+        <p14:creationId xmlns:p14="http://schemas.microsoft.com/office/powerpoint/2010/main" val="204800194"/>
       </p:ext>
     </p:extLst>
   </p:cSld>
@@ -1203,37 +1920,74 @@
           <a:bodyPr/>
           <a:lstStyle/>
           <a:p>
+            <a:pPr marL="171450" indent="-171450">
+              <a:buFontTx/>
+              <a:buChar char="-"/>
+            </a:pPr>
+            <a:r>
+              <a:rPr lang="en-US" dirty="0"/>
+              <a:t>Unmet customer needs</a:t>
+            </a:r>
+          </a:p>
+          <a:p>
+            <a:pPr marL="171450" indent="-171450">
+              <a:buFontTx/>
+              <a:buChar char="-"/>
+            </a:pPr>
+            <a:r>
+              <a:rPr lang="en-US" dirty="0"/>
+              <a:t>Work scope identification</a:t>
+            </a:r>
+          </a:p>
+          <a:p>
+            <a:pPr marL="171450" indent="-171450">
+              <a:buFontTx/>
+              <a:buChar char="-"/>
+            </a:pPr>
+            <a:r>
+              <a:rPr lang="en-US" dirty="0"/>
+              <a:t>Espressif</a:t>
+            </a:r>
+          </a:p>
+          <a:p>
+            <a:pPr marL="171450" indent="-171450">
+              <a:buFontTx/>
+              <a:buChar char="-"/>
+            </a:pPr>
+            <a:r>
+              <a:rPr lang="en-US" dirty="0"/>
+              <a:t>Satisfying ambitious, abstract design needs</a:t>
+            </a:r>
+          </a:p>
+        </p:txBody>
+      </p:sp>
+      <p:sp>
+        <p:nvSpPr>
+          <p:cNvPr id="4" name="Slide Number Placeholder 3"/>
+          <p:cNvSpPr>
+            <a:spLocks noGrp="1"/>
+          </p:cNvSpPr>
+          <p:nvPr>
+            <p:ph type="sldNum" sz="quarter" idx="10"/>
+          </p:nvPr>
+        </p:nvSpPr>
+        <p:spPr/>
+        <p:txBody>
+          <a:bodyPr/>
+          <a:lstStyle/>
+          <a:p>
+            <a:fld id="{6361AABB-628C-496F-B0CB-A3FDC087FD3D}" type="slidenum">
+              <a:rPr lang="en-US" smtClean="0"/>
+              <a:t>6</a:t>
+            </a:fld>
             <a:endParaRPr lang="en-US"/>
-          </a:p>
-        </p:txBody>
-      </p:sp>
-      <p:sp>
-        <p:nvSpPr>
-          <p:cNvPr id="4" name="Slide Number Placeholder 3"/>
-          <p:cNvSpPr>
-            <a:spLocks noGrp="1"/>
-          </p:cNvSpPr>
-          <p:nvPr>
-            <p:ph type="sldNum" sz="quarter" idx="10"/>
-          </p:nvPr>
-        </p:nvSpPr>
-        <p:spPr/>
-        <p:txBody>
-          <a:bodyPr/>
-          <a:lstStyle/>
-          <a:p>
-            <a:fld id="{4AC65D0B-F732-4E21-9A8D-1C6A15A6A84B}" type="slidenum">
-              <a:rPr lang="en-US" smtClean="0"/>
-              <a:t>7</a:t>
-            </a:fld>
-            <a:endParaRPr lang="en-US" dirty="0"/>
           </a:p>
         </p:txBody>
       </p:sp>
     </p:spTree>
     <p:extLst>
       <p:ext uri="{BB962C8B-B14F-4D97-AF65-F5344CB8AC3E}">
-        <p14:creationId xmlns:p14="http://schemas.microsoft.com/office/powerpoint/2010/main" val="2003587252"/>
+        <p14:creationId xmlns:p14="http://schemas.microsoft.com/office/powerpoint/2010/main" val="1640240939"/>
       </p:ext>
     </p:extLst>
   </p:cSld>
@@ -1287,7 +2041,74 @@
           <a:bodyPr/>
           <a:lstStyle/>
           <a:p>
-            <a:endParaRPr lang="en-US"/>
+            <a:pPr marL="171450" indent="-171450">
+              <a:buFontTx/>
+              <a:buChar char="-"/>
+            </a:pPr>
+            <a:r>
+              <a:rPr lang="en-US" dirty="0"/>
+              <a:t>Schematics</a:t>
+            </a:r>
+          </a:p>
+          <a:p>
+            <a:pPr marL="171450" indent="-171450">
+              <a:buFontTx/>
+              <a:buChar char="-"/>
+            </a:pPr>
+            <a:r>
+              <a:rPr lang="en-US" dirty="0"/>
+              <a:t>Documentation</a:t>
+            </a:r>
+          </a:p>
+          <a:p>
+            <a:pPr marL="171450" indent="-171450">
+              <a:buFontTx/>
+              <a:buChar char="-"/>
+            </a:pPr>
+            <a:r>
+              <a:rPr lang="en-US" dirty="0"/>
+              <a:t>Board Design</a:t>
+            </a:r>
+          </a:p>
+          <a:p>
+            <a:pPr marL="171450" indent="-171450">
+              <a:buFontTx/>
+              <a:buChar char="-"/>
+            </a:pPr>
+            <a:r>
+              <a:rPr lang="en-US" dirty="0"/>
+              <a:t>Espressif bare-metal scope</a:t>
+            </a:r>
+          </a:p>
+          <a:p>
+            <a:pPr marL="171450" indent="-171450">
+              <a:buFontTx/>
+              <a:buChar char="-"/>
+            </a:pPr>
+            <a:r>
+              <a:rPr lang="en-US" dirty="0"/>
+              <a:t>Roadmap establish</a:t>
+            </a:r>
+          </a:p>
+          <a:p>
+            <a:pPr marL="171450" indent="-171450">
+              <a:buFontTx/>
+              <a:buChar char="-"/>
+            </a:pPr>
+            <a:r>
+              <a:rPr lang="en-US" dirty="0"/>
+              <a:t>Procedure Reference</a:t>
+            </a:r>
+          </a:p>
+          <a:p>
+            <a:pPr marL="171450" indent="-171450">
+              <a:buFontTx/>
+              <a:buChar char="-"/>
+            </a:pPr>
+            <a:r>
+              <a:rPr lang="en-US" dirty="0"/>
+              <a:t>GitHub</a:t>
+            </a:r>
           </a:p>
         </p:txBody>
       </p:sp>
@@ -1308,7 +2129,7 @@
           <a:p>
             <a:fld id="{4AC65D0B-F732-4E21-9A8D-1C6A15A6A84B}" type="slidenum">
               <a:rPr lang="en-US" smtClean="0"/>
-              <a:t>8</a:t>
+              <a:t>7</a:t>
             </a:fld>
             <a:endParaRPr lang="en-US" dirty="0"/>
           </a:p>
@@ -1317,7 +2138,7 @@
     </p:spTree>
     <p:extLst>
       <p:ext uri="{BB962C8B-B14F-4D97-AF65-F5344CB8AC3E}">
-        <p14:creationId xmlns:p14="http://schemas.microsoft.com/office/powerpoint/2010/main" val="3412337435"/>
+        <p14:creationId xmlns:p14="http://schemas.microsoft.com/office/powerpoint/2010/main" val="2781359423"/>
       </p:ext>
     </p:extLst>
   </p:cSld>
@@ -1377,11 +2198,7 @@
             </a:pPr>
             <a:r>
               <a:rPr lang="en-US" dirty="0"/>
-              <a:t>Frame, sketch w/vision</a:t>
-            </a:r>
-            <a:r>
-              <a:rPr lang="en-US" baseline="0" dirty="0"/>
-              <a:t> &amp; intent, draft</a:t>
+              <a:t>Communication</a:t>
             </a:r>
           </a:p>
           <a:p>
@@ -1390,8 +2207,8 @@
               <a:buChar char="-"/>
             </a:pPr>
             <a:r>
-              <a:rPr lang="en-US" baseline="0" dirty="0"/>
-              <a:t>Source control &amp; procedure!</a:t>
+              <a:rPr lang="en-US" dirty="0"/>
+              <a:t>Needs Identification &amp; Customer Relations</a:t>
             </a:r>
           </a:p>
           <a:p>
@@ -1400,8 +2217,8 @@
               <a:buChar char="-"/>
             </a:pPr>
             <a:r>
-              <a:rPr lang="en-US" baseline="0" dirty="0"/>
-              <a:t>Help from experience (Tomm, Terry, Father)</a:t>
+              <a:rPr lang="en-US" dirty="0"/>
+              <a:t>Translation of Ambitions to Marketable Results</a:t>
             </a:r>
           </a:p>
           <a:p>
@@ -1411,11 +2228,7 @@
             </a:pPr>
             <a:r>
               <a:rPr lang="en-US" dirty="0"/>
-              <a:t>Describe</a:t>
-            </a:r>
-            <a:r>
-              <a:rPr lang="en-US" baseline="0" dirty="0"/>
-              <a:t> procedure of PPT Generation</a:t>
+              <a:t>EAGLE Ramp</a:t>
             </a:r>
           </a:p>
           <a:p>
@@ -1424,8 +2237,8 @@
               <a:buChar char="-"/>
             </a:pPr>
             <a:r>
-              <a:rPr lang="en-US" baseline="0" dirty="0"/>
-              <a:t>    selection &amp; outline</a:t>
+              <a:rPr lang="en-US" dirty="0"/>
+              <a:t>Espressif Exposure &amp; Practice</a:t>
             </a:r>
           </a:p>
           <a:p>
@@ -1434,72 +2247,39 @@
               <a:buChar char="-"/>
             </a:pPr>
             <a:r>
-              <a:rPr lang="en-US" baseline="0" dirty="0"/>
-              <a:t>    customer meeting (Tomm)</a:t>
-            </a:r>
-          </a:p>
-          <a:p>
-            <a:pPr marL="171450" indent="-171450">
-              <a:buFontTx/>
-              <a:buChar char="-"/>
-            </a:pPr>
-            <a:r>
-              <a:rPr lang="en-US" baseline="0" dirty="0"/>
-              <a:t>    mentor advise (Tom, Father)</a:t>
-            </a:r>
-          </a:p>
-          <a:p>
-            <a:pPr marL="171450" indent="-171450">
-              <a:buFontTx/>
-              <a:buChar char="-"/>
-            </a:pPr>
-            <a:r>
-              <a:rPr lang="en-US" baseline="0" dirty="0"/>
-              <a:t>    outline</a:t>
-            </a:r>
-          </a:p>
-          <a:p>
-            <a:pPr marL="171450" indent="-171450">
-              <a:buFontTx/>
-              <a:buChar char="-"/>
-            </a:pPr>
-            <a:r>
-              <a:rPr lang="en-US" baseline="0" dirty="0"/>
-              <a:t>    find template</a:t>
-            </a:r>
-          </a:p>
-          <a:p>
+              <a:rPr lang="en-US" dirty="0"/>
+              <a:t>Relationships</a:t>
+            </a:r>
+          </a:p>
+        </p:txBody>
+      </p:sp>
+      <p:sp>
+        <p:nvSpPr>
+          <p:cNvPr id="4" name="Slide Number Placeholder 3"/>
+          <p:cNvSpPr>
+            <a:spLocks noGrp="1"/>
+          </p:cNvSpPr>
+          <p:nvPr>
+            <p:ph type="sldNum" sz="quarter" idx="10"/>
+          </p:nvPr>
+        </p:nvSpPr>
+        <p:spPr/>
+        <p:txBody>
+          <a:bodyPr/>
+          <a:lstStyle/>
+          <a:p>
+            <a:fld id="{4AC65D0B-F732-4E21-9A8D-1C6A15A6A84B}" type="slidenum">
+              <a:rPr lang="en-US" smtClean="0"/>
+              <a:t>8</a:t>
+            </a:fld>
             <a:endParaRPr lang="en-US" dirty="0"/>
-          </a:p>
-        </p:txBody>
-      </p:sp>
-      <p:sp>
-        <p:nvSpPr>
-          <p:cNvPr id="4" name="Slide Number Placeholder 3"/>
-          <p:cNvSpPr>
-            <a:spLocks noGrp="1"/>
-          </p:cNvSpPr>
-          <p:nvPr>
-            <p:ph type="sldNum" sz="quarter" idx="10"/>
-          </p:nvPr>
-        </p:nvSpPr>
-        <p:spPr/>
-        <p:txBody>
-          <a:bodyPr/>
-          <a:lstStyle/>
-          <a:p>
-            <a:fld id="{6361AABB-628C-496F-B0CB-A3FDC087FD3D}" type="slidenum">
-              <a:rPr lang="en-US" smtClean="0"/>
-              <a:t>9</a:t>
-            </a:fld>
-            <a:endParaRPr lang="en-US"/>
           </a:p>
         </p:txBody>
       </p:sp>
     </p:spTree>
     <p:extLst>
       <p:ext uri="{BB962C8B-B14F-4D97-AF65-F5344CB8AC3E}">
-        <p14:creationId xmlns:p14="http://schemas.microsoft.com/office/powerpoint/2010/main" val="2520438497"/>
+        <p14:creationId xmlns:p14="http://schemas.microsoft.com/office/powerpoint/2010/main" val="2003587252"/>
       </p:ext>
     </p:extLst>
   </p:cSld>
@@ -1553,7 +2333,64 @@
           <a:bodyPr/>
           <a:lstStyle/>
           <a:p>
-            <a:endParaRPr lang="en-US"/>
+            <a:pPr marL="171450" indent="-171450">
+              <a:buFontTx/>
+              <a:buChar char="-"/>
+            </a:pPr>
+            <a:r>
+              <a:rPr lang="en-US" dirty="0"/>
+              <a:t>Strengthened relations with Tomm</a:t>
+            </a:r>
+          </a:p>
+          <a:p>
+            <a:pPr marL="171450" indent="-171450">
+              <a:buFontTx/>
+              <a:buChar char="-"/>
+            </a:pPr>
+            <a:r>
+              <a:rPr lang="en-US" dirty="0"/>
+              <a:t>Tyler Brown Opportunity</a:t>
+            </a:r>
+          </a:p>
+          <a:p>
+            <a:pPr marL="171450" indent="-171450">
+              <a:buFontTx/>
+              <a:buChar char="-"/>
+            </a:pPr>
+            <a:r>
+              <a:rPr lang="en-US" dirty="0"/>
+              <a:t>Billy Keogh Opportunity</a:t>
+            </a:r>
+          </a:p>
+          <a:p>
+            <a:pPr marL="171450" indent="-171450">
+              <a:buFontTx/>
+              <a:buChar char="-"/>
+            </a:pPr>
+            <a:r>
+              <a:rPr lang="en-US" dirty="0"/>
+              <a:t>Jmr Opportunity</a:t>
+            </a:r>
+          </a:p>
+          <a:p>
+            <a:pPr marL="171450" indent="-171450">
+              <a:buFontTx/>
+              <a:buChar char="-"/>
+            </a:pPr>
+            <a:r>
+              <a:rPr lang="en-US" dirty="0"/>
+              <a:t>Mentor &amp; Network relations</a:t>
+            </a:r>
+          </a:p>
+          <a:p>
+            <a:pPr marL="171450" indent="-171450">
+              <a:buFontTx/>
+              <a:buChar char="-"/>
+            </a:pPr>
+            <a:r>
+              <a:rPr lang="en-US" dirty="0"/>
+              <a:t>Xylem &amp; Ergsense relations</a:t>
+            </a:r>
           </a:p>
         </p:txBody>
       </p:sp>
@@ -1574,7 +2411,7 @@
           <a:p>
             <a:fld id="{4AC65D0B-F732-4E21-9A8D-1C6A15A6A84B}" type="slidenum">
               <a:rPr lang="en-US" smtClean="0"/>
-              <a:t>10</a:t>
+              <a:t>9</a:t>
             </a:fld>
             <a:endParaRPr lang="en-US" dirty="0"/>
           </a:p>
@@ -1583,7 +2420,7 @@
     </p:spTree>
     <p:extLst>
       <p:ext uri="{BB962C8B-B14F-4D97-AF65-F5344CB8AC3E}">
-        <p14:creationId xmlns:p14="http://schemas.microsoft.com/office/powerpoint/2010/main" val="3872874621"/>
+        <p14:creationId xmlns:p14="http://schemas.microsoft.com/office/powerpoint/2010/main" val="3412337435"/>
       </p:ext>
     </p:extLst>
   </p:cSld>
@@ -9199,6 +10036,103 @@
           <p:cNvPr id="2" name="Title 1">
             <a:extLst>
               <a:ext uri="{FF2B5EF4-FFF2-40B4-BE49-F238E27FC236}">
+                <a16:creationId xmlns:a16="http://schemas.microsoft.com/office/drawing/2014/main" id="{3E7CF58B-BC39-4957-8290-A9DDACA503C3}"/>
+              </a:ext>
+            </a:extLst>
+          </p:cNvPr>
+          <p:cNvSpPr>
+            <a:spLocks noGrp="1"/>
+          </p:cNvSpPr>
+          <p:nvPr>
+            <p:ph type="title"/>
+          </p:nvPr>
+        </p:nvSpPr>
+        <p:spPr/>
+        <p:txBody>
+          <a:bodyPr>
+            <a:normAutofit/>
+          </a:bodyPr>
+          <a:lstStyle/>
+          <a:p>
+            <a:r>
+              <a:rPr lang="en-US" sz="4400" b="0" i="0" kern="1200" baseline="0" dirty="0">
+                <a:solidFill>
+                  <a:schemeClr val="tx1">
+                    <a:lumMod val="85000"/>
+                    <a:lumOff val="15000"/>
+                  </a:schemeClr>
+                </a:solidFill>
+                <a:effectLst/>
+                <a:latin typeface="+mj-lt"/>
+                <a:ea typeface="+mj-ea"/>
+                <a:cs typeface="+mj-cs"/>
+              </a:rPr>
+              <a:t>Procedure</a:t>
+            </a:r>
+            <a:endParaRPr lang="en-US" sz="4400" dirty="0"/>
+          </a:p>
+        </p:txBody>
+      </p:sp>
+      <p:sp>
+        <p:nvSpPr>
+          <p:cNvPr id="3" name="Content Placeholder 2">
+            <a:extLst>
+              <a:ext uri="{FF2B5EF4-FFF2-40B4-BE49-F238E27FC236}">
+                <a16:creationId xmlns:a16="http://schemas.microsoft.com/office/drawing/2014/main" id="{45BEC0FF-6757-4834-8BE8-CB7CC0E6958B}"/>
+              </a:ext>
+            </a:extLst>
+          </p:cNvPr>
+          <p:cNvSpPr>
+            <a:spLocks noGrp="1"/>
+          </p:cNvSpPr>
+          <p:nvPr>
+            <p:ph idx="1"/>
+          </p:nvPr>
+        </p:nvSpPr>
+        <p:spPr/>
+        <p:txBody>
+          <a:bodyPr/>
+          <a:lstStyle/>
+          <a:p>
+            <a:endParaRPr lang="en-US"/>
+          </a:p>
+        </p:txBody>
+      </p:sp>
+    </p:spTree>
+    <p:extLst>
+      <p:ext uri="{BB962C8B-B14F-4D97-AF65-F5344CB8AC3E}">
+        <p14:creationId xmlns:p14="http://schemas.microsoft.com/office/powerpoint/2010/main" val="3224787290"/>
+      </p:ext>
+    </p:extLst>
+  </p:cSld>
+  <p:clrMapOvr>
+    <a:masterClrMapping/>
+  </p:clrMapOvr>
+</p:sld>
+</file>
+
+<file path=ppt/slides/slide11.xml><?xml version="1.0" encoding="utf-8"?>
+<p:sld xmlns:a="http://schemas.openxmlformats.org/drawingml/2006/main" xmlns:r="http://schemas.openxmlformats.org/officeDocument/2006/relationships" xmlns:p="http://schemas.openxmlformats.org/presentationml/2006/main">
+  <p:cSld>
+    <p:spTree>
+      <p:nvGrpSpPr>
+        <p:cNvPr id="1" name=""/>
+        <p:cNvGrpSpPr/>
+        <p:nvPr/>
+      </p:nvGrpSpPr>
+      <p:grpSpPr>
+        <a:xfrm>
+          <a:off x="0" y="0"/>
+          <a:ext cx="0" cy="0"/>
+          <a:chOff x="0" y="0"/>
+          <a:chExt cx="0" cy="0"/>
+        </a:xfrm>
+      </p:grpSpPr>
+      <p:sp>
+        <p:nvSpPr>
+          <p:cNvPr id="2" name="Title 1">
+            <a:extLst>
+              <a:ext uri="{FF2B5EF4-FFF2-40B4-BE49-F238E27FC236}">
                 <a16:creationId xmlns:a16="http://schemas.microsoft.com/office/drawing/2014/main" id="{43A28E36-012E-4395-B0EC-36761B56D78C}"/>
               </a:ext>
             </a:extLst>
@@ -9269,7 +10203,7 @@
 </p:sld>
 </file>
 
-<file path=ppt/slides/slide11.xml><?xml version="1.0" encoding="utf-8"?>
+<file path=ppt/slides/slide12.xml><?xml version="1.0" encoding="utf-8"?>
 <p:sld xmlns:a="http://schemas.openxmlformats.org/drawingml/2006/main" xmlns:r="http://schemas.openxmlformats.org/officeDocument/2006/relationships" xmlns:p="http://schemas.openxmlformats.org/presentationml/2006/main">
   <p:cSld>
     <p:spTree>
@@ -9387,7 +10321,9 @@
         </p:nvSpPr>
         <p:spPr/>
         <p:txBody>
-          <a:bodyPr/>
+          <a:bodyPr>
+            <a:normAutofit/>
+          </a:bodyPr>
           <a:lstStyle/>
           <a:p>
             <a:r>
@@ -9399,10 +10335,10 @@
                 <a:ea typeface="+mj-ea"/>
                 <a:cs typeface="+mj-cs"/>
               </a:rPr>
-              <a:t>Customer Request,</a:t>
-            </a:r>
-            <a:r>
-              <a:rPr lang="en-US" sz="4400" b="0" i="0" u="none" strike="noStrike" kern="1200" dirty="0">
+              <a:t>Customer Request</a:t>
+            </a:r>
+            <a:br>
+              <a:rPr lang="en-US" sz="4400" b="0" i="0" u="none" strike="noStrike" kern="1200" baseline="0" dirty="0">
                 <a:solidFill>
                   <a:schemeClr val="tx1"/>
                 </a:solidFill>
@@ -9410,15 +10346,14 @@
                 <a:ea typeface="+mj-ea"/>
                 <a:cs typeface="+mj-cs"/>
               </a:rPr>
-              <a:t> </a:t>
-            </a:r>
+            </a:br>
             <a:r>
               <a:rPr lang="en-US" sz="2800" b="0" i="0" u="none" strike="noStrike" kern="1200" dirty="0">
                 <a:solidFill>
                   <a:schemeClr val="tx1"/>
                 </a:solidFill>
               </a:rPr>
-              <a:t>Needs &amp; </a:t>
+              <a:t>Identification of Needs &amp; </a:t>
             </a:r>
             <a:r>
               <a:rPr lang="en-US" sz="2800" b="0" i="0" u="none" strike="noStrike" kern="1200" baseline="0" dirty="0">
@@ -9492,7 +10427,7 @@
           <p:cNvPr id="2" name="Title 1">
             <a:extLst>
               <a:ext uri="{FF2B5EF4-FFF2-40B4-BE49-F238E27FC236}">
-                <a16:creationId xmlns:a16="http://schemas.microsoft.com/office/drawing/2014/main" id="{88363E62-F888-4FCB-A175-EB3706B85F1B}"/>
+                <a16:creationId xmlns:a16="http://schemas.microsoft.com/office/drawing/2014/main" id="{04C993AE-4FB0-4669-8BB3-8801EA50AF12}"/>
               </a:ext>
             </a:extLst>
           </p:cNvPr>
@@ -9505,21 +10440,15 @@
         </p:nvSpPr>
         <p:spPr/>
         <p:txBody>
-          <a:bodyPr/>
-          <a:lstStyle/>
-          <a:p>
-            <a:r>
-              <a:rPr lang="en-US" sz="4400" b="0" i="0" u="none" strike="noStrike" kern="1200" baseline="0" dirty="0">
-                <a:solidFill>
-                  <a:schemeClr val="tx1"/>
-                </a:solidFill>
-                <a:latin typeface="+mj-lt"/>
-                <a:ea typeface="+mj-ea"/>
-                <a:cs typeface="+mj-cs"/>
-              </a:rPr>
-              <a:t>Design Procedure (2)</a:t>
-            </a:r>
-            <a:endParaRPr lang="en-US" dirty="0"/>
+          <a:bodyPr>
+            <a:normAutofit/>
+          </a:bodyPr>
+          <a:lstStyle/>
+          <a:p>
+            <a:r>
+              <a:rPr lang="en-US" sz="4400" dirty="0"/>
+              <a:t>Feather Opportunities</a:t>
+            </a:r>
           </a:p>
         </p:txBody>
       </p:sp>
@@ -9528,7 +10457,7 @@
           <p:cNvPr id="3" name="Content Placeholder 2">
             <a:extLst>
               <a:ext uri="{FF2B5EF4-FFF2-40B4-BE49-F238E27FC236}">
-                <a16:creationId xmlns:a16="http://schemas.microsoft.com/office/drawing/2014/main" id="{A935FB1E-B06B-4E3A-A54C-04A508519109}"/>
+                <a16:creationId xmlns:a16="http://schemas.microsoft.com/office/drawing/2014/main" id="{D6C3F04F-3BFF-453C-8031-AE312E0A3509}"/>
               </a:ext>
             </a:extLst>
           </p:cNvPr>
@@ -9551,7 +10480,7 @@
     </p:spTree>
     <p:extLst>
       <p:ext uri="{BB962C8B-B14F-4D97-AF65-F5344CB8AC3E}">
-        <p14:creationId xmlns:p14="http://schemas.microsoft.com/office/powerpoint/2010/main" val="927521282"/>
+        <p14:creationId xmlns:p14="http://schemas.microsoft.com/office/powerpoint/2010/main" val="1141245059"/>
       </p:ext>
     </p:extLst>
   </p:cSld>
@@ -9583,7 +10512,7 @@
           <p:cNvPr id="2" name="Title 1">
             <a:extLst>
               <a:ext uri="{FF2B5EF4-FFF2-40B4-BE49-F238E27FC236}">
-                <a16:creationId xmlns:a16="http://schemas.microsoft.com/office/drawing/2014/main" id="{563C072F-80F0-4A4C-AF42-6FE541B5E5E8}"/>
+                <a16:creationId xmlns:a16="http://schemas.microsoft.com/office/drawing/2014/main" id="{88363E62-F888-4FCB-A175-EB3706B85F1B}"/>
               </a:ext>
             </a:extLst>
           </p:cNvPr>
@@ -9608,7 +10537,7 @@
                 <a:ea typeface="+mj-ea"/>
                 <a:cs typeface="+mj-cs"/>
               </a:rPr>
-              <a:t>Development Methodology (3)</a:t>
+              <a:t>Design Procedure (2)</a:t>
             </a:r>
             <a:endParaRPr lang="en-US" dirty="0"/>
           </a:p>
@@ -9619,7 +10548,7 @@
           <p:cNvPr id="3" name="Content Placeholder 2">
             <a:extLst>
               <a:ext uri="{FF2B5EF4-FFF2-40B4-BE49-F238E27FC236}">
-                <a16:creationId xmlns:a16="http://schemas.microsoft.com/office/drawing/2014/main" id="{FD858DE0-CA2F-478E-B44A-4A16F74BB9EE}"/>
+                <a16:creationId xmlns:a16="http://schemas.microsoft.com/office/drawing/2014/main" id="{A935FB1E-B06B-4E3A-A54C-04A508519109}"/>
               </a:ext>
             </a:extLst>
           </p:cNvPr>
@@ -9642,7 +10571,7 @@
     </p:spTree>
     <p:extLst>
       <p:ext uri="{BB962C8B-B14F-4D97-AF65-F5344CB8AC3E}">
-        <p14:creationId xmlns:p14="http://schemas.microsoft.com/office/powerpoint/2010/main" val="163627118"/>
+        <p14:creationId xmlns:p14="http://schemas.microsoft.com/office/powerpoint/2010/main" val="927521282"/>
       </p:ext>
     </p:extLst>
   </p:cSld>
@@ -9674,7 +10603,7 @@
           <p:cNvPr id="2" name="Title 1">
             <a:extLst>
               <a:ext uri="{FF2B5EF4-FFF2-40B4-BE49-F238E27FC236}">
-                <a16:creationId xmlns:a16="http://schemas.microsoft.com/office/drawing/2014/main" id="{D4A719D7-5C57-4915-9A3F-78D1A0EFB069}"/>
+                <a16:creationId xmlns:a16="http://schemas.microsoft.com/office/drawing/2014/main" id="{563C072F-80F0-4A4C-AF42-6FE541B5E5E8}"/>
               </a:ext>
             </a:extLst>
           </p:cNvPr>
@@ -9699,7 +10628,7 @@
                 <a:ea typeface="+mj-ea"/>
                 <a:cs typeface="+mj-cs"/>
               </a:rPr>
-              <a:t>Overcome Challenges</a:t>
+              <a:t>Development Methodology (3)</a:t>
             </a:r>
             <a:endParaRPr lang="en-US" dirty="0"/>
           </a:p>
@@ -9710,7 +10639,7 @@
           <p:cNvPr id="3" name="Content Placeholder 2">
             <a:extLst>
               <a:ext uri="{FF2B5EF4-FFF2-40B4-BE49-F238E27FC236}">
-                <a16:creationId xmlns:a16="http://schemas.microsoft.com/office/drawing/2014/main" id="{8987EDAD-8262-4FFE-8E62-474EB7CAFDCC}"/>
+                <a16:creationId xmlns:a16="http://schemas.microsoft.com/office/drawing/2014/main" id="{FD858DE0-CA2F-478E-B44A-4A16F74BB9EE}"/>
               </a:ext>
             </a:extLst>
           </p:cNvPr>
@@ -9733,7 +10662,7 @@
     </p:spTree>
     <p:extLst>
       <p:ext uri="{BB962C8B-B14F-4D97-AF65-F5344CB8AC3E}">
-        <p14:creationId xmlns:p14="http://schemas.microsoft.com/office/powerpoint/2010/main" val="73419143"/>
+        <p14:creationId xmlns:p14="http://schemas.microsoft.com/office/powerpoint/2010/main" val="163627118"/>
       </p:ext>
     </p:extLst>
   </p:cSld>
@@ -9765,7 +10694,7 @@
           <p:cNvPr id="2" name="Title 1">
             <a:extLst>
               <a:ext uri="{FF2B5EF4-FFF2-40B4-BE49-F238E27FC236}">
-                <a16:creationId xmlns:a16="http://schemas.microsoft.com/office/drawing/2014/main" id="{5012C1FE-807C-428F-AC4E-16C44712459E}"/>
+                <a16:creationId xmlns:a16="http://schemas.microsoft.com/office/drawing/2014/main" id="{D4A719D7-5C57-4915-9A3F-78D1A0EFB069}"/>
               </a:ext>
             </a:extLst>
           </p:cNvPr>
@@ -9790,7 +10719,7 @@
                 <a:ea typeface="+mj-ea"/>
                 <a:cs typeface="+mj-cs"/>
               </a:rPr>
-              <a:t>Deliverable &amp; Results (2)</a:t>
+              <a:t>Overcome Challenges</a:t>
             </a:r>
             <a:endParaRPr lang="en-US" dirty="0"/>
           </a:p>
@@ -9801,7 +10730,7 @@
           <p:cNvPr id="3" name="Content Placeholder 2">
             <a:extLst>
               <a:ext uri="{FF2B5EF4-FFF2-40B4-BE49-F238E27FC236}">
-                <a16:creationId xmlns:a16="http://schemas.microsoft.com/office/drawing/2014/main" id="{C04C8CA2-BD0D-4489-B64B-CD3544982353}"/>
+                <a16:creationId xmlns:a16="http://schemas.microsoft.com/office/drawing/2014/main" id="{8987EDAD-8262-4FFE-8E62-474EB7CAFDCC}"/>
               </a:ext>
             </a:extLst>
           </p:cNvPr>
@@ -9824,7 +10753,7 @@
     </p:spTree>
     <p:extLst>
       <p:ext uri="{BB962C8B-B14F-4D97-AF65-F5344CB8AC3E}">
-        <p14:creationId xmlns:p14="http://schemas.microsoft.com/office/powerpoint/2010/main" val="820223982"/>
+        <p14:creationId xmlns:p14="http://schemas.microsoft.com/office/powerpoint/2010/main" val="73419143"/>
       </p:ext>
     </p:extLst>
   </p:cSld>
@@ -9856,7 +10785,7 @@
           <p:cNvPr id="2" name="Title 1">
             <a:extLst>
               <a:ext uri="{FF2B5EF4-FFF2-40B4-BE49-F238E27FC236}">
-                <a16:creationId xmlns:a16="http://schemas.microsoft.com/office/drawing/2014/main" id="{6217DE87-9215-4E9A-B6B9-7706767BAD3A}"/>
+                <a16:creationId xmlns:a16="http://schemas.microsoft.com/office/drawing/2014/main" id="{5012C1FE-807C-428F-AC4E-16C44712459E}"/>
               </a:ext>
             </a:extLst>
           </p:cNvPr>
@@ -9881,7 +10810,7 @@
                 <a:ea typeface="+mj-ea"/>
                 <a:cs typeface="+mj-cs"/>
               </a:rPr>
-              <a:t>Learnings &amp; Growths</a:t>
+              <a:t>Deliverable &amp; Results (2)</a:t>
             </a:r>
             <a:endParaRPr lang="en-US" dirty="0"/>
           </a:p>
@@ -9892,7 +10821,7 @@
           <p:cNvPr id="3" name="Content Placeholder 2">
             <a:extLst>
               <a:ext uri="{FF2B5EF4-FFF2-40B4-BE49-F238E27FC236}">
-                <a16:creationId xmlns:a16="http://schemas.microsoft.com/office/drawing/2014/main" id="{B1138675-87A9-4CDA-A016-E6EED43EF64E}"/>
+                <a16:creationId xmlns:a16="http://schemas.microsoft.com/office/drawing/2014/main" id="{C04C8CA2-BD0D-4489-B64B-CD3544982353}"/>
               </a:ext>
             </a:extLst>
           </p:cNvPr>
@@ -9915,7 +10844,7 @@
     </p:spTree>
     <p:extLst>
       <p:ext uri="{BB962C8B-B14F-4D97-AF65-F5344CB8AC3E}">
-        <p14:creationId xmlns:p14="http://schemas.microsoft.com/office/powerpoint/2010/main" val="4001811534"/>
+        <p14:creationId xmlns:p14="http://schemas.microsoft.com/office/powerpoint/2010/main" val="820223982"/>
       </p:ext>
     </p:extLst>
   </p:cSld>
@@ -9947,7 +10876,7 @@
           <p:cNvPr id="2" name="Title 1">
             <a:extLst>
               <a:ext uri="{FF2B5EF4-FFF2-40B4-BE49-F238E27FC236}">
-                <a16:creationId xmlns:a16="http://schemas.microsoft.com/office/drawing/2014/main" id="{0F0EC5FE-E316-4499-AEE1-3F203FB8075C}"/>
+                <a16:creationId xmlns:a16="http://schemas.microsoft.com/office/drawing/2014/main" id="{6217DE87-9215-4E9A-B6B9-7706767BAD3A}"/>
               </a:ext>
             </a:extLst>
           </p:cNvPr>
@@ -9964,16 +10893,15 @@
           <a:lstStyle/>
           <a:p>
             <a:r>
-              <a:rPr lang="en-US" sz="4400" b="0" i="0" kern="1200" baseline="0" dirty="0">
+              <a:rPr lang="en-US" sz="4400" b="0" i="0" u="none" strike="noStrike" kern="1200" baseline="0" dirty="0">
                 <a:solidFill>
                   <a:schemeClr val="tx1"/>
                 </a:solidFill>
-                <a:effectLst/>
                 <a:latin typeface="+mj-lt"/>
                 <a:ea typeface="+mj-ea"/>
                 <a:cs typeface="+mj-cs"/>
               </a:rPr>
-              <a:t>Outcomes</a:t>
+              <a:t>Learnings &amp; Growths</a:t>
             </a:r>
             <a:endParaRPr lang="en-US" dirty="0"/>
           </a:p>
@@ -9984,7 +10912,7 @@
           <p:cNvPr id="3" name="Content Placeholder 2">
             <a:extLst>
               <a:ext uri="{FF2B5EF4-FFF2-40B4-BE49-F238E27FC236}">
-                <a16:creationId xmlns:a16="http://schemas.microsoft.com/office/drawing/2014/main" id="{5F34F862-E71D-4D72-B80B-A4351D585243}"/>
+                <a16:creationId xmlns:a16="http://schemas.microsoft.com/office/drawing/2014/main" id="{B1138675-87A9-4CDA-A016-E6EED43EF64E}"/>
               </a:ext>
             </a:extLst>
           </p:cNvPr>
@@ -10007,7 +10935,7 @@
     </p:spTree>
     <p:extLst>
       <p:ext uri="{BB962C8B-B14F-4D97-AF65-F5344CB8AC3E}">
-        <p14:creationId xmlns:p14="http://schemas.microsoft.com/office/powerpoint/2010/main" val="681447346"/>
+        <p14:creationId xmlns:p14="http://schemas.microsoft.com/office/powerpoint/2010/main" val="4001811534"/>
       </p:ext>
     </p:extLst>
   </p:cSld>
@@ -10039,7 +10967,7 @@
           <p:cNvPr id="2" name="Title 1">
             <a:extLst>
               <a:ext uri="{FF2B5EF4-FFF2-40B4-BE49-F238E27FC236}">
-                <a16:creationId xmlns:a16="http://schemas.microsoft.com/office/drawing/2014/main" id="{3E7CF58B-BC39-4957-8290-A9DDACA503C3}"/>
+                <a16:creationId xmlns:a16="http://schemas.microsoft.com/office/drawing/2014/main" id="{0F0EC5FE-E316-4499-AEE1-3F203FB8075C}"/>
               </a:ext>
             </a:extLst>
           </p:cNvPr>
@@ -10056,19 +10984,16 @@
           <a:lstStyle/>
           <a:p>
             <a:r>
-              <a:rPr lang="en-US" sz="3600" b="0" i="0" kern="1200" baseline="0" dirty="0">
+              <a:rPr lang="en-US" sz="4400" b="0" i="0" kern="1200" baseline="0" dirty="0">
                 <a:solidFill>
-                  <a:schemeClr val="tx1">
-                    <a:lumMod val="85000"/>
-                    <a:lumOff val="15000"/>
-                  </a:schemeClr>
+                  <a:schemeClr val="tx1"/>
                 </a:solidFill>
                 <a:effectLst/>
                 <a:latin typeface="+mj-lt"/>
                 <a:ea typeface="+mj-ea"/>
                 <a:cs typeface="+mj-cs"/>
               </a:rPr>
-              <a:t>Procedure</a:t>
+              <a:t>Outcomes</a:t>
             </a:r>
             <a:endParaRPr lang="en-US" dirty="0"/>
           </a:p>
@@ -10079,7 +11004,7 @@
           <p:cNvPr id="3" name="Content Placeholder 2">
             <a:extLst>
               <a:ext uri="{FF2B5EF4-FFF2-40B4-BE49-F238E27FC236}">
-                <a16:creationId xmlns:a16="http://schemas.microsoft.com/office/drawing/2014/main" id="{45BEC0FF-6757-4834-8BE8-CB7CC0E6958B}"/>
+                <a16:creationId xmlns:a16="http://schemas.microsoft.com/office/drawing/2014/main" id="{5F34F862-E71D-4D72-B80B-A4351D585243}"/>
               </a:ext>
             </a:extLst>
           </p:cNvPr>
@@ -10102,7 +11027,7 @@
     </p:spTree>
     <p:extLst>
       <p:ext uri="{BB962C8B-B14F-4D97-AF65-F5344CB8AC3E}">
-        <p14:creationId xmlns:p14="http://schemas.microsoft.com/office/powerpoint/2010/main" val="3224787290"/>
+        <p14:creationId xmlns:p14="http://schemas.microsoft.com/office/powerpoint/2010/main" val="681447346"/>
       </p:ext>
     </p:extLst>
   </p:cSld>

</xml_diff>

<commit_message>
(+)    wbd add, format clean
</commit_message>
<xml_diff>
--- a/Suppl/Pivotal Presentation - DTECTS.pptx
+++ b/Suppl/Pivotal Presentation - DTECTS.pptx
@@ -10,16 +10,16 @@
   <p:sldIdLst>
     <p:sldId id="257" r:id="rId2"/>
     <p:sldId id="259" r:id="rId3"/>
-    <p:sldId id="279" r:id="rId4"/>
-    <p:sldId id="261" r:id="rId5"/>
-    <p:sldId id="263" r:id="rId6"/>
-    <p:sldId id="265" r:id="rId7"/>
-    <p:sldId id="267" r:id="rId8"/>
-    <p:sldId id="262" r:id="rId9"/>
-    <p:sldId id="273" r:id="rId10"/>
-    <p:sldId id="274" r:id="rId11"/>
-    <p:sldId id="276" r:id="rId12"/>
-    <p:sldId id="278" r:id="rId13"/>
+    <p:sldId id="280" r:id="rId4"/>
+    <p:sldId id="281" r:id="rId5"/>
+    <p:sldId id="282" r:id="rId6"/>
+    <p:sldId id="283" r:id="rId7"/>
+    <p:sldId id="284" r:id="rId8"/>
+    <p:sldId id="286" r:id="rId9"/>
+    <p:sldId id="287" r:id="rId10"/>
+    <p:sldId id="288" r:id="rId11"/>
+    <p:sldId id="290" r:id="rId12"/>
+    <p:sldId id="289" r:id="rId13"/>
   </p:sldIdLst>
   <p:sldSz cx="12192000" cy="6858000"/>
   <p:notesSz cx="6858000" cy="9144000"/>
@@ -919,6 +919,13 @@
           <a:p>
             <a:endParaRPr lang="en-US" dirty="0"/>
           </a:p>
+          <a:p>
+            <a:pPr marL="0" indent="0">
+              <a:buFontTx/>
+              <a:buNone/>
+            </a:pPr>
+            <a:endParaRPr lang="en-US" dirty="0"/>
+          </a:p>
         </p:txBody>
       </p:sp>
       <p:sp>
@@ -936,18 +943,18 @@
           <a:bodyPr/>
           <a:lstStyle/>
           <a:p>
-            <a:fld id="{6361AABB-628C-496F-B0CB-A3FDC087FD3D}" type="slidenum">
+            <a:fld id="{4AC65D0B-F732-4E21-9A8D-1C6A15A6A84B}" type="slidenum">
               <a:rPr lang="en-US" smtClean="0"/>
               <a:t>10</a:t>
             </a:fld>
-            <a:endParaRPr lang="en-US"/>
+            <a:endParaRPr lang="en-US" dirty="0"/>
           </a:p>
         </p:txBody>
       </p:sp>
     </p:spTree>
     <p:extLst>
       <p:ext uri="{BB962C8B-B14F-4D97-AF65-F5344CB8AC3E}">
-        <p14:creationId xmlns:p14="http://schemas.microsoft.com/office/powerpoint/2010/main" val="2520438497"/>
+        <p14:creationId xmlns:p14="http://schemas.microsoft.com/office/powerpoint/2010/main" val="648812506"/>
       </p:ext>
     </p:extLst>
   </p:cSld>
@@ -1040,6 +1047,13 @@
               <a:t>Rapid Prototyping</a:t>
             </a:r>
           </a:p>
+          <a:p>
+            <a:pPr marL="0" indent="0">
+              <a:buFontTx/>
+              <a:buNone/>
+            </a:pPr>
+            <a:endParaRPr lang="en-US" dirty="0"/>
+          </a:p>
         </p:txBody>
       </p:sp>
       <p:sp>
@@ -1068,7 +1082,7 @@
     </p:spTree>
     <p:extLst>
       <p:ext uri="{BB962C8B-B14F-4D97-AF65-F5344CB8AC3E}">
-        <p14:creationId xmlns:p14="http://schemas.microsoft.com/office/powerpoint/2010/main" val="3872874621"/>
+        <p14:creationId xmlns:p14="http://schemas.microsoft.com/office/powerpoint/2010/main" val="3025603983"/>
       </p:ext>
     </p:extLst>
   </p:cSld>
@@ -1138,6 +1152,13 @@
             </a:r>
             <a:endParaRPr lang="en-US" dirty="0"/>
           </a:p>
+          <a:p>
+            <a:pPr marL="0" indent="0">
+              <a:buFontTx/>
+              <a:buNone/>
+            </a:pPr>
+            <a:endParaRPr lang="en-US" dirty="0"/>
+          </a:p>
         </p:txBody>
       </p:sp>
       <p:sp>
@@ -1166,7 +1187,7 @@
     </p:spTree>
     <p:extLst>
       <p:ext uri="{BB962C8B-B14F-4D97-AF65-F5344CB8AC3E}">
-        <p14:creationId xmlns:p14="http://schemas.microsoft.com/office/powerpoint/2010/main" val="1742817908"/>
+        <p14:creationId xmlns:p14="http://schemas.microsoft.com/office/powerpoint/2010/main" val="1594136022"/>
       </p:ext>
     </p:extLst>
   </p:cSld>
@@ -1219,6 +1240,49 @@
         <p:txBody>
           <a:bodyPr/>
           <a:lstStyle/>
+          <a:p>
+            <a:pPr marL="0" indent="0">
+              <a:buFontTx/>
+              <a:buNone/>
+            </a:pPr>
+            <a:r>
+              <a:rPr lang="en-US" dirty="0"/>
+              <a:t>Summary</a:t>
+            </a:r>
+          </a:p>
+          <a:p>
+            <a:pPr marL="171450" indent="-171450">
+              <a:buFontTx/>
+              <a:buChar char="-"/>
+            </a:pPr>
+            <a:r>
+              <a:rPr lang="en-US" sz="1200" b="0" i="0" u="none" strike="noStrike" kern="1200" dirty="0">
+                <a:solidFill>
+                  <a:schemeClr val="tx1"/>
+                </a:solidFill>
+              </a:rPr>
+              <a:t>Identification of Needs &amp; </a:t>
+            </a:r>
+            <a:r>
+              <a:rPr lang="en-US" sz="1200" b="0" i="0" u="none" strike="noStrike" kern="1200" baseline="0" dirty="0">
+                <a:solidFill>
+                  <a:schemeClr val="tx1"/>
+                </a:solidFill>
+              </a:rPr>
+              <a:t>Challenges</a:t>
+            </a:r>
+          </a:p>
+          <a:p>
+            <a:pPr marL="171450" indent="-171450">
+              <a:buFontTx/>
+              <a:buChar char="-"/>
+            </a:pPr>
+            <a:endParaRPr lang="en-US" sz="1200" b="0" i="0" u="none" strike="noStrike" kern="1200" baseline="0" dirty="0">
+              <a:solidFill>
+                <a:schemeClr val="tx1"/>
+              </a:solidFill>
+            </a:endParaRPr>
+          </a:p>
           <a:p>
             <a:pPr marL="0" indent="0">
               <a:buFontTx/>
@@ -1556,6 +1620,13 @@
               <a:t>What it brought to Tomm’s project</a:t>
             </a:r>
           </a:p>
+          <a:p>
+            <a:pPr marL="0" indent="0">
+              <a:buFontTx/>
+              <a:buNone/>
+            </a:pPr>
+            <a:endParaRPr lang="en-US" dirty="0"/>
+          </a:p>
         </p:txBody>
       </p:sp>
       <p:sp>
@@ -1573,18 +1644,18 @@
           <a:bodyPr/>
           <a:lstStyle/>
           <a:p>
-            <a:fld id="{6361AABB-628C-496F-B0CB-A3FDC087FD3D}" type="slidenum">
+            <a:fld id="{4AC65D0B-F732-4E21-9A8D-1C6A15A6A84B}" type="slidenum">
               <a:rPr lang="en-US" smtClean="0"/>
               <a:t>3</a:t>
             </a:fld>
-            <a:endParaRPr lang="en-US"/>
+            <a:endParaRPr lang="en-US" dirty="0"/>
           </a:p>
         </p:txBody>
       </p:sp>
     </p:spTree>
     <p:extLst>
       <p:ext uri="{BB962C8B-B14F-4D97-AF65-F5344CB8AC3E}">
-        <p14:creationId xmlns:p14="http://schemas.microsoft.com/office/powerpoint/2010/main" val="2194817254"/>
+        <p14:creationId xmlns:p14="http://schemas.microsoft.com/office/powerpoint/2010/main" val="408159008"/>
       </p:ext>
     </p:extLst>
   </p:cSld>
@@ -1677,6 +1748,13 @@
               <a:t>Contract Completion &amp; Transfer</a:t>
             </a:r>
           </a:p>
+          <a:p>
+            <a:pPr marL="0" indent="0">
+              <a:buFontTx/>
+              <a:buNone/>
+            </a:pPr>
+            <a:endParaRPr lang="en-US" dirty="0"/>
+          </a:p>
         </p:txBody>
       </p:sp>
       <p:sp>
@@ -1705,7 +1783,7 @@
     </p:spTree>
     <p:extLst>
       <p:ext uri="{BB962C8B-B14F-4D97-AF65-F5344CB8AC3E}">
-        <p14:creationId xmlns:p14="http://schemas.microsoft.com/office/powerpoint/2010/main" val="3333099726"/>
+        <p14:creationId xmlns:p14="http://schemas.microsoft.com/office/powerpoint/2010/main" val="292211601"/>
       </p:ext>
     </p:extLst>
   </p:cSld>
@@ -1838,6 +1916,13 @@
               <a:t>Revision Control</a:t>
             </a:r>
           </a:p>
+          <a:p>
+            <a:pPr marL="0" indent="0">
+              <a:buFontTx/>
+              <a:buNone/>
+            </a:pPr>
+            <a:endParaRPr lang="en-US" dirty="0"/>
+          </a:p>
         </p:txBody>
       </p:sp>
       <p:sp>
@@ -1866,7 +1951,7 @@
     </p:spTree>
     <p:extLst>
       <p:ext uri="{BB962C8B-B14F-4D97-AF65-F5344CB8AC3E}">
-        <p14:creationId xmlns:p14="http://schemas.microsoft.com/office/powerpoint/2010/main" val="204800194"/>
+        <p14:creationId xmlns:p14="http://schemas.microsoft.com/office/powerpoint/2010/main" val="1782159032"/>
       </p:ext>
     </p:extLst>
   </p:cSld>
@@ -1959,6 +2044,13 @@
               <a:t>Satisfying ambitious, abstract design needs</a:t>
             </a:r>
           </a:p>
+          <a:p>
+            <a:pPr marL="0" indent="0">
+              <a:buFontTx/>
+              <a:buNone/>
+            </a:pPr>
+            <a:endParaRPr lang="en-US" dirty="0"/>
+          </a:p>
         </p:txBody>
       </p:sp>
       <p:sp>
@@ -1976,18 +2068,18 @@
           <a:bodyPr/>
           <a:lstStyle/>
           <a:p>
-            <a:fld id="{6361AABB-628C-496F-B0CB-A3FDC087FD3D}" type="slidenum">
+            <a:fld id="{4AC65D0B-F732-4E21-9A8D-1C6A15A6A84B}" type="slidenum">
               <a:rPr lang="en-US" smtClean="0"/>
               <a:t>6</a:t>
             </a:fld>
-            <a:endParaRPr lang="en-US"/>
+            <a:endParaRPr lang="en-US" dirty="0"/>
           </a:p>
         </p:txBody>
       </p:sp>
     </p:spTree>
     <p:extLst>
       <p:ext uri="{BB962C8B-B14F-4D97-AF65-F5344CB8AC3E}">
-        <p14:creationId xmlns:p14="http://schemas.microsoft.com/office/powerpoint/2010/main" val="1640240939"/>
+        <p14:creationId xmlns:p14="http://schemas.microsoft.com/office/powerpoint/2010/main" val="3236089897"/>
       </p:ext>
     </p:extLst>
   </p:cSld>
@@ -2110,6 +2202,13 @@
               <a:t>GitHub</a:t>
             </a:r>
           </a:p>
+          <a:p>
+            <a:pPr marL="0" indent="0">
+              <a:buFontTx/>
+              <a:buNone/>
+            </a:pPr>
+            <a:endParaRPr lang="en-US" dirty="0"/>
+          </a:p>
         </p:txBody>
       </p:sp>
       <p:sp>
@@ -2138,7 +2237,7 @@
     </p:spTree>
     <p:extLst>
       <p:ext uri="{BB962C8B-B14F-4D97-AF65-F5344CB8AC3E}">
-        <p14:creationId xmlns:p14="http://schemas.microsoft.com/office/powerpoint/2010/main" val="2781359423"/>
+        <p14:creationId xmlns:p14="http://schemas.microsoft.com/office/powerpoint/2010/main" val="812602940"/>
       </p:ext>
     </p:extLst>
   </p:cSld>
@@ -2251,6 +2350,13 @@
               <a:t>Relationships</a:t>
             </a:r>
           </a:p>
+          <a:p>
+            <a:pPr marL="0" indent="0">
+              <a:buFontTx/>
+              <a:buNone/>
+            </a:pPr>
+            <a:endParaRPr lang="en-US" dirty="0"/>
+          </a:p>
         </p:txBody>
       </p:sp>
       <p:sp>
@@ -2279,7 +2385,7 @@
     </p:spTree>
     <p:extLst>
       <p:ext uri="{BB962C8B-B14F-4D97-AF65-F5344CB8AC3E}">
-        <p14:creationId xmlns:p14="http://schemas.microsoft.com/office/powerpoint/2010/main" val="2003587252"/>
+        <p14:creationId xmlns:p14="http://schemas.microsoft.com/office/powerpoint/2010/main" val="264461871"/>
       </p:ext>
     </p:extLst>
   </p:cSld>
@@ -2392,6 +2498,13 @@
               <a:t>Xylem &amp; Ergsense relations</a:t>
             </a:r>
           </a:p>
+          <a:p>
+            <a:pPr marL="0" indent="0">
+              <a:buFontTx/>
+              <a:buNone/>
+            </a:pPr>
+            <a:endParaRPr lang="en-US" dirty="0"/>
+          </a:p>
         </p:txBody>
       </p:sp>
       <p:sp>
@@ -2420,7 +2533,7 @@
     </p:spTree>
     <p:extLst>
       <p:ext uri="{BB962C8B-B14F-4D97-AF65-F5344CB8AC3E}">
-        <p14:creationId xmlns:p14="http://schemas.microsoft.com/office/powerpoint/2010/main" val="3412337435"/>
+        <p14:creationId xmlns:p14="http://schemas.microsoft.com/office/powerpoint/2010/main" val="3716442150"/>
       </p:ext>
     </p:extLst>
   </p:cSld>
@@ -10036,7 +10149,7 @@
           <p:cNvPr id="2" name="Title 1">
             <a:extLst>
               <a:ext uri="{FF2B5EF4-FFF2-40B4-BE49-F238E27FC236}">
-                <a16:creationId xmlns:a16="http://schemas.microsoft.com/office/drawing/2014/main" id="{3E7CF58B-BC39-4957-8290-A9DDACA503C3}"/>
+                <a16:creationId xmlns:a16="http://schemas.microsoft.com/office/drawing/2014/main" id="{9C5E42EE-EA5D-4203-B1EC-B96B68D2A8EA}"/>
               </a:ext>
             </a:extLst>
           </p:cNvPr>
@@ -10054,8 +10167,9 @@
           </a:bodyPr>
           <a:lstStyle/>
           <a:p>
-            <a:r>
-              <a:rPr lang="en-US" sz="4400" b="0" i="0" kern="1200" baseline="0" dirty="0">
+            <a:pPr rtl="0" eaLnBrk="1" latinLnBrk="0" hangingPunct="1"/>
+            <a:r>
+              <a:rPr lang="en-US" sz="3600" b="0" i="0" kern="1200" baseline="0" dirty="0">
                 <a:solidFill>
                   <a:schemeClr val="tx1">
                     <a:lumMod val="85000"/>
@@ -10069,7 +10183,9 @@
               </a:rPr>
               <a:t>Procedure</a:t>
             </a:r>
-            <a:endParaRPr lang="en-US" sz="4400" dirty="0"/>
+            <a:endParaRPr lang="en-US" sz="4400" dirty="0">
+              <a:effectLst/>
+            </a:endParaRPr>
           </a:p>
         </p:txBody>
       </p:sp>
@@ -10078,7 +10194,7 @@
           <p:cNvPr id="3" name="Content Placeholder 2">
             <a:extLst>
               <a:ext uri="{FF2B5EF4-FFF2-40B4-BE49-F238E27FC236}">
-                <a16:creationId xmlns:a16="http://schemas.microsoft.com/office/drawing/2014/main" id="{45BEC0FF-6757-4834-8BE8-CB7CC0E6958B}"/>
+                <a16:creationId xmlns:a16="http://schemas.microsoft.com/office/drawing/2014/main" id="{044B4F6E-A639-47F4-91A5-68807265D618}"/>
               </a:ext>
             </a:extLst>
           </p:cNvPr>
@@ -10089,19 +10205,24 @@
             <p:ph idx="1"/>
           </p:nvPr>
         </p:nvSpPr>
-        <p:spPr/>
+        <p:spPr>
+          <a:xfrm>
+            <a:off x="2589211" y="1451113"/>
+            <a:ext cx="9079327" cy="5068957"/>
+          </a:xfrm>
+        </p:spPr>
         <p:txBody>
           <a:bodyPr/>
           <a:lstStyle/>
           <a:p>
-            <a:endParaRPr lang="en-US"/>
+            <a:endParaRPr lang="en-US" dirty="0"/>
           </a:p>
         </p:txBody>
       </p:sp>
     </p:spTree>
     <p:extLst>
       <p:ext uri="{BB962C8B-B14F-4D97-AF65-F5344CB8AC3E}">
-        <p14:creationId xmlns:p14="http://schemas.microsoft.com/office/powerpoint/2010/main" val="3224787290"/>
+        <p14:creationId xmlns:p14="http://schemas.microsoft.com/office/powerpoint/2010/main" val="3600086102"/>
       </p:ext>
     </p:extLst>
   </p:cSld>
@@ -10133,7 +10254,7 @@
           <p:cNvPr id="2" name="Title 1">
             <a:extLst>
               <a:ext uri="{FF2B5EF4-FFF2-40B4-BE49-F238E27FC236}">
-                <a16:creationId xmlns:a16="http://schemas.microsoft.com/office/drawing/2014/main" id="{43A28E36-012E-4395-B0EC-36761B56D78C}"/>
+                <a16:creationId xmlns:a16="http://schemas.microsoft.com/office/drawing/2014/main" id="{9C5E42EE-EA5D-4203-B1EC-B96B68D2A8EA}"/>
               </a:ext>
             </a:extLst>
           </p:cNvPr>
@@ -10146,13 +10267,19 @@
         </p:nvSpPr>
         <p:spPr/>
         <p:txBody>
-          <a:bodyPr/>
+          <a:bodyPr>
+            <a:normAutofit/>
+          </a:bodyPr>
           <a:lstStyle/>
           <a:p>
-            <a:r>
-              <a:rPr lang="en-US" sz="4400" b="0" i="0" kern="1200" baseline="0" dirty="0">
+            <a:pPr rtl="0" eaLnBrk="1" latinLnBrk="0" hangingPunct="1"/>
+            <a:r>
+              <a:rPr lang="en-US" sz="3600" b="0" i="0" kern="1200" baseline="0" dirty="0">
                 <a:solidFill>
-                  <a:schemeClr val="tx1"/>
+                  <a:schemeClr val="tx1">
+                    <a:lumMod val="85000"/>
+                    <a:lumOff val="15000"/>
+                  </a:schemeClr>
                 </a:solidFill>
                 <a:effectLst/>
                 <a:latin typeface="+mj-lt"/>
@@ -10161,7 +10288,9 @@
               </a:rPr>
               <a:t>Pivotal Value Statement </a:t>
             </a:r>
-            <a:endParaRPr lang="en-US" dirty="0"/>
+            <a:endParaRPr lang="en-US" sz="4400" dirty="0">
+              <a:effectLst/>
+            </a:endParaRPr>
           </a:p>
         </p:txBody>
       </p:sp>
@@ -10170,7 +10299,7 @@
           <p:cNvPr id="3" name="Content Placeholder 2">
             <a:extLst>
               <a:ext uri="{FF2B5EF4-FFF2-40B4-BE49-F238E27FC236}">
-                <a16:creationId xmlns:a16="http://schemas.microsoft.com/office/drawing/2014/main" id="{5CFC58F6-1277-49D4-86BB-7D1B0E885E68}"/>
+                <a16:creationId xmlns:a16="http://schemas.microsoft.com/office/drawing/2014/main" id="{044B4F6E-A639-47F4-91A5-68807265D618}"/>
               </a:ext>
             </a:extLst>
           </p:cNvPr>
@@ -10181,19 +10310,24 @@
             <p:ph idx="1"/>
           </p:nvPr>
         </p:nvSpPr>
-        <p:spPr/>
+        <p:spPr>
+          <a:xfrm>
+            <a:off x="2589211" y="1451113"/>
+            <a:ext cx="9079327" cy="5068957"/>
+          </a:xfrm>
+        </p:spPr>
         <p:txBody>
           <a:bodyPr/>
           <a:lstStyle/>
           <a:p>
-            <a:endParaRPr lang="en-US"/>
+            <a:endParaRPr lang="en-US" dirty="0"/>
           </a:p>
         </p:txBody>
       </p:sp>
     </p:spTree>
     <p:extLst>
       <p:ext uri="{BB962C8B-B14F-4D97-AF65-F5344CB8AC3E}">
-        <p14:creationId xmlns:p14="http://schemas.microsoft.com/office/powerpoint/2010/main" val="2764781334"/>
+        <p14:creationId xmlns:p14="http://schemas.microsoft.com/office/powerpoint/2010/main" val="3071141420"/>
       </p:ext>
     </p:extLst>
   </p:cSld>
@@ -10225,7 +10359,7 @@
           <p:cNvPr id="2" name="Title 1">
             <a:extLst>
               <a:ext uri="{FF2B5EF4-FFF2-40B4-BE49-F238E27FC236}">
-                <a16:creationId xmlns:a16="http://schemas.microsoft.com/office/drawing/2014/main" id="{30D8BA34-68B4-477E-AA56-8A4413D45AC9}"/>
+                <a16:creationId xmlns:a16="http://schemas.microsoft.com/office/drawing/2014/main" id="{9C5E42EE-EA5D-4203-B1EC-B96B68D2A8EA}"/>
               </a:ext>
             </a:extLst>
           </p:cNvPr>
@@ -10238,13 +10372,46 @@
         </p:nvSpPr>
         <p:spPr/>
         <p:txBody>
-          <a:bodyPr/>
+          <a:bodyPr>
+            <a:normAutofit/>
+          </a:bodyPr>
           <a:lstStyle/>
           <a:p>
-            <a:r>
-              <a:rPr lang="en-US" dirty="0"/>
+            <a:pPr marL="0" marR="0" lvl="0" indent="0" algn="l" defTabSz="457200" rtl="0" eaLnBrk="1" fontAlgn="auto" latinLnBrk="0" hangingPunct="1">
+              <a:lnSpc>
+                <a:spcPct val="100000"/>
+              </a:lnSpc>
+              <a:spcBef>
+                <a:spcPct val="0"/>
+              </a:spcBef>
+              <a:spcAft>
+                <a:spcPts val="0"/>
+              </a:spcAft>
+              <a:buClrTx/>
+              <a:buSzTx/>
+              <a:buFontTx/>
+              <a:buNone/>
+              <a:tabLst/>
+              <a:defRPr/>
+            </a:pPr>
+            <a:r>
+              <a:rPr lang="en-US" sz="3600" kern="1200" dirty="0">
+                <a:solidFill>
+                  <a:schemeClr val="tx1">
+                    <a:lumMod val="85000"/>
+                    <a:lumOff val="15000"/>
+                  </a:schemeClr>
+                </a:solidFill>
+                <a:effectLst/>
+                <a:latin typeface="+mj-lt"/>
+                <a:ea typeface="+mj-ea"/>
+                <a:cs typeface="+mj-cs"/>
+              </a:rPr>
               <a:t>_Notes_</a:t>
             </a:r>
+            <a:endParaRPr lang="en-US" dirty="0">
+              <a:effectLst/>
+            </a:endParaRPr>
           </a:p>
         </p:txBody>
       </p:sp>
@@ -10253,7 +10420,7 @@
           <p:cNvPr id="3" name="Content Placeholder 2">
             <a:extLst>
               <a:ext uri="{FF2B5EF4-FFF2-40B4-BE49-F238E27FC236}">
-                <a16:creationId xmlns:a16="http://schemas.microsoft.com/office/drawing/2014/main" id="{F80EC028-51B1-4DE2-B579-B7B5745BC933}"/>
+                <a16:creationId xmlns:a16="http://schemas.microsoft.com/office/drawing/2014/main" id="{044B4F6E-A639-47F4-91A5-68807265D618}"/>
               </a:ext>
             </a:extLst>
           </p:cNvPr>
@@ -10264,19 +10431,24 @@
             <p:ph idx="1"/>
           </p:nvPr>
         </p:nvSpPr>
-        <p:spPr/>
+        <p:spPr>
+          <a:xfrm>
+            <a:off x="2589211" y="1451113"/>
+            <a:ext cx="9079327" cy="5068957"/>
+          </a:xfrm>
+        </p:spPr>
         <p:txBody>
           <a:bodyPr/>
           <a:lstStyle/>
           <a:p>
-            <a:endParaRPr lang="en-US"/>
+            <a:endParaRPr lang="en-US" dirty="0"/>
           </a:p>
         </p:txBody>
       </p:sp>
     </p:spTree>
     <p:extLst>
       <p:ext uri="{BB962C8B-B14F-4D97-AF65-F5344CB8AC3E}">
-        <p14:creationId xmlns:p14="http://schemas.microsoft.com/office/powerpoint/2010/main" val="2109186630"/>
+        <p14:creationId xmlns:p14="http://schemas.microsoft.com/office/powerpoint/2010/main" val="3976643547"/>
       </p:ext>
     </p:extLst>
   </p:cSld>
@@ -10337,32 +10509,6 @@
               </a:rPr>
               <a:t>Customer Request</a:t>
             </a:r>
-            <a:br>
-              <a:rPr lang="en-US" sz="4400" b="0" i="0" u="none" strike="noStrike" kern="1200" baseline="0" dirty="0">
-                <a:solidFill>
-                  <a:schemeClr val="tx1"/>
-                </a:solidFill>
-                <a:latin typeface="+mj-lt"/>
-                <a:ea typeface="+mj-ea"/>
-                <a:cs typeface="+mj-cs"/>
-              </a:rPr>
-            </a:br>
-            <a:r>
-              <a:rPr lang="en-US" sz="2800" b="0" i="0" u="none" strike="noStrike" kern="1200" dirty="0">
-                <a:solidFill>
-                  <a:schemeClr val="tx1"/>
-                </a:solidFill>
-              </a:rPr>
-              <a:t>Identification of Needs &amp; </a:t>
-            </a:r>
-            <a:r>
-              <a:rPr lang="en-US" sz="2800" b="0" i="0" u="none" strike="noStrike" kern="1200" baseline="0" dirty="0">
-                <a:solidFill>
-                  <a:schemeClr val="tx1"/>
-                </a:solidFill>
-              </a:rPr>
-              <a:t>Challenges</a:t>
-            </a:r>
             <a:endParaRPr lang="en-US" sz="2800" dirty="0"/>
           </a:p>
         </p:txBody>
@@ -10383,7 +10529,12 @@
             <p:ph idx="1"/>
           </p:nvPr>
         </p:nvSpPr>
-        <p:spPr/>
+        <p:spPr>
+          <a:xfrm>
+            <a:off x="2589211" y="1451113"/>
+            <a:ext cx="9079327" cy="5068957"/>
+          </a:xfrm>
+        </p:spPr>
         <p:txBody>
           <a:bodyPr/>
           <a:lstStyle/>
@@ -10427,7 +10578,7 @@
           <p:cNvPr id="2" name="Title 1">
             <a:extLst>
               <a:ext uri="{FF2B5EF4-FFF2-40B4-BE49-F238E27FC236}">
-                <a16:creationId xmlns:a16="http://schemas.microsoft.com/office/drawing/2014/main" id="{04C993AE-4FB0-4669-8BB3-8801EA50AF12}"/>
+                <a16:creationId xmlns:a16="http://schemas.microsoft.com/office/drawing/2014/main" id="{9C5E42EE-EA5D-4203-B1EC-B96B68D2A8EA}"/>
               </a:ext>
             </a:extLst>
           </p:cNvPr>
@@ -10446,9 +10597,21 @@
           <a:lstStyle/>
           <a:p>
             <a:r>
-              <a:rPr lang="en-US" sz="4400" dirty="0"/>
+              <a:rPr lang="en-US" sz="3600" kern="1200" dirty="0">
+                <a:solidFill>
+                  <a:schemeClr val="tx1">
+                    <a:lumMod val="85000"/>
+                    <a:lumOff val="15000"/>
+                  </a:schemeClr>
+                </a:solidFill>
+                <a:effectLst/>
+                <a:latin typeface="+mj-lt"/>
+                <a:ea typeface="+mj-ea"/>
+                <a:cs typeface="+mj-cs"/>
+              </a:rPr>
               <a:t>Feather Opportunities</a:t>
             </a:r>
+            <a:endParaRPr lang="en-US" sz="2800" dirty="0"/>
           </a:p>
         </p:txBody>
       </p:sp>
@@ -10457,7 +10620,7 @@
           <p:cNvPr id="3" name="Content Placeholder 2">
             <a:extLst>
               <a:ext uri="{FF2B5EF4-FFF2-40B4-BE49-F238E27FC236}">
-                <a16:creationId xmlns:a16="http://schemas.microsoft.com/office/drawing/2014/main" id="{D6C3F04F-3BFF-453C-8031-AE312E0A3509}"/>
+                <a16:creationId xmlns:a16="http://schemas.microsoft.com/office/drawing/2014/main" id="{044B4F6E-A639-47F4-91A5-68807265D618}"/>
               </a:ext>
             </a:extLst>
           </p:cNvPr>
@@ -10468,19 +10631,24 @@
             <p:ph idx="1"/>
           </p:nvPr>
         </p:nvSpPr>
-        <p:spPr/>
+        <p:spPr>
+          <a:xfrm>
+            <a:off x="2589211" y="1451113"/>
+            <a:ext cx="9079327" cy="5068957"/>
+          </a:xfrm>
+        </p:spPr>
         <p:txBody>
           <a:bodyPr/>
           <a:lstStyle/>
           <a:p>
-            <a:endParaRPr lang="en-US"/>
+            <a:endParaRPr lang="en-US" dirty="0"/>
           </a:p>
         </p:txBody>
       </p:sp>
     </p:spTree>
     <p:extLst>
       <p:ext uri="{BB962C8B-B14F-4D97-AF65-F5344CB8AC3E}">
-        <p14:creationId xmlns:p14="http://schemas.microsoft.com/office/powerpoint/2010/main" val="1141245059"/>
+        <p14:creationId xmlns:p14="http://schemas.microsoft.com/office/powerpoint/2010/main" val="906578158"/>
       </p:ext>
     </p:extLst>
   </p:cSld>
@@ -10512,7 +10680,7 @@
           <p:cNvPr id="2" name="Title 1">
             <a:extLst>
               <a:ext uri="{FF2B5EF4-FFF2-40B4-BE49-F238E27FC236}">
-                <a16:creationId xmlns:a16="http://schemas.microsoft.com/office/drawing/2014/main" id="{88363E62-F888-4FCB-A175-EB3706B85F1B}"/>
+                <a16:creationId xmlns:a16="http://schemas.microsoft.com/office/drawing/2014/main" id="{9C5E42EE-EA5D-4203-B1EC-B96B68D2A8EA}"/>
               </a:ext>
             </a:extLst>
           </p:cNvPr>
@@ -10525,21 +10693,30 @@
         </p:nvSpPr>
         <p:spPr/>
         <p:txBody>
-          <a:bodyPr/>
+          <a:bodyPr>
+            <a:normAutofit/>
+          </a:bodyPr>
           <a:lstStyle/>
           <a:p>
-            <a:r>
-              <a:rPr lang="en-US" sz="4400" b="0" i="0" u="none" strike="noStrike" kern="1200" baseline="0" dirty="0">
+            <a:pPr rtl="0" eaLnBrk="1" latinLnBrk="0" hangingPunct="1"/>
+            <a:r>
+              <a:rPr lang="en-US" sz="3600" b="0" i="0" kern="1200" baseline="0" dirty="0">
                 <a:solidFill>
-                  <a:schemeClr val="tx1"/>
+                  <a:schemeClr val="tx1">
+                    <a:lumMod val="85000"/>
+                    <a:lumOff val="15000"/>
+                  </a:schemeClr>
                 </a:solidFill>
+                <a:effectLst/>
                 <a:latin typeface="+mj-lt"/>
                 <a:ea typeface="+mj-ea"/>
                 <a:cs typeface="+mj-cs"/>
               </a:rPr>
               <a:t>Design Procedure (2)</a:t>
             </a:r>
-            <a:endParaRPr lang="en-US" dirty="0"/>
+            <a:endParaRPr lang="en-US" sz="4400" dirty="0">
+              <a:effectLst/>
+            </a:endParaRPr>
           </a:p>
         </p:txBody>
       </p:sp>
@@ -10548,7 +10725,7 @@
           <p:cNvPr id="3" name="Content Placeholder 2">
             <a:extLst>
               <a:ext uri="{FF2B5EF4-FFF2-40B4-BE49-F238E27FC236}">
-                <a16:creationId xmlns:a16="http://schemas.microsoft.com/office/drawing/2014/main" id="{A935FB1E-B06B-4E3A-A54C-04A508519109}"/>
+                <a16:creationId xmlns:a16="http://schemas.microsoft.com/office/drawing/2014/main" id="{044B4F6E-A639-47F4-91A5-68807265D618}"/>
               </a:ext>
             </a:extLst>
           </p:cNvPr>
@@ -10559,19 +10736,24 @@
             <p:ph idx="1"/>
           </p:nvPr>
         </p:nvSpPr>
-        <p:spPr/>
+        <p:spPr>
+          <a:xfrm>
+            <a:off x="2589211" y="1451113"/>
+            <a:ext cx="9079327" cy="5068957"/>
+          </a:xfrm>
+        </p:spPr>
         <p:txBody>
           <a:bodyPr/>
           <a:lstStyle/>
           <a:p>
-            <a:endParaRPr lang="en-US"/>
+            <a:endParaRPr lang="en-US" dirty="0"/>
           </a:p>
         </p:txBody>
       </p:sp>
     </p:spTree>
     <p:extLst>
       <p:ext uri="{BB962C8B-B14F-4D97-AF65-F5344CB8AC3E}">
-        <p14:creationId xmlns:p14="http://schemas.microsoft.com/office/powerpoint/2010/main" val="927521282"/>
+        <p14:creationId xmlns:p14="http://schemas.microsoft.com/office/powerpoint/2010/main" val="306193403"/>
       </p:ext>
     </p:extLst>
   </p:cSld>
@@ -10603,7 +10785,7 @@
           <p:cNvPr id="2" name="Title 1">
             <a:extLst>
               <a:ext uri="{FF2B5EF4-FFF2-40B4-BE49-F238E27FC236}">
-                <a16:creationId xmlns:a16="http://schemas.microsoft.com/office/drawing/2014/main" id="{563C072F-80F0-4A4C-AF42-6FE541B5E5E8}"/>
+                <a16:creationId xmlns:a16="http://schemas.microsoft.com/office/drawing/2014/main" id="{9C5E42EE-EA5D-4203-B1EC-B96B68D2A8EA}"/>
               </a:ext>
             </a:extLst>
           </p:cNvPr>
@@ -10616,21 +10798,30 @@
         </p:nvSpPr>
         <p:spPr/>
         <p:txBody>
-          <a:bodyPr/>
+          <a:bodyPr>
+            <a:normAutofit/>
+          </a:bodyPr>
           <a:lstStyle/>
           <a:p>
-            <a:r>
-              <a:rPr lang="en-US" sz="4400" b="0" i="0" u="none" strike="noStrike" kern="1200" baseline="0" dirty="0">
+            <a:pPr rtl="0" eaLnBrk="1" latinLnBrk="0" hangingPunct="1"/>
+            <a:r>
+              <a:rPr lang="en-US" sz="3600" b="0" i="0" kern="1200" baseline="0" dirty="0">
                 <a:solidFill>
-                  <a:schemeClr val="tx1"/>
+                  <a:schemeClr val="tx1">
+                    <a:lumMod val="85000"/>
+                    <a:lumOff val="15000"/>
+                  </a:schemeClr>
                 </a:solidFill>
+                <a:effectLst/>
                 <a:latin typeface="+mj-lt"/>
                 <a:ea typeface="+mj-ea"/>
                 <a:cs typeface="+mj-cs"/>
               </a:rPr>
               <a:t>Development Methodology (3)</a:t>
             </a:r>
-            <a:endParaRPr lang="en-US" dirty="0"/>
+            <a:endParaRPr lang="en-US" sz="4400" dirty="0">
+              <a:effectLst/>
+            </a:endParaRPr>
           </a:p>
         </p:txBody>
       </p:sp>
@@ -10639,7 +10830,7 @@
           <p:cNvPr id="3" name="Content Placeholder 2">
             <a:extLst>
               <a:ext uri="{FF2B5EF4-FFF2-40B4-BE49-F238E27FC236}">
-                <a16:creationId xmlns:a16="http://schemas.microsoft.com/office/drawing/2014/main" id="{FD858DE0-CA2F-478E-B44A-4A16F74BB9EE}"/>
+                <a16:creationId xmlns:a16="http://schemas.microsoft.com/office/drawing/2014/main" id="{044B4F6E-A639-47F4-91A5-68807265D618}"/>
               </a:ext>
             </a:extLst>
           </p:cNvPr>
@@ -10650,19 +10841,24 @@
             <p:ph idx="1"/>
           </p:nvPr>
         </p:nvSpPr>
-        <p:spPr/>
+        <p:spPr>
+          <a:xfrm>
+            <a:off x="2589211" y="1451113"/>
+            <a:ext cx="9079327" cy="5068957"/>
+          </a:xfrm>
+        </p:spPr>
         <p:txBody>
           <a:bodyPr/>
           <a:lstStyle/>
           <a:p>
-            <a:endParaRPr lang="en-US"/>
+            <a:endParaRPr lang="en-US" dirty="0"/>
           </a:p>
         </p:txBody>
       </p:sp>
     </p:spTree>
     <p:extLst>
       <p:ext uri="{BB962C8B-B14F-4D97-AF65-F5344CB8AC3E}">
-        <p14:creationId xmlns:p14="http://schemas.microsoft.com/office/powerpoint/2010/main" val="163627118"/>
+        <p14:creationId xmlns:p14="http://schemas.microsoft.com/office/powerpoint/2010/main" val="1317707174"/>
       </p:ext>
     </p:extLst>
   </p:cSld>
@@ -10694,7 +10890,7 @@
           <p:cNvPr id="2" name="Title 1">
             <a:extLst>
               <a:ext uri="{FF2B5EF4-FFF2-40B4-BE49-F238E27FC236}">
-                <a16:creationId xmlns:a16="http://schemas.microsoft.com/office/drawing/2014/main" id="{D4A719D7-5C57-4915-9A3F-78D1A0EFB069}"/>
+                <a16:creationId xmlns:a16="http://schemas.microsoft.com/office/drawing/2014/main" id="{9C5E42EE-EA5D-4203-B1EC-B96B68D2A8EA}"/>
               </a:ext>
             </a:extLst>
           </p:cNvPr>
@@ -10707,21 +10903,30 @@
         </p:nvSpPr>
         <p:spPr/>
         <p:txBody>
-          <a:bodyPr/>
+          <a:bodyPr>
+            <a:normAutofit/>
+          </a:bodyPr>
           <a:lstStyle/>
           <a:p>
-            <a:r>
-              <a:rPr lang="en-US" sz="4400" b="0" i="0" u="none" strike="noStrike" kern="1200" baseline="0" dirty="0">
+            <a:pPr rtl="0" eaLnBrk="1" latinLnBrk="0" hangingPunct="1"/>
+            <a:r>
+              <a:rPr lang="en-US" sz="3600" b="0" i="0" kern="1200" baseline="0" dirty="0">
                 <a:solidFill>
-                  <a:schemeClr val="tx1"/>
+                  <a:schemeClr val="tx1">
+                    <a:lumMod val="85000"/>
+                    <a:lumOff val="15000"/>
+                  </a:schemeClr>
                 </a:solidFill>
+                <a:effectLst/>
                 <a:latin typeface="+mj-lt"/>
                 <a:ea typeface="+mj-ea"/>
                 <a:cs typeface="+mj-cs"/>
               </a:rPr>
               <a:t>Overcome Challenges</a:t>
             </a:r>
-            <a:endParaRPr lang="en-US" dirty="0"/>
+            <a:endParaRPr lang="en-US" sz="4400" dirty="0">
+              <a:effectLst/>
+            </a:endParaRPr>
           </a:p>
         </p:txBody>
       </p:sp>
@@ -10730,7 +10935,7 @@
           <p:cNvPr id="3" name="Content Placeholder 2">
             <a:extLst>
               <a:ext uri="{FF2B5EF4-FFF2-40B4-BE49-F238E27FC236}">
-                <a16:creationId xmlns:a16="http://schemas.microsoft.com/office/drawing/2014/main" id="{8987EDAD-8262-4FFE-8E62-474EB7CAFDCC}"/>
+                <a16:creationId xmlns:a16="http://schemas.microsoft.com/office/drawing/2014/main" id="{044B4F6E-A639-47F4-91A5-68807265D618}"/>
               </a:ext>
             </a:extLst>
           </p:cNvPr>
@@ -10741,19 +10946,24 @@
             <p:ph idx="1"/>
           </p:nvPr>
         </p:nvSpPr>
-        <p:spPr/>
+        <p:spPr>
+          <a:xfrm>
+            <a:off x="2589211" y="1451113"/>
+            <a:ext cx="9079327" cy="5068957"/>
+          </a:xfrm>
+        </p:spPr>
         <p:txBody>
           <a:bodyPr/>
           <a:lstStyle/>
           <a:p>
-            <a:endParaRPr lang="en-US"/>
+            <a:endParaRPr lang="en-US" dirty="0"/>
           </a:p>
         </p:txBody>
       </p:sp>
     </p:spTree>
     <p:extLst>
       <p:ext uri="{BB962C8B-B14F-4D97-AF65-F5344CB8AC3E}">
-        <p14:creationId xmlns:p14="http://schemas.microsoft.com/office/powerpoint/2010/main" val="73419143"/>
+        <p14:creationId xmlns:p14="http://schemas.microsoft.com/office/powerpoint/2010/main" val="2805820393"/>
       </p:ext>
     </p:extLst>
   </p:cSld>
@@ -10785,7 +10995,7 @@
           <p:cNvPr id="2" name="Title 1">
             <a:extLst>
               <a:ext uri="{FF2B5EF4-FFF2-40B4-BE49-F238E27FC236}">
-                <a16:creationId xmlns:a16="http://schemas.microsoft.com/office/drawing/2014/main" id="{5012C1FE-807C-428F-AC4E-16C44712459E}"/>
+                <a16:creationId xmlns:a16="http://schemas.microsoft.com/office/drawing/2014/main" id="{9C5E42EE-EA5D-4203-B1EC-B96B68D2A8EA}"/>
               </a:ext>
             </a:extLst>
           </p:cNvPr>
@@ -10798,21 +11008,27 @@
         </p:nvSpPr>
         <p:spPr/>
         <p:txBody>
-          <a:bodyPr/>
+          <a:bodyPr>
+            <a:normAutofit/>
+          </a:bodyPr>
           <a:lstStyle/>
           <a:p>
             <a:r>
-              <a:rPr lang="en-US" sz="4400" b="0" i="0" u="none" strike="noStrike" kern="1200" baseline="0" dirty="0">
+              <a:rPr lang="en-US" sz="3600" b="0" i="0" kern="1200" baseline="0" dirty="0">
                 <a:solidFill>
-                  <a:schemeClr val="tx1"/>
+                  <a:schemeClr val="tx1">
+                    <a:lumMod val="85000"/>
+                    <a:lumOff val="15000"/>
+                  </a:schemeClr>
                 </a:solidFill>
+                <a:effectLst/>
                 <a:latin typeface="+mj-lt"/>
                 <a:ea typeface="+mj-ea"/>
                 <a:cs typeface="+mj-cs"/>
               </a:rPr>
               <a:t>Deliverable &amp; Results (2)</a:t>
             </a:r>
-            <a:endParaRPr lang="en-US" dirty="0"/>
+            <a:endParaRPr lang="en-US" sz="2800" dirty="0"/>
           </a:p>
         </p:txBody>
       </p:sp>
@@ -10821,7 +11037,7 @@
           <p:cNvPr id="3" name="Content Placeholder 2">
             <a:extLst>
               <a:ext uri="{FF2B5EF4-FFF2-40B4-BE49-F238E27FC236}">
-                <a16:creationId xmlns:a16="http://schemas.microsoft.com/office/drawing/2014/main" id="{C04C8CA2-BD0D-4489-B64B-CD3544982353}"/>
+                <a16:creationId xmlns:a16="http://schemas.microsoft.com/office/drawing/2014/main" id="{044B4F6E-A639-47F4-91A5-68807265D618}"/>
               </a:ext>
             </a:extLst>
           </p:cNvPr>
@@ -10832,19 +11048,24 @@
             <p:ph idx="1"/>
           </p:nvPr>
         </p:nvSpPr>
-        <p:spPr/>
+        <p:spPr>
+          <a:xfrm>
+            <a:off x="2589211" y="1451113"/>
+            <a:ext cx="9079327" cy="5068957"/>
+          </a:xfrm>
+        </p:spPr>
         <p:txBody>
           <a:bodyPr/>
           <a:lstStyle/>
           <a:p>
-            <a:endParaRPr lang="en-US"/>
+            <a:endParaRPr lang="en-US" dirty="0"/>
           </a:p>
         </p:txBody>
       </p:sp>
     </p:spTree>
     <p:extLst>
       <p:ext uri="{BB962C8B-B14F-4D97-AF65-F5344CB8AC3E}">
-        <p14:creationId xmlns:p14="http://schemas.microsoft.com/office/powerpoint/2010/main" val="820223982"/>
+        <p14:creationId xmlns:p14="http://schemas.microsoft.com/office/powerpoint/2010/main" val="821675052"/>
       </p:ext>
     </p:extLst>
   </p:cSld>
@@ -10876,7 +11097,7 @@
           <p:cNvPr id="2" name="Title 1">
             <a:extLst>
               <a:ext uri="{FF2B5EF4-FFF2-40B4-BE49-F238E27FC236}">
-                <a16:creationId xmlns:a16="http://schemas.microsoft.com/office/drawing/2014/main" id="{6217DE87-9215-4E9A-B6B9-7706767BAD3A}"/>
+                <a16:creationId xmlns:a16="http://schemas.microsoft.com/office/drawing/2014/main" id="{9C5E42EE-EA5D-4203-B1EC-B96B68D2A8EA}"/>
               </a:ext>
             </a:extLst>
           </p:cNvPr>
@@ -10889,21 +11110,30 @@
         </p:nvSpPr>
         <p:spPr/>
         <p:txBody>
-          <a:bodyPr/>
+          <a:bodyPr>
+            <a:normAutofit/>
+          </a:bodyPr>
           <a:lstStyle/>
           <a:p>
-            <a:r>
-              <a:rPr lang="en-US" sz="4400" b="0" i="0" u="none" strike="noStrike" kern="1200" baseline="0" dirty="0">
+            <a:pPr rtl="0" eaLnBrk="1" latinLnBrk="0" hangingPunct="1"/>
+            <a:r>
+              <a:rPr lang="en-US" sz="3600" b="0" i="0" kern="1200" baseline="0" dirty="0">
                 <a:solidFill>
-                  <a:schemeClr val="tx1"/>
+                  <a:schemeClr val="tx1">
+                    <a:lumMod val="85000"/>
+                    <a:lumOff val="15000"/>
+                  </a:schemeClr>
                 </a:solidFill>
+                <a:effectLst/>
                 <a:latin typeface="+mj-lt"/>
                 <a:ea typeface="+mj-ea"/>
                 <a:cs typeface="+mj-cs"/>
               </a:rPr>
               <a:t>Learnings &amp; Growths</a:t>
             </a:r>
-            <a:endParaRPr lang="en-US" dirty="0"/>
+            <a:endParaRPr lang="en-US" sz="4400" dirty="0">
+              <a:effectLst/>
+            </a:endParaRPr>
           </a:p>
         </p:txBody>
       </p:sp>
@@ -10912,7 +11142,7 @@
           <p:cNvPr id="3" name="Content Placeholder 2">
             <a:extLst>
               <a:ext uri="{FF2B5EF4-FFF2-40B4-BE49-F238E27FC236}">
-                <a16:creationId xmlns:a16="http://schemas.microsoft.com/office/drawing/2014/main" id="{B1138675-87A9-4CDA-A016-E6EED43EF64E}"/>
+                <a16:creationId xmlns:a16="http://schemas.microsoft.com/office/drawing/2014/main" id="{044B4F6E-A639-47F4-91A5-68807265D618}"/>
               </a:ext>
             </a:extLst>
           </p:cNvPr>
@@ -10923,19 +11153,24 @@
             <p:ph idx="1"/>
           </p:nvPr>
         </p:nvSpPr>
-        <p:spPr/>
+        <p:spPr>
+          <a:xfrm>
+            <a:off x="2589211" y="1451113"/>
+            <a:ext cx="9079327" cy="5068957"/>
+          </a:xfrm>
+        </p:spPr>
         <p:txBody>
           <a:bodyPr/>
           <a:lstStyle/>
           <a:p>
-            <a:endParaRPr lang="en-US"/>
+            <a:endParaRPr lang="en-US" dirty="0"/>
           </a:p>
         </p:txBody>
       </p:sp>
     </p:spTree>
     <p:extLst>
       <p:ext uri="{BB962C8B-B14F-4D97-AF65-F5344CB8AC3E}">
-        <p14:creationId xmlns:p14="http://schemas.microsoft.com/office/powerpoint/2010/main" val="4001811534"/>
+        <p14:creationId xmlns:p14="http://schemas.microsoft.com/office/powerpoint/2010/main" val="3042754836"/>
       </p:ext>
     </p:extLst>
   </p:cSld>
@@ -10967,7 +11202,7 @@
           <p:cNvPr id="2" name="Title 1">
             <a:extLst>
               <a:ext uri="{FF2B5EF4-FFF2-40B4-BE49-F238E27FC236}">
-                <a16:creationId xmlns:a16="http://schemas.microsoft.com/office/drawing/2014/main" id="{0F0EC5FE-E316-4499-AEE1-3F203FB8075C}"/>
+                <a16:creationId xmlns:a16="http://schemas.microsoft.com/office/drawing/2014/main" id="{9C5E42EE-EA5D-4203-B1EC-B96B68D2A8EA}"/>
               </a:ext>
             </a:extLst>
           </p:cNvPr>
@@ -10980,13 +11215,19 @@
         </p:nvSpPr>
         <p:spPr/>
         <p:txBody>
-          <a:bodyPr/>
+          <a:bodyPr>
+            <a:normAutofit/>
+          </a:bodyPr>
           <a:lstStyle/>
           <a:p>
-            <a:r>
-              <a:rPr lang="en-US" sz="4400" b="0" i="0" kern="1200" baseline="0" dirty="0">
+            <a:pPr rtl="0" eaLnBrk="1" latinLnBrk="0" hangingPunct="1"/>
+            <a:r>
+              <a:rPr lang="en-US" sz="3600" b="0" i="0" kern="1200" baseline="0" dirty="0">
                 <a:solidFill>
-                  <a:schemeClr val="tx1"/>
+                  <a:schemeClr val="tx1">
+                    <a:lumMod val="85000"/>
+                    <a:lumOff val="15000"/>
+                  </a:schemeClr>
                 </a:solidFill>
                 <a:effectLst/>
                 <a:latin typeface="+mj-lt"/>
@@ -10995,7 +11236,9 @@
               </a:rPr>
               <a:t>Outcomes</a:t>
             </a:r>
-            <a:endParaRPr lang="en-US" dirty="0"/>
+            <a:endParaRPr lang="en-US" sz="4400" dirty="0">
+              <a:effectLst/>
+            </a:endParaRPr>
           </a:p>
         </p:txBody>
       </p:sp>
@@ -11004,7 +11247,7 @@
           <p:cNvPr id="3" name="Content Placeholder 2">
             <a:extLst>
               <a:ext uri="{FF2B5EF4-FFF2-40B4-BE49-F238E27FC236}">
-                <a16:creationId xmlns:a16="http://schemas.microsoft.com/office/drawing/2014/main" id="{5F34F862-E71D-4D72-B80B-A4351D585243}"/>
+                <a16:creationId xmlns:a16="http://schemas.microsoft.com/office/drawing/2014/main" id="{044B4F6E-A639-47F4-91A5-68807265D618}"/>
               </a:ext>
             </a:extLst>
           </p:cNvPr>
@@ -11015,19 +11258,24 @@
             <p:ph idx="1"/>
           </p:nvPr>
         </p:nvSpPr>
-        <p:spPr/>
+        <p:spPr>
+          <a:xfrm>
+            <a:off x="2589211" y="1451113"/>
+            <a:ext cx="9079327" cy="5068957"/>
+          </a:xfrm>
+        </p:spPr>
         <p:txBody>
           <a:bodyPr/>
           <a:lstStyle/>
           <a:p>
-            <a:endParaRPr lang="en-US"/>
+            <a:endParaRPr lang="en-US" dirty="0"/>
           </a:p>
         </p:txBody>
       </p:sp>
     </p:spTree>
     <p:extLst>
       <p:ext uri="{BB962C8B-B14F-4D97-AF65-F5344CB8AC3E}">
-        <p14:creationId xmlns:p14="http://schemas.microsoft.com/office/powerpoint/2010/main" val="681447346"/>
+        <p14:creationId xmlns:p14="http://schemas.microsoft.com/office/powerpoint/2010/main" val="2229688103"/>
       </p:ext>
     </p:extLst>
   </p:cSld>

</xml_diff>

<commit_message>
(+)    add design procedure outline
</commit_message>
<xml_diff>
--- a/Suppl/Pivotal Presentation - DTECTS.pptx
+++ b/Suppl/Pivotal Presentation - DTECTS.pptx
@@ -1310,7 +1310,15 @@
             </a:pPr>
             <a:r>
               <a:rPr lang="en-US" dirty="0"/>
-              <a:t>OTM evaluate, path option identifications (Arduino, Python, OTM(C/C++), Lua, JavaScript)</a:t>
+              <a:t>OTM evaluate, path option identifications (Arduino, Python, OTM(C/C++), </a:t>
+            </a:r>
+            <a:r>
+              <a:rPr lang="en-US" dirty="0" err="1"/>
+              <a:t>PlatformIO</a:t>
+            </a:r>
+            <a:r>
+              <a:rPr lang="en-US" dirty="0"/>
+              <a:t>, Lua, JavaScript)</a:t>
             </a:r>
           </a:p>
           <a:p>
@@ -1719,6 +1727,79 @@
             </a:r>
           </a:p>
           <a:p>
+            <a:pPr marL="628650" marR="0" lvl="1" indent="-171450" algn="l" defTabSz="914400" rtl="0" eaLnBrk="1" fontAlgn="auto" latinLnBrk="0" hangingPunct="1">
+              <a:lnSpc>
+                <a:spcPct val="100000"/>
+              </a:lnSpc>
+              <a:spcBef>
+                <a:spcPts val="0"/>
+              </a:spcBef>
+              <a:spcAft>
+                <a:spcPts val="0"/>
+              </a:spcAft>
+              <a:buClrTx/>
+              <a:buSzTx/>
+              <a:buFontTx/>
+              <a:buChar char="-"/>
+              <a:tabLst/>
+              <a:defRPr/>
+            </a:pPr>
+            <a:r>
+              <a:rPr lang="en-US" dirty="0"/>
+              <a:t>Time</a:t>
+            </a:r>
+            <a:r>
+              <a:rPr lang="en-US" baseline="0" dirty="0"/>
+              <a:t> Spent: </a:t>
+            </a:r>
+            <a:endParaRPr lang="en-US" dirty="0"/>
+          </a:p>
+          <a:p>
+            <a:pPr marL="628650" lvl="1" indent="-171450">
+              <a:buFontTx/>
+              <a:buChar char="-"/>
+            </a:pPr>
+            <a:r>
+              <a:rPr lang="en-US" dirty="0"/>
+              <a:t>In-person</a:t>
+            </a:r>
+            <a:r>
+              <a:rPr lang="en-US" baseline="0" dirty="0"/>
+              <a:t> visits, hands on time with DUT to establish scope &amp; path forward</a:t>
+            </a:r>
+          </a:p>
+          <a:p>
+            <a:pPr marL="628650" lvl="1" indent="-171450">
+              <a:buFontTx/>
+              <a:buChar char="-"/>
+            </a:pPr>
+            <a:r>
+              <a:rPr lang="en-US" baseline="0" dirty="0"/>
+              <a:t>Time on the seat trying things that were known to not succeed, in order to communicate this (ESP, Hand Re-work, PCB Design Selections, Comm Interfaces)</a:t>
+            </a:r>
+          </a:p>
+          <a:p>
+            <a:pPr marL="628650" lvl="1" indent="-171450">
+              <a:buFontTx/>
+              <a:buChar char="-"/>
+            </a:pPr>
+            <a:r>
+              <a:rPr lang="en-US" baseline="0" dirty="0"/>
+              <a:t>Clear Scope with Doc of Ideas</a:t>
+            </a:r>
+          </a:p>
+          <a:p>
+            <a:pPr marL="628650" lvl="1" indent="-171450">
+              <a:buFontTx/>
+              <a:buChar char="-"/>
+            </a:pPr>
+            <a:r>
+              <a:rPr lang="en-US" baseline="0" dirty="0"/>
+              <a:t>Present ideas with articulation, PoC when possible</a:t>
+            </a:r>
+            <a:endParaRPr lang="en-US" dirty="0"/>
+          </a:p>
+          <a:p>
             <a:pPr marL="171450" indent="-171450">
               <a:buFontTx/>
               <a:buChar char="-"/>
@@ -1729,6 +1810,45 @@
             </a:r>
           </a:p>
           <a:p>
+            <a:pPr marL="628650" lvl="1" indent="-171450">
+              <a:buFontTx/>
+              <a:buChar char="-"/>
+            </a:pPr>
+            <a:r>
+              <a:rPr lang="en-US" dirty="0"/>
+              <a:t>Time</a:t>
+            </a:r>
+            <a:r>
+              <a:rPr lang="en-US" baseline="0" dirty="0"/>
+              <a:t> Spent: Espressif VM, ESP-SDK Ramp &amp; Feather Deployment (JTAG)</a:t>
+            </a:r>
+            <a:endParaRPr lang="en-US" dirty="0"/>
+          </a:p>
+          <a:p>
+            <a:pPr marL="628650" lvl="1" indent="-171450">
+              <a:buFontTx/>
+              <a:buChar char="-"/>
+            </a:pPr>
+            <a:r>
+              <a:rPr lang="en-US" dirty="0"/>
+              <a:t>Focused on path to market and only stepped in</a:t>
+            </a:r>
+            <a:r>
+              <a:rPr lang="en-US" baseline="0" dirty="0"/>
+              <a:t> on request (Arduino) or for path (ESP)</a:t>
+            </a:r>
+          </a:p>
+          <a:p>
+            <a:pPr marL="628650" lvl="1" indent="-171450">
+              <a:buFontTx/>
+              <a:buChar char="-"/>
+            </a:pPr>
+            <a:r>
+              <a:rPr lang="en-US" baseline="0" dirty="0"/>
+              <a:t>Focused on tangible results, shared with customer and asked for decision on next steps</a:t>
+            </a:r>
+          </a:p>
+          <a:p>
             <a:pPr marL="171450" indent="-171450">
               <a:buFontTx/>
               <a:buChar char="-"/>
@@ -1739,6 +1859,34 @@
             </a:r>
           </a:p>
           <a:p>
+            <a:pPr marL="628650" marR="0" lvl="1" indent="-171450" algn="l" defTabSz="914400" rtl="0" eaLnBrk="1" fontAlgn="auto" latinLnBrk="0" hangingPunct="1">
+              <a:lnSpc>
+                <a:spcPct val="100000"/>
+              </a:lnSpc>
+              <a:spcBef>
+                <a:spcPts val="0"/>
+              </a:spcBef>
+              <a:spcAft>
+                <a:spcPts val="0"/>
+              </a:spcAft>
+              <a:buClrTx/>
+              <a:buSzTx/>
+              <a:buFontTx/>
+              <a:buChar char="-"/>
+              <a:tabLst/>
+              <a:defRPr/>
+            </a:pPr>
+            <a:r>
+              <a:rPr lang="en-US" dirty="0"/>
+              <a:t>Time</a:t>
+            </a:r>
+            <a:r>
+              <a:rPr lang="en-US" baseline="0" dirty="0"/>
+              <a:t> Spent: EAGLE Ramp, Existing Design Port, Revision Proposal, Revision Generation &amp; Release</a:t>
+            </a:r>
+            <a:endParaRPr lang="en-US" dirty="0"/>
+          </a:p>
+          <a:p>
             <a:pPr marL="171450" indent="-171450">
               <a:buFontTx/>
               <a:buChar char="-"/>
@@ -1747,6 +1895,103 @@
               <a:rPr lang="en-US" dirty="0"/>
               <a:t>Contract Completion &amp; Transfer</a:t>
             </a:r>
+          </a:p>
+          <a:p>
+            <a:pPr marL="628650" lvl="1" indent="-171450">
+              <a:buFontTx/>
+              <a:buChar char="-"/>
+            </a:pPr>
+            <a:r>
+              <a:rPr lang="en-US" dirty="0"/>
+              <a:t>HW: Project</a:t>
+            </a:r>
+            <a:r>
+              <a:rPr lang="en-US" baseline="0" dirty="0"/>
+              <a:t> &amp; Board Revision</a:t>
+            </a:r>
+          </a:p>
+          <a:p>
+            <a:pPr marL="628650" marR="0" lvl="1" indent="-171450" algn="l" defTabSz="914400" rtl="0" eaLnBrk="1" fontAlgn="auto" latinLnBrk="0" hangingPunct="1">
+              <a:lnSpc>
+                <a:spcPct val="100000"/>
+              </a:lnSpc>
+              <a:spcBef>
+                <a:spcPts val="0"/>
+              </a:spcBef>
+              <a:spcAft>
+                <a:spcPts val="0"/>
+              </a:spcAft>
+              <a:buClrTx/>
+              <a:buSzTx/>
+              <a:buFontTx/>
+              <a:buChar char="-"/>
+              <a:tabLst/>
+              <a:defRPr/>
+            </a:pPr>
+            <a:r>
+              <a:rPr lang="en-US" baseline="0" dirty="0"/>
+              <a:t>FW: OTM spec w/path to use (c</a:t>
+            </a:r>
+            <a:r>
+              <a:rPr lang="en-US" dirty="0"/>
+              <a:t>omplete VM w/next steps &amp; design support)</a:t>
+            </a:r>
+          </a:p>
+          <a:p>
+            <a:pPr marL="628650" marR="0" lvl="1" indent="-171450" algn="l" defTabSz="914400" rtl="0" eaLnBrk="1" fontAlgn="auto" latinLnBrk="0" hangingPunct="1">
+              <a:lnSpc>
+                <a:spcPct val="100000"/>
+              </a:lnSpc>
+              <a:spcBef>
+                <a:spcPts val="0"/>
+              </a:spcBef>
+              <a:spcAft>
+                <a:spcPts val="0"/>
+              </a:spcAft>
+              <a:buClrTx/>
+              <a:buSzTx/>
+              <a:buFontTx/>
+              <a:buChar char="-"/>
+              <a:tabLst/>
+              <a:defRPr/>
+            </a:pPr>
+            <a:r>
+              <a:rPr lang="en-US" dirty="0"/>
+              <a:t>Design:</a:t>
+            </a:r>
+            <a:r>
+              <a:rPr lang="en-US" baseline="0" dirty="0"/>
+              <a:t>  Clear organization &amp; repo integration, </a:t>
+            </a:r>
+            <a:r>
+              <a:rPr lang="en-US" dirty="0"/>
+              <a:t>Identification</a:t>
+            </a:r>
+            <a:r>
+              <a:rPr lang="en-US" baseline="0" dirty="0"/>
+              <a:t> of OTM, Python &amp; JavaScript options</a:t>
+            </a:r>
+          </a:p>
+          <a:p>
+            <a:pPr marL="628650" lvl="1" indent="-171450">
+              <a:buFontTx/>
+              <a:buChar char="-"/>
+            </a:pPr>
+            <a:endParaRPr lang="en-US" dirty="0"/>
+          </a:p>
+          <a:p>
+            <a:pPr marL="628650" lvl="1" indent="-171450">
+              <a:buFontTx/>
+              <a:buChar char="-"/>
+            </a:pPr>
+            <a:endParaRPr lang="en-US" baseline="0" dirty="0"/>
+          </a:p>
+          <a:p>
+            <a:pPr marL="628650" lvl="1" indent="-171450">
+              <a:buFontTx/>
+              <a:buChar char="-"/>
+            </a:pPr>
+            <a:endParaRPr lang="en-US" dirty="0"/>
           </a:p>
           <a:p>
             <a:pPr marL="0" indent="0">
@@ -10539,7 +10784,64 @@
           <a:bodyPr/>
           <a:lstStyle/>
           <a:p>
-            <a:endParaRPr lang="en-US" dirty="0"/>
+            <a:r>
+              <a:rPr lang="en-US" dirty="0"/>
+              <a:t>Novel embedded device work with esteemed peer</a:t>
+            </a:r>
+          </a:p>
+          <a:p>
+            <a:pPr lvl="1"/>
+            <a:r>
+              <a:rPr lang="en-US" dirty="0"/>
+              <a:t>DTECTS for Ergsense</a:t>
+            </a:r>
+          </a:p>
+          <a:p>
+            <a:r>
+              <a:rPr lang="en-US" dirty="0"/>
+              <a:t>Stabilization &amp; path forward</a:t>
+            </a:r>
+          </a:p>
+          <a:p>
+            <a:pPr lvl="1"/>
+            <a:r>
+              <a:rPr lang="en-US" dirty="0"/>
+              <a:t>Firmware Architecture &amp; Path to Market</a:t>
+            </a:r>
+          </a:p>
+          <a:p>
+            <a:pPr lvl="1"/>
+            <a:r>
+              <a:rPr lang="en-US" dirty="0"/>
+              <a:t>Board Revisions</a:t>
+            </a:r>
+          </a:p>
+          <a:p>
+            <a:pPr lvl="1"/>
+            <a:r>
+              <a:rPr lang="en-US" dirty="0"/>
+              <a:t>Feature Integration &amp; Design Simplification</a:t>
+            </a:r>
+          </a:p>
+          <a:p>
+            <a:r>
+              <a:rPr lang="en-US" dirty="0"/>
+              <a:t>Shared</a:t>
+            </a:r>
+          </a:p>
+          <a:p>
+            <a:pPr lvl="1"/>
+            <a:r>
+              <a:rPr lang="en-US" dirty="0"/>
+              <a:t>Contract Identified</a:t>
+            </a:r>
+          </a:p>
+          <a:p>
+            <a:pPr lvl="1"/>
+            <a:r>
+              <a:rPr lang="en-US" dirty="0"/>
+              <a:t>Work Selection</a:t>
+            </a:r>
           </a:p>
         </p:txBody>
       </p:sp>

</xml_diff>

<commit_message>
(+)    add dev focus
</commit_message>
<xml_diff>
--- a/Suppl/Pivotal Presentation - DTECTS.pptx
+++ b/Suppl/Pivotal Presentation - DTECTS.pptx
@@ -688,6 +688,75 @@
             </a:r>
           </a:p>
           <a:p>
+            <a:r>
+              <a:rPr lang="en-US" sz="1200" b="0" i="0" u="none" strike="noStrike" kern="1200" baseline="0" dirty="0">
+                <a:solidFill>
+                  <a:schemeClr val="tx1"/>
+                </a:solidFill>
+                <a:latin typeface="+mn-lt"/>
+                <a:ea typeface="+mn-ea"/>
+                <a:cs typeface="+mn-cs"/>
+              </a:rPr>
+              <a:t>Dev Focus</a:t>
+            </a:r>
+          </a:p>
+          <a:p>
+            <a:pPr marL="171450" indent="-171450">
+              <a:buFontTx/>
+              <a:buChar char="-"/>
+            </a:pPr>
+            <a:r>
+              <a:rPr lang="en-US" sz="1200" b="0" i="0" u="none" strike="noStrike" kern="1200" baseline="0" dirty="0">
+                <a:solidFill>
+                  <a:schemeClr val="tx1"/>
+                </a:solidFill>
+                <a:latin typeface="+mn-lt"/>
+                <a:ea typeface="+mn-ea"/>
+                <a:cs typeface="+mn-cs"/>
+              </a:rPr>
+              <a:t>Start big, with goal for description of full picture</a:t>
+            </a:r>
+          </a:p>
+          <a:p>
+            <a:pPr marL="171450" indent="-171450">
+              <a:buFontTx/>
+              <a:buChar char="-"/>
+            </a:pPr>
+            <a:r>
+              <a:rPr lang="en-US" sz="1200" b="0" i="0" u="none" strike="noStrike" kern="1200" baseline="0" dirty="0">
+                <a:solidFill>
+                  <a:schemeClr val="tx1"/>
+                </a:solidFill>
+                <a:latin typeface="+mn-lt"/>
+                <a:ea typeface="+mn-ea"/>
+                <a:cs typeface="+mn-cs"/>
+              </a:rPr>
+              <a:t>On completion, </a:t>
+            </a:r>
+            <a:r>
+              <a:rPr lang="en-US" sz="1200" b="0" i="0" u="sng" strike="noStrike" kern="1200" baseline="0" dirty="0">
+                <a:solidFill>
+                  <a:schemeClr val="tx1"/>
+                </a:solidFill>
+                <a:latin typeface="+mn-lt"/>
+                <a:ea typeface="+mn-ea"/>
+                <a:cs typeface="+mn-cs"/>
+              </a:rPr>
+              <a:t>then</a:t>
+            </a:r>
+            <a:r>
+              <a:rPr lang="en-US" sz="1200" b="0" i="0" u="none" strike="noStrike" kern="1200" baseline="0" dirty="0">
+                <a:solidFill>
+                  <a:schemeClr val="tx1"/>
+                </a:solidFill>
+                <a:latin typeface="+mn-lt"/>
+                <a:ea typeface="+mn-ea"/>
+                <a:cs typeface="+mn-cs"/>
+              </a:rPr>
+              <a:t> revise down to meet ‘Rules’</a:t>
+            </a:r>
+          </a:p>
+          <a:p>
             <a:endParaRPr lang="en-US" sz="1200" b="0" i="0" u="none" strike="noStrike" kern="1200" baseline="0" dirty="0">
               <a:solidFill>
                 <a:schemeClr val="tx1"/>
@@ -711,6 +780,10 @@
             </a:r>
           </a:p>
           <a:p>
+            <a:pPr marL="171450" indent="-171450">
+              <a:buFontTx/>
+              <a:buChar char="-"/>
+            </a:pPr>
             <a:r>
               <a:rPr lang="en-US" sz="1200" b="0" i="0" u="none" strike="noStrike" kern="1200" baseline="0" dirty="0">
                 <a:solidFill>
@@ -724,6 +797,10 @@
             </a:r>
           </a:p>
           <a:p>
+            <a:pPr marL="171450" indent="-171450">
+              <a:buFontTx/>
+              <a:buChar char="-"/>
+            </a:pPr>
             <a:r>
               <a:rPr lang="en-US" sz="1200" b="0" i="0" u="none" strike="noStrike" kern="1200" baseline="0" dirty="0">
                 <a:solidFill>
@@ -735,7 +812,34 @@
               </a:rPr>
               <a:t>45 min presentation -&gt; 15 slides max</a:t>
             </a:r>
-            <a:endParaRPr lang="en-US" dirty="0"/>
+          </a:p>
+          <a:p>
+            <a:pPr marL="0" indent="0">
+              <a:buFontTx/>
+              <a:buNone/>
+            </a:pPr>
+            <a:endParaRPr lang="en-US" sz="1200" b="0" i="0" u="none" strike="noStrike" kern="1200" baseline="0" dirty="0">
+              <a:solidFill>
+                <a:schemeClr val="tx1"/>
+              </a:solidFill>
+              <a:latin typeface="+mn-lt"/>
+              <a:ea typeface="+mn-ea"/>
+              <a:cs typeface="+mn-cs"/>
+            </a:endParaRPr>
+          </a:p>
+          <a:p>
+            <a:pPr marL="0" indent="0">
+              <a:buFontTx/>
+              <a:buNone/>
+            </a:pPr>
+            <a:endParaRPr lang="en-US" sz="1200" b="0" i="0" u="none" strike="noStrike" kern="1200" baseline="0" dirty="0">
+              <a:solidFill>
+                <a:schemeClr val="tx1"/>
+              </a:solidFill>
+              <a:latin typeface="+mn-lt"/>
+              <a:ea typeface="+mn-ea"/>
+              <a:cs typeface="+mn-cs"/>
+            </a:endParaRPr>
           </a:p>
         </p:txBody>
       </p:sp>

</xml_diff>

<commit_message>
(C)    add ref for slide content
</commit_message>
<xml_diff>
--- a/Suppl/Pivotal Presentation - DTECTS.pptx
+++ b/Suppl/Pivotal Presentation - DTECTS.pptx
@@ -5,7 +5,7 @@
     <p:sldMasterId id="2147483648" r:id="rId1"/>
   </p:sldMasterIdLst>
   <p:notesMasterIdLst>
-    <p:notesMasterId r:id="rId14"/>
+    <p:notesMasterId r:id="rId15"/>
   </p:notesMasterIdLst>
   <p:sldIdLst>
     <p:sldId id="257" r:id="rId2"/>
@@ -13,13 +13,14 @@
     <p:sldId id="280" r:id="rId4"/>
     <p:sldId id="281" r:id="rId5"/>
     <p:sldId id="282" r:id="rId6"/>
-    <p:sldId id="283" r:id="rId7"/>
-    <p:sldId id="284" r:id="rId8"/>
-    <p:sldId id="286" r:id="rId9"/>
-    <p:sldId id="287" r:id="rId10"/>
-    <p:sldId id="288" r:id="rId11"/>
-    <p:sldId id="290" r:id="rId12"/>
-    <p:sldId id="289" r:id="rId13"/>
+    <p:sldId id="291" r:id="rId7"/>
+    <p:sldId id="283" r:id="rId8"/>
+    <p:sldId id="284" r:id="rId9"/>
+    <p:sldId id="286" r:id="rId10"/>
+    <p:sldId id="287" r:id="rId11"/>
+    <p:sldId id="288" r:id="rId12"/>
+    <p:sldId id="290" r:id="rId13"/>
+    <p:sldId id="289" r:id="rId14"/>
   </p:sldIdLst>
   <p:sldSz cx="12192000" cy="6858000"/>
   <p:notesSz cx="6858000" cy="9144000"/>
@@ -929,11 +930,7 @@
             </a:pPr>
             <a:r>
               <a:rPr lang="en-US" dirty="0"/>
-              <a:t>Frame, sketch w/vision</a:t>
-            </a:r>
-            <a:r>
-              <a:rPr lang="en-US" baseline="0" dirty="0"/>
-              <a:t> &amp; intent, draft</a:t>
+              <a:t>Strengthened relations with Tomm</a:t>
             </a:r>
           </a:p>
           <a:p>
@@ -942,8 +939,8 @@
               <a:buChar char="-"/>
             </a:pPr>
             <a:r>
-              <a:rPr lang="en-US" baseline="0" dirty="0"/>
-              <a:t>Source control &amp; procedure!</a:t>
+              <a:rPr lang="en-US" dirty="0"/>
+              <a:t>Tyler Brown Opportunity</a:t>
             </a:r>
           </a:p>
           <a:p>
@@ -952,8 +949,8 @@
               <a:buChar char="-"/>
             </a:pPr>
             <a:r>
-              <a:rPr lang="en-US" baseline="0" dirty="0"/>
-              <a:t>Help from experience (Tomm, Terry, Father)</a:t>
+              <a:rPr lang="en-US" dirty="0"/>
+              <a:t>Billy Keogh Opportunity</a:t>
             </a:r>
           </a:p>
           <a:p>
@@ -963,11 +960,7 @@
             </a:pPr>
             <a:r>
               <a:rPr lang="en-US" dirty="0"/>
-              <a:t>Describe</a:t>
-            </a:r>
-            <a:r>
-              <a:rPr lang="en-US" baseline="0" dirty="0"/>
-              <a:t> procedure of PPT Generation</a:t>
+              <a:t>Jmr Opportunity</a:t>
             </a:r>
           </a:p>
           <a:p>
@@ -976,8 +969,8 @@
               <a:buChar char="-"/>
             </a:pPr>
             <a:r>
-              <a:rPr lang="en-US" baseline="0" dirty="0"/>
-              <a:t>    selection &amp; outline</a:t>
+              <a:rPr lang="en-US" dirty="0"/>
+              <a:t>Mentor &amp; Network relations</a:t>
             </a:r>
           </a:p>
           <a:p>
@@ -986,42 +979,9 @@
               <a:buChar char="-"/>
             </a:pPr>
             <a:r>
-              <a:rPr lang="en-US" baseline="0" dirty="0"/>
-              <a:t>    customer meeting (Tomm)</a:t>
-            </a:r>
-          </a:p>
-          <a:p>
-            <a:pPr marL="171450" indent="-171450">
-              <a:buFontTx/>
-              <a:buChar char="-"/>
-            </a:pPr>
-            <a:r>
-              <a:rPr lang="en-US" baseline="0" dirty="0"/>
-              <a:t>    mentor advise (Tom, Father)</a:t>
-            </a:r>
-          </a:p>
-          <a:p>
-            <a:pPr marL="171450" indent="-171450">
-              <a:buFontTx/>
-              <a:buChar char="-"/>
-            </a:pPr>
-            <a:r>
-              <a:rPr lang="en-US" baseline="0" dirty="0"/>
-              <a:t>    outline</a:t>
-            </a:r>
-          </a:p>
-          <a:p>
-            <a:pPr marL="171450" indent="-171450">
-              <a:buFontTx/>
-              <a:buChar char="-"/>
-            </a:pPr>
-            <a:r>
-              <a:rPr lang="en-US" baseline="0" dirty="0"/>
-              <a:t>    find template</a:t>
-            </a:r>
-          </a:p>
-          <a:p>
-            <a:endParaRPr lang="en-US" dirty="0"/>
+              <a:rPr lang="en-US" dirty="0"/>
+              <a:t>Xylem &amp; Ergsense relations</a:t>
+            </a:r>
           </a:p>
           <a:p>
             <a:pPr marL="0" indent="0">
@@ -1058,7 +1018,7 @@
     </p:spTree>
     <p:extLst>
       <p:ext uri="{BB962C8B-B14F-4D97-AF65-F5344CB8AC3E}">
-        <p14:creationId xmlns:p14="http://schemas.microsoft.com/office/powerpoint/2010/main" val="648812506"/>
+        <p14:creationId xmlns:p14="http://schemas.microsoft.com/office/powerpoint/2010/main" val="3716442150"/>
       </p:ext>
     </p:extLst>
   </p:cSld>
@@ -1118,7 +1078,11 @@
             </a:pPr>
             <a:r>
               <a:rPr lang="en-US" dirty="0"/>
-              <a:t>Board Design</a:t>
+              <a:t>Frame, sketch w/vision</a:t>
+            </a:r>
+            <a:r>
+              <a:rPr lang="en-US" baseline="0" dirty="0"/>
+              <a:t> &amp; intent, draft</a:t>
             </a:r>
           </a:p>
           <a:p>
@@ -1127,8 +1091,8 @@
               <a:buChar char="-"/>
             </a:pPr>
             <a:r>
-              <a:rPr lang="en-US" dirty="0"/>
-              <a:t>Board Fab &amp; Validate</a:t>
+              <a:rPr lang="en-US" baseline="0" dirty="0"/>
+              <a:t>Source control &amp; procedure!</a:t>
             </a:r>
           </a:p>
           <a:p>
@@ -1137,8 +1101,8 @@
               <a:buChar char="-"/>
             </a:pPr>
             <a:r>
-              <a:rPr lang="en-US" dirty="0"/>
-              <a:t>Firmware</a:t>
+              <a:rPr lang="en-US" baseline="0" dirty="0"/>
+              <a:t>Help from experience (Tomm, Terry, Father)</a:t>
             </a:r>
           </a:p>
           <a:p>
@@ -1148,8 +1112,65 @@
             </a:pPr>
             <a:r>
               <a:rPr lang="en-US" dirty="0"/>
-              <a:t>Rapid Prototyping</a:t>
-            </a:r>
+              <a:t>Describe</a:t>
+            </a:r>
+            <a:r>
+              <a:rPr lang="en-US" baseline="0" dirty="0"/>
+              <a:t> procedure of PPT Generation</a:t>
+            </a:r>
+          </a:p>
+          <a:p>
+            <a:pPr marL="171450" indent="-171450">
+              <a:buFontTx/>
+              <a:buChar char="-"/>
+            </a:pPr>
+            <a:r>
+              <a:rPr lang="en-US" baseline="0" dirty="0"/>
+              <a:t>    selection &amp; outline</a:t>
+            </a:r>
+          </a:p>
+          <a:p>
+            <a:pPr marL="171450" indent="-171450">
+              <a:buFontTx/>
+              <a:buChar char="-"/>
+            </a:pPr>
+            <a:r>
+              <a:rPr lang="en-US" baseline="0" dirty="0"/>
+              <a:t>    customer meeting (Tomm)</a:t>
+            </a:r>
+          </a:p>
+          <a:p>
+            <a:pPr marL="171450" indent="-171450">
+              <a:buFontTx/>
+              <a:buChar char="-"/>
+            </a:pPr>
+            <a:r>
+              <a:rPr lang="en-US" baseline="0" dirty="0"/>
+              <a:t>    mentor advise (Tom, Father)</a:t>
+            </a:r>
+          </a:p>
+          <a:p>
+            <a:pPr marL="171450" indent="-171450">
+              <a:buFontTx/>
+              <a:buChar char="-"/>
+            </a:pPr>
+            <a:r>
+              <a:rPr lang="en-US" baseline="0" dirty="0"/>
+              <a:t>    outline</a:t>
+            </a:r>
+          </a:p>
+          <a:p>
+            <a:pPr marL="171450" indent="-171450">
+              <a:buFontTx/>
+              <a:buChar char="-"/>
+            </a:pPr>
+            <a:r>
+              <a:rPr lang="en-US" baseline="0" dirty="0"/>
+              <a:t>    find template</a:t>
+            </a:r>
+          </a:p>
+          <a:p>
+            <a:endParaRPr lang="en-US" dirty="0"/>
           </a:p>
           <a:p>
             <a:pPr marL="0" indent="0">
@@ -1186,7 +1207,7 @@
     </p:spTree>
     <p:extLst>
       <p:ext uri="{BB962C8B-B14F-4D97-AF65-F5344CB8AC3E}">
-        <p14:creationId xmlns:p14="http://schemas.microsoft.com/office/powerpoint/2010/main" val="3025603983"/>
+        <p14:creationId xmlns:p14="http://schemas.microsoft.com/office/powerpoint/2010/main" val="648812506"/>
       </p:ext>
     </p:extLst>
   </p:cSld>
@@ -1240,21 +1261,44 @@
           <a:bodyPr/>
           <a:lstStyle/>
           <a:p>
-            <a:r>
-              <a:rPr lang="en-US" dirty="0"/>
-              <a:t>*Integrate Tomm Notes</a:t>
-            </a:r>
-          </a:p>
-          <a:p>
-            <a:r>
-              <a:rPr lang="en-US" dirty="0"/>
-              <a:t>*Form</a:t>
-            </a:r>
-            <a:r>
-              <a:rPr lang="en-US" baseline="0" dirty="0"/>
-              <a:t> rules &amp; presentation target</a:t>
-            </a:r>
-            <a:endParaRPr lang="en-US" dirty="0"/>
+            <a:pPr marL="171450" indent="-171450">
+              <a:buFontTx/>
+              <a:buChar char="-"/>
+            </a:pPr>
+            <a:r>
+              <a:rPr lang="en-US" dirty="0"/>
+              <a:t>Board Design</a:t>
+            </a:r>
+          </a:p>
+          <a:p>
+            <a:pPr marL="171450" indent="-171450">
+              <a:buFontTx/>
+              <a:buChar char="-"/>
+            </a:pPr>
+            <a:r>
+              <a:rPr lang="en-US" dirty="0"/>
+              <a:t>Board Fab &amp; Validate</a:t>
+            </a:r>
+          </a:p>
+          <a:p>
+            <a:pPr marL="171450" indent="-171450">
+              <a:buFontTx/>
+              <a:buChar char="-"/>
+            </a:pPr>
+            <a:r>
+              <a:rPr lang="en-US" dirty="0"/>
+              <a:t>Firmware</a:t>
+            </a:r>
+          </a:p>
+          <a:p>
+            <a:pPr marL="171450" indent="-171450">
+              <a:buFontTx/>
+              <a:buChar char="-"/>
+            </a:pPr>
+            <a:r>
+              <a:rPr lang="en-US" dirty="0"/>
+              <a:t>Rapid Prototyping</a:t>
+            </a:r>
           </a:p>
           <a:p>
             <a:pPr marL="0" indent="0">
@@ -1283,6 +1327,111 @@
             <a:fld id="{4AC65D0B-F732-4E21-9A8D-1C6A15A6A84B}" type="slidenum">
               <a:rPr lang="en-US" smtClean="0"/>
               <a:t>12</a:t>
+            </a:fld>
+            <a:endParaRPr lang="en-US" dirty="0"/>
+          </a:p>
+        </p:txBody>
+      </p:sp>
+    </p:spTree>
+    <p:extLst>
+      <p:ext uri="{BB962C8B-B14F-4D97-AF65-F5344CB8AC3E}">
+        <p14:creationId xmlns:p14="http://schemas.microsoft.com/office/powerpoint/2010/main" val="3025603983"/>
+      </p:ext>
+    </p:extLst>
+  </p:cSld>
+  <p:clrMapOvr>
+    <a:masterClrMapping/>
+  </p:clrMapOvr>
+</p:notes>
+</file>
+
+<file path=ppt/notesSlides/notesSlide13.xml><?xml version="1.0" encoding="utf-8"?>
+<p:notes xmlns:a="http://schemas.openxmlformats.org/drawingml/2006/main" xmlns:r="http://schemas.openxmlformats.org/officeDocument/2006/relationships" xmlns:p="http://schemas.openxmlformats.org/presentationml/2006/main">
+  <p:cSld>
+    <p:spTree>
+      <p:nvGrpSpPr>
+        <p:cNvPr id="1" name=""/>
+        <p:cNvGrpSpPr/>
+        <p:nvPr/>
+      </p:nvGrpSpPr>
+      <p:grpSpPr>
+        <a:xfrm>
+          <a:off x="0" y="0"/>
+          <a:ext cx="0" cy="0"/>
+          <a:chOff x="0" y="0"/>
+          <a:chExt cx="0" cy="0"/>
+        </a:xfrm>
+      </p:grpSpPr>
+      <p:sp>
+        <p:nvSpPr>
+          <p:cNvPr id="2" name="Slide Image Placeholder 1"/>
+          <p:cNvSpPr>
+            <a:spLocks noGrp="1" noRot="1" noChangeAspect="1"/>
+          </p:cNvSpPr>
+          <p:nvPr>
+            <p:ph type="sldImg"/>
+          </p:nvPr>
+        </p:nvSpPr>
+        <p:spPr/>
+      </p:sp>
+      <p:sp>
+        <p:nvSpPr>
+          <p:cNvPr id="3" name="Notes Placeholder 2"/>
+          <p:cNvSpPr>
+            <a:spLocks noGrp="1"/>
+          </p:cNvSpPr>
+          <p:nvPr>
+            <p:ph type="body" idx="1"/>
+          </p:nvPr>
+        </p:nvSpPr>
+        <p:spPr/>
+        <p:txBody>
+          <a:bodyPr/>
+          <a:lstStyle/>
+          <a:p>
+            <a:r>
+              <a:rPr lang="en-US" dirty="0"/>
+              <a:t>*Integrate Tomm Notes</a:t>
+            </a:r>
+          </a:p>
+          <a:p>
+            <a:r>
+              <a:rPr lang="en-US" dirty="0"/>
+              <a:t>*Form</a:t>
+            </a:r>
+            <a:r>
+              <a:rPr lang="en-US" baseline="0" dirty="0"/>
+              <a:t> rules &amp; presentation target</a:t>
+            </a:r>
+            <a:endParaRPr lang="en-US" dirty="0"/>
+          </a:p>
+          <a:p>
+            <a:pPr marL="0" indent="0">
+              <a:buFontTx/>
+              <a:buNone/>
+            </a:pPr>
+            <a:endParaRPr lang="en-US" dirty="0"/>
+          </a:p>
+        </p:txBody>
+      </p:sp>
+      <p:sp>
+        <p:nvSpPr>
+          <p:cNvPr id="4" name="Slide Number Placeholder 3"/>
+          <p:cNvSpPr>
+            <a:spLocks noGrp="1"/>
+          </p:cNvSpPr>
+          <p:nvPr>
+            <p:ph type="sldNum" sz="quarter" idx="10"/>
+          </p:nvPr>
+        </p:nvSpPr>
+        <p:spPr/>
+        <p:txBody>
+          <a:bodyPr/>
+          <a:lstStyle/>
+          <a:p>
+            <a:fld id="{4AC65D0B-F732-4E21-9A8D-1C6A15A6A84B}" type="slidenum">
+              <a:rPr lang="en-US" smtClean="0"/>
+              <a:t>13</a:t>
             </a:fld>
             <a:endParaRPr lang="en-US" dirty="0"/>
           </a:p>
@@ -1719,7 +1868,7 @@
             </a:pPr>
             <a:r>
               <a:rPr lang="en-US" dirty="0"/>
-              <a:t>Why Tomm picked on &amp; motion established</a:t>
+              <a:t>Tomm Product Description</a:t>
             </a:r>
           </a:p>
           <a:p>
@@ -1729,7 +1878,17 @@
             </a:pPr>
             <a:r>
               <a:rPr lang="en-US" dirty="0"/>
-              <a:t>What it brought to Tomm’s project</a:t>
+              <a:t>Why Tomm picked feather &amp; motion established</a:t>
+            </a:r>
+          </a:p>
+          <a:p>
+            <a:pPr marL="171450" indent="-171450">
+              <a:buFontTx/>
+              <a:buChar char="-"/>
+            </a:pPr>
+            <a:r>
+              <a:rPr lang="en-US" dirty="0"/>
+              <a:t>What it brought to Tomm’s project (DTECTS)</a:t>
             </a:r>
           </a:p>
           <a:p>
@@ -1738,6 +1897,173 @@
               <a:buNone/>
             </a:pPr>
             <a:endParaRPr lang="en-US" dirty="0"/>
+          </a:p>
+          <a:p>
+            <a:pPr marL="0" marR="0" lvl="0" indent="0" algn="l" defTabSz="914400" rtl="0" eaLnBrk="1" fontAlgn="auto" latinLnBrk="0" hangingPunct="1">
+              <a:lnSpc>
+                <a:spcPct val="100000"/>
+              </a:lnSpc>
+              <a:spcBef>
+                <a:spcPts val="0"/>
+              </a:spcBef>
+              <a:spcAft>
+                <a:spcPts val="0"/>
+              </a:spcAft>
+              <a:buClrTx/>
+              <a:buSzTx/>
+              <a:buFontTx/>
+              <a:buNone/>
+              <a:tabLst/>
+              <a:defRPr/>
+            </a:pPr>
+            <a:r>
+              <a:rPr lang="en-US" dirty="0"/>
+              <a:t>Tomm Product Description</a:t>
+            </a:r>
+          </a:p>
+          <a:p>
+            <a:pPr marL="171450" indent="-171450">
+              <a:buFontTx/>
+              <a:buChar char="-"/>
+            </a:pPr>
+            <a:r>
+              <a:rPr lang="en-US" dirty="0"/>
+              <a:t>A simple motor interface to monitor performance, detect status &amp; alert</a:t>
+            </a:r>
+            <a:r>
+              <a:rPr lang="en-US" baseline="0" dirty="0"/>
+              <a:t> on performance error</a:t>
+            </a:r>
+          </a:p>
+          <a:p>
+            <a:pPr marL="171450" indent="-171450">
+              <a:buFontTx/>
+              <a:buChar char="-"/>
+            </a:pPr>
+            <a:r>
+              <a:rPr lang="en-US" baseline="0" dirty="0"/>
+              <a:t>Includes wireless interfaces, multiple sensing options, battery &amp; web interfaces</a:t>
+            </a:r>
+          </a:p>
+          <a:p>
+            <a:pPr marL="0" indent="0">
+              <a:buFontTx/>
+              <a:buNone/>
+            </a:pPr>
+            <a:endParaRPr lang="en-US" dirty="0"/>
+          </a:p>
+          <a:p>
+            <a:pPr marL="0" indent="0">
+              <a:buFontTx/>
+              <a:buNone/>
+            </a:pPr>
+            <a:r>
+              <a:rPr lang="en-US" dirty="0"/>
+              <a:t>Feather Selection</a:t>
+            </a:r>
+          </a:p>
+          <a:p>
+            <a:pPr marL="171450" indent="-171450">
+              <a:buFontTx/>
+              <a:buChar char="-"/>
+            </a:pPr>
+            <a:r>
+              <a:rPr lang="en-US" dirty="0"/>
+              <a:t>Selected for ability</a:t>
+            </a:r>
+            <a:r>
+              <a:rPr lang="en-US" baseline="0" dirty="0"/>
+              <a:t> to express ideas, test viability and begin PoC development by upper </a:t>
+            </a:r>
+            <a:r>
+              <a:rPr lang="en-US" baseline="0" dirty="0" err="1"/>
+              <a:t>mgmt</a:t>
+            </a:r>
+            <a:endParaRPr lang="en-US" baseline="0" dirty="0"/>
+          </a:p>
+          <a:p>
+            <a:pPr marL="171450" indent="-171450">
+              <a:buFontTx/>
+              <a:buChar char="-"/>
+            </a:pPr>
+            <a:r>
+              <a:rPr lang="en-US" baseline="0" dirty="0"/>
+              <a:t>Allowed Tomm to generate working unit with market prospect quickly</a:t>
+            </a:r>
+          </a:p>
+          <a:p>
+            <a:pPr marL="171450" indent="-171450">
+              <a:buFontTx/>
+              <a:buChar char="-"/>
+            </a:pPr>
+            <a:r>
+              <a:rPr lang="en-US" baseline="0" dirty="0"/>
+              <a:t>Enabled generation by one person</a:t>
+            </a:r>
+          </a:p>
+          <a:p>
+            <a:pPr marL="0" indent="0">
+              <a:buFontTx/>
+              <a:buNone/>
+            </a:pPr>
+            <a:endParaRPr lang="en-US" baseline="0" dirty="0"/>
+          </a:p>
+          <a:p>
+            <a:pPr marL="0" indent="0">
+              <a:buFontTx/>
+              <a:buNone/>
+            </a:pPr>
+            <a:r>
+              <a:rPr lang="en-US" baseline="0" dirty="0"/>
+              <a:t>Feather Benefits for DTECTS</a:t>
+            </a:r>
+          </a:p>
+          <a:p>
+            <a:pPr marL="171450" indent="-171450">
+              <a:buFontTx/>
+              <a:buChar char="-"/>
+            </a:pPr>
+            <a:r>
+              <a:rPr lang="en-US" baseline="0" dirty="0"/>
+              <a:t>Wide range of reference</a:t>
+            </a:r>
+          </a:p>
+          <a:p>
+            <a:pPr marL="171450" indent="-171450">
+              <a:buFontTx/>
+              <a:buChar char="-"/>
+            </a:pPr>
+            <a:r>
+              <a:rPr lang="en-US" baseline="0" dirty="0"/>
+              <a:t>Clean IO interface for DTECTS socket integration</a:t>
+            </a:r>
+          </a:p>
+          <a:p>
+            <a:pPr marL="171450" indent="-171450">
+              <a:buFontTx/>
+              <a:buChar char="-"/>
+            </a:pPr>
+            <a:r>
+              <a:rPr lang="en-US" baseline="0" dirty="0"/>
+              <a:t>Simple operating conditions (power, stable IO)</a:t>
+            </a:r>
+          </a:p>
+          <a:p>
+            <a:pPr marL="171450" indent="-171450">
+              <a:buFontTx/>
+              <a:buChar char="-"/>
+            </a:pPr>
+            <a:r>
+              <a:rPr lang="en-US" baseline="0" dirty="0"/>
+              <a:t>Highly Debuggable</a:t>
+            </a:r>
+          </a:p>
+          <a:p>
+            <a:pPr marL="0" indent="0">
+              <a:buFontTx/>
+              <a:buNone/>
+            </a:pPr>
+            <a:endParaRPr lang="en-US" baseline="0" dirty="0"/>
           </a:p>
         </p:txBody>
       </p:sp>
@@ -1821,9 +2147,9 @@
           <a:bodyPr/>
           <a:lstStyle/>
           <a:p>
-            <a:pPr marL="171450" indent="-171450">
-              <a:buFontTx/>
-              <a:buChar char="-"/>
+            <a:pPr marL="0" indent="0">
+              <a:buFontTx/>
+              <a:buNone/>
             </a:pPr>
             <a:r>
               <a:rPr lang="en-US" dirty="0"/>
@@ -1904,9 +2230,16 @@
             <a:endParaRPr lang="en-US" dirty="0"/>
           </a:p>
           <a:p>
-            <a:pPr marL="171450" indent="-171450">
-              <a:buFontTx/>
-              <a:buChar char="-"/>
+            <a:pPr marL="0" indent="0">
+              <a:buFontTx/>
+              <a:buNone/>
+            </a:pPr>
+            <a:endParaRPr lang="en-US" dirty="0"/>
+          </a:p>
+          <a:p>
+            <a:pPr marL="0" indent="0">
+              <a:buFontTx/>
+              <a:buNone/>
             </a:pPr>
             <a:r>
               <a:rPr lang="en-US" dirty="0"/>
@@ -1953,9 +2286,16 @@
             </a:r>
           </a:p>
           <a:p>
-            <a:pPr marL="171450" indent="-171450">
-              <a:buFontTx/>
-              <a:buChar char="-"/>
+            <a:pPr marL="0" indent="0">
+              <a:buFontTx/>
+              <a:buNone/>
+            </a:pPr>
+            <a:endParaRPr lang="en-US" dirty="0"/>
+          </a:p>
+          <a:p>
+            <a:pPr marL="0" indent="0">
+              <a:buFontTx/>
+              <a:buNone/>
             </a:pPr>
             <a:r>
               <a:rPr lang="en-US" dirty="0"/>
@@ -1991,9 +2331,16 @@
             <a:endParaRPr lang="en-US" dirty="0"/>
           </a:p>
           <a:p>
-            <a:pPr marL="171450" indent="-171450">
-              <a:buFontTx/>
-              <a:buChar char="-"/>
+            <a:pPr marL="0" indent="0">
+              <a:buFontTx/>
+              <a:buNone/>
+            </a:pPr>
+            <a:endParaRPr lang="en-US" dirty="0"/>
+          </a:p>
+          <a:p>
+            <a:pPr marL="0" indent="0">
+              <a:buFontTx/>
+              <a:buNone/>
             </a:pPr>
             <a:r>
               <a:rPr lang="en-US" dirty="0"/>
@@ -2077,32 +2424,27 @@
             </a:r>
           </a:p>
           <a:p>
-            <a:pPr marL="628650" lvl="1" indent="-171450">
-              <a:buFontTx/>
-              <a:buChar char="-"/>
-            </a:pPr>
-            <a:endParaRPr lang="en-US" dirty="0"/>
-          </a:p>
-          <a:p>
-            <a:pPr marL="628650" lvl="1" indent="-171450">
-              <a:buFontTx/>
-              <a:buChar char="-"/>
-            </a:pPr>
-            <a:endParaRPr lang="en-US" baseline="0" dirty="0"/>
-          </a:p>
-          <a:p>
-            <a:pPr marL="628650" lvl="1" indent="-171450">
-              <a:buFontTx/>
-              <a:buChar char="-"/>
-            </a:pPr>
-            <a:endParaRPr lang="en-US" dirty="0"/>
-          </a:p>
-          <a:p>
-            <a:pPr marL="0" indent="0">
-              <a:buFontTx/>
-              <a:buNone/>
-            </a:pPr>
-            <a:endParaRPr lang="en-US" dirty="0"/>
+            <a:pPr marL="457200" marR="0" lvl="1" indent="0" algn="l" defTabSz="914400" rtl="0" eaLnBrk="1" fontAlgn="auto" latinLnBrk="0" hangingPunct="1">
+              <a:lnSpc>
+                <a:spcPct val="100000"/>
+              </a:lnSpc>
+              <a:spcBef>
+                <a:spcPts val="0"/>
+              </a:spcBef>
+              <a:spcAft>
+                <a:spcPts val="0"/>
+              </a:spcAft>
+              <a:buClrTx/>
+              <a:buSzTx/>
+              <a:buFontTx/>
+              <a:buNone/>
+              <a:tabLst/>
+              <a:defRPr/>
+            </a:pPr>
+            <a:r>
+              <a:rPr lang="en-US" baseline="0" dirty="0"/>
+              <a:t>	</a:t>
+            </a:r>
           </a:p>
         </p:txBody>
       </p:sp>
@@ -2212,7 +2554,41 @@
             </a:pPr>
             <a:r>
               <a:rPr lang="en-US" dirty="0"/>
-              <a:t>Code Syntax</a:t>
+              <a:t>Embedded Systems Development</a:t>
+            </a:r>
+          </a:p>
+          <a:p>
+            <a:pPr marL="171450" indent="-171450">
+              <a:buFontTx/>
+              <a:buChar char="-"/>
+            </a:pPr>
+            <a:r>
+              <a:rPr lang="en-US" dirty="0"/>
+              <a:t>Board Design</a:t>
+            </a:r>
+          </a:p>
+          <a:p>
+            <a:pPr marL="171450" indent="-171450">
+              <a:buFontTx/>
+              <a:buChar char="-"/>
+            </a:pPr>
+            <a:r>
+              <a:rPr lang="en-US" dirty="0"/>
+              <a:t>Code Syntax (share examples from code)</a:t>
+            </a:r>
+          </a:p>
+          <a:p>
+            <a:pPr marL="628650" lvl="1" indent="-171450">
+              <a:buFontTx/>
+              <a:buChar char="-"/>
+            </a:pPr>
+            <a:r>
+              <a:rPr lang="en-US" dirty="0" err="1"/>
+              <a:t>example_pwm_tc.c</a:t>
+            </a:r>
+            <a:r>
+              <a:rPr lang="en-US" dirty="0"/>
+              <a:t> reference</a:t>
             </a:r>
           </a:p>
           <a:p>
@@ -2354,46 +2730,6 @@
           <a:bodyPr/>
           <a:lstStyle/>
           <a:p>
-            <a:pPr marL="171450" indent="-171450">
-              <a:buFontTx/>
-              <a:buChar char="-"/>
-            </a:pPr>
-            <a:r>
-              <a:rPr lang="en-US" dirty="0"/>
-              <a:t>Unmet customer needs</a:t>
-            </a:r>
-          </a:p>
-          <a:p>
-            <a:pPr marL="171450" indent="-171450">
-              <a:buFontTx/>
-              <a:buChar char="-"/>
-            </a:pPr>
-            <a:r>
-              <a:rPr lang="en-US" dirty="0"/>
-              <a:t>Work scope identification</a:t>
-            </a:r>
-          </a:p>
-          <a:p>
-            <a:pPr marL="171450" indent="-171450">
-              <a:buFontTx/>
-              <a:buChar char="-"/>
-            </a:pPr>
-            <a:r>
-              <a:rPr lang="en-US" dirty="0"/>
-              <a:t>Espressif</a:t>
-            </a:r>
-          </a:p>
-          <a:p>
-            <a:pPr marL="171450" indent="-171450">
-              <a:buFontTx/>
-              <a:buChar char="-"/>
-            </a:pPr>
-            <a:r>
-              <a:rPr lang="en-US" dirty="0"/>
-              <a:t>Satisfying ambitious, abstract design needs</a:t>
-            </a:r>
-          </a:p>
-          <a:p>
             <a:pPr marL="0" indent="0">
               <a:buFontTx/>
               <a:buNone/>
@@ -2428,7 +2764,7 @@
     </p:spTree>
     <p:extLst>
       <p:ext uri="{BB962C8B-B14F-4D97-AF65-F5344CB8AC3E}">
-        <p14:creationId xmlns:p14="http://schemas.microsoft.com/office/powerpoint/2010/main" val="3236089897"/>
+        <p14:creationId xmlns:p14="http://schemas.microsoft.com/office/powerpoint/2010/main" val="4145813878"/>
       </p:ext>
     </p:extLst>
   </p:cSld>
@@ -2488,7 +2824,7 @@
             </a:pPr>
             <a:r>
               <a:rPr lang="en-US" dirty="0"/>
-              <a:t>Schematics</a:t>
+              <a:t>Unmet customer needs</a:t>
             </a:r>
           </a:p>
           <a:p>
@@ -2498,7 +2834,7 @@
             </a:pPr>
             <a:r>
               <a:rPr lang="en-US" dirty="0"/>
-              <a:t>Documentation</a:t>
+              <a:t>Work scope identification</a:t>
             </a:r>
           </a:p>
           <a:p>
@@ -2508,7 +2844,7 @@
             </a:pPr>
             <a:r>
               <a:rPr lang="en-US" dirty="0"/>
-              <a:t>Board Design</a:t>
+              <a:t>Espressif</a:t>
             </a:r>
           </a:p>
           <a:p>
@@ -2518,37 +2854,7 @@
             </a:pPr>
             <a:r>
               <a:rPr lang="en-US" dirty="0"/>
-              <a:t>Espressif bare-metal scope</a:t>
-            </a:r>
-          </a:p>
-          <a:p>
-            <a:pPr marL="171450" indent="-171450">
-              <a:buFontTx/>
-              <a:buChar char="-"/>
-            </a:pPr>
-            <a:r>
-              <a:rPr lang="en-US" dirty="0"/>
-              <a:t>Roadmap establish</a:t>
-            </a:r>
-          </a:p>
-          <a:p>
-            <a:pPr marL="171450" indent="-171450">
-              <a:buFontTx/>
-              <a:buChar char="-"/>
-            </a:pPr>
-            <a:r>
-              <a:rPr lang="en-US" dirty="0"/>
-              <a:t>Procedure Reference</a:t>
-            </a:r>
-          </a:p>
-          <a:p>
-            <a:pPr marL="171450" indent="-171450">
-              <a:buFontTx/>
-              <a:buChar char="-"/>
-            </a:pPr>
-            <a:r>
-              <a:rPr lang="en-US" dirty="0"/>
-              <a:t>GitHub</a:t>
+              <a:t>Satisfying ambitious, abstract design needs</a:t>
             </a:r>
           </a:p>
           <a:p>
@@ -2586,7 +2892,7 @@
     </p:spTree>
     <p:extLst>
       <p:ext uri="{BB962C8B-B14F-4D97-AF65-F5344CB8AC3E}">
-        <p14:creationId xmlns:p14="http://schemas.microsoft.com/office/powerpoint/2010/main" val="812602940"/>
+        <p14:creationId xmlns:p14="http://schemas.microsoft.com/office/powerpoint/2010/main" val="3236089897"/>
       </p:ext>
     </p:extLst>
   </p:cSld>
@@ -2646,7 +2952,7 @@
             </a:pPr>
             <a:r>
               <a:rPr lang="en-US" dirty="0"/>
-              <a:t>Communication</a:t>
+              <a:t>Schematics</a:t>
             </a:r>
           </a:p>
           <a:p>
@@ -2656,7 +2962,7 @@
             </a:pPr>
             <a:r>
               <a:rPr lang="en-US" dirty="0"/>
-              <a:t>Needs Identification &amp; Customer Relations</a:t>
+              <a:t>Documentation</a:t>
             </a:r>
           </a:p>
           <a:p>
@@ -2666,7 +2972,7 @@
             </a:pPr>
             <a:r>
               <a:rPr lang="en-US" dirty="0"/>
-              <a:t>Translation of Ambitions to Marketable Results</a:t>
+              <a:t>Board Design</a:t>
             </a:r>
           </a:p>
           <a:p>
@@ -2676,7 +2982,7 @@
             </a:pPr>
             <a:r>
               <a:rPr lang="en-US" dirty="0"/>
-              <a:t>EAGLE Ramp</a:t>
+              <a:t>Espressif bare-metal scope</a:t>
             </a:r>
           </a:p>
           <a:p>
@@ -2686,7 +2992,7 @@
             </a:pPr>
             <a:r>
               <a:rPr lang="en-US" dirty="0"/>
-              <a:t>Espressif Exposure &amp; Practice</a:t>
+              <a:t>Roadmap establish</a:t>
             </a:r>
           </a:p>
           <a:p>
@@ -2696,7 +3002,17 @@
             </a:pPr>
             <a:r>
               <a:rPr lang="en-US" dirty="0"/>
-              <a:t>Relationships</a:t>
+              <a:t>Procedure Reference</a:t>
+            </a:r>
+          </a:p>
+          <a:p>
+            <a:pPr marL="171450" indent="-171450">
+              <a:buFontTx/>
+              <a:buChar char="-"/>
+            </a:pPr>
+            <a:r>
+              <a:rPr lang="en-US" dirty="0"/>
+              <a:t>GitHub</a:t>
             </a:r>
           </a:p>
           <a:p>
@@ -2734,7 +3050,7 @@
     </p:spTree>
     <p:extLst>
       <p:ext uri="{BB962C8B-B14F-4D97-AF65-F5344CB8AC3E}">
-        <p14:creationId xmlns:p14="http://schemas.microsoft.com/office/powerpoint/2010/main" val="264461871"/>
+        <p14:creationId xmlns:p14="http://schemas.microsoft.com/office/powerpoint/2010/main" val="812602940"/>
       </p:ext>
     </p:extLst>
   </p:cSld>
@@ -2794,7 +3110,7 @@
             </a:pPr>
             <a:r>
               <a:rPr lang="en-US" dirty="0"/>
-              <a:t>Strengthened relations with Tomm</a:t>
+              <a:t>Communication</a:t>
             </a:r>
           </a:p>
           <a:p>
@@ -2804,7 +3120,7 @@
             </a:pPr>
             <a:r>
               <a:rPr lang="en-US" dirty="0"/>
-              <a:t>Tyler Brown Opportunity</a:t>
+              <a:t>Needs Identification &amp; Customer Relations</a:t>
             </a:r>
           </a:p>
           <a:p>
@@ -2814,7 +3130,7 @@
             </a:pPr>
             <a:r>
               <a:rPr lang="en-US" dirty="0"/>
-              <a:t>Billy Keogh Opportunity</a:t>
+              <a:t>Translation of Ambitions to Marketable Results</a:t>
             </a:r>
           </a:p>
           <a:p>
@@ -2824,7 +3140,7 @@
             </a:pPr>
             <a:r>
               <a:rPr lang="en-US" dirty="0"/>
-              <a:t>Jmr Opportunity</a:t>
+              <a:t>EAGLE Ramp</a:t>
             </a:r>
           </a:p>
           <a:p>
@@ -2834,7 +3150,7 @@
             </a:pPr>
             <a:r>
               <a:rPr lang="en-US" dirty="0"/>
-              <a:t>Mentor &amp; Network relations</a:t>
+              <a:t>Espressif Exposure &amp; Practice</a:t>
             </a:r>
           </a:p>
           <a:p>
@@ -2844,7 +3160,7 @@
             </a:pPr>
             <a:r>
               <a:rPr lang="en-US" dirty="0"/>
-              <a:t>Xylem &amp; Ergsense relations</a:t>
+              <a:t>Relationships</a:t>
             </a:r>
           </a:p>
           <a:p>
@@ -2882,7 +3198,7 @@
     </p:spTree>
     <p:extLst>
       <p:ext uri="{BB962C8B-B14F-4D97-AF65-F5344CB8AC3E}">
-        <p14:creationId xmlns:p14="http://schemas.microsoft.com/office/powerpoint/2010/main" val="3716442150"/>
+        <p14:creationId xmlns:p14="http://schemas.microsoft.com/office/powerpoint/2010/main" val="264461871"/>
       </p:ext>
     </p:extLst>
   </p:cSld>
@@ -10530,7 +10846,7 @@
                 <a:ea typeface="+mj-ea"/>
                 <a:cs typeface="+mj-cs"/>
               </a:rPr>
-              <a:t>Procedure</a:t>
+              <a:t>Outcomes</a:t>
             </a:r>
             <a:endParaRPr lang="en-US" sz="4400" dirty="0">
               <a:effectLst/>
@@ -10571,7 +10887,7 @@
     </p:spTree>
     <p:extLst>
       <p:ext uri="{BB962C8B-B14F-4D97-AF65-F5344CB8AC3E}">
-        <p14:creationId xmlns:p14="http://schemas.microsoft.com/office/powerpoint/2010/main" val="3600086102"/>
+        <p14:creationId xmlns:p14="http://schemas.microsoft.com/office/powerpoint/2010/main" val="2229688103"/>
       </p:ext>
     </p:extLst>
   </p:cSld>
@@ -10635,7 +10951,7 @@
                 <a:ea typeface="+mj-ea"/>
                 <a:cs typeface="+mj-cs"/>
               </a:rPr>
-              <a:t>Pivotal Value Statement </a:t>
+              <a:t>Procedure</a:t>
             </a:r>
             <a:endParaRPr lang="en-US" sz="4400" dirty="0">
               <a:effectLst/>
@@ -10676,7 +10992,7 @@
     </p:spTree>
     <p:extLst>
       <p:ext uri="{BB962C8B-B14F-4D97-AF65-F5344CB8AC3E}">
-        <p14:creationId xmlns:p14="http://schemas.microsoft.com/office/powerpoint/2010/main" val="3071141420"/>
+        <p14:creationId xmlns:p14="http://schemas.microsoft.com/office/powerpoint/2010/main" val="3600086102"/>
       </p:ext>
     </p:extLst>
   </p:cSld>
@@ -10726,6 +11042,111 @@
           </a:bodyPr>
           <a:lstStyle/>
           <a:p>
+            <a:pPr rtl="0" eaLnBrk="1" latinLnBrk="0" hangingPunct="1"/>
+            <a:r>
+              <a:rPr lang="en-US" sz="3600" b="0" i="0" kern="1200" baseline="0" dirty="0">
+                <a:solidFill>
+                  <a:schemeClr val="tx1">
+                    <a:lumMod val="85000"/>
+                    <a:lumOff val="15000"/>
+                  </a:schemeClr>
+                </a:solidFill>
+                <a:effectLst/>
+                <a:latin typeface="+mj-lt"/>
+                <a:ea typeface="+mj-ea"/>
+                <a:cs typeface="+mj-cs"/>
+              </a:rPr>
+              <a:t>Pivotal Value Statement </a:t>
+            </a:r>
+            <a:endParaRPr lang="en-US" sz="4400" dirty="0">
+              <a:effectLst/>
+            </a:endParaRPr>
+          </a:p>
+        </p:txBody>
+      </p:sp>
+      <p:sp>
+        <p:nvSpPr>
+          <p:cNvPr id="3" name="Content Placeholder 2">
+            <a:extLst>
+              <a:ext uri="{FF2B5EF4-FFF2-40B4-BE49-F238E27FC236}">
+                <a16:creationId xmlns:a16="http://schemas.microsoft.com/office/drawing/2014/main" id="{044B4F6E-A639-47F4-91A5-68807265D618}"/>
+              </a:ext>
+            </a:extLst>
+          </p:cNvPr>
+          <p:cNvSpPr>
+            <a:spLocks noGrp="1"/>
+          </p:cNvSpPr>
+          <p:nvPr>
+            <p:ph idx="1"/>
+          </p:nvPr>
+        </p:nvSpPr>
+        <p:spPr>
+          <a:xfrm>
+            <a:off x="2589211" y="1451113"/>
+            <a:ext cx="9079327" cy="5068957"/>
+          </a:xfrm>
+        </p:spPr>
+        <p:txBody>
+          <a:bodyPr/>
+          <a:lstStyle/>
+          <a:p>
+            <a:endParaRPr lang="en-US" dirty="0"/>
+          </a:p>
+        </p:txBody>
+      </p:sp>
+    </p:spTree>
+    <p:extLst>
+      <p:ext uri="{BB962C8B-B14F-4D97-AF65-F5344CB8AC3E}">
+        <p14:creationId xmlns:p14="http://schemas.microsoft.com/office/powerpoint/2010/main" val="3071141420"/>
+      </p:ext>
+    </p:extLst>
+  </p:cSld>
+  <p:clrMapOvr>
+    <a:masterClrMapping/>
+  </p:clrMapOvr>
+</p:sld>
+</file>
+
+<file path=ppt/slides/slide13.xml><?xml version="1.0" encoding="utf-8"?>
+<p:sld xmlns:a="http://schemas.openxmlformats.org/drawingml/2006/main" xmlns:r="http://schemas.openxmlformats.org/officeDocument/2006/relationships" xmlns:p="http://schemas.openxmlformats.org/presentationml/2006/main">
+  <p:cSld>
+    <p:spTree>
+      <p:nvGrpSpPr>
+        <p:cNvPr id="1" name=""/>
+        <p:cNvGrpSpPr/>
+        <p:nvPr/>
+      </p:nvGrpSpPr>
+      <p:grpSpPr>
+        <a:xfrm>
+          <a:off x="0" y="0"/>
+          <a:ext cx="0" cy="0"/>
+          <a:chOff x="0" y="0"/>
+          <a:chExt cx="0" cy="0"/>
+        </a:xfrm>
+      </p:grpSpPr>
+      <p:sp>
+        <p:nvSpPr>
+          <p:cNvPr id="2" name="Title 1">
+            <a:extLst>
+              <a:ext uri="{FF2B5EF4-FFF2-40B4-BE49-F238E27FC236}">
+                <a16:creationId xmlns:a16="http://schemas.microsoft.com/office/drawing/2014/main" id="{9C5E42EE-EA5D-4203-B1EC-B96B68D2A8EA}"/>
+              </a:ext>
+            </a:extLst>
+          </p:cNvPr>
+          <p:cNvSpPr>
+            <a:spLocks noGrp="1"/>
+          </p:cNvSpPr>
+          <p:nvPr>
+            <p:ph type="title"/>
+          </p:nvPr>
+        </p:nvSpPr>
+        <p:spPr/>
+        <p:txBody>
+          <a:bodyPr>
+            <a:normAutofit/>
+          </a:bodyPr>
+          <a:lstStyle/>
+          <a:p>
             <a:pPr marL="0" marR="0" lvl="0" indent="0" algn="l" defTabSz="457200" rtl="0" eaLnBrk="1" fontAlgn="auto" latinLnBrk="0" hangingPunct="1">
               <a:lnSpc>
                 <a:spcPct val="100000"/>
@@ -10790,6 +11211,16 @@
           <a:bodyPr/>
           <a:lstStyle/>
           <a:p>
+            <a:r>
+              <a:rPr lang="en-US" dirty="0"/>
+              <a:t>[1] </a:t>
+            </a:r>
+            <a:r>
+              <a:rPr lang="en-US" dirty="0">
+                <a:hlinkClick r:id="rId3"/>
+              </a:rPr>
+              <a:t>Feather - A complete line of development boards from Adafruit that are both standalone and stackable</a:t>
+            </a:r>
             <a:endParaRPr lang="en-US" dirty="0"/>
           </a:p>
         </p:txBody>
@@ -11047,7 +11478,121 @@
           <a:bodyPr/>
           <a:lstStyle/>
           <a:p>
-            <a:endParaRPr lang="en-US" dirty="0"/>
+            <a:r>
+              <a:rPr lang="en-US" dirty="0"/>
+              <a:t>Cross-compatible platform spanning several vendors, use cases &amp; solutions</a:t>
+            </a:r>
+          </a:p>
+          <a:p>
+            <a:pPr lvl="1"/>
+            <a:r>
+              <a:rPr lang="en-US" dirty="0"/>
+              <a:t>Picture of Hats or Feather options</a:t>
+            </a:r>
+          </a:p>
+          <a:p>
+            <a:pPr lvl="1"/>
+            <a:r>
+              <a:rPr lang="en-US" dirty="0"/>
+              <a:t>What feature or family do you need, they’ve got it w/example</a:t>
+            </a:r>
+          </a:p>
+          <a:p>
+            <a:r>
+              <a:rPr lang="en-US" dirty="0"/>
+              <a:t>A leading expression platform at present</a:t>
+            </a:r>
+          </a:p>
+          <a:p>
+            <a:pPr lvl="1"/>
+            <a:r>
+              <a:rPr lang="en-US" dirty="0"/>
+              <a:t>Enables idea generation and investigation by large audience</a:t>
+            </a:r>
+          </a:p>
+          <a:p>
+            <a:pPr lvl="1"/>
+            <a:r>
+              <a:rPr lang="en-US" dirty="0"/>
+              <a:t>Like the DTECTS platform with Ergsense, enabling real-time monitoring of electrical motors</a:t>
+            </a:r>
+          </a:p>
+          <a:p>
+            <a:pPr lvl="1"/>
+            <a:r>
+              <a:rPr lang="en-US" dirty="0"/>
+              <a:t>With academic physics experimentation, chemistry monitoring or computer science embedded user interfaces for example</a:t>
+            </a:r>
+          </a:p>
+          <a:p>
+            <a:pPr lvl="1"/>
+            <a:r>
+              <a:rPr lang="en-US" dirty="0"/>
+              <a:t>In industry with PoC examination &amp; formulation (e.g. grain moisture detection)</a:t>
+            </a:r>
+          </a:p>
+          <a:p>
+            <a:r>
+              <a:rPr lang="en-US" dirty="0"/>
+              <a:t>This platform genre is maturing</a:t>
+            </a:r>
+          </a:p>
+          <a:p>
+            <a:pPr lvl="1"/>
+            <a:r>
+              <a:rPr lang="en-US" dirty="0"/>
+              <a:t>Integration into later stages of product design &amp; release</a:t>
+            </a:r>
+          </a:p>
+          <a:p>
+            <a:pPr lvl="1"/>
+            <a:r>
+              <a:rPr lang="en-US" dirty="0"/>
+              <a:t>Arduino, Feather, Particle, etc.</a:t>
+            </a:r>
+          </a:p>
+        </p:txBody>
+      </p:sp>
+      <p:sp>
+        <p:nvSpPr>
+          <p:cNvPr id="4" name="TextBox 3">
+            <a:extLst>
+              <a:ext uri="{FF2B5EF4-FFF2-40B4-BE49-F238E27FC236}">
+                <a16:creationId xmlns:a16="http://schemas.microsoft.com/office/drawing/2014/main" id="{790809A5-49C1-4088-8A82-6305D423F75D}"/>
+              </a:ext>
+            </a:extLst>
+          </p:cNvPr>
+          <p:cNvSpPr txBox="1"/>
+          <p:nvPr/>
+        </p:nvSpPr>
+        <p:spPr>
+          <a:xfrm>
+            <a:off x="6448098" y="6117021"/>
+            <a:ext cx="5376042" cy="523220"/>
+          </a:xfrm>
+          <a:prstGeom prst="rect">
+            <a:avLst/>
+          </a:prstGeom>
+          <a:noFill/>
+        </p:spPr>
+        <p:txBody>
+          <a:bodyPr wrap="square" rtlCol="0">
+            <a:spAutoFit/>
+          </a:bodyPr>
+          <a:lstStyle/>
+          <a:p>
+            <a:pPr algn="ctr"/>
+            <a:r>
+              <a:rPr lang="en-US" sz="1400" dirty="0"/>
+              <a:t>"At its core, the Adafruit Feather is a complete ecosystem of products - and the best way to get your project flying” </a:t>
+            </a:r>
+            <a:r>
+              <a:rPr lang="en-US" sz="1400" dirty="0">
+                <a:hlinkClick r:id="rId3"/>
+              </a:rPr>
+              <a:t>[1]</a:t>
+            </a:r>
+            <a:endParaRPr lang="en-US" sz="1400" dirty="0"/>
           </a:p>
         </p:txBody>
       </p:sp>
@@ -11328,7 +11873,7 @@
                 <a:ea typeface="+mj-ea"/>
                 <a:cs typeface="+mj-cs"/>
               </a:rPr>
-              <a:t>Overcome Challenges</a:t>
+              <a:t>Development Methodology (3)</a:t>
             </a:r>
             <a:endParaRPr lang="en-US" sz="4400" dirty="0">
               <a:effectLst/>
@@ -11338,38 +11883,81 @@
       </p:sp>
       <p:sp>
         <p:nvSpPr>
-          <p:cNvPr id="3" name="Content Placeholder 2">
+          <p:cNvPr id="6" name="Rectangle: Rounded Corners 5">
             <a:extLst>
               <a:ext uri="{FF2B5EF4-FFF2-40B4-BE49-F238E27FC236}">
-                <a16:creationId xmlns:a16="http://schemas.microsoft.com/office/drawing/2014/main" id="{044B4F6E-A639-47F4-91A5-68807265D618}"/>
+                <a16:creationId xmlns:a16="http://schemas.microsoft.com/office/drawing/2014/main" id="{056C338A-A877-44DB-BB5C-C03AC80D2BF2}"/>
               </a:ext>
             </a:extLst>
           </p:cNvPr>
-          <p:cNvSpPr>
-            <a:spLocks noGrp="1"/>
-          </p:cNvSpPr>
-          <p:nvPr>
-            <p:ph idx="1"/>
-          </p:nvPr>
+          <p:cNvSpPr/>
+          <p:nvPr/>
         </p:nvSpPr>
         <p:spPr>
           <a:xfrm>
-            <a:off x="2589211" y="1451113"/>
-            <a:ext cx="9079327" cy="5068957"/>
+            <a:off x="2072640" y="1700046"/>
+            <a:ext cx="9289252" cy="4346645"/>
           </a:xfrm>
+          <a:prstGeom prst="roundRect">
+            <a:avLst>
+              <a:gd name="adj" fmla="val 3519"/>
+            </a:avLst>
+          </a:prstGeom>
+          <a:blipFill dpi="0" rotWithShape="1">
+            <a:blip r:embed="rId3">
+              <a:extLst>
+                <a:ext uri="{28A0092B-C50C-407E-A947-70E740481C1C}">
+                  <a14:useLocalDpi xmlns:a14="http://schemas.microsoft.com/office/drawing/2010/main" val="0"/>
+                </a:ext>
+              </a:extLst>
+            </a:blip>
+            <a:srcRect/>
+            <a:stretch>
+              <a:fillRect/>
+            </a:stretch>
+          </a:blipFill>
+          <a:ln w="6350">
+            <a:solidFill>
+              <a:schemeClr val="tx1"/>
+            </a:solidFill>
+          </a:ln>
+          <a:effectLst>
+            <a:outerShdw blurRad="152400" dist="25400" dir="2700000" sx="102000" sy="102000" algn="tl" rotWithShape="0">
+              <a:prstClr val="black">
+                <a:alpha val="10000"/>
+              </a:prstClr>
+            </a:outerShdw>
+          </a:effectLst>
         </p:spPr>
-        <p:txBody>
-          <a:bodyPr/>
+        <p:style>
+          <a:lnRef idx="2">
+            <a:schemeClr val="accent1">
+              <a:shade val="50000"/>
+            </a:schemeClr>
+          </a:lnRef>
+          <a:fillRef idx="1">
+            <a:schemeClr val="accent1"/>
+          </a:fillRef>
+          <a:effectRef idx="0">
+            <a:schemeClr val="accent1"/>
+          </a:effectRef>
+          <a:fontRef idx="minor">
+            <a:schemeClr val="lt1"/>
+          </a:fontRef>
+        </p:style>
+        <p:txBody>
+          <a:bodyPr rtlCol="0" anchor="ctr"/>
           <a:lstStyle/>
           <a:p>
-            <a:endParaRPr lang="en-US" dirty="0"/>
+            <a:pPr algn="ctr"/>
+            <a:endParaRPr lang="en-US"/>
           </a:p>
         </p:txBody>
       </p:sp>
     </p:spTree>
     <p:extLst>
       <p:ext uri="{BB962C8B-B14F-4D97-AF65-F5344CB8AC3E}">
-        <p14:creationId xmlns:p14="http://schemas.microsoft.com/office/powerpoint/2010/main" val="2805820393"/>
+        <p14:creationId xmlns:p14="http://schemas.microsoft.com/office/powerpoint/2010/main" val="2956004668"/>
       </p:ext>
     </p:extLst>
   </p:cSld>
@@ -11419,6 +12007,7 @@
           </a:bodyPr>
           <a:lstStyle/>
           <a:p>
+            <a:pPr rtl="0" eaLnBrk="1" latinLnBrk="0" hangingPunct="1"/>
             <a:r>
               <a:rPr lang="en-US" sz="3600" b="0" i="0" kern="1200" baseline="0" dirty="0">
                 <a:solidFill>
@@ -11432,9 +12021,11 @@
                 <a:ea typeface="+mj-ea"/>
                 <a:cs typeface="+mj-cs"/>
               </a:rPr>
-              <a:t>Deliverable &amp; Results (2)</a:t>
-            </a:r>
-            <a:endParaRPr lang="en-US" sz="2800" dirty="0"/>
+              <a:t>Overcome Challenges</a:t>
+            </a:r>
+            <a:endParaRPr lang="en-US" sz="4400" dirty="0">
+              <a:effectLst/>
+            </a:endParaRPr>
           </a:p>
         </p:txBody>
       </p:sp>
@@ -11471,7 +12062,7 @@
     </p:spTree>
     <p:extLst>
       <p:ext uri="{BB962C8B-B14F-4D97-AF65-F5344CB8AC3E}">
-        <p14:creationId xmlns:p14="http://schemas.microsoft.com/office/powerpoint/2010/main" val="821675052"/>
+        <p14:creationId xmlns:p14="http://schemas.microsoft.com/office/powerpoint/2010/main" val="2805820393"/>
       </p:ext>
     </p:extLst>
   </p:cSld>
@@ -11521,7 +12112,6 @@
           </a:bodyPr>
           <a:lstStyle/>
           <a:p>
-            <a:pPr rtl="0" eaLnBrk="1" latinLnBrk="0" hangingPunct="1"/>
             <a:r>
               <a:rPr lang="en-US" sz="3600" b="0" i="0" kern="1200" baseline="0" dirty="0">
                 <a:solidFill>
@@ -11535,11 +12125,9 @@
                 <a:ea typeface="+mj-ea"/>
                 <a:cs typeface="+mj-cs"/>
               </a:rPr>
-              <a:t>Learnings &amp; Growths</a:t>
-            </a:r>
-            <a:endParaRPr lang="en-US" sz="4400" dirty="0">
-              <a:effectLst/>
-            </a:endParaRPr>
+              <a:t>Deliverable &amp; Results (2)</a:t>
+            </a:r>
+            <a:endParaRPr lang="en-US" sz="2800" dirty="0"/>
           </a:p>
         </p:txBody>
       </p:sp>
@@ -11576,7 +12164,7 @@
     </p:spTree>
     <p:extLst>
       <p:ext uri="{BB962C8B-B14F-4D97-AF65-F5344CB8AC3E}">
-        <p14:creationId xmlns:p14="http://schemas.microsoft.com/office/powerpoint/2010/main" val="3042754836"/>
+        <p14:creationId xmlns:p14="http://schemas.microsoft.com/office/powerpoint/2010/main" val="821675052"/>
       </p:ext>
     </p:extLst>
   </p:cSld>
@@ -11640,7 +12228,7 @@
                 <a:ea typeface="+mj-ea"/>
                 <a:cs typeface="+mj-cs"/>
               </a:rPr>
-              <a:t>Outcomes</a:t>
+              <a:t>Learnings &amp; Growths</a:t>
             </a:r>
             <a:endParaRPr lang="en-US" sz="4400" dirty="0">
               <a:effectLst/>
@@ -11681,7 +12269,7 @@
     </p:spTree>
     <p:extLst>
       <p:ext uri="{BB962C8B-B14F-4D97-AF65-F5344CB8AC3E}">
-        <p14:creationId xmlns:p14="http://schemas.microsoft.com/office/powerpoint/2010/main" val="2229688103"/>
+        <p14:creationId xmlns:p14="http://schemas.microsoft.com/office/powerpoint/2010/main" val="3042754836"/>
       </p:ext>
     </p:extLst>
   </p:cSld>

</xml_diff>

<commit_message>
(+)    add work performed
</commit_message>
<xml_diff>
--- a/Suppl/Pivotal Presentation - DTECTS.pptx
+++ b/Suppl/Pivotal Presentation - DTECTS.pptx
@@ -5,28 +5,29 @@
     <p:sldMasterId id="2147483648" r:id="rId1"/>
   </p:sldMasterIdLst>
   <p:notesMasterIdLst>
-    <p:notesMasterId r:id="rId21"/>
+    <p:notesMasterId r:id="rId22"/>
   </p:notesMasterIdLst>
   <p:sldIdLst>
     <p:sldId id="257" r:id="rId2"/>
     <p:sldId id="259" r:id="rId3"/>
     <p:sldId id="280" r:id="rId4"/>
-    <p:sldId id="281" r:id="rId5"/>
-    <p:sldId id="282" r:id="rId6"/>
-    <p:sldId id="296" r:id="rId7"/>
-    <p:sldId id="298" r:id="rId8"/>
-    <p:sldId id="291" r:id="rId9"/>
-    <p:sldId id="295" r:id="rId10"/>
-    <p:sldId id="294" r:id="rId11"/>
-    <p:sldId id="293" r:id="rId12"/>
-    <p:sldId id="292" r:id="rId13"/>
-    <p:sldId id="283" r:id="rId14"/>
-    <p:sldId id="284" r:id="rId15"/>
-    <p:sldId id="286" r:id="rId16"/>
-    <p:sldId id="287" r:id="rId17"/>
-    <p:sldId id="288" r:id="rId18"/>
-    <p:sldId id="290" r:id="rId19"/>
-    <p:sldId id="289" r:id="rId20"/>
+    <p:sldId id="299" r:id="rId5"/>
+    <p:sldId id="281" r:id="rId6"/>
+    <p:sldId id="282" r:id="rId7"/>
+    <p:sldId id="296" r:id="rId8"/>
+    <p:sldId id="298" r:id="rId9"/>
+    <p:sldId id="291" r:id="rId10"/>
+    <p:sldId id="295" r:id="rId11"/>
+    <p:sldId id="294" r:id="rId12"/>
+    <p:sldId id="293" r:id="rId13"/>
+    <p:sldId id="292" r:id="rId14"/>
+    <p:sldId id="283" r:id="rId15"/>
+    <p:sldId id="284" r:id="rId16"/>
+    <p:sldId id="286" r:id="rId17"/>
+    <p:sldId id="287" r:id="rId18"/>
+    <p:sldId id="288" r:id="rId19"/>
+    <p:sldId id="290" r:id="rId20"/>
+    <p:sldId id="289" r:id="rId21"/>
   </p:sldIdLst>
   <p:sldSz cx="12192000" cy="6858000"/>
   <p:notesSz cx="6858000" cy="9144000"/>
@@ -226,7 +227,7 @@
           <a:p>
             <a:fld id="{70A2C202-6B9D-433D-94D3-48C0EF1495AE}" type="datetimeFigureOut">
               <a:rPr lang="en-US" smtClean="0"/>
-              <a:t>7/25/2018</a:t>
+              <a:t>7/26/2018</a:t>
             </a:fld>
             <a:endParaRPr lang="en-US"/>
           </a:p>
@@ -936,7 +937,7 @@
             </a:pPr>
             <a:r>
               <a:rPr lang="en-US" dirty="0"/>
-              <a:t>Clear segmentation and modularization of design</a:t>
+              <a:t>Uniform naming schema</a:t>
             </a:r>
           </a:p>
           <a:p>
@@ -946,7 +947,7 @@
             </a:pPr>
             <a:r>
               <a:rPr lang="en-US" dirty="0"/>
-              <a:t>Consistent part selection</a:t>
+              <a:t>Consistent, uniform symbols</a:t>
             </a:r>
           </a:p>
           <a:p>
@@ -956,25 +957,8 @@
             </a:pPr>
             <a:r>
               <a:rPr lang="en-US" dirty="0"/>
-              <a:t>Clean selection and placement for external I/O</a:t>
-            </a:r>
-          </a:p>
-          <a:p>
-            <a:pPr marL="171450" indent="-171450">
-              <a:buFontTx/>
-              <a:buChar char="-"/>
-            </a:pPr>
-            <a:r>
-              <a:rPr lang="en-US" dirty="0"/>
-              <a:t>Design flexibility for future expansion</a:t>
-            </a:r>
-          </a:p>
-          <a:p>
-            <a:pPr marL="171450" indent="-171450">
-              <a:buFontTx/>
-              <a:buChar char="-"/>
-            </a:pPr>
-            <a:endParaRPr lang="en-US" dirty="0"/>
+              <a:t>Complete silkscreen &amp; outline markup</a:t>
+            </a:r>
           </a:p>
         </p:txBody>
       </p:sp>
@@ -1004,7 +988,7 @@
     </p:spTree>
     <p:extLst>
       <p:ext uri="{BB962C8B-B14F-4D97-AF65-F5344CB8AC3E}">
-        <p14:creationId xmlns:p14="http://schemas.microsoft.com/office/powerpoint/2010/main" val="2959733451"/>
+        <p14:creationId xmlns:p14="http://schemas.microsoft.com/office/powerpoint/2010/main" val="3592769984"/>
       </p:ext>
     </p:extLst>
   </p:cSld>
@@ -1058,9 +1042,49 @@
           <a:bodyPr/>
           <a:lstStyle/>
           <a:p>
-            <a:pPr marL="0" indent="0">
-              <a:buFontTx/>
-              <a:buNone/>
+            <a:pPr marL="171450" indent="-171450">
+              <a:buFontTx/>
+              <a:buChar char="-"/>
+            </a:pPr>
+            <a:r>
+              <a:rPr lang="en-US" dirty="0"/>
+              <a:t>Clear segmentation and modularization of design</a:t>
+            </a:r>
+          </a:p>
+          <a:p>
+            <a:pPr marL="171450" indent="-171450">
+              <a:buFontTx/>
+              <a:buChar char="-"/>
+            </a:pPr>
+            <a:r>
+              <a:rPr lang="en-US" dirty="0"/>
+              <a:t>Consistent part selection</a:t>
+            </a:r>
+          </a:p>
+          <a:p>
+            <a:pPr marL="171450" indent="-171450">
+              <a:buFontTx/>
+              <a:buChar char="-"/>
+            </a:pPr>
+            <a:r>
+              <a:rPr lang="en-US" dirty="0"/>
+              <a:t>Clean selection and placement for external I/O</a:t>
+            </a:r>
+          </a:p>
+          <a:p>
+            <a:pPr marL="171450" indent="-171450">
+              <a:buFontTx/>
+              <a:buChar char="-"/>
+            </a:pPr>
+            <a:r>
+              <a:rPr lang="en-US" dirty="0"/>
+              <a:t>Design flexibility for future expansion</a:t>
+            </a:r>
+          </a:p>
+          <a:p>
+            <a:pPr marL="171450" indent="-171450">
+              <a:buFontTx/>
+              <a:buChar char="-"/>
             </a:pPr>
             <a:endParaRPr lang="en-US" dirty="0"/>
           </a:p>
@@ -1092,7 +1116,7 @@
     </p:spTree>
     <p:extLst>
       <p:ext uri="{BB962C8B-B14F-4D97-AF65-F5344CB8AC3E}">
-        <p14:creationId xmlns:p14="http://schemas.microsoft.com/office/powerpoint/2010/main" val="3749563727"/>
+        <p14:creationId xmlns:p14="http://schemas.microsoft.com/office/powerpoint/2010/main" val="2959733451"/>
       </p:ext>
     </p:extLst>
   </p:cSld>
@@ -1180,7 +1204,7 @@
     </p:spTree>
     <p:extLst>
       <p:ext uri="{BB962C8B-B14F-4D97-AF65-F5344CB8AC3E}">
-        <p14:creationId xmlns:p14="http://schemas.microsoft.com/office/powerpoint/2010/main" val="1280536660"/>
+        <p14:creationId xmlns:p14="http://schemas.microsoft.com/office/powerpoint/2010/main" val="3749563727"/>
       </p:ext>
     </p:extLst>
   </p:cSld>
@@ -1234,46 +1258,6 @@
           <a:bodyPr/>
           <a:lstStyle/>
           <a:p>
-            <a:pPr marL="171450" indent="-171450">
-              <a:buFontTx/>
-              <a:buChar char="-"/>
-            </a:pPr>
-            <a:r>
-              <a:rPr lang="en-US" dirty="0"/>
-              <a:t>Unmet customer needs</a:t>
-            </a:r>
-          </a:p>
-          <a:p>
-            <a:pPr marL="171450" indent="-171450">
-              <a:buFontTx/>
-              <a:buChar char="-"/>
-            </a:pPr>
-            <a:r>
-              <a:rPr lang="en-US" dirty="0"/>
-              <a:t>Work scope identification</a:t>
-            </a:r>
-          </a:p>
-          <a:p>
-            <a:pPr marL="171450" indent="-171450">
-              <a:buFontTx/>
-              <a:buChar char="-"/>
-            </a:pPr>
-            <a:r>
-              <a:rPr lang="en-US" dirty="0"/>
-              <a:t>Espressif</a:t>
-            </a:r>
-          </a:p>
-          <a:p>
-            <a:pPr marL="171450" indent="-171450">
-              <a:buFontTx/>
-              <a:buChar char="-"/>
-            </a:pPr>
-            <a:r>
-              <a:rPr lang="en-US" dirty="0"/>
-              <a:t>Satisfying ambitious, abstract design needs</a:t>
-            </a:r>
-          </a:p>
-          <a:p>
             <a:pPr marL="0" indent="0">
               <a:buFontTx/>
               <a:buNone/>
@@ -1308,7 +1292,7 @@
     </p:spTree>
     <p:extLst>
       <p:ext uri="{BB962C8B-B14F-4D97-AF65-F5344CB8AC3E}">
-        <p14:creationId xmlns:p14="http://schemas.microsoft.com/office/powerpoint/2010/main" val="3236089897"/>
+        <p14:creationId xmlns:p14="http://schemas.microsoft.com/office/powerpoint/2010/main" val="1280536660"/>
       </p:ext>
     </p:extLst>
   </p:cSld>
@@ -1368,7 +1352,7 @@
             </a:pPr>
             <a:r>
               <a:rPr lang="en-US" dirty="0"/>
-              <a:t>Schematics</a:t>
+              <a:t>Unmet customer needs</a:t>
             </a:r>
           </a:p>
           <a:p>
@@ -1378,7 +1362,7 @@
             </a:pPr>
             <a:r>
               <a:rPr lang="en-US" dirty="0"/>
-              <a:t>Documentation</a:t>
+              <a:t>Work scope identification</a:t>
             </a:r>
           </a:p>
           <a:p>
@@ -1388,7 +1372,7 @@
             </a:pPr>
             <a:r>
               <a:rPr lang="en-US" dirty="0"/>
-              <a:t>Board Design</a:t>
+              <a:t>Espressif</a:t>
             </a:r>
           </a:p>
           <a:p>
@@ -1398,37 +1382,7 @@
             </a:pPr>
             <a:r>
               <a:rPr lang="en-US" dirty="0"/>
-              <a:t>Espressif bare-metal scope</a:t>
-            </a:r>
-          </a:p>
-          <a:p>
-            <a:pPr marL="171450" indent="-171450">
-              <a:buFontTx/>
-              <a:buChar char="-"/>
-            </a:pPr>
-            <a:r>
-              <a:rPr lang="en-US" dirty="0"/>
-              <a:t>Roadmap establish</a:t>
-            </a:r>
-          </a:p>
-          <a:p>
-            <a:pPr marL="171450" indent="-171450">
-              <a:buFontTx/>
-              <a:buChar char="-"/>
-            </a:pPr>
-            <a:r>
-              <a:rPr lang="en-US" dirty="0"/>
-              <a:t>Procedure Reference</a:t>
-            </a:r>
-          </a:p>
-          <a:p>
-            <a:pPr marL="171450" indent="-171450">
-              <a:buFontTx/>
-              <a:buChar char="-"/>
-            </a:pPr>
-            <a:r>
-              <a:rPr lang="en-US" dirty="0"/>
-              <a:t>GitHub</a:t>
+              <a:t>Satisfying ambitious, abstract design needs</a:t>
             </a:r>
           </a:p>
           <a:p>
@@ -1466,7 +1420,7 @@
     </p:spTree>
     <p:extLst>
       <p:ext uri="{BB962C8B-B14F-4D97-AF65-F5344CB8AC3E}">
-        <p14:creationId xmlns:p14="http://schemas.microsoft.com/office/powerpoint/2010/main" val="812602940"/>
+        <p14:creationId xmlns:p14="http://schemas.microsoft.com/office/powerpoint/2010/main" val="3236089897"/>
       </p:ext>
     </p:extLst>
   </p:cSld>
@@ -1526,7 +1480,7 @@
             </a:pPr>
             <a:r>
               <a:rPr lang="en-US" dirty="0"/>
-              <a:t>Communication</a:t>
+              <a:t>Schematics</a:t>
             </a:r>
           </a:p>
           <a:p>
@@ -1536,7 +1490,7 @@
             </a:pPr>
             <a:r>
               <a:rPr lang="en-US" dirty="0"/>
-              <a:t>Needs Identification &amp; Customer Relations</a:t>
+              <a:t>Documentation</a:t>
             </a:r>
           </a:p>
           <a:p>
@@ -1546,7 +1500,7 @@
             </a:pPr>
             <a:r>
               <a:rPr lang="en-US" dirty="0"/>
-              <a:t>Translation of Ambitions to Marketable Results</a:t>
+              <a:t>Board Design</a:t>
             </a:r>
           </a:p>
           <a:p>
@@ -1556,7 +1510,7 @@
             </a:pPr>
             <a:r>
               <a:rPr lang="en-US" dirty="0"/>
-              <a:t>EAGLE Ramp</a:t>
+              <a:t>Espressif bare-metal scope</a:t>
             </a:r>
           </a:p>
           <a:p>
@@ -1566,7 +1520,7 @@
             </a:pPr>
             <a:r>
               <a:rPr lang="en-US" dirty="0"/>
-              <a:t>Espressif Exposure &amp; Practice</a:t>
+              <a:t>Roadmap establish</a:t>
             </a:r>
           </a:p>
           <a:p>
@@ -1576,7 +1530,17 @@
             </a:pPr>
             <a:r>
               <a:rPr lang="en-US" dirty="0"/>
-              <a:t>Relationships</a:t>
+              <a:t>Procedure Reference</a:t>
+            </a:r>
+          </a:p>
+          <a:p>
+            <a:pPr marL="171450" indent="-171450">
+              <a:buFontTx/>
+              <a:buChar char="-"/>
+            </a:pPr>
+            <a:r>
+              <a:rPr lang="en-US" dirty="0"/>
+              <a:t>GitHub</a:t>
             </a:r>
           </a:p>
           <a:p>
@@ -1614,7 +1578,7 @@
     </p:spTree>
     <p:extLst>
       <p:ext uri="{BB962C8B-B14F-4D97-AF65-F5344CB8AC3E}">
-        <p14:creationId xmlns:p14="http://schemas.microsoft.com/office/powerpoint/2010/main" val="264461871"/>
+        <p14:creationId xmlns:p14="http://schemas.microsoft.com/office/powerpoint/2010/main" val="812602940"/>
       </p:ext>
     </p:extLst>
   </p:cSld>
@@ -1674,7 +1638,7 @@
             </a:pPr>
             <a:r>
               <a:rPr lang="en-US" dirty="0"/>
-              <a:t>Strengthened relations with Tomm</a:t>
+              <a:t>Communication</a:t>
             </a:r>
           </a:p>
           <a:p>
@@ -1684,7 +1648,7 @@
             </a:pPr>
             <a:r>
               <a:rPr lang="en-US" dirty="0"/>
-              <a:t>Tyler Brown Opportunity</a:t>
+              <a:t>Needs Identification &amp; Customer Relations</a:t>
             </a:r>
           </a:p>
           <a:p>
@@ -1694,7 +1658,7 @@
             </a:pPr>
             <a:r>
               <a:rPr lang="en-US" dirty="0"/>
-              <a:t>Billy Keogh Opportunity</a:t>
+              <a:t>Translation of Ambitions to Marketable Results</a:t>
             </a:r>
           </a:p>
           <a:p>
@@ -1704,7 +1668,7 @@
             </a:pPr>
             <a:r>
               <a:rPr lang="en-US" dirty="0"/>
-              <a:t>Jmr Opportunity</a:t>
+              <a:t>EAGLE Ramp</a:t>
             </a:r>
           </a:p>
           <a:p>
@@ -1714,7 +1678,7 @@
             </a:pPr>
             <a:r>
               <a:rPr lang="en-US" dirty="0"/>
-              <a:t>Mentor &amp; Network relations</a:t>
+              <a:t>Espressif Exposure &amp; Practice</a:t>
             </a:r>
           </a:p>
           <a:p>
@@ -1724,7 +1688,7 @@
             </a:pPr>
             <a:r>
               <a:rPr lang="en-US" dirty="0"/>
-              <a:t>Xylem &amp; Ergsense relations</a:t>
+              <a:t>Relationships</a:t>
             </a:r>
           </a:p>
           <a:p>
@@ -1762,7 +1726,7 @@
     </p:spTree>
     <p:extLst>
       <p:ext uri="{BB962C8B-B14F-4D97-AF65-F5344CB8AC3E}">
-        <p14:creationId xmlns:p14="http://schemas.microsoft.com/office/powerpoint/2010/main" val="3716442150"/>
+        <p14:creationId xmlns:p14="http://schemas.microsoft.com/office/powerpoint/2010/main" val="264461871"/>
       </p:ext>
     </p:extLst>
   </p:cSld>
@@ -1822,11 +1786,7 @@
             </a:pPr>
             <a:r>
               <a:rPr lang="en-US" dirty="0"/>
-              <a:t>Frame, sketch w/vision</a:t>
-            </a:r>
-            <a:r>
-              <a:rPr lang="en-US" baseline="0" dirty="0"/>
-              <a:t> &amp; intent, draft</a:t>
+              <a:t>Strengthened relations with Tomm</a:t>
             </a:r>
           </a:p>
           <a:p>
@@ -1835,8 +1795,8 @@
               <a:buChar char="-"/>
             </a:pPr>
             <a:r>
-              <a:rPr lang="en-US" baseline="0" dirty="0"/>
-              <a:t>Source control &amp; procedure!</a:t>
+              <a:rPr lang="en-US" dirty="0"/>
+              <a:t>Tyler Brown Opportunity</a:t>
             </a:r>
           </a:p>
           <a:p>
@@ -1845,8 +1805,8 @@
               <a:buChar char="-"/>
             </a:pPr>
             <a:r>
-              <a:rPr lang="en-US" baseline="0" dirty="0"/>
-              <a:t>Help from experience (Tomm, Terry, Father)</a:t>
+              <a:rPr lang="en-US" dirty="0"/>
+              <a:t>Billy Keogh Opportunity</a:t>
             </a:r>
           </a:p>
           <a:p>
@@ -1856,11 +1816,7 @@
             </a:pPr>
             <a:r>
               <a:rPr lang="en-US" dirty="0"/>
-              <a:t>Describe</a:t>
-            </a:r>
-            <a:r>
-              <a:rPr lang="en-US" baseline="0" dirty="0"/>
-              <a:t> procedure of PPT Generation</a:t>
+              <a:t>Jmr Opportunity</a:t>
             </a:r>
           </a:p>
           <a:p>
@@ -1869,8 +1825,8 @@
               <a:buChar char="-"/>
             </a:pPr>
             <a:r>
-              <a:rPr lang="en-US" baseline="0" dirty="0"/>
-              <a:t>    selection &amp; outline</a:t>
+              <a:rPr lang="en-US" dirty="0"/>
+              <a:t>Mentor &amp; Network relations</a:t>
             </a:r>
           </a:p>
           <a:p>
@@ -1879,42 +1835,9 @@
               <a:buChar char="-"/>
             </a:pPr>
             <a:r>
-              <a:rPr lang="en-US" baseline="0" dirty="0"/>
-              <a:t>    customer meeting (Tomm)</a:t>
-            </a:r>
-          </a:p>
-          <a:p>
-            <a:pPr marL="171450" indent="-171450">
-              <a:buFontTx/>
-              <a:buChar char="-"/>
-            </a:pPr>
-            <a:r>
-              <a:rPr lang="en-US" baseline="0" dirty="0"/>
-              <a:t>    mentor advise (Tom, Father)</a:t>
-            </a:r>
-          </a:p>
-          <a:p>
-            <a:pPr marL="171450" indent="-171450">
-              <a:buFontTx/>
-              <a:buChar char="-"/>
-            </a:pPr>
-            <a:r>
-              <a:rPr lang="en-US" baseline="0" dirty="0"/>
-              <a:t>    outline</a:t>
-            </a:r>
-          </a:p>
-          <a:p>
-            <a:pPr marL="171450" indent="-171450">
-              <a:buFontTx/>
-              <a:buChar char="-"/>
-            </a:pPr>
-            <a:r>
-              <a:rPr lang="en-US" baseline="0" dirty="0"/>
-              <a:t>    find template</a:t>
-            </a:r>
-          </a:p>
-          <a:p>
-            <a:endParaRPr lang="en-US" dirty="0"/>
+              <a:rPr lang="en-US" dirty="0"/>
+              <a:t>Xylem &amp; Ergsense relations</a:t>
+            </a:r>
           </a:p>
           <a:p>
             <a:pPr marL="0" indent="0">
@@ -1951,7 +1874,7 @@
     </p:spTree>
     <p:extLst>
       <p:ext uri="{BB962C8B-B14F-4D97-AF65-F5344CB8AC3E}">
-        <p14:creationId xmlns:p14="http://schemas.microsoft.com/office/powerpoint/2010/main" val="648812506"/>
+        <p14:creationId xmlns:p14="http://schemas.microsoft.com/office/powerpoint/2010/main" val="3716442150"/>
       </p:ext>
     </p:extLst>
   </p:cSld>
@@ -2011,7 +1934,11 @@
             </a:pPr>
             <a:r>
               <a:rPr lang="en-US" dirty="0"/>
-              <a:t>Board Design</a:t>
+              <a:t>Frame, sketch w/vision</a:t>
+            </a:r>
+            <a:r>
+              <a:rPr lang="en-US" baseline="0" dirty="0"/>
+              <a:t> &amp; intent, draft</a:t>
             </a:r>
           </a:p>
           <a:p>
@@ -2020,8 +1947,8 @@
               <a:buChar char="-"/>
             </a:pPr>
             <a:r>
-              <a:rPr lang="en-US" dirty="0"/>
-              <a:t>Board Fab &amp; Validate</a:t>
+              <a:rPr lang="en-US" baseline="0" dirty="0"/>
+              <a:t>Source control &amp; procedure!</a:t>
             </a:r>
           </a:p>
           <a:p>
@@ -2030,8 +1957,8 @@
               <a:buChar char="-"/>
             </a:pPr>
             <a:r>
-              <a:rPr lang="en-US" dirty="0"/>
-              <a:t>Firmware</a:t>
+              <a:rPr lang="en-US" baseline="0" dirty="0"/>
+              <a:t>Help from experience (Tomm, Terry, Father)</a:t>
             </a:r>
           </a:p>
           <a:p>
@@ -2041,8 +1968,65 @@
             </a:pPr>
             <a:r>
               <a:rPr lang="en-US" dirty="0"/>
-              <a:t>Rapid Prototyping</a:t>
-            </a:r>
+              <a:t>Describe</a:t>
+            </a:r>
+            <a:r>
+              <a:rPr lang="en-US" baseline="0" dirty="0"/>
+              <a:t> procedure of PPT Generation</a:t>
+            </a:r>
+          </a:p>
+          <a:p>
+            <a:pPr marL="171450" indent="-171450">
+              <a:buFontTx/>
+              <a:buChar char="-"/>
+            </a:pPr>
+            <a:r>
+              <a:rPr lang="en-US" baseline="0" dirty="0"/>
+              <a:t>    selection &amp; outline</a:t>
+            </a:r>
+          </a:p>
+          <a:p>
+            <a:pPr marL="171450" indent="-171450">
+              <a:buFontTx/>
+              <a:buChar char="-"/>
+            </a:pPr>
+            <a:r>
+              <a:rPr lang="en-US" baseline="0" dirty="0"/>
+              <a:t>    customer meeting (Tomm)</a:t>
+            </a:r>
+          </a:p>
+          <a:p>
+            <a:pPr marL="171450" indent="-171450">
+              <a:buFontTx/>
+              <a:buChar char="-"/>
+            </a:pPr>
+            <a:r>
+              <a:rPr lang="en-US" baseline="0" dirty="0"/>
+              <a:t>    mentor advise (Tom, Father)</a:t>
+            </a:r>
+          </a:p>
+          <a:p>
+            <a:pPr marL="171450" indent="-171450">
+              <a:buFontTx/>
+              <a:buChar char="-"/>
+            </a:pPr>
+            <a:r>
+              <a:rPr lang="en-US" baseline="0" dirty="0"/>
+              <a:t>    outline</a:t>
+            </a:r>
+          </a:p>
+          <a:p>
+            <a:pPr marL="171450" indent="-171450">
+              <a:buFontTx/>
+              <a:buChar char="-"/>
+            </a:pPr>
+            <a:r>
+              <a:rPr lang="en-US" baseline="0" dirty="0"/>
+              <a:t>    find template</a:t>
+            </a:r>
+          </a:p>
+          <a:p>
+            <a:endParaRPr lang="en-US" dirty="0"/>
           </a:p>
           <a:p>
             <a:pPr marL="0" indent="0">
@@ -2079,7 +2063,7 @@
     </p:spTree>
     <p:extLst>
       <p:ext uri="{BB962C8B-B14F-4D97-AF65-F5344CB8AC3E}">
-        <p14:creationId xmlns:p14="http://schemas.microsoft.com/office/powerpoint/2010/main" val="3025603983"/>
+        <p14:creationId xmlns:p14="http://schemas.microsoft.com/office/powerpoint/2010/main" val="648812506"/>
       </p:ext>
     </p:extLst>
   </p:cSld>
@@ -2133,21 +2117,44 @@
           <a:bodyPr/>
           <a:lstStyle/>
           <a:p>
-            <a:r>
-              <a:rPr lang="en-US" dirty="0"/>
-              <a:t>*Integrate Tomm Notes</a:t>
-            </a:r>
-          </a:p>
-          <a:p>
-            <a:r>
-              <a:rPr lang="en-US" dirty="0"/>
-              <a:t>*Form</a:t>
-            </a:r>
-            <a:r>
-              <a:rPr lang="en-US" baseline="0" dirty="0"/>
-              <a:t> rules &amp; presentation target</a:t>
-            </a:r>
-            <a:endParaRPr lang="en-US" dirty="0"/>
+            <a:pPr marL="171450" indent="-171450">
+              <a:buFontTx/>
+              <a:buChar char="-"/>
+            </a:pPr>
+            <a:r>
+              <a:rPr lang="en-US" dirty="0"/>
+              <a:t>Board Design</a:t>
+            </a:r>
+          </a:p>
+          <a:p>
+            <a:pPr marL="171450" indent="-171450">
+              <a:buFontTx/>
+              <a:buChar char="-"/>
+            </a:pPr>
+            <a:r>
+              <a:rPr lang="en-US" dirty="0"/>
+              <a:t>Board Fab &amp; Validate</a:t>
+            </a:r>
+          </a:p>
+          <a:p>
+            <a:pPr marL="171450" indent="-171450">
+              <a:buFontTx/>
+              <a:buChar char="-"/>
+            </a:pPr>
+            <a:r>
+              <a:rPr lang="en-US" dirty="0"/>
+              <a:t>Firmware</a:t>
+            </a:r>
+          </a:p>
+          <a:p>
+            <a:pPr marL="171450" indent="-171450">
+              <a:buFontTx/>
+              <a:buChar char="-"/>
+            </a:pPr>
+            <a:r>
+              <a:rPr lang="en-US" dirty="0"/>
+              <a:t>Rapid Prototyping</a:t>
+            </a:r>
           </a:p>
           <a:p>
             <a:pPr marL="0" indent="0">
@@ -2184,7 +2191,7 @@
     </p:spTree>
     <p:extLst>
       <p:ext uri="{BB962C8B-B14F-4D97-AF65-F5344CB8AC3E}">
-        <p14:creationId xmlns:p14="http://schemas.microsoft.com/office/powerpoint/2010/main" val="1594136022"/>
+        <p14:creationId xmlns:p14="http://schemas.microsoft.com/office/powerpoint/2010/main" val="3025603983"/>
       </p:ext>
     </p:extLst>
   </p:cSld>
@@ -2523,6 +2530,111 @@
     <p:extLst>
       <p:ext uri="{BB962C8B-B14F-4D97-AF65-F5344CB8AC3E}">
         <p14:creationId xmlns:p14="http://schemas.microsoft.com/office/powerpoint/2010/main" val="3206697118"/>
+      </p:ext>
+    </p:extLst>
+  </p:cSld>
+  <p:clrMapOvr>
+    <a:masterClrMapping/>
+  </p:clrMapOvr>
+</p:notes>
+</file>
+
+<file path=ppt/notesSlides/notesSlide20.xml><?xml version="1.0" encoding="utf-8"?>
+<p:notes xmlns:a="http://schemas.openxmlformats.org/drawingml/2006/main" xmlns:r="http://schemas.openxmlformats.org/officeDocument/2006/relationships" xmlns:p="http://schemas.openxmlformats.org/presentationml/2006/main">
+  <p:cSld>
+    <p:spTree>
+      <p:nvGrpSpPr>
+        <p:cNvPr id="1" name=""/>
+        <p:cNvGrpSpPr/>
+        <p:nvPr/>
+      </p:nvGrpSpPr>
+      <p:grpSpPr>
+        <a:xfrm>
+          <a:off x="0" y="0"/>
+          <a:ext cx="0" cy="0"/>
+          <a:chOff x="0" y="0"/>
+          <a:chExt cx="0" cy="0"/>
+        </a:xfrm>
+      </p:grpSpPr>
+      <p:sp>
+        <p:nvSpPr>
+          <p:cNvPr id="2" name="Slide Image Placeholder 1"/>
+          <p:cNvSpPr>
+            <a:spLocks noGrp="1" noRot="1" noChangeAspect="1"/>
+          </p:cNvSpPr>
+          <p:nvPr>
+            <p:ph type="sldImg"/>
+          </p:nvPr>
+        </p:nvSpPr>
+        <p:spPr/>
+      </p:sp>
+      <p:sp>
+        <p:nvSpPr>
+          <p:cNvPr id="3" name="Notes Placeholder 2"/>
+          <p:cNvSpPr>
+            <a:spLocks noGrp="1"/>
+          </p:cNvSpPr>
+          <p:nvPr>
+            <p:ph type="body" idx="1"/>
+          </p:nvPr>
+        </p:nvSpPr>
+        <p:spPr/>
+        <p:txBody>
+          <a:bodyPr/>
+          <a:lstStyle/>
+          <a:p>
+            <a:r>
+              <a:rPr lang="en-US" dirty="0"/>
+              <a:t>*Integrate Tomm Notes</a:t>
+            </a:r>
+          </a:p>
+          <a:p>
+            <a:r>
+              <a:rPr lang="en-US" dirty="0"/>
+              <a:t>*Form</a:t>
+            </a:r>
+            <a:r>
+              <a:rPr lang="en-US" baseline="0" dirty="0"/>
+              <a:t> rules &amp; presentation target</a:t>
+            </a:r>
+            <a:endParaRPr lang="en-US" dirty="0"/>
+          </a:p>
+          <a:p>
+            <a:pPr marL="0" indent="0">
+              <a:buFontTx/>
+              <a:buNone/>
+            </a:pPr>
+            <a:endParaRPr lang="en-US" dirty="0"/>
+          </a:p>
+        </p:txBody>
+      </p:sp>
+      <p:sp>
+        <p:nvSpPr>
+          <p:cNvPr id="4" name="Slide Number Placeholder 3"/>
+          <p:cNvSpPr>
+            <a:spLocks noGrp="1"/>
+          </p:cNvSpPr>
+          <p:nvPr>
+            <p:ph type="sldNum" sz="quarter" idx="10"/>
+          </p:nvPr>
+        </p:nvSpPr>
+        <p:spPr/>
+        <p:txBody>
+          <a:bodyPr/>
+          <a:lstStyle/>
+          <a:p>
+            <a:fld id="{4AC65D0B-F732-4E21-9A8D-1C6A15A6A84B}" type="slidenum">
+              <a:rPr lang="en-US" smtClean="0"/>
+              <a:t>20</a:t>
+            </a:fld>
+            <a:endParaRPr lang="en-US" dirty="0"/>
+          </a:p>
+        </p:txBody>
+      </p:sp>
+    </p:spTree>
+    <p:extLst>
+      <p:ext uri="{BB962C8B-B14F-4D97-AF65-F5344CB8AC3E}">
+        <p14:creationId xmlns:p14="http://schemas.microsoft.com/office/powerpoint/2010/main" val="1594136022"/>
       </p:ext>
     </p:extLst>
   </p:cSld>
@@ -2891,303 +3003,93 @@
           <a:bodyPr/>
           <a:lstStyle/>
           <a:p>
-            <a:pPr marL="0" indent="0">
-              <a:buFontTx/>
-              <a:buNone/>
-            </a:pPr>
-            <a:r>
-              <a:rPr lang="en-US" dirty="0"/>
-              <a:t>Needs Identification</a:t>
-            </a:r>
-          </a:p>
-          <a:p>
-            <a:pPr marL="628650" marR="0" lvl="1" indent="-171450" algn="l" defTabSz="914400" rtl="0" eaLnBrk="1" fontAlgn="auto" latinLnBrk="0" hangingPunct="1">
-              <a:lnSpc>
-                <a:spcPct val="100000"/>
-              </a:lnSpc>
-              <a:spcBef>
-                <a:spcPts val="0"/>
-              </a:spcBef>
-              <a:spcAft>
-                <a:spcPts val="0"/>
-              </a:spcAft>
-              <a:buClrTx/>
-              <a:buSzTx/>
+            <a:pPr marL="171450" indent="-171450">
               <a:buFontTx/>
               <a:buChar char="-"/>
-              <a:tabLst/>
-              <a:defRPr/>
-            </a:pPr>
-            <a:r>
-              <a:rPr lang="en-US" dirty="0"/>
-              <a:t>Time</a:t>
-            </a:r>
+            </a:pPr>
             <a:r>
               <a:rPr lang="en-US" baseline="0" dirty="0"/>
-              <a:t> Spent: </a:t>
-            </a:r>
-            <a:endParaRPr lang="en-US" dirty="0"/>
-          </a:p>
-          <a:p>
-            <a:pPr marL="628650" lvl="1" indent="-171450">
+              <a:t>Project ramp (remote site visits, project acclimate, Arduino explore)</a:t>
+            </a:r>
+          </a:p>
+          <a:p>
+            <a:pPr marL="171450" indent="-171450">
               <a:buFontTx/>
               <a:buChar char="-"/>
             </a:pPr>
             <a:r>
-              <a:rPr lang="en-US" dirty="0"/>
-              <a:t>In-person</a:t>
-            </a:r>
-            <a:r>
               <a:rPr lang="en-US" baseline="0" dirty="0"/>
-              <a:t> visits, hands on time with DUT to establish scope &amp; path forward</a:t>
-            </a:r>
-          </a:p>
-          <a:p>
-            <a:pPr marL="628650" lvl="1" indent="-171450">
+              <a:t>Path identification</a:t>
+            </a:r>
+          </a:p>
+          <a:p>
+            <a:pPr marL="171450" indent="-171450">
               <a:buFontTx/>
               <a:buChar char="-"/>
             </a:pPr>
             <a:r>
               <a:rPr lang="en-US" baseline="0" dirty="0"/>
-              <a:t>Time on the seat trying things that were known to not succeed, in order to communicate this (ESP, Hand Re-work, PCB Design Selections, Comm Interfaces)</a:t>
-            </a:r>
-          </a:p>
-          <a:p>
-            <a:pPr marL="628650" lvl="1" indent="-171450">
+              <a:t>Bare metal investigation, ESP32</a:t>
+            </a:r>
+          </a:p>
+          <a:p>
+            <a:pPr marL="171450" indent="-171450">
               <a:buFontTx/>
               <a:buChar char="-"/>
             </a:pPr>
             <a:r>
               <a:rPr lang="en-US" baseline="0" dirty="0"/>
-              <a:t>Clear Scope with Doc of Ideas</a:t>
-            </a:r>
-          </a:p>
-          <a:p>
-            <a:pPr marL="628650" lvl="1" indent="-171450">
+              <a:t>…</a:t>
+            </a:r>
+          </a:p>
+          <a:p>
+            <a:pPr marL="171450" indent="-171450">
               <a:buFontTx/>
               <a:buChar char="-"/>
             </a:pPr>
             <a:r>
               <a:rPr lang="en-US" baseline="0" dirty="0"/>
-              <a:t>Present ideas with articulation, PoC when possible</a:t>
-            </a:r>
-            <a:endParaRPr lang="en-US" dirty="0"/>
-          </a:p>
-          <a:p>
-            <a:pPr marL="0" indent="0">
-              <a:buFontTx/>
-              <a:buNone/>
-            </a:pPr>
-            <a:endParaRPr lang="en-US" dirty="0"/>
-          </a:p>
-          <a:p>
-            <a:pPr marL="0" indent="0">
-              <a:buFontTx/>
-              <a:buNone/>
-            </a:pPr>
-            <a:r>
-              <a:rPr lang="en-US" dirty="0"/>
-              <a:t>Firmware Development</a:t>
-            </a:r>
-          </a:p>
-          <a:p>
-            <a:pPr marL="628650" lvl="1" indent="-171450">
+              <a:t>Revisioning formalization &amp; team sharing (GitHub)</a:t>
+            </a:r>
+          </a:p>
+          <a:p>
+            <a:pPr marL="171450" indent="-171450">
               <a:buFontTx/>
               <a:buChar char="-"/>
             </a:pPr>
             <a:r>
-              <a:rPr lang="en-US" dirty="0"/>
-              <a:t>Time</a:t>
-            </a:r>
-            <a:r>
               <a:rPr lang="en-US" baseline="0" dirty="0"/>
-              <a:t> Spent: Espressif VM, ESP-SDK Ramp &amp; Feather Deployment (JTAG)</a:t>
-            </a:r>
-            <a:endParaRPr lang="en-US" dirty="0"/>
-          </a:p>
-          <a:p>
-            <a:pPr marL="628650" lvl="1" indent="-171450">
+              <a:t>Project &amp; documentation standardization</a:t>
+            </a:r>
+          </a:p>
+          <a:p>
+            <a:pPr marL="171450" indent="-171450">
               <a:buFontTx/>
               <a:buChar char="-"/>
             </a:pPr>
             <a:r>
-              <a:rPr lang="en-US" dirty="0"/>
-              <a:t>Focused on path to market and only stepped in</a:t>
-            </a:r>
-            <a:r>
               <a:rPr lang="en-US" baseline="0" dirty="0"/>
-              <a:t> on request (Arduino) or for path (ESP)</a:t>
-            </a:r>
-          </a:p>
-          <a:p>
-            <a:pPr marL="628650" lvl="1" indent="-171450">
+              <a:t>Schematics &amp; project standardize</a:t>
+            </a:r>
+          </a:p>
+          <a:p>
+            <a:pPr marL="171450" indent="-171450">
               <a:buFontTx/>
               <a:buChar char="-"/>
             </a:pPr>
             <a:r>
               <a:rPr lang="en-US" baseline="0" dirty="0"/>
-              <a:t>Focused on tangible results, shared with customer and asked for decision on next steps</a:t>
-            </a:r>
-          </a:p>
-          <a:p>
-            <a:pPr marL="0" indent="0">
-              <a:buFontTx/>
-              <a:buNone/>
-            </a:pPr>
-            <a:endParaRPr lang="en-US" dirty="0"/>
-          </a:p>
-          <a:p>
-            <a:pPr marL="0" indent="0">
-              <a:buFontTx/>
-              <a:buNone/>
-            </a:pPr>
-            <a:r>
-              <a:rPr lang="en-US" dirty="0"/>
-              <a:t>Board Development</a:t>
-            </a:r>
-          </a:p>
-          <a:p>
-            <a:pPr marL="628650" marR="0" lvl="1" indent="-171450" algn="l" defTabSz="914400" rtl="0" eaLnBrk="1" fontAlgn="auto" latinLnBrk="0" hangingPunct="1">
-              <a:lnSpc>
-                <a:spcPct val="100000"/>
-              </a:lnSpc>
-              <a:spcBef>
-                <a:spcPts val="0"/>
-              </a:spcBef>
-              <a:spcAft>
-                <a:spcPts val="0"/>
-              </a:spcAft>
-              <a:buClrTx/>
-              <a:buSzTx/>
+              <a:t>Board architecture standardize</a:t>
+            </a:r>
+          </a:p>
+          <a:p>
+            <a:pPr marL="171450" indent="-171450">
               <a:buFontTx/>
               <a:buChar char="-"/>
-              <a:tabLst/>
-              <a:defRPr/>
-            </a:pPr>
-            <a:r>
-              <a:rPr lang="en-US" dirty="0"/>
-              <a:t>Time</a:t>
-            </a:r>
+            </a:pPr>
             <a:r>
               <a:rPr lang="en-US" baseline="0" dirty="0"/>
-              <a:t> Spent: EAGLE Ramp, Existing Design Port, Revision Proposal, Revision Generation &amp; Release</a:t>
-            </a:r>
-            <a:endParaRPr lang="en-US" dirty="0"/>
-          </a:p>
-          <a:p>
-            <a:pPr marL="0" indent="0">
-              <a:buFontTx/>
-              <a:buNone/>
-            </a:pPr>
-            <a:endParaRPr lang="en-US" dirty="0"/>
-          </a:p>
-          <a:p>
-            <a:pPr marL="0" indent="0">
-              <a:buFontTx/>
-              <a:buNone/>
-            </a:pPr>
-            <a:r>
-              <a:rPr lang="en-US" dirty="0"/>
-              <a:t>Contract Completion &amp; Transfer</a:t>
-            </a:r>
-          </a:p>
-          <a:p>
-            <a:pPr marL="628650" lvl="1" indent="-171450">
-              <a:buFontTx/>
-              <a:buChar char="-"/>
-            </a:pPr>
-            <a:r>
-              <a:rPr lang="en-US" dirty="0"/>
-              <a:t>HW: Project</a:t>
-            </a:r>
-            <a:r>
-              <a:rPr lang="en-US" baseline="0" dirty="0"/>
-              <a:t> &amp; Board Revision</a:t>
-            </a:r>
-          </a:p>
-          <a:p>
-            <a:pPr marL="628650" marR="0" lvl="1" indent="-171450" algn="l" defTabSz="914400" rtl="0" eaLnBrk="1" fontAlgn="auto" latinLnBrk="0" hangingPunct="1">
-              <a:lnSpc>
-                <a:spcPct val="100000"/>
-              </a:lnSpc>
-              <a:spcBef>
-                <a:spcPts val="0"/>
-              </a:spcBef>
-              <a:spcAft>
-                <a:spcPts val="0"/>
-              </a:spcAft>
-              <a:buClrTx/>
-              <a:buSzTx/>
-              <a:buFontTx/>
-              <a:buChar char="-"/>
-              <a:tabLst/>
-              <a:defRPr/>
-            </a:pPr>
-            <a:r>
-              <a:rPr lang="en-US" baseline="0" dirty="0"/>
-              <a:t>FW: OTM spec w/path to use (c</a:t>
-            </a:r>
-            <a:r>
-              <a:rPr lang="en-US" dirty="0"/>
-              <a:t>omplete VM w/next steps &amp; design support)</a:t>
-            </a:r>
-          </a:p>
-          <a:p>
-            <a:pPr marL="628650" marR="0" lvl="1" indent="-171450" algn="l" defTabSz="914400" rtl="0" eaLnBrk="1" fontAlgn="auto" latinLnBrk="0" hangingPunct="1">
-              <a:lnSpc>
-                <a:spcPct val="100000"/>
-              </a:lnSpc>
-              <a:spcBef>
-                <a:spcPts val="0"/>
-              </a:spcBef>
-              <a:spcAft>
-                <a:spcPts val="0"/>
-              </a:spcAft>
-              <a:buClrTx/>
-              <a:buSzTx/>
-              <a:buFontTx/>
-              <a:buChar char="-"/>
-              <a:tabLst/>
-              <a:defRPr/>
-            </a:pPr>
-            <a:r>
-              <a:rPr lang="en-US" dirty="0"/>
-              <a:t>Design:</a:t>
-            </a:r>
-            <a:r>
-              <a:rPr lang="en-US" baseline="0" dirty="0"/>
-              <a:t>  Clear organization &amp; repo integration, </a:t>
-            </a:r>
-            <a:r>
-              <a:rPr lang="en-US" dirty="0"/>
-              <a:t>Identification</a:t>
-            </a:r>
-            <a:r>
-              <a:rPr lang="en-US" baseline="0" dirty="0"/>
-              <a:t> of OTM, Python &amp; JavaScript options</a:t>
-            </a:r>
-          </a:p>
-          <a:p>
-            <a:pPr marL="457200" marR="0" lvl="1" indent="0" algn="l" defTabSz="914400" rtl="0" eaLnBrk="1" fontAlgn="auto" latinLnBrk="0" hangingPunct="1">
-              <a:lnSpc>
-                <a:spcPct val="100000"/>
-              </a:lnSpc>
-              <a:spcBef>
-                <a:spcPts val="0"/>
-              </a:spcBef>
-              <a:spcAft>
-                <a:spcPts val="0"/>
-              </a:spcAft>
-              <a:buClrTx/>
-              <a:buSzTx/>
-              <a:buFontTx/>
-              <a:buNone/>
-              <a:tabLst/>
-              <a:defRPr/>
-            </a:pPr>
-            <a:r>
-              <a:rPr lang="en-US" baseline="0" dirty="0"/>
-              <a:t>	</a:t>
+              <a:t>Path forward to product generation</a:t>
             </a:r>
           </a:p>
         </p:txBody>
@@ -3218,7 +3120,7 @@
     </p:spTree>
     <p:extLst>
       <p:ext uri="{BB962C8B-B14F-4D97-AF65-F5344CB8AC3E}">
-        <p14:creationId xmlns:p14="http://schemas.microsoft.com/office/powerpoint/2010/main" val="292211601"/>
+        <p14:creationId xmlns:p14="http://schemas.microsoft.com/office/powerpoint/2010/main" val="3365085616"/>
       </p:ext>
     </p:extLst>
   </p:cSld>
@@ -3272,53 +3174,103 @@
           <a:bodyPr/>
           <a:lstStyle/>
           <a:p>
-            <a:pPr marL="171450" indent="-171450">
+            <a:pPr marL="0" indent="0">
+              <a:buFontTx/>
+              <a:buNone/>
+            </a:pPr>
+            <a:r>
+              <a:rPr lang="en-US" dirty="0"/>
+              <a:t>Needs Identification</a:t>
+            </a:r>
+          </a:p>
+          <a:p>
+            <a:pPr marL="628650" marR="0" lvl="1" indent="-171450" algn="l" defTabSz="914400" rtl="0" eaLnBrk="1" fontAlgn="auto" latinLnBrk="0" hangingPunct="1">
+              <a:lnSpc>
+                <a:spcPct val="100000"/>
+              </a:lnSpc>
+              <a:spcBef>
+                <a:spcPts val="0"/>
+              </a:spcBef>
+              <a:spcAft>
+                <a:spcPts val="0"/>
+              </a:spcAft>
+              <a:buClrTx/>
+              <a:buSzTx/>
               <a:buFontTx/>
               <a:buChar char="-"/>
-            </a:pPr>
-            <a:r>
-              <a:rPr lang="en-US" dirty="0"/>
-              <a:t>Documentation</a:t>
-            </a:r>
-          </a:p>
-          <a:p>
-            <a:pPr marL="171450" indent="-171450">
+              <a:tabLst/>
+              <a:defRPr/>
+            </a:pPr>
+            <a:r>
+              <a:rPr lang="en-US" dirty="0"/>
+              <a:t>Time</a:t>
+            </a:r>
+            <a:r>
+              <a:rPr lang="en-US" baseline="0" dirty="0"/>
+              <a:t> Spent: </a:t>
+            </a:r>
+            <a:endParaRPr lang="en-US" dirty="0"/>
+          </a:p>
+          <a:p>
+            <a:pPr marL="628650" lvl="1" indent="-171450">
               <a:buFontTx/>
               <a:buChar char="-"/>
             </a:pPr>
             <a:r>
               <a:rPr lang="en-US" dirty="0"/>
-              <a:t>Presentation</a:t>
-            </a:r>
-          </a:p>
-          <a:p>
-            <a:pPr marL="171450" indent="-171450">
+              <a:t>In-person</a:t>
+            </a:r>
+            <a:r>
+              <a:rPr lang="en-US" baseline="0" dirty="0"/>
+              <a:t> visits, hands on time with DUT to establish scope &amp; path forward</a:t>
+            </a:r>
+          </a:p>
+          <a:p>
+            <a:pPr marL="628650" lvl="1" indent="-171450">
               <a:buFontTx/>
               <a:buChar char="-"/>
             </a:pPr>
             <a:r>
-              <a:rPr lang="en-US" dirty="0"/>
-              <a:t>Embedded Systems Development</a:t>
-            </a:r>
-          </a:p>
-          <a:p>
-            <a:pPr marL="171450" indent="-171450">
+              <a:rPr lang="en-US" baseline="0" dirty="0"/>
+              <a:t>Time on the seat trying things that were known to not succeed, in order to communicate this (ESP, Hand Re-work, PCB Design Selections, Comm Interfaces)</a:t>
+            </a:r>
+          </a:p>
+          <a:p>
+            <a:pPr marL="628650" lvl="1" indent="-171450">
               <a:buFontTx/>
               <a:buChar char="-"/>
             </a:pPr>
             <a:r>
-              <a:rPr lang="en-US" dirty="0"/>
-              <a:t>Board Design</a:t>
-            </a:r>
-          </a:p>
-          <a:p>
-            <a:pPr marL="171450" indent="-171450">
+              <a:rPr lang="en-US" baseline="0" dirty="0"/>
+              <a:t>Clear Scope with Doc of Ideas</a:t>
+            </a:r>
+          </a:p>
+          <a:p>
+            <a:pPr marL="628650" lvl="1" indent="-171450">
               <a:buFontTx/>
               <a:buChar char="-"/>
             </a:pPr>
             <a:r>
-              <a:rPr lang="en-US" dirty="0"/>
-              <a:t>Code Syntax (share examples from code)</a:t>
+              <a:rPr lang="en-US" baseline="0" dirty="0"/>
+              <a:t>Present ideas with articulation, PoC when possible</a:t>
+            </a:r>
+            <a:endParaRPr lang="en-US" dirty="0"/>
+          </a:p>
+          <a:p>
+            <a:pPr marL="0" indent="0">
+              <a:buFontTx/>
+              <a:buNone/>
+            </a:pPr>
+            <a:endParaRPr lang="en-US" dirty="0"/>
+          </a:p>
+          <a:p>
+            <a:pPr marL="0" indent="0">
+              <a:buFontTx/>
+              <a:buNone/>
+            </a:pPr>
+            <a:r>
+              <a:rPr lang="en-US" dirty="0"/>
+              <a:t>Firmware Development</a:t>
             </a:r>
           </a:p>
           <a:p>
@@ -3327,70 +3279,199 @@
               <a:buChar char="-"/>
             </a:pPr>
             <a:r>
-              <a:rPr lang="en-US" dirty="0" err="1"/>
-              <a:t>example_pwm_tc.c</a:t>
-            </a:r>
-            <a:r>
-              <a:rPr lang="en-US" dirty="0"/>
-              <a:t> reference</a:t>
-            </a:r>
-          </a:p>
-          <a:p>
-            <a:pPr marL="171450" indent="-171450">
+              <a:rPr lang="en-US" dirty="0"/>
+              <a:t>Time</a:t>
+            </a:r>
+            <a:r>
+              <a:rPr lang="en-US" baseline="0" dirty="0"/>
+              <a:t> Spent: Espressif VM, ESP-SDK Ramp &amp; Feather Deployment (JTAG)</a:t>
+            </a:r>
+            <a:endParaRPr lang="en-US" dirty="0"/>
+          </a:p>
+          <a:p>
+            <a:pPr marL="628650" lvl="1" indent="-171450">
               <a:buFontTx/>
               <a:buChar char="-"/>
             </a:pPr>
             <a:r>
               <a:rPr lang="en-US" dirty="0"/>
-              <a:t>Development Validation</a:t>
-            </a:r>
-          </a:p>
-          <a:p>
-            <a:pPr marL="171450" indent="-171450">
+              <a:t>Focused on path to market and only stepped in</a:t>
+            </a:r>
+            <a:r>
+              <a:rPr lang="en-US" baseline="0" dirty="0"/>
+              <a:t> on request (Arduino) or for path (ESP)</a:t>
+            </a:r>
+          </a:p>
+          <a:p>
+            <a:pPr marL="628650" lvl="1" indent="-171450">
               <a:buFontTx/>
               <a:buChar char="-"/>
             </a:pPr>
             <a:r>
-              <a:rPr lang="en-US" dirty="0"/>
-              <a:t>PoC Form</a:t>
-            </a:r>
-          </a:p>
-          <a:p>
-            <a:pPr marL="171450" indent="-171450">
+              <a:rPr lang="en-US" baseline="0" dirty="0"/>
+              <a:t>Focused on tangible results, shared with customer and asked for decision on next steps</a:t>
+            </a:r>
+          </a:p>
+          <a:p>
+            <a:pPr marL="0" indent="0">
+              <a:buFontTx/>
+              <a:buNone/>
+            </a:pPr>
+            <a:endParaRPr lang="en-US" dirty="0"/>
+          </a:p>
+          <a:p>
+            <a:pPr marL="0" indent="0">
+              <a:buFontTx/>
+              <a:buNone/>
+            </a:pPr>
+            <a:r>
+              <a:rPr lang="en-US" dirty="0"/>
+              <a:t>Board Development</a:t>
+            </a:r>
+          </a:p>
+          <a:p>
+            <a:pPr marL="628650" marR="0" lvl="1" indent="-171450" algn="l" defTabSz="914400" rtl="0" eaLnBrk="1" fontAlgn="auto" latinLnBrk="0" hangingPunct="1">
+              <a:lnSpc>
+                <a:spcPct val="100000"/>
+              </a:lnSpc>
+              <a:spcBef>
+                <a:spcPts val="0"/>
+              </a:spcBef>
+              <a:spcAft>
+                <a:spcPts val="0"/>
+              </a:spcAft>
+              <a:buClrTx/>
+              <a:buSzTx/>
               <a:buFontTx/>
               <a:buChar char="-"/>
-            </a:pPr>
-            <a:r>
-              <a:rPr lang="en-US" dirty="0"/>
-              <a:t>Schematic Examples</a:t>
-            </a:r>
-          </a:p>
-          <a:p>
-            <a:pPr marL="171450" indent="-171450">
+              <a:tabLst/>
+              <a:defRPr/>
+            </a:pPr>
+            <a:r>
+              <a:rPr lang="en-US" dirty="0"/>
+              <a:t>Time</a:t>
+            </a:r>
+            <a:r>
+              <a:rPr lang="en-US" baseline="0" dirty="0"/>
+              <a:t> Spent: EAGLE Ramp, Existing Design Port, Revision Proposal, Revision Generation &amp; Release</a:t>
+            </a:r>
+            <a:endParaRPr lang="en-US" dirty="0"/>
+          </a:p>
+          <a:p>
+            <a:pPr marL="0" indent="0">
+              <a:buFontTx/>
+              <a:buNone/>
+            </a:pPr>
+            <a:endParaRPr lang="en-US" dirty="0"/>
+          </a:p>
+          <a:p>
+            <a:pPr marL="0" indent="0">
+              <a:buFontTx/>
+              <a:buNone/>
+            </a:pPr>
+            <a:r>
+              <a:rPr lang="en-US" dirty="0"/>
+              <a:t>Contract Completion &amp; Transfer</a:t>
+            </a:r>
+          </a:p>
+          <a:p>
+            <a:pPr marL="628650" lvl="1" indent="-171450">
               <a:buFontTx/>
               <a:buChar char="-"/>
             </a:pPr>
             <a:r>
               <a:rPr lang="en-US" dirty="0"/>
-              <a:t>Content Transfer to Ergsense</a:t>
-            </a:r>
-          </a:p>
-          <a:p>
-            <a:pPr marL="171450" indent="-171450">
+              <a:t>HW: Project</a:t>
+            </a:r>
+            <a:r>
+              <a:rPr lang="en-US" baseline="0" dirty="0"/>
+              <a:t> &amp; Board Revision</a:t>
+            </a:r>
+          </a:p>
+          <a:p>
+            <a:pPr marL="628650" marR="0" lvl="1" indent="-171450" algn="l" defTabSz="914400" rtl="0" eaLnBrk="1" fontAlgn="auto" latinLnBrk="0" hangingPunct="1">
+              <a:lnSpc>
+                <a:spcPct val="100000"/>
+              </a:lnSpc>
+              <a:spcBef>
+                <a:spcPts val="0"/>
+              </a:spcBef>
+              <a:spcAft>
+                <a:spcPts val="0"/>
+              </a:spcAft>
+              <a:buClrTx/>
+              <a:buSzTx/>
               <a:buFontTx/>
               <a:buChar char="-"/>
-            </a:pPr>
-            <a:r>
-              <a:rPr lang="en-US" dirty="0"/>
-              <a:t>Revision Control</a:t>
-            </a:r>
-          </a:p>
-          <a:p>
-            <a:pPr marL="0" indent="0">
+              <a:tabLst/>
+              <a:defRPr/>
+            </a:pPr>
+            <a:r>
+              <a:rPr lang="en-US" baseline="0" dirty="0"/>
+              <a:t>FW: OTM spec w/path to use (c</a:t>
+            </a:r>
+            <a:r>
+              <a:rPr lang="en-US" dirty="0"/>
+              <a:t>omplete VM w/next steps &amp; design support)</a:t>
+            </a:r>
+          </a:p>
+          <a:p>
+            <a:pPr marL="628650" marR="0" lvl="1" indent="-171450" algn="l" defTabSz="914400" rtl="0" eaLnBrk="1" fontAlgn="auto" latinLnBrk="0" hangingPunct="1">
+              <a:lnSpc>
+                <a:spcPct val="100000"/>
+              </a:lnSpc>
+              <a:spcBef>
+                <a:spcPts val="0"/>
+              </a:spcBef>
+              <a:spcAft>
+                <a:spcPts val="0"/>
+              </a:spcAft>
+              <a:buClrTx/>
+              <a:buSzTx/>
+              <a:buFontTx/>
+              <a:buChar char="-"/>
+              <a:tabLst/>
+              <a:defRPr/>
+            </a:pPr>
+            <a:r>
+              <a:rPr lang="en-US" dirty="0"/>
+              <a:t>Design:</a:t>
+            </a:r>
+            <a:r>
+              <a:rPr lang="en-US" baseline="0" dirty="0"/>
+              <a:t>  Clear organization &amp; repo integration, </a:t>
+            </a:r>
+            <a:r>
+              <a:rPr lang="en-US" dirty="0"/>
+              <a:t>Identification</a:t>
+            </a:r>
+            <a:r>
+              <a:rPr lang="en-US" baseline="0" dirty="0"/>
+              <a:t> of OTM, Python &amp; JavaScript options</a:t>
+            </a:r>
+          </a:p>
+          <a:p>
+            <a:pPr marL="457200" marR="0" lvl="1" indent="0" algn="l" defTabSz="914400" rtl="0" eaLnBrk="1" fontAlgn="auto" latinLnBrk="0" hangingPunct="1">
+              <a:lnSpc>
+                <a:spcPct val="100000"/>
+              </a:lnSpc>
+              <a:spcBef>
+                <a:spcPts val="0"/>
+              </a:spcBef>
+              <a:spcAft>
+                <a:spcPts val="0"/>
+              </a:spcAft>
+              <a:buClrTx/>
+              <a:buSzTx/>
               <a:buFontTx/>
               <a:buNone/>
-            </a:pPr>
-            <a:endParaRPr lang="en-US" dirty="0"/>
+              <a:tabLst/>
+              <a:defRPr/>
+            </a:pPr>
+            <a:r>
+              <a:rPr lang="en-US" baseline="0" dirty="0"/>
+              <a:t>	</a:t>
+            </a:r>
           </a:p>
         </p:txBody>
       </p:sp>
@@ -3420,7 +3501,7 @@
     </p:spTree>
     <p:extLst>
       <p:ext uri="{BB962C8B-B14F-4D97-AF65-F5344CB8AC3E}">
-        <p14:creationId xmlns:p14="http://schemas.microsoft.com/office/powerpoint/2010/main" val="1782159032"/>
+        <p14:creationId xmlns:p14="http://schemas.microsoft.com/office/powerpoint/2010/main" val="292211601"/>
       </p:ext>
     </p:extLst>
   </p:cSld>
@@ -3622,7 +3703,7 @@
     </p:spTree>
     <p:extLst>
       <p:ext uri="{BB962C8B-B14F-4D97-AF65-F5344CB8AC3E}">
-        <p14:creationId xmlns:p14="http://schemas.microsoft.com/office/powerpoint/2010/main" val="1922393564"/>
+        <p14:creationId xmlns:p14="http://schemas.microsoft.com/office/powerpoint/2010/main" val="1782159032"/>
       </p:ext>
     </p:extLst>
   </p:cSld>
@@ -3682,7 +3763,7 @@
             </a:pPr>
             <a:r>
               <a:rPr lang="en-US" dirty="0"/>
-              <a:t>Clear segmentation and modularization of design</a:t>
+              <a:t>Documentation</a:t>
             </a:r>
           </a:p>
           <a:p>
@@ -3692,7 +3773,7 @@
             </a:pPr>
             <a:r>
               <a:rPr lang="en-US" dirty="0"/>
-              <a:t>Uniform, consistent layout</a:t>
+              <a:t>Presentation</a:t>
             </a:r>
           </a:p>
           <a:p>
@@ -3702,8 +3783,99 @@
             </a:pPr>
             <a:r>
               <a:rPr lang="en-US" dirty="0"/>
-              <a:t>Clear labelling with notes</a:t>
-            </a:r>
+              <a:t>Embedded Systems Development</a:t>
+            </a:r>
+          </a:p>
+          <a:p>
+            <a:pPr marL="171450" indent="-171450">
+              <a:buFontTx/>
+              <a:buChar char="-"/>
+            </a:pPr>
+            <a:r>
+              <a:rPr lang="en-US" dirty="0"/>
+              <a:t>Board Design</a:t>
+            </a:r>
+          </a:p>
+          <a:p>
+            <a:pPr marL="171450" indent="-171450">
+              <a:buFontTx/>
+              <a:buChar char="-"/>
+            </a:pPr>
+            <a:r>
+              <a:rPr lang="en-US" dirty="0"/>
+              <a:t>Code Syntax (share examples from code)</a:t>
+            </a:r>
+          </a:p>
+          <a:p>
+            <a:pPr marL="628650" lvl="1" indent="-171450">
+              <a:buFontTx/>
+              <a:buChar char="-"/>
+            </a:pPr>
+            <a:r>
+              <a:rPr lang="en-US" dirty="0" err="1"/>
+              <a:t>example_pwm_tc.c</a:t>
+            </a:r>
+            <a:r>
+              <a:rPr lang="en-US" dirty="0"/>
+              <a:t> reference</a:t>
+            </a:r>
+          </a:p>
+          <a:p>
+            <a:pPr marL="171450" indent="-171450">
+              <a:buFontTx/>
+              <a:buChar char="-"/>
+            </a:pPr>
+            <a:r>
+              <a:rPr lang="en-US" dirty="0"/>
+              <a:t>Development Validation</a:t>
+            </a:r>
+          </a:p>
+          <a:p>
+            <a:pPr marL="171450" indent="-171450">
+              <a:buFontTx/>
+              <a:buChar char="-"/>
+            </a:pPr>
+            <a:r>
+              <a:rPr lang="en-US" dirty="0"/>
+              <a:t>PoC Form</a:t>
+            </a:r>
+          </a:p>
+          <a:p>
+            <a:pPr marL="171450" indent="-171450">
+              <a:buFontTx/>
+              <a:buChar char="-"/>
+            </a:pPr>
+            <a:r>
+              <a:rPr lang="en-US" dirty="0"/>
+              <a:t>Schematic Examples</a:t>
+            </a:r>
+          </a:p>
+          <a:p>
+            <a:pPr marL="171450" indent="-171450">
+              <a:buFontTx/>
+              <a:buChar char="-"/>
+            </a:pPr>
+            <a:r>
+              <a:rPr lang="en-US" dirty="0"/>
+              <a:t>Content Transfer to Ergsense</a:t>
+            </a:r>
+          </a:p>
+          <a:p>
+            <a:pPr marL="171450" indent="-171450">
+              <a:buFontTx/>
+              <a:buChar char="-"/>
+            </a:pPr>
+            <a:r>
+              <a:rPr lang="en-US" dirty="0"/>
+              <a:t>Revision Control</a:t>
+            </a:r>
+          </a:p>
+          <a:p>
+            <a:pPr marL="0" indent="0">
+              <a:buFontTx/>
+              <a:buNone/>
+            </a:pPr>
+            <a:endParaRPr lang="en-US" dirty="0"/>
           </a:p>
         </p:txBody>
       </p:sp>
@@ -3733,7 +3905,7 @@
     </p:spTree>
     <p:extLst>
       <p:ext uri="{BB962C8B-B14F-4D97-AF65-F5344CB8AC3E}">
-        <p14:creationId xmlns:p14="http://schemas.microsoft.com/office/powerpoint/2010/main" val="1255233405"/>
+        <p14:creationId xmlns:p14="http://schemas.microsoft.com/office/powerpoint/2010/main" val="1922393564"/>
       </p:ext>
     </p:extLst>
   </p:cSld>
@@ -3844,7 +4016,7 @@
     </p:spTree>
     <p:extLst>
       <p:ext uri="{BB962C8B-B14F-4D97-AF65-F5344CB8AC3E}">
-        <p14:creationId xmlns:p14="http://schemas.microsoft.com/office/powerpoint/2010/main" val="4145813878"/>
+        <p14:creationId xmlns:p14="http://schemas.microsoft.com/office/powerpoint/2010/main" val="1255233405"/>
       </p:ext>
     </p:extLst>
   </p:cSld>
@@ -3904,7 +4076,7 @@
             </a:pPr>
             <a:r>
               <a:rPr lang="en-US" dirty="0"/>
-              <a:t>Uniform naming schema</a:t>
+              <a:t>Clear segmentation and modularization of design</a:t>
             </a:r>
           </a:p>
           <a:p>
@@ -3914,7 +4086,7 @@
             </a:pPr>
             <a:r>
               <a:rPr lang="en-US" dirty="0"/>
-              <a:t>Consistent, uniform symbols</a:t>
+              <a:t>Uniform, consistent layout</a:t>
             </a:r>
           </a:p>
           <a:p>
@@ -3924,7 +4096,7 @@
             </a:pPr>
             <a:r>
               <a:rPr lang="en-US" dirty="0"/>
-              <a:t>Complete silkscreen &amp; outline markup</a:t>
+              <a:t>Clear labelling with notes</a:t>
             </a:r>
           </a:p>
         </p:txBody>
@@ -3955,7 +4127,7 @@
     </p:spTree>
     <p:extLst>
       <p:ext uri="{BB962C8B-B14F-4D97-AF65-F5344CB8AC3E}">
-        <p14:creationId xmlns:p14="http://schemas.microsoft.com/office/powerpoint/2010/main" val="3592769984"/>
+        <p14:creationId xmlns:p14="http://schemas.microsoft.com/office/powerpoint/2010/main" val="4145813878"/>
       </p:ext>
     </p:extLst>
   </p:cSld>
@@ -4154,7 +4326,7 @@
             <a:fld id="{B61BEF0D-F0BB-DE4B-95CE-6DB70DBA9567}" type="datetimeFigureOut">
               <a:rPr lang="en-US" dirty="0"/>
               <a:pPr/>
-              <a:t>7/25/2018</a:t>
+              <a:t>7/26/2018</a:t>
             </a:fld>
             <a:endParaRPr lang="en-US" dirty="0"/>
           </a:p>
@@ -4489,7 +4661,7 @@
             <a:fld id="{B61BEF0D-F0BB-DE4B-95CE-6DB70DBA9567}" type="datetimeFigureOut">
               <a:rPr lang="en-US" dirty="0"/>
               <a:pPr/>
-              <a:t>7/25/2018</a:t>
+              <a:t>7/26/2018</a:t>
             </a:fld>
             <a:endParaRPr lang="en-US" dirty="0"/>
           </a:p>
@@ -4887,7 +5059,7 @@
             <a:fld id="{B61BEF0D-F0BB-DE4B-95CE-6DB70DBA9567}" type="datetimeFigureOut">
               <a:rPr lang="en-US" dirty="0"/>
               <a:pPr/>
-              <a:t>7/25/2018</a:t>
+              <a:t>7/26/2018</a:t>
             </a:fld>
             <a:endParaRPr lang="en-US" dirty="0"/>
           </a:p>
@@ -5220,7 +5392,7 @@
             <a:fld id="{B61BEF0D-F0BB-DE4B-95CE-6DB70DBA9567}" type="datetimeFigureOut">
               <a:rPr lang="en-US" dirty="0"/>
               <a:pPr/>
-              <a:t>7/25/2018</a:t>
+              <a:t>7/26/2018</a:t>
             </a:fld>
             <a:endParaRPr lang="en-US" dirty="0"/>
           </a:p>
@@ -5537,7 +5709,7 @@
             <a:fld id="{B61BEF0D-F0BB-DE4B-95CE-6DB70DBA9567}" type="datetimeFigureOut">
               <a:rPr lang="en-US" dirty="0"/>
               <a:pPr/>
-              <a:t>7/25/2018</a:t>
+              <a:t>7/26/2018</a:t>
             </a:fld>
             <a:endParaRPr lang="en-US" dirty="0"/>
           </a:p>
@@ -5930,7 +6102,7 @@
             <a:fld id="{B61BEF0D-F0BB-DE4B-95CE-6DB70DBA9567}" type="datetimeFigureOut">
               <a:rPr lang="en-US" dirty="0"/>
               <a:pPr/>
-              <a:t>7/25/2018</a:t>
+              <a:t>7/26/2018</a:t>
             </a:fld>
             <a:endParaRPr lang="en-US" dirty="0"/>
           </a:p>
@@ -6184,7 +6356,7 @@
             <a:fld id="{B61BEF0D-F0BB-DE4B-95CE-6DB70DBA9567}" type="datetimeFigureOut">
               <a:rPr lang="en-US" dirty="0"/>
               <a:pPr/>
-              <a:t>7/25/2018</a:t>
+              <a:t>7/26/2018</a:t>
             </a:fld>
             <a:endParaRPr lang="en-US" dirty="0"/>
           </a:p>
@@ -6443,7 +6615,7 @@
             <a:fld id="{B61BEF0D-F0BB-DE4B-95CE-6DB70DBA9567}" type="datetimeFigureOut">
               <a:rPr lang="en-US" dirty="0"/>
               <a:pPr/>
-              <a:t>7/25/2018</a:t>
+              <a:t>7/26/2018</a:t>
             </a:fld>
             <a:endParaRPr lang="en-US" dirty="0"/>
           </a:p>
@@ -6702,7 +6874,7 @@
             <a:fld id="{B61BEF0D-F0BB-DE4B-95CE-6DB70DBA9567}" type="datetimeFigureOut">
               <a:rPr lang="en-US" dirty="0"/>
               <a:pPr/>
-              <a:t>7/25/2018</a:t>
+              <a:t>7/26/2018</a:t>
             </a:fld>
             <a:endParaRPr lang="en-US" dirty="0"/>
           </a:p>
@@ -7028,7 +7200,7 @@
             <a:fld id="{B61BEF0D-F0BB-DE4B-95CE-6DB70DBA9567}" type="datetimeFigureOut">
               <a:rPr lang="en-US" dirty="0"/>
               <a:pPr/>
-              <a:t>7/25/2018</a:t>
+              <a:t>7/26/2018</a:t>
             </a:fld>
             <a:endParaRPr lang="en-US" dirty="0"/>
           </a:p>
@@ -7348,7 +7520,7 @@
             <a:fld id="{B61BEF0D-F0BB-DE4B-95CE-6DB70DBA9567}" type="datetimeFigureOut">
               <a:rPr lang="en-US" dirty="0"/>
               <a:pPr/>
-              <a:t>7/25/2018</a:t>
+              <a:t>7/26/2018</a:t>
             </a:fld>
             <a:endParaRPr lang="en-US" dirty="0"/>
           </a:p>
@@ -7802,7 +7974,7 @@
             <a:fld id="{B61BEF0D-F0BB-DE4B-95CE-6DB70DBA9567}" type="datetimeFigureOut">
               <a:rPr lang="en-US" dirty="0"/>
               <a:pPr/>
-              <a:t>7/25/2018</a:t>
+              <a:t>7/26/2018</a:t>
             </a:fld>
             <a:endParaRPr lang="en-US" dirty="0"/>
           </a:p>
@@ -8004,7 +8176,7 @@
             <a:fld id="{B61BEF0D-F0BB-DE4B-95CE-6DB70DBA9567}" type="datetimeFigureOut">
               <a:rPr lang="en-US" dirty="0"/>
               <a:pPr/>
-              <a:t>7/25/2018</a:t>
+              <a:t>7/26/2018</a:t>
             </a:fld>
             <a:endParaRPr lang="en-US" dirty="0"/>
           </a:p>
@@ -8178,7 +8350,7 @@
             <a:fld id="{B61BEF0D-F0BB-DE4B-95CE-6DB70DBA9567}" type="datetimeFigureOut">
               <a:rPr lang="en-US" dirty="0"/>
               <a:pPr/>
-              <a:t>7/25/2018</a:t>
+              <a:t>7/26/2018</a:t>
             </a:fld>
             <a:endParaRPr lang="en-US" dirty="0"/>
           </a:p>
@@ -8508,7 +8680,7 @@
             <a:fld id="{B61BEF0D-F0BB-DE4B-95CE-6DB70DBA9567}" type="datetimeFigureOut">
               <a:rPr lang="en-US" dirty="0"/>
               <a:pPr/>
-              <a:t>7/25/2018</a:t>
+              <a:t>7/26/2018</a:t>
             </a:fld>
             <a:endParaRPr lang="en-US" dirty="0"/>
           </a:p>
@@ -8850,7 +9022,7 @@
             <a:fld id="{B61BEF0D-F0BB-DE4B-95CE-6DB70DBA9567}" type="datetimeFigureOut">
               <a:rPr lang="en-US" dirty="0"/>
               <a:pPr/>
-              <a:t>7/25/2018</a:t>
+              <a:t>7/26/2018</a:t>
             </a:fld>
             <a:endParaRPr lang="en-US" dirty="0"/>
           </a:p>
@@ -10964,7 +11136,7 @@
             <a:fld id="{B61BEF0D-F0BB-DE4B-95CE-6DB70DBA9567}" type="datetimeFigureOut">
               <a:rPr lang="en-US" dirty="0"/>
               <a:pPr/>
-              <a:t>7/25/2018</a:t>
+              <a:t>7/26/2018</a:t>
             </a:fld>
             <a:endParaRPr lang="en-US" dirty="0"/>
           </a:p>
@@ -11603,6 +11775,141 @@
                 <a:ea typeface="+mj-ea"/>
                 <a:cs typeface="+mj-cs"/>
               </a:rPr>
+              <a:t>DTECTS Library</a:t>
+            </a:r>
+            <a:endParaRPr lang="en-US" sz="4400" dirty="0">
+              <a:effectLst/>
+            </a:endParaRPr>
+          </a:p>
+        </p:txBody>
+      </p:sp>
+      <p:pic>
+        <p:nvPicPr>
+          <p:cNvPr id="7" name="Picture 6">
+            <a:extLst>
+              <a:ext uri="{FF2B5EF4-FFF2-40B4-BE49-F238E27FC236}">
+                <a16:creationId xmlns:a16="http://schemas.microsoft.com/office/drawing/2014/main" id="{D939D839-2D14-4EEF-B198-53A77C1F0AB3}"/>
+              </a:ext>
+            </a:extLst>
+          </p:cNvPr>
+          <p:cNvPicPr>
+            <a:picLocks noChangeAspect="1"/>
+          </p:cNvPicPr>
+          <p:nvPr/>
+        </p:nvPicPr>
+        <p:blipFill>
+          <a:blip r:embed="rId3"/>
+          <a:stretch>
+            <a:fillRect/>
+          </a:stretch>
+        </p:blipFill>
+        <p:spPr>
+          <a:xfrm>
+            <a:off x="2769323" y="1518368"/>
+            <a:ext cx="6361613" cy="4477897"/>
+          </a:xfrm>
+          <a:prstGeom prst="rect">
+            <a:avLst/>
+          </a:prstGeom>
+        </p:spPr>
+      </p:pic>
+      <p:pic>
+        <p:nvPicPr>
+          <p:cNvPr id="4" name="Picture 3">
+            <a:extLst>
+              <a:ext uri="{FF2B5EF4-FFF2-40B4-BE49-F238E27FC236}">
+                <a16:creationId xmlns:a16="http://schemas.microsoft.com/office/drawing/2014/main" id="{DD99FE0C-189B-460A-A9AC-9D01098A1696}"/>
+              </a:ext>
+            </a:extLst>
+          </p:cNvPr>
+          <p:cNvPicPr>
+            <a:picLocks noChangeAspect="1"/>
+          </p:cNvPicPr>
+          <p:nvPr/>
+        </p:nvPicPr>
+        <p:blipFill>
+          <a:blip r:embed="rId4"/>
+          <a:stretch>
+            <a:fillRect/>
+          </a:stretch>
+        </p:blipFill>
+        <p:spPr>
+          <a:xfrm>
+            <a:off x="2069123" y="1518368"/>
+            <a:ext cx="7954268" cy="4477897"/>
+          </a:xfrm>
+          <a:prstGeom prst="rect">
+            <a:avLst/>
+          </a:prstGeom>
+        </p:spPr>
+      </p:pic>
+    </p:spTree>
+    <p:extLst>
+      <p:ext uri="{BB962C8B-B14F-4D97-AF65-F5344CB8AC3E}">
+        <p14:creationId xmlns:p14="http://schemas.microsoft.com/office/powerpoint/2010/main" val="3340878372"/>
+      </p:ext>
+    </p:extLst>
+  </p:cSld>
+  <p:clrMapOvr>
+    <a:masterClrMapping/>
+  </p:clrMapOvr>
+</p:sld>
+</file>
+
+<file path=ppt/slides/slide11.xml><?xml version="1.0" encoding="utf-8"?>
+<p:sld xmlns:a="http://schemas.openxmlformats.org/drawingml/2006/main" xmlns:r="http://schemas.openxmlformats.org/officeDocument/2006/relationships" xmlns:p="http://schemas.openxmlformats.org/presentationml/2006/main">
+  <p:cSld>
+    <p:spTree>
+      <p:nvGrpSpPr>
+        <p:cNvPr id="1" name=""/>
+        <p:cNvGrpSpPr/>
+        <p:nvPr/>
+      </p:nvGrpSpPr>
+      <p:grpSpPr>
+        <a:xfrm>
+          <a:off x="0" y="0"/>
+          <a:ext cx="0" cy="0"/>
+          <a:chOff x="0" y="0"/>
+          <a:chExt cx="0" cy="0"/>
+        </a:xfrm>
+      </p:grpSpPr>
+      <p:sp>
+        <p:nvSpPr>
+          <p:cNvPr id="2" name="Title 1">
+            <a:extLst>
+              <a:ext uri="{FF2B5EF4-FFF2-40B4-BE49-F238E27FC236}">
+                <a16:creationId xmlns:a16="http://schemas.microsoft.com/office/drawing/2014/main" id="{9C5E42EE-EA5D-4203-B1EC-B96B68D2A8EA}"/>
+              </a:ext>
+            </a:extLst>
+          </p:cNvPr>
+          <p:cNvSpPr>
+            <a:spLocks noGrp="1"/>
+          </p:cNvSpPr>
+          <p:nvPr>
+            <p:ph type="title"/>
+          </p:nvPr>
+        </p:nvSpPr>
+        <p:spPr/>
+        <p:txBody>
+          <a:bodyPr>
+            <a:normAutofit/>
+          </a:bodyPr>
+          <a:lstStyle/>
+          <a:p>
+            <a:pPr rtl="0" eaLnBrk="1" latinLnBrk="0" hangingPunct="1"/>
+            <a:r>
+              <a:rPr lang="en-US" sz="3600" b="0" i="0" kern="1200" baseline="0" dirty="0">
+                <a:solidFill>
+                  <a:schemeClr val="tx1">
+                    <a:lumMod val="85000"/>
+                    <a:lumOff val="15000"/>
+                  </a:schemeClr>
+                </a:solidFill>
+                <a:effectLst/>
+                <a:latin typeface="+mj-lt"/>
+                <a:ea typeface="+mj-ea"/>
+                <a:cs typeface="+mj-cs"/>
+              </a:rPr>
               <a:t>DTECTS Board Design</a:t>
             </a:r>
             <a:endParaRPr lang="en-US" sz="4400" dirty="0">
@@ -11654,7 +11961,7 @@
 </p:sld>
 </file>
 
-<file path=ppt/slides/slide11.xml><?xml version="1.0" encoding="utf-8"?>
+<file path=ppt/slides/slide12.xml><?xml version="1.0" encoding="utf-8"?>
 <p:sld xmlns:a="http://schemas.openxmlformats.org/drawingml/2006/main" xmlns:r="http://schemas.openxmlformats.org/officeDocument/2006/relationships" xmlns:p="http://schemas.openxmlformats.org/presentationml/2006/main">
   <p:cSld>
     <p:spTree>
@@ -11759,7 +12066,7 @@
 </p:sld>
 </file>
 
-<file path=ppt/slides/slide12.xml><?xml version="1.0" encoding="utf-8"?>
+<file path=ppt/slides/slide13.xml><?xml version="1.0" encoding="utf-8"?>
 <p:sld xmlns:a="http://schemas.openxmlformats.org/drawingml/2006/main" xmlns:r="http://schemas.openxmlformats.org/officeDocument/2006/relationships" xmlns:p="http://schemas.openxmlformats.org/presentationml/2006/main">
   <p:cSld>
     <p:spTree>
@@ -11907,111 +12214,6 @@
 </p:sld>
 </file>
 
-<file path=ppt/slides/slide13.xml><?xml version="1.0" encoding="utf-8"?>
-<p:sld xmlns:a="http://schemas.openxmlformats.org/drawingml/2006/main" xmlns:r="http://schemas.openxmlformats.org/officeDocument/2006/relationships" xmlns:p="http://schemas.openxmlformats.org/presentationml/2006/main">
-  <p:cSld>
-    <p:spTree>
-      <p:nvGrpSpPr>
-        <p:cNvPr id="1" name=""/>
-        <p:cNvGrpSpPr/>
-        <p:nvPr/>
-      </p:nvGrpSpPr>
-      <p:grpSpPr>
-        <a:xfrm>
-          <a:off x="0" y="0"/>
-          <a:ext cx="0" cy="0"/>
-          <a:chOff x="0" y="0"/>
-          <a:chExt cx="0" cy="0"/>
-        </a:xfrm>
-      </p:grpSpPr>
-      <p:sp>
-        <p:nvSpPr>
-          <p:cNvPr id="2" name="Title 1">
-            <a:extLst>
-              <a:ext uri="{FF2B5EF4-FFF2-40B4-BE49-F238E27FC236}">
-                <a16:creationId xmlns:a16="http://schemas.microsoft.com/office/drawing/2014/main" id="{9C5E42EE-EA5D-4203-B1EC-B96B68D2A8EA}"/>
-              </a:ext>
-            </a:extLst>
-          </p:cNvPr>
-          <p:cNvSpPr>
-            <a:spLocks noGrp="1"/>
-          </p:cNvSpPr>
-          <p:nvPr>
-            <p:ph type="title"/>
-          </p:nvPr>
-        </p:nvSpPr>
-        <p:spPr/>
-        <p:txBody>
-          <a:bodyPr>
-            <a:normAutofit/>
-          </a:bodyPr>
-          <a:lstStyle/>
-          <a:p>
-            <a:pPr rtl="0" eaLnBrk="1" latinLnBrk="0" hangingPunct="1"/>
-            <a:r>
-              <a:rPr lang="en-US" sz="3600" b="0" i="0" kern="1200" baseline="0" dirty="0">
-                <a:solidFill>
-                  <a:schemeClr val="tx1">
-                    <a:lumMod val="85000"/>
-                    <a:lumOff val="15000"/>
-                  </a:schemeClr>
-                </a:solidFill>
-                <a:effectLst/>
-                <a:latin typeface="+mj-lt"/>
-                <a:ea typeface="+mj-ea"/>
-                <a:cs typeface="+mj-cs"/>
-              </a:rPr>
-              <a:t>Overcome Challenges</a:t>
-            </a:r>
-            <a:endParaRPr lang="en-US" sz="4400" dirty="0">
-              <a:effectLst/>
-            </a:endParaRPr>
-          </a:p>
-        </p:txBody>
-      </p:sp>
-      <p:sp>
-        <p:nvSpPr>
-          <p:cNvPr id="3" name="Content Placeholder 2">
-            <a:extLst>
-              <a:ext uri="{FF2B5EF4-FFF2-40B4-BE49-F238E27FC236}">
-                <a16:creationId xmlns:a16="http://schemas.microsoft.com/office/drawing/2014/main" id="{044B4F6E-A639-47F4-91A5-68807265D618}"/>
-              </a:ext>
-            </a:extLst>
-          </p:cNvPr>
-          <p:cNvSpPr>
-            <a:spLocks noGrp="1"/>
-          </p:cNvSpPr>
-          <p:nvPr>
-            <p:ph idx="1"/>
-          </p:nvPr>
-        </p:nvSpPr>
-        <p:spPr>
-          <a:xfrm>
-            <a:off x="2589211" y="1451113"/>
-            <a:ext cx="9079327" cy="5068957"/>
-          </a:xfrm>
-        </p:spPr>
-        <p:txBody>
-          <a:bodyPr/>
-          <a:lstStyle/>
-          <a:p>
-            <a:endParaRPr lang="en-US" dirty="0"/>
-          </a:p>
-        </p:txBody>
-      </p:sp>
-    </p:spTree>
-    <p:extLst>
-      <p:ext uri="{BB962C8B-B14F-4D97-AF65-F5344CB8AC3E}">
-        <p14:creationId xmlns:p14="http://schemas.microsoft.com/office/powerpoint/2010/main" val="2805820393"/>
-      </p:ext>
-    </p:extLst>
-  </p:cSld>
-  <p:clrMapOvr>
-    <a:masterClrMapping/>
-  </p:clrMapOvr>
-</p:sld>
-</file>
-
 <file path=ppt/slides/slide14.xml><?xml version="1.0" encoding="utf-8"?>
 <p:sld xmlns:a="http://schemas.openxmlformats.org/drawingml/2006/main" xmlns:r="http://schemas.openxmlformats.org/officeDocument/2006/relationships" xmlns:p="http://schemas.openxmlformats.org/presentationml/2006/main">
   <p:cSld>
@@ -12052,6 +12254,7 @@
           </a:bodyPr>
           <a:lstStyle/>
           <a:p>
+            <a:pPr rtl="0" eaLnBrk="1" latinLnBrk="0" hangingPunct="1"/>
             <a:r>
               <a:rPr lang="en-US" sz="3600" b="0" i="0" kern="1200" baseline="0" dirty="0">
                 <a:solidFill>
@@ -12065,9 +12268,11 @@
                 <a:ea typeface="+mj-ea"/>
                 <a:cs typeface="+mj-cs"/>
               </a:rPr>
-              <a:t>Deliverable &amp; Results (2)</a:t>
-            </a:r>
-            <a:endParaRPr lang="en-US" sz="2800" dirty="0"/>
+              <a:t>Overcome Challenges</a:t>
+            </a:r>
+            <a:endParaRPr lang="en-US" sz="4400" dirty="0">
+              <a:effectLst/>
+            </a:endParaRPr>
           </a:p>
         </p:txBody>
       </p:sp>
@@ -12104,7 +12309,7 @@
     </p:spTree>
     <p:extLst>
       <p:ext uri="{BB962C8B-B14F-4D97-AF65-F5344CB8AC3E}">
-        <p14:creationId xmlns:p14="http://schemas.microsoft.com/office/powerpoint/2010/main" val="821675052"/>
+        <p14:creationId xmlns:p14="http://schemas.microsoft.com/office/powerpoint/2010/main" val="2805820393"/>
       </p:ext>
     </p:extLst>
   </p:cSld>
@@ -12154,7 +12359,6 @@
           </a:bodyPr>
           <a:lstStyle/>
           <a:p>
-            <a:pPr rtl="0" eaLnBrk="1" latinLnBrk="0" hangingPunct="1"/>
             <a:r>
               <a:rPr lang="en-US" sz="3600" b="0" i="0" kern="1200" baseline="0" dirty="0">
                 <a:solidFill>
@@ -12168,11 +12372,9 @@
                 <a:ea typeface="+mj-ea"/>
                 <a:cs typeface="+mj-cs"/>
               </a:rPr>
-              <a:t>Learnings &amp; Growths</a:t>
-            </a:r>
-            <a:endParaRPr lang="en-US" sz="4400" dirty="0">
-              <a:effectLst/>
-            </a:endParaRPr>
+              <a:t>Deliverable &amp; Results (2)</a:t>
+            </a:r>
+            <a:endParaRPr lang="en-US" sz="2800" dirty="0"/>
           </a:p>
         </p:txBody>
       </p:sp>
@@ -12209,7 +12411,7 @@
     </p:spTree>
     <p:extLst>
       <p:ext uri="{BB962C8B-B14F-4D97-AF65-F5344CB8AC3E}">
-        <p14:creationId xmlns:p14="http://schemas.microsoft.com/office/powerpoint/2010/main" val="3042754836"/>
+        <p14:creationId xmlns:p14="http://schemas.microsoft.com/office/powerpoint/2010/main" val="821675052"/>
       </p:ext>
     </p:extLst>
   </p:cSld>
@@ -12273,7 +12475,7 @@
                 <a:ea typeface="+mj-ea"/>
                 <a:cs typeface="+mj-cs"/>
               </a:rPr>
-              <a:t>Outcomes</a:t>
+              <a:t>Learnings &amp; Growths</a:t>
             </a:r>
             <a:endParaRPr lang="en-US" sz="4400" dirty="0">
               <a:effectLst/>
@@ -12314,7 +12516,7 @@
     </p:spTree>
     <p:extLst>
       <p:ext uri="{BB962C8B-B14F-4D97-AF65-F5344CB8AC3E}">
-        <p14:creationId xmlns:p14="http://schemas.microsoft.com/office/powerpoint/2010/main" val="2229688103"/>
+        <p14:creationId xmlns:p14="http://schemas.microsoft.com/office/powerpoint/2010/main" val="3042754836"/>
       </p:ext>
     </p:extLst>
   </p:cSld>
@@ -12378,7 +12580,7 @@
                 <a:ea typeface="+mj-ea"/>
                 <a:cs typeface="+mj-cs"/>
               </a:rPr>
-              <a:t>Procedure</a:t>
+              <a:t>Outcomes</a:t>
             </a:r>
             <a:endParaRPr lang="en-US" sz="4400" dirty="0">
               <a:effectLst/>
@@ -12419,7 +12621,7 @@
     </p:spTree>
     <p:extLst>
       <p:ext uri="{BB962C8B-B14F-4D97-AF65-F5344CB8AC3E}">
-        <p14:creationId xmlns:p14="http://schemas.microsoft.com/office/powerpoint/2010/main" val="3600086102"/>
+        <p14:creationId xmlns:p14="http://schemas.microsoft.com/office/powerpoint/2010/main" val="2229688103"/>
       </p:ext>
     </p:extLst>
   </p:cSld>
@@ -12483,7 +12685,7 @@
                 <a:ea typeface="+mj-ea"/>
                 <a:cs typeface="+mj-cs"/>
               </a:rPr>
-              <a:t>Pivotal Value Statement </a:t>
+              <a:t>Procedure</a:t>
             </a:r>
             <a:endParaRPr lang="en-US" sz="4400" dirty="0">
               <a:effectLst/>
@@ -12524,7 +12726,7 @@
     </p:spTree>
     <p:extLst>
       <p:ext uri="{BB962C8B-B14F-4D97-AF65-F5344CB8AC3E}">
-        <p14:creationId xmlns:p14="http://schemas.microsoft.com/office/powerpoint/2010/main" val="3071141420"/>
+        <p14:creationId xmlns:p14="http://schemas.microsoft.com/office/powerpoint/2010/main" val="3600086102"/>
       </p:ext>
     </p:extLst>
   </p:cSld>
@@ -12574,25 +12776,9 @@
           </a:bodyPr>
           <a:lstStyle/>
           <a:p>
-            <a:pPr marL="0" marR="0" lvl="0" indent="0" algn="l" defTabSz="457200" rtl="0" eaLnBrk="1" fontAlgn="auto" latinLnBrk="0" hangingPunct="1">
-              <a:lnSpc>
-                <a:spcPct val="100000"/>
-              </a:lnSpc>
-              <a:spcBef>
-                <a:spcPct val="0"/>
-              </a:spcBef>
-              <a:spcAft>
-                <a:spcPts val="0"/>
-              </a:spcAft>
-              <a:buClrTx/>
-              <a:buSzTx/>
-              <a:buFontTx/>
-              <a:buNone/>
-              <a:tabLst/>
-              <a:defRPr/>
-            </a:pPr>
-            <a:r>
-              <a:rPr lang="en-US" sz="3600" kern="1200" dirty="0">
+            <a:pPr rtl="0" eaLnBrk="1" latinLnBrk="0" hangingPunct="1"/>
+            <a:r>
+              <a:rPr lang="en-US" sz="3600" b="0" i="0" kern="1200" baseline="0" dirty="0">
                 <a:solidFill>
                   <a:schemeClr val="tx1">
                     <a:lumMod val="85000"/>
@@ -12604,9 +12790,9 @@
                 <a:ea typeface="+mj-ea"/>
                 <a:cs typeface="+mj-cs"/>
               </a:rPr>
-              <a:t>_Notes_</a:t>
-            </a:r>
-            <a:endParaRPr lang="en-US" dirty="0">
+              <a:t>Pivotal Value Statement </a:t>
+            </a:r>
+            <a:endParaRPr lang="en-US" sz="4400" dirty="0">
               <a:effectLst/>
             </a:endParaRPr>
           </a:p>
@@ -12638,16 +12824,6 @@
           <a:bodyPr/>
           <a:lstStyle/>
           <a:p>
-            <a:r>
-              <a:rPr lang="en-US" dirty="0"/>
-              <a:t>[1] </a:t>
-            </a:r>
-            <a:r>
-              <a:rPr lang="en-US" dirty="0">
-                <a:hlinkClick r:id="rId3"/>
-              </a:rPr>
-              <a:t>Feather - A complete line of development boards from Adafruit that are both standalone and stackable</a:t>
-            </a:r>
             <a:endParaRPr lang="en-US" dirty="0"/>
           </a:p>
         </p:txBody>
@@ -12655,7 +12831,7 @@
     </p:spTree>
     <p:extLst>
       <p:ext uri="{BB962C8B-B14F-4D97-AF65-F5344CB8AC3E}">
-        <p14:creationId xmlns:p14="http://schemas.microsoft.com/office/powerpoint/2010/main" val="3976643547"/>
+        <p14:creationId xmlns:p14="http://schemas.microsoft.com/office/powerpoint/2010/main" val="3071141420"/>
       </p:ext>
     </p:extLst>
   </p:cSld>
@@ -12759,6 +12935,12 @@
             </a:r>
           </a:p>
           <a:p>
+            <a:pPr marL="457200" lvl="1" indent="0">
+              <a:buNone/>
+            </a:pPr>
+            <a:endParaRPr lang="en-US" dirty="0"/>
+          </a:p>
+          <a:p>
             <a:r>
               <a:rPr lang="en-US" dirty="0"/>
               <a:t>Stabilization &amp; path forward</a:t>
@@ -12784,6 +12966,12 @@
               <a:rPr lang="en-US" dirty="0"/>
               <a:t>Feature Integration &amp; Design Simplification</a:t>
             </a:r>
+          </a:p>
+          <a:p>
+            <a:pPr marL="457200" lvl="1" indent="0">
+              <a:buNone/>
+            </a:pPr>
+            <a:endParaRPr lang="en-US" dirty="0"/>
           </a:p>
           <a:p>
             <a:r>
@@ -12811,6 +12999,137 @@
     <p:extLst>
       <p:ext uri="{BB962C8B-B14F-4D97-AF65-F5344CB8AC3E}">
         <p14:creationId xmlns:p14="http://schemas.microsoft.com/office/powerpoint/2010/main" val="536683639"/>
+      </p:ext>
+    </p:extLst>
+  </p:cSld>
+  <p:clrMapOvr>
+    <a:masterClrMapping/>
+  </p:clrMapOvr>
+</p:sld>
+</file>
+
+<file path=ppt/slides/slide20.xml><?xml version="1.0" encoding="utf-8"?>
+<p:sld xmlns:a="http://schemas.openxmlformats.org/drawingml/2006/main" xmlns:r="http://schemas.openxmlformats.org/officeDocument/2006/relationships" xmlns:p="http://schemas.openxmlformats.org/presentationml/2006/main">
+  <p:cSld>
+    <p:spTree>
+      <p:nvGrpSpPr>
+        <p:cNvPr id="1" name=""/>
+        <p:cNvGrpSpPr/>
+        <p:nvPr/>
+      </p:nvGrpSpPr>
+      <p:grpSpPr>
+        <a:xfrm>
+          <a:off x="0" y="0"/>
+          <a:ext cx="0" cy="0"/>
+          <a:chOff x="0" y="0"/>
+          <a:chExt cx="0" cy="0"/>
+        </a:xfrm>
+      </p:grpSpPr>
+      <p:sp>
+        <p:nvSpPr>
+          <p:cNvPr id="2" name="Title 1">
+            <a:extLst>
+              <a:ext uri="{FF2B5EF4-FFF2-40B4-BE49-F238E27FC236}">
+                <a16:creationId xmlns:a16="http://schemas.microsoft.com/office/drawing/2014/main" id="{9C5E42EE-EA5D-4203-B1EC-B96B68D2A8EA}"/>
+              </a:ext>
+            </a:extLst>
+          </p:cNvPr>
+          <p:cNvSpPr>
+            <a:spLocks noGrp="1"/>
+          </p:cNvSpPr>
+          <p:nvPr>
+            <p:ph type="title"/>
+          </p:nvPr>
+        </p:nvSpPr>
+        <p:spPr/>
+        <p:txBody>
+          <a:bodyPr>
+            <a:normAutofit/>
+          </a:bodyPr>
+          <a:lstStyle/>
+          <a:p>
+            <a:pPr marL="0" marR="0" lvl="0" indent="0" algn="l" defTabSz="457200" rtl="0" eaLnBrk="1" fontAlgn="auto" latinLnBrk="0" hangingPunct="1">
+              <a:lnSpc>
+                <a:spcPct val="100000"/>
+              </a:lnSpc>
+              <a:spcBef>
+                <a:spcPct val="0"/>
+              </a:spcBef>
+              <a:spcAft>
+                <a:spcPts val="0"/>
+              </a:spcAft>
+              <a:buClrTx/>
+              <a:buSzTx/>
+              <a:buFontTx/>
+              <a:buNone/>
+              <a:tabLst/>
+              <a:defRPr/>
+            </a:pPr>
+            <a:r>
+              <a:rPr lang="en-US" sz="3600" kern="1200" dirty="0">
+                <a:solidFill>
+                  <a:schemeClr val="tx1">
+                    <a:lumMod val="85000"/>
+                    <a:lumOff val="15000"/>
+                  </a:schemeClr>
+                </a:solidFill>
+                <a:effectLst/>
+                <a:latin typeface="+mj-lt"/>
+                <a:ea typeface="+mj-ea"/>
+                <a:cs typeface="+mj-cs"/>
+              </a:rPr>
+              <a:t>_Notes_</a:t>
+            </a:r>
+            <a:endParaRPr lang="en-US" dirty="0">
+              <a:effectLst/>
+            </a:endParaRPr>
+          </a:p>
+        </p:txBody>
+      </p:sp>
+      <p:sp>
+        <p:nvSpPr>
+          <p:cNvPr id="3" name="Content Placeholder 2">
+            <a:extLst>
+              <a:ext uri="{FF2B5EF4-FFF2-40B4-BE49-F238E27FC236}">
+                <a16:creationId xmlns:a16="http://schemas.microsoft.com/office/drawing/2014/main" id="{044B4F6E-A639-47F4-91A5-68807265D618}"/>
+              </a:ext>
+            </a:extLst>
+          </p:cNvPr>
+          <p:cNvSpPr>
+            <a:spLocks noGrp="1"/>
+          </p:cNvSpPr>
+          <p:nvPr>
+            <p:ph idx="1"/>
+          </p:nvPr>
+        </p:nvSpPr>
+        <p:spPr>
+          <a:xfrm>
+            <a:off x="2589211" y="1451113"/>
+            <a:ext cx="9079327" cy="5068957"/>
+          </a:xfrm>
+        </p:spPr>
+        <p:txBody>
+          <a:bodyPr/>
+          <a:lstStyle/>
+          <a:p>
+            <a:r>
+              <a:rPr lang="en-US" dirty="0"/>
+              <a:t>[1] </a:t>
+            </a:r>
+            <a:r>
+              <a:rPr lang="en-US" dirty="0">
+                <a:hlinkClick r:id="rId3"/>
+              </a:rPr>
+              <a:t>Feather - A complete line of development boards from Adafruit that are both standalone and stackable</a:t>
+            </a:r>
+            <a:endParaRPr lang="en-US" dirty="0"/>
+          </a:p>
+        </p:txBody>
+      </p:sp>
+    </p:spTree>
+    <p:extLst>
+      <p:ext uri="{BB962C8B-B14F-4D97-AF65-F5344CB8AC3E}">
+        <p14:creationId xmlns:p14="http://schemas.microsoft.com/office/powerpoint/2010/main" val="3976643547"/>
       </p:ext>
     </p:extLst>
   </p:cSld>
@@ -13076,9 +13395,8 @@
           </a:bodyPr>
           <a:lstStyle/>
           <a:p>
-            <a:pPr rtl="0" eaLnBrk="1" latinLnBrk="0" hangingPunct="1"/>
-            <a:r>
-              <a:rPr lang="en-US" sz="3600" b="0" i="0" kern="1200" baseline="0" dirty="0">
+            <a:r>
+              <a:rPr lang="en-US" kern="1200" dirty="0">
                 <a:solidFill>
                   <a:schemeClr val="tx1">
                     <a:lumMod val="85000"/>
@@ -13090,11 +13408,9 @@
                 <a:ea typeface="+mj-ea"/>
                 <a:cs typeface="+mj-cs"/>
               </a:rPr>
-              <a:t>Design Procedure (2)</a:t>
-            </a:r>
-            <a:endParaRPr lang="en-US" sz="4400" dirty="0">
-              <a:effectLst/>
-            </a:endParaRPr>
+              <a:t>Work Performed</a:t>
+            </a:r>
+            <a:endParaRPr lang="en-US" dirty="0"/>
           </a:p>
         </p:txBody>
       </p:sp>
@@ -13124,6 +13440,86 @@
           <a:bodyPr/>
           <a:lstStyle/>
           <a:p>
+            <a:r>
+              <a:rPr lang="en-US" dirty="0"/>
+              <a:t>Path identification</a:t>
+            </a:r>
+          </a:p>
+          <a:p>
+            <a:pPr lvl="1"/>
+            <a:r>
+              <a:rPr lang="en-US" dirty="0"/>
+              <a:t>Bare-metal investigate</a:t>
+            </a:r>
+          </a:p>
+          <a:p>
+            <a:pPr lvl="1"/>
+            <a:r>
+              <a:rPr lang="en-US" dirty="0"/>
+              <a:t>Standardized design practices?</a:t>
+            </a:r>
+          </a:p>
+          <a:p>
+            <a:pPr marL="457200" lvl="1" indent="0">
+              <a:buNone/>
+            </a:pPr>
+            <a:endParaRPr lang="en-US" dirty="0"/>
+          </a:p>
+          <a:p>
+            <a:r>
+              <a:rPr lang="en-US" dirty="0"/>
+              <a:t>Design Standardization</a:t>
+            </a:r>
+          </a:p>
+          <a:p>
+            <a:pPr lvl="1"/>
+            <a:r>
+              <a:rPr lang="en-US" dirty="0"/>
+              <a:t>Revisioning (multiple repositories)</a:t>
+            </a:r>
+          </a:p>
+          <a:p>
+            <a:pPr lvl="1"/>
+            <a:r>
+              <a:rPr lang="en-US" dirty="0"/>
+              <a:t>Schematics (modularization, consistency)</a:t>
+            </a:r>
+          </a:p>
+          <a:p>
+            <a:pPr lvl="1"/>
+            <a:r>
+              <a:rPr lang="en-US" dirty="0"/>
+              <a:t>Board (features, design flexibility)</a:t>
+            </a:r>
+          </a:p>
+          <a:p>
+            <a:pPr marL="457200" lvl="1" indent="0">
+              <a:buNone/>
+            </a:pPr>
+            <a:endParaRPr lang="en-US" dirty="0"/>
+          </a:p>
+          <a:p>
+            <a:r>
+              <a:rPr lang="en-US" dirty="0"/>
+              <a:t>Secure a Path Forward</a:t>
+            </a:r>
+          </a:p>
+          <a:p>
+            <a:pPr lvl="1"/>
+            <a:r>
+              <a:rPr lang="en-US" dirty="0"/>
+              <a:t>Standardization &amp; Organization</a:t>
+            </a:r>
+          </a:p>
+          <a:p>
+            <a:pPr lvl="1"/>
+            <a:r>
+              <a:rPr lang="en-US" dirty="0"/>
+              <a:t>Clarity of Communications &amp; Media</a:t>
+            </a:r>
+          </a:p>
+          <a:p>
+            <a:pPr lvl="1"/>
             <a:endParaRPr lang="en-US" dirty="0"/>
           </a:p>
         </p:txBody>
@@ -13131,7 +13527,7 @@
     </p:spTree>
     <p:extLst>
       <p:ext uri="{BB962C8B-B14F-4D97-AF65-F5344CB8AC3E}">
-        <p14:creationId xmlns:p14="http://schemas.microsoft.com/office/powerpoint/2010/main" val="306193403"/>
+        <p14:creationId xmlns:p14="http://schemas.microsoft.com/office/powerpoint/2010/main" val="512168512"/>
       </p:ext>
     </p:extLst>
   </p:cSld>
@@ -13195,7 +13591,7 @@
                 <a:ea typeface="+mj-ea"/>
                 <a:cs typeface="+mj-cs"/>
               </a:rPr>
-              <a:t>Development Methodology (3)</a:t>
+              <a:t>Design Procedure (2)</a:t>
             </a:r>
             <a:endParaRPr lang="en-US" sz="4400" dirty="0">
               <a:effectLst/>
@@ -13236,7 +13632,7 @@
     </p:spTree>
     <p:extLst>
       <p:ext uri="{BB962C8B-B14F-4D97-AF65-F5344CB8AC3E}">
-        <p14:creationId xmlns:p14="http://schemas.microsoft.com/office/powerpoint/2010/main" val="1317707174"/>
+        <p14:creationId xmlns:p14="http://schemas.microsoft.com/office/powerpoint/2010/main" val="306193403"/>
       </p:ext>
     </p:extLst>
   </p:cSld>
@@ -13334,6 +13730,111 @@
           <a:bodyPr/>
           <a:lstStyle/>
           <a:p>
+            <a:endParaRPr lang="en-US" dirty="0"/>
+          </a:p>
+        </p:txBody>
+      </p:sp>
+    </p:spTree>
+    <p:extLst>
+      <p:ext uri="{BB962C8B-B14F-4D97-AF65-F5344CB8AC3E}">
+        <p14:creationId xmlns:p14="http://schemas.microsoft.com/office/powerpoint/2010/main" val="1317707174"/>
+      </p:ext>
+    </p:extLst>
+  </p:cSld>
+  <p:clrMapOvr>
+    <a:masterClrMapping/>
+  </p:clrMapOvr>
+</p:sld>
+</file>
+
+<file path=ppt/slides/slide7.xml><?xml version="1.0" encoding="utf-8"?>
+<p:sld xmlns:a="http://schemas.openxmlformats.org/drawingml/2006/main" xmlns:r="http://schemas.openxmlformats.org/officeDocument/2006/relationships" xmlns:p="http://schemas.openxmlformats.org/presentationml/2006/main">
+  <p:cSld>
+    <p:spTree>
+      <p:nvGrpSpPr>
+        <p:cNvPr id="1" name=""/>
+        <p:cNvGrpSpPr/>
+        <p:nvPr/>
+      </p:nvGrpSpPr>
+      <p:grpSpPr>
+        <a:xfrm>
+          <a:off x="0" y="0"/>
+          <a:ext cx="0" cy="0"/>
+          <a:chOff x="0" y="0"/>
+          <a:chExt cx="0" cy="0"/>
+        </a:xfrm>
+      </p:grpSpPr>
+      <p:sp>
+        <p:nvSpPr>
+          <p:cNvPr id="2" name="Title 1">
+            <a:extLst>
+              <a:ext uri="{FF2B5EF4-FFF2-40B4-BE49-F238E27FC236}">
+                <a16:creationId xmlns:a16="http://schemas.microsoft.com/office/drawing/2014/main" id="{9C5E42EE-EA5D-4203-B1EC-B96B68D2A8EA}"/>
+              </a:ext>
+            </a:extLst>
+          </p:cNvPr>
+          <p:cNvSpPr>
+            <a:spLocks noGrp="1"/>
+          </p:cNvSpPr>
+          <p:nvPr>
+            <p:ph type="title"/>
+          </p:nvPr>
+        </p:nvSpPr>
+        <p:spPr/>
+        <p:txBody>
+          <a:bodyPr>
+            <a:normAutofit/>
+          </a:bodyPr>
+          <a:lstStyle/>
+          <a:p>
+            <a:pPr rtl="0" eaLnBrk="1" latinLnBrk="0" hangingPunct="1"/>
+            <a:r>
+              <a:rPr lang="en-US" sz="3600" b="0" i="0" kern="1200" baseline="0" dirty="0">
+                <a:solidFill>
+                  <a:schemeClr val="tx1">
+                    <a:lumMod val="85000"/>
+                    <a:lumOff val="15000"/>
+                  </a:schemeClr>
+                </a:solidFill>
+                <a:effectLst/>
+                <a:latin typeface="+mj-lt"/>
+                <a:ea typeface="+mj-ea"/>
+                <a:cs typeface="+mj-cs"/>
+              </a:rPr>
+              <a:t>Development Methodology (3)</a:t>
+            </a:r>
+            <a:endParaRPr lang="en-US" sz="4400" dirty="0">
+              <a:effectLst/>
+            </a:endParaRPr>
+          </a:p>
+        </p:txBody>
+      </p:sp>
+      <p:sp>
+        <p:nvSpPr>
+          <p:cNvPr id="3" name="Content Placeholder 2">
+            <a:extLst>
+              <a:ext uri="{FF2B5EF4-FFF2-40B4-BE49-F238E27FC236}">
+                <a16:creationId xmlns:a16="http://schemas.microsoft.com/office/drawing/2014/main" id="{044B4F6E-A639-47F4-91A5-68807265D618}"/>
+              </a:ext>
+            </a:extLst>
+          </p:cNvPr>
+          <p:cNvSpPr>
+            <a:spLocks noGrp="1"/>
+          </p:cNvSpPr>
+          <p:nvPr>
+            <p:ph idx="1"/>
+          </p:nvPr>
+        </p:nvSpPr>
+        <p:spPr>
+          <a:xfrm>
+            <a:off x="2589211" y="1451113"/>
+            <a:ext cx="9079327" cy="5068957"/>
+          </a:xfrm>
+        </p:spPr>
+        <p:txBody>
+          <a:bodyPr/>
+          <a:lstStyle/>
+          <a:p>
             <a:r>
               <a:rPr lang="en-US" dirty="0"/>
               <a:t>Revision Control</a:t>
@@ -13360,7 +13861,7 @@
 </p:sld>
 </file>
 
-<file path=ppt/slides/slide7.xml><?xml version="1.0" encoding="utf-8"?>
+<file path=ppt/slides/slide8.xml><?xml version="1.0" encoding="utf-8"?>
 <p:sld xmlns:a="http://schemas.openxmlformats.org/drawingml/2006/main" xmlns:r="http://schemas.openxmlformats.org/officeDocument/2006/relationships" xmlns:p="http://schemas.openxmlformats.org/presentationml/2006/main">
   <p:cSld>
     <p:spTree>
@@ -14767,7 +15268,7 @@
 </p:sld>
 </file>
 
-<file path=ppt/slides/slide8.xml><?xml version="1.0" encoding="utf-8"?>
+<file path=ppt/slides/slide9.xml><?xml version="1.0" encoding="utf-8"?>
 <p:sld xmlns:a="http://schemas.openxmlformats.org/drawingml/2006/main" xmlns:r="http://schemas.openxmlformats.org/officeDocument/2006/relationships" xmlns:p="http://schemas.openxmlformats.org/presentationml/2006/main">
   <p:cSld>
     <p:spTree>
@@ -14893,141 +15394,6 @@
     <p:extLst>
       <p:ext uri="{BB962C8B-B14F-4D97-AF65-F5344CB8AC3E}">
         <p14:creationId xmlns:p14="http://schemas.microsoft.com/office/powerpoint/2010/main" val="2956004668"/>
-      </p:ext>
-    </p:extLst>
-  </p:cSld>
-  <p:clrMapOvr>
-    <a:masterClrMapping/>
-  </p:clrMapOvr>
-</p:sld>
-</file>
-
-<file path=ppt/slides/slide9.xml><?xml version="1.0" encoding="utf-8"?>
-<p:sld xmlns:a="http://schemas.openxmlformats.org/drawingml/2006/main" xmlns:r="http://schemas.openxmlformats.org/officeDocument/2006/relationships" xmlns:p="http://schemas.openxmlformats.org/presentationml/2006/main">
-  <p:cSld>
-    <p:spTree>
-      <p:nvGrpSpPr>
-        <p:cNvPr id="1" name=""/>
-        <p:cNvGrpSpPr/>
-        <p:nvPr/>
-      </p:nvGrpSpPr>
-      <p:grpSpPr>
-        <a:xfrm>
-          <a:off x="0" y="0"/>
-          <a:ext cx="0" cy="0"/>
-          <a:chOff x="0" y="0"/>
-          <a:chExt cx="0" cy="0"/>
-        </a:xfrm>
-      </p:grpSpPr>
-      <p:sp>
-        <p:nvSpPr>
-          <p:cNvPr id="2" name="Title 1">
-            <a:extLst>
-              <a:ext uri="{FF2B5EF4-FFF2-40B4-BE49-F238E27FC236}">
-                <a16:creationId xmlns:a16="http://schemas.microsoft.com/office/drawing/2014/main" id="{9C5E42EE-EA5D-4203-B1EC-B96B68D2A8EA}"/>
-              </a:ext>
-            </a:extLst>
-          </p:cNvPr>
-          <p:cNvSpPr>
-            <a:spLocks noGrp="1"/>
-          </p:cNvSpPr>
-          <p:nvPr>
-            <p:ph type="title"/>
-          </p:nvPr>
-        </p:nvSpPr>
-        <p:spPr/>
-        <p:txBody>
-          <a:bodyPr>
-            <a:normAutofit/>
-          </a:bodyPr>
-          <a:lstStyle/>
-          <a:p>
-            <a:pPr rtl="0" eaLnBrk="1" latinLnBrk="0" hangingPunct="1"/>
-            <a:r>
-              <a:rPr lang="en-US" sz="3600" b="0" i="0" kern="1200" baseline="0" dirty="0">
-                <a:solidFill>
-                  <a:schemeClr val="tx1">
-                    <a:lumMod val="85000"/>
-                    <a:lumOff val="15000"/>
-                  </a:schemeClr>
-                </a:solidFill>
-                <a:effectLst/>
-                <a:latin typeface="+mj-lt"/>
-                <a:ea typeface="+mj-ea"/>
-                <a:cs typeface="+mj-cs"/>
-              </a:rPr>
-              <a:t>DTECTS Library</a:t>
-            </a:r>
-            <a:endParaRPr lang="en-US" sz="4400" dirty="0">
-              <a:effectLst/>
-            </a:endParaRPr>
-          </a:p>
-        </p:txBody>
-      </p:sp>
-      <p:pic>
-        <p:nvPicPr>
-          <p:cNvPr id="7" name="Picture 6">
-            <a:extLst>
-              <a:ext uri="{FF2B5EF4-FFF2-40B4-BE49-F238E27FC236}">
-                <a16:creationId xmlns:a16="http://schemas.microsoft.com/office/drawing/2014/main" id="{D939D839-2D14-4EEF-B198-53A77C1F0AB3}"/>
-              </a:ext>
-            </a:extLst>
-          </p:cNvPr>
-          <p:cNvPicPr>
-            <a:picLocks noChangeAspect="1"/>
-          </p:cNvPicPr>
-          <p:nvPr/>
-        </p:nvPicPr>
-        <p:blipFill>
-          <a:blip r:embed="rId3"/>
-          <a:stretch>
-            <a:fillRect/>
-          </a:stretch>
-        </p:blipFill>
-        <p:spPr>
-          <a:xfrm>
-            <a:off x="2769323" y="1518368"/>
-            <a:ext cx="6361613" cy="4477897"/>
-          </a:xfrm>
-          <a:prstGeom prst="rect">
-            <a:avLst/>
-          </a:prstGeom>
-        </p:spPr>
-      </p:pic>
-      <p:pic>
-        <p:nvPicPr>
-          <p:cNvPr id="4" name="Picture 3">
-            <a:extLst>
-              <a:ext uri="{FF2B5EF4-FFF2-40B4-BE49-F238E27FC236}">
-                <a16:creationId xmlns:a16="http://schemas.microsoft.com/office/drawing/2014/main" id="{DD99FE0C-189B-460A-A9AC-9D01098A1696}"/>
-              </a:ext>
-            </a:extLst>
-          </p:cNvPr>
-          <p:cNvPicPr>
-            <a:picLocks noChangeAspect="1"/>
-          </p:cNvPicPr>
-          <p:nvPr/>
-        </p:nvPicPr>
-        <p:blipFill>
-          <a:blip r:embed="rId4"/>
-          <a:stretch>
-            <a:fillRect/>
-          </a:stretch>
-        </p:blipFill>
-        <p:spPr>
-          <a:xfrm>
-            <a:off x="2069123" y="1518368"/>
-            <a:ext cx="7954268" cy="4477897"/>
-          </a:xfrm>
-          <a:prstGeom prst="rect">
-            <a:avLst/>
-          </a:prstGeom>
-        </p:spPr>
-      </p:pic>
-    </p:spTree>
-    <p:extLst>
-      <p:ext uri="{BB962C8B-B14F-4D97-AF65-F5344CB8AC3E}">
-        <p14:creationId xmlns:p14="http://schemas.microsoft.com/office/powerpoint/2010/main" val="3340878372"/>
       </p:ext>
     </p:extLst>
   </p:cSld>

</xml_diff>

<commit_message>
(+)    add final board pics, features added slide
</commit_message>
<xml_diff>
--- a/Suppl/Pivotal Presentation - DTECTS.pptx
+++ b/Suppl/Pivotal Presentation - DTECTS.pptx
@@ -2206,6 +2206,52 @@
         <p:txBody>
           <a:bodyPr/>
           <a:lstStyle/>
+          <a:p>
+            <a:r>
+              <a:rPr lang="en-US" sz="1200" b="0" i="0" u="none" strike="noStrike" kern="1200" baseline="0" dirty="0">
+                <a:solidFill>
+                  <a:schemeClr val="tx1"/>
+                </a:solidFill>
+                <a:latin typeface="+mn-lt"/>
+                <a:ea typeface="+mn-ea"/>
+                <a:cs typeface="+mn-cs"/>
+              </a:rPr>
+              <a:t>“When inventor meets IOT”</a:t>
+            </a:r>
+          </a:p>
+          <a:p>
+            <a:endParaRPr lang="en-US" sz="1200" b="0" i="0" u="none" strike="noStrike" kern="1200" baseline="0" dirty="0">
+              <a:solidFill>
+                <a:schemeClr val="tx1"/>
+              </a:solidFill>
+              <a:latin typeface="+mn-lt"/>
+              <a:ea typeface="+mn-ea"/>
+              <a:cs typeface="+mn-cs"/>
+            </a:endParaRPr>
+          </a:p>
+          <a:p>
+            <a:r>
+              <a:rPr lang="en-US" sz="1200" b="0" i="0" u="none" strike="noStrike" kern="1200" baseline="0" dirty="0">
+                <a:solidFill>
+                  <a:schemeClr val="tx1"/>
+                </a:solidFill>
+                <a:latin typeface="+mn-lt"/>
+                <a:ea typeface="+mn-ea"/>
+                <a:cs typeface="+mn-cs"/>
+              </a:rPr>
+              <a:t>//…</a:t>
+            </a:r>
+          </a:p>
+          <a:p>
+            <a:endParaRPr lang="en-US" sz="1200" b="0" i="0" u="none" strike="noStrike" kern="1200" baseline="0" dirty="0">
+              <a:solidFill>
+                <a:schemeClr val="tx1"/>
+              </a:solidFill>
+              <a:latin typeface="+mn-lt"/>
+              <a:ea typeface="+mn-ea"/>
+              <a:cs typeface="+mn-cs"/>
+            </a:endParaRPr>
+          </a:p>
           <a:p>
             <a:r>
               <a:rPr lang="en-US" sz="1200" b="0" i="0" u="none" strike="noStrike" kern="1200" baseline="0" dirty="0">
@@ -17156,13 +17202,487 @@
             <a:pPr lvl="1"/>
             <a:r>
               <a:rPr lang="en-US" dirty="0"/>
+              <a:t>Jumpers</a:t>
+            </a:r>
+          </a:p>
+          <a:p>
+            <a:pPr lvl="1"/>
+            <a:r>
+              <a:rPr lang="en-US" dirty="0"/>
+              <a:t>Serial Port</a:t>
+            </a:r>
+          </a:p>
+          <a:p>
+            <a:pPr lvl="1"/>
+            <a:r>
+              <a:rPr lang="en-US" dirty="0"/>
               <a:t>JTAG Port</a:t>
             </a:r>
           </a:p>
           <a:p>
+            <a:pPr marL="457200" lvl="1" indent="0">
+              <a:buNone/>
+            </a:pPr>
+            <a:endParaRPr lang="en-US" dirty="0"/>
+          </a:p>
+          <a:p>
+            <a:r>
+              <a:rPr lang="en-US" dirty="0"/>
+              <a:t>Project</a:t>
+            </a:r>
+          </a:p>
+          <a:p>
             <a:pPr lvl="1"/>
             <a:r>
               <a:rPr lang="en-US" dirty="0"/>
+              <a:t>Organized Schematics</a:t>
+            </a:r>
+          </a:p>
+          <a:p>
+            <a:pPr lvl="1"/>
+            <a:r>
+              <a:rPr lang="en-US" dirty="0"/>
+              <a:t>Unified Library</a:t>
+            </a:r>
+          </a:p>
+          <a:p>
+            <a:pPr lvl="1"/>
+            <a:r>
+              <a:rPr lang="en-US" dirty="0"/>
+              <a:t>Board Modularization</a:t>
+            </a:r>
+          </a:p>
+        </p:txBody>
+      </p:sp>
+      <p:sp>
+        <p:nvSpPr>
+          <p:cNvPr id="6" name="Rectangle: Rounded Corners 5">
+            <a:extLst>
+              <a:ext uri="{FF2B5EF4-FFF2-40B4-BE49-F238E27FC236}">
+                <a16:creationId xmlns:a16="http://schemas.microsoft.com/office/drawing/2014/main" id="{8844B131-81B1-4E4E-8E3B-F6E7360D48EA}"/>
+              </a:ext>
+            </a:extLst>
+          </p:cNvPr>
+          <p:cNvSpPr/>
+          <p:nvPr/>
+        </p:nvSpPr>
+        <p:spPr>
+          <a:xfrm>
+            <a:off x="7590730" y="1451113"/>
+            <a:ext cx="2773181" cy="3203333"/>
+          </a:xfrm>
+          <a:prstGeom prst="roundRect">
+            <a:avLst/>
+          </a:prstGeom>
+          <a:blipFill dpi="0" rotWithShape="1">
+            <a:blip r:embed="rId3">
+              <a:extLst>
+                <a:ext uri="{28A0092B-C50C-407E-A947-70E740481C1C}">
+                  <a14:useLocalDpi xmlns:a14="http://schemas.microsoft.com/office/drawing/2010/main" val="0"/>
+                </a:ext>
+              </a:extLst>
+            </a:blip>
+            <a:srcRect/>
+            <a:stretch>
+              <a:fillRect t="-10258" r="-16667" b="-36280"/>
+            </a:stretch>
+          </a:blipFill>
+        </p:spPr>
+        <p:style>
+          <a:lnRef idx="2">
+            <a:schemeClr val="accent1">
+              <a:shade val="50000"/>
+            </a:schemeClr>
+          </a:lnRef>
+          <a:fillRef idx="1">
+            <a:schemeClr val="accent1"/>
+          </a:fillRef>
+          <a:effectRef idx="0">
+            <a:schemeClr val="accent1"/>
+          </a:effectRef>
+          <a:fontRef idx="minor">
+            <a:schemeClr val="lt1"/>
+          </a:fontRef>
+        </p:style>
+        <p:txBody>
+          <a:bodyPr rtlCol="0" anchor="ctr"/>
+          <a:lstStyle/>
+          <a:p>
+            <a:pPr algn="ctr"/>
+            <a:endParaRPr lang="en-US"/>
+          </a:p>
+        </p:txBody>
+      </p:sp>
+      <p:sp>
+        <p:nvSpPr>
+          <p:cNvPr id="7" name="Oval 6">
+            <a:extLst>
+              <a:ext uri="{FF2B5EF4-FFF2-40B4-BE49-F238E27FC236}">
+                <a16:creationId xmlns:a16="http://schemas.microsoft.com/office/drawing/2014/main" id="{63947CB2-726B-40E0-B489-C19B42E6FDCE}"/>
+              </a:ext>
+            </a:extLst>
+          </p:cNvPr>
+          <p:cNvSpPr/>
+          <p:nvPr/>
+        </p:nvSpPr>
+        <p:spPr>
+          <a:xfrm rot="19586404">
+            <a:off x="6798316" y="3201474"/>
+            <a:ext cx="2864405" cy="721360"/>
+          </a:xfrm>
+          <a:prstGeom prst="ellipse">
+            <a:avLst/>
+          </a:prstGeom>
+          <a:noFill/>
+          <a:ln w="28575">
+            <a:solidFill>
+              <a:schemeClr val="accent6">
+                <a:lumMod val="75000"/>
+              </a:schemeClr>
+            </a:solidFill>
+          </a:ln>
+        </p:spPr>
+        <p:style>
+          <a:lnRef idx="2">
+            <a:schemeClr val="accent1">
+              <a:shade val="50000"/>
+            </a:schemeClr>
+          </a:lnRef>
+          <a:fillRef idx="1">
+            <a:schemeClr val="accent1"/>
+          </a:fillRef>
+          <a:effectRef idx="0">
+            <a:schemeClr val="accent1"/>
+          </a:effectRef>
+          <a:fontRef idx="minor">
+            <a:schemeClr val="lt1"/>
+          </a:fontRef>
+        </p:style>
+        <p:txBody>
+          <a:bodyPr rtlCol="0" anchor="ctr"/>
+          <a:lstStyle/>
+          <a:p>
+            <a:pPr algn="ctr"/>
+            <a:endParaRPr lang="en-US"/>
+          </a:p>
+        </p:txBody>
+      </p:sp>
+      <p:sp>
+        <p:nvSpPr>
+          <p:cNvPr id="8" name="Oval 7">
+            <a:extLst>
+              <a:ext uri="{FF2B5EF4-FFF2-40B4-BE49-F238E27FC236}">
+                <a16:creationId xmlns:a16="http://schemas.microsoft.com/office/drawing/2014/main" id="{E4CF3A24-E010-42DC-B0A8-C0466906FFC7}"/>
+              </a:ext>
+            </a:extLst>
+          </p:cNvPr>
+          <p:cNvSpPr/>
+          <p:nvPr/>
+        </p:nvSpPr>
+        <p:spPr>
+          <a:xfrm>
+            <a:off x="8710870" y="1543591"/>
+            <a:ext cx="1764090" cy="1280890"/>
+          </a:xfrm>
+          <a:prstGeom prst="ellipse">
+            <a:avLst/>
+          </a:prstGeom>
+          <a:noFill/>
+          <a:ln w="28575">
+            <a:solidFill>
+              <a:schemeClr val="accent6">
+                <a:lumMod val="75000"/>
+              </a:schemeClr>
+            </a:solidFill>
+          </a:ln>
+        </p:spPr>
+        <p:style>
+          <a:lnRef idx="2">
+            <a:schemeClr val="accent1">
+              <a:shade val="50000"/>
+            </a:schemeClr>
+          </a:lnRef>
+          <a:fillRef idx="1">
+            <a:schemeClr val="accent1"/>
+          </a:fillRef>
+          <a:effectRef idx="0">
+            <a:schemeClr val="accent1"/>
+          </a:effectRef>
+          <a:fontRef idx="minor">
+            <a:schemeClr val="lt1"/>
+          </a:fontRef>
+        </p:style>
+        <p:txBody>
+          <a:bodyPr rtlCol="0" anchor="ctr"/>
+          <a:lstStyle/>
+          <a:p>
+            <a:pPr algn="ctr"/>
+            <a:endParaRPr lang="en-US"/>
+          </a:p>
+        </p:txBody>
+      </p:sp>
+      <p:sp>
+        <p:nvSpPr>
+          <p:cNvPr id="9" name="Content Placeholder 2">
+            <a:extLst>
+              <a:ext uri="{FF2B5EF4-FFF2-40B4-BE49-F238E27FC236}">
+                <a16:creationId xmlns:a16="http://schemas.microsoft.com/office/drawing/2014/main" id="{76B6953B-3A45-4F86-B849-F73505B9D537}"/>
+              </a:ext>
+            </a:extLst>
+          </p:cNvPr>
+          <p:cNvSpPr txBox="1">
+            <a:spLocks/>
+          </p:cNvSpPr>
+          <p:nvPr/>
+        </p:nvSpPr>
+        <p:spPr>
+          <a:xfrm>
+            <a:off x="2589211" y="1451113"/>
+            <a:ext cx="9079327" cy="5068957"/>
+          </a:xfrm>
+          <a:prstGeom prst="rect">
+            <a:avLst/>
+          </a:prstGeom>
+        </p:spPr>
+        <p:txBody>
+          <a:bodyPr vert="horz" lIns="91440" tIns="45720" rIns="91440" bIns="45720" rtlCol="0">
+            <a:normAutofit/>
+          </a:bodyPr>
+          <a:lstStyle>
+            <a:lvl1pPr marL="342900" indent="-342900" algn="l" defTabSz="457200" rtl="0" eaLnBrk="1" latinLnBrk="0" hangingPunct="1">
+              <a:spcBef>
+                <a:spcPts val="1000"/>
+              </a:spcBef>
+              <a:spcAft>
+                <a:spcPts val="0"/>
+              </a:spcAft>
+              <a:buClr>
+                <a:schemeClr val="accent1"/>
+              </a:buClr>
+              <a:buFont typeface="Wingdings 3" charset="2"/>
+              <a:buChar char=""/>
+              <a:defRPr sz="1800" kern="1200">
+                <a:solidFill>
+                  <a:schemeClr val="tx1">
+                    <a:lumMod val="75000"/>
+                    <a:lumOff val="25000"/>
+                  </a:schemeClr>
+                </a:solidFill>
+                <a:latin typeface="+mn-lt"/>
+                <a:ea typeface="+mn-ea"/>
+                <a:cs typeface="+mn-cs"/>
+              </a:defRPr>
+            </a:lvl1pPr>
+            <a:lvl2pPr marL="742950" indent="-285750" algn="l" defTabSz="457200" rtl="0" eaLnBrk="1" latinLnBrk="0" hangingPunct="1">
+              <a:spcBef>
+                <a:spcPts val="1000"/>
+              </a:spcBef>
+              <a:spcAft>
+                <a:spcPts val="0"/>
+              </a:spcAft>
+              <a:buClr>
+                <a:schemeClr val="accent1"/>
+              </a:buClr>
+              <a:buFont typeface="Wingdings 3" charset="2"/>
+              <a:buChar char=""/>
+              <a:defRPr sz="1600" kern="1200">
+                <a:solidFill>
+                  <a:schemeClr val="tx1">
+                    <a:lumMod val="75000"/>
+                    <a:lumOff val="25000"/>
+                  </a:schemeClr>
+                </a:solidFill>
+                <a:latin typeface="+mn-lt"/>
+                <a:ea typeface="+mn-ea"/>
+                <a:cs typeface="+mn-cs"/>
+              </a:defRPr>
+            </a:lvl2pPr>
+            <a:lvl3pPr marL="1143000" indent="-228600" algn="l" defTabSz="457200" rtl="0" eaLnBrk="1" latinLnBrk="0" hangingPunct="1">
+              <a:spcBef>
+                <a:spcPts val="1000"/>
+              </a:spcBef>
+              <a:spcAft>
+                <a:spcPts val="0"/>
+              </a:spcAft>
+              <a:buClr>
+                <a:schemeClr val="accent1"/>
+              </a:buClr>
+              <a:buFont typeface="Wingdings 3" charset="2"/>
+              <a:buChar char=""/>
+              <a:defRPr sz="1400" kern="1200">
+                <a:solidFill>
+                  <a:schemeClr val="tx1">
+                    <a:lumMod val="75000"/>
+                    <a:lumOff val="25000"/>
+                  </a:schemeClr>
+                </a:solidFill>
+                <a:latin typeface="+mn-lt"/>
+                <a:ea typeface="+mn-ea"/>
+                <a:cs typeface="+mn-cs"/>
+              </a:defRPr>
+            </a:lvl3pPr>
+            <a:lvl4pPr marL="1600200" indent="-228600" algn="l" defTabSz="457200" rtl="0" eaLnBrk="1" latinLnBrk="0" hangingPunct="1">
+              <a:spcBef>
+                <a:spcPts val="1000"/>
+              </a:spcBef>
+              <a:spcAft>
+                <a:spcPts val="0"/>
+              </a:spcAft>
+              <a:buClr>
+                <a:schemeClr val="accent1"/>
+              </a:buClr>
+              <a:buFont typeface="Wingdings 3" charset="2"/>
+              <a:buChar char=""/>
+              <a:defRPr sz="1200" kern="1200">
+                <a:solidFill>
+                  <a:schemeClr val="tx1">
+                    <a:lumMod val="75000"/>
+                    <a:lumOff val="25000"/>
+                  </a:schemeClr>
+                </a:solidFill>
+                <a:latin typeface="+mn-lt"/>
+                <a:ea typeface="+mn-ea"/>
+                <a:cs typeface="+mn-cs"/>
+              </a:defRPr>
+            </a:lvl4pPr>
+            <a:lvl5pPr marL="2057400" indent="-228600" algn="l" defTabSz="457200" rtl="0" eaLnBrk="1" latinLnBrk="0" hangingPunct="1">
+              <a:spcBef>
+                <a:spcPts val="1000"/>
+              </a:spcBef>
+              <a:spcAft>
+                <a:spcPts val="0"/>
+              </a:spcAft>
+              <a:buClr>
+                <a:schemeClr val="accent1"/>
+              </a:buClr>
+              <a:buFont typeface="Wingdings 3" charset="2"/>
+              <a:buChar char=""/>
+              <a:defRPr sz="1200" kern="1200">
+                <a:solidFill>
+                  <a:schemeClr val="tx1">
+                    <a:lumMod val="75000"/>
+                    <a:lumOff val="25000"/>
+                  </a:schemeClr>
+                </a:solidFill>
+                <a:latin typeface="+mn-lt"/>
+                <a:ea typeface="+mn-ea"/>
+                <a:cs typeface="+mn-cs"/>
+              </a:defRPr>
+            </a:lvl5pPr>
+            <a:lvl6pPr marL="2514600" indent="-228600" algn="l" defTabSz="457200" rtl="0" eaLnBrk="1" latinLnBrk="0" hangingPunct="1">
+              <a:spcBef>
+                <a:spcPts val="1000"/>
+              </a:spcBef>
+              <a:spcAft>
+                <a:spcPts val="0"/>
+              </a:spcAft>
+              <a:buClr>
+                <a:schemeClr val="accent1"/>
+              </a:buClr>
+              <a:buFont typeface="Wingdings 3" charset="2"/>
+              <a:buChar char=""/>
+              <a:defRPr sz="1200" kern="1200">
+                <a:solidFill>
+                  <a:schemeClr val="tx1">
+                    <a:lumMod val="75000"/>
+                    <a:lumOff val="25000"/>
+                  </a:schemeClr>
+                </a:solidFill>
+                <a:latin typeface="+mn-lt"/>
+                <a:ea typeface="+mn-ea"/>
+                <a:cs typeface="+mn-cs"/>
+              </a:defRPr>
+            </a:lvl6pPr>
+            <a:lvl7pPr marL="2971800" indent="-228600" algn="l" defTabSz="457200" rtl="0" eaLnBrk="1" latinLnBrk="0" hangingPunct="1">
+              <a:spcBef>
+                <a:spcPts val="1000"/>
+              </a:spcBef>
+              <a:spcAft>
+                <a:spcPts val="0"/>
+              </a:spcAft>
+              <a:buClr>
+                <a:schemeClr val="accent1"/>
+              </a:buClr>
+              <a:buFont typeface="Wingdings 3" charset="2"/>
+              <a:buChar char=""/>
+              <a:defRPr sz="1200" kern="1200">
+                <a:solidFill>
+                  <a:schemeClr val="tx1">
+                    <a:lumMod val="75000"/>
+                    <a:lumOff val="25000"/>
+                  </a:schemeClr>
+                </a:solidFill>
+                <a:latin typeface="+mn-lt"/>
+                <a:ea typeface="+mn-ea"/>
+                <a:cs typeface="+mn-cs"/>
+              </a:defRPr>
+            </a:lvl7pPr>
+            <a:lvl8pPr marL="3429000" indent="-228600" algn="l" defTabSz="457200" rtl="0" eaLnBrk="1" latinLnBrk="0" hangingPunct="1">
+              <a:spcBef>
+                <a:spcPts val="1000"/>
+              </a:spcBef>
+              <a:spcAft>
+                <a:spcPts val="0"/>
+              </a:spcAft>
+              <a:buClr>
+                <a:schemeClr val="accent1"/>
+              </a:buClr>
+              <a:buFont typeface="Wingdings 3" charset="2"/>
+              <a:buChar char=""/>
+              <a:defRPr sz="1200" kern="1200">
+                <a:solidFill>
+                  <a:schemeClr val="tx1">
+                    <a:lumMod val="75000"/>
+                    <a:lumOff val="25000"/>
+                  </a:schemeClr>
+                </a:solidFill>
+                <a:latin typeface="+mn-lt"/>
+                <a:ea typeface="+mn-ea"/>
+                <a:cs typeface="+mn-cs"/>
+              </a:defRPr>
+            </a:lvl8pPr>
+            <a:lvl9pPr marL="3886200" indent="-228600" algn="l" defTabSz="457200" rtl="0" eaLnBrk="1" latinLnBrk="0" hangingPunct="1">
+              <a:spcBef>
+                <a:spcPts val="1000"/>
+              </a:spcBef>
+              <a:spcAft>
+                <a:spcPts val="0"/>
+              </a:spcAft>
+              <a:buClr>
+                <a:schemeClr val="accent1"/>
+              </a:buClr>
+              <a:buFont typeface="Wingdings 3" charset="2"/>
+              <a:buChar char=""/>
+              <a:defRPr sz="1200" kern="1200">
+                <a:solidFill>
+                  <a:schemeClr val="tx1">
+                    <a:lumMod val="75000"/>
+                    <a:lumOff val="25000"/>
+                  </a:schemeClr>
+                </a:solidFill>
+                <a:latin typeface="+mn-lt"/>
+                <a:ea typeface="+mn-ea"/>
+                <a:cs typeface="+mn-cs"/>
+              </a:defRPr>
+            </a:lvl9pPr>
+          </a:lstStyle>
+          <a:p>
+            <a:r>
+              <a:rPr lang="en-US" dirty="0"/>
+              <a:t>Design</a:t>
+            </a:r>
+          </a:p>
+          <a:p>
+            <a:pPr lvl="1"/>
+            <a:r>
+              <a:rPr lang="en-US" b="1" dirty="0"/>
+              <a:t>Jumpers</a:t>
+            </a:r>
+          </a:p>
+          <a:p>
+            <a:pPr lvl="1"/>
+            <a:r>
+              <a:rPr lang="en-US" dirty="0"/>
               <a:t>Serial Port</a:t>
             </a:r>
           </a:p>
@@ -17170,11 +17690,320 @@
             <a:pPr lvl="1"/>
             <a:r>
               <a:rPr lang="en-US" dirty="0"/>
-              <a:t>Jumpers</a:t>
+              <a:t>JTAG Port</a:t>
             </a:r>
           </a:p>
           <a:p>
             <a:pPr marL="457200" lvl="1" indent="0">
+              <a:buFont typeface="Wingdings 3" charset="2"/>
+              <a:buNone/>
+            </a:pPr>
+            <a:endParaRPr lang="en-US" dirty="0"/>
+          </a:p>
+          <a:p>
+            <a:r>
+              <a:rPr lang="en-US" dirty="0"/>
+              <a:t>Project</a:t>
+            </a:r>
+          </a:p>
+          <a:p>
+            <a:pPr lvl="1"/>
+            <a:r>
+              <a:rPr lang="en-US" dirty="0"/>
+              <a:t>Organized Schematics</a:t>
+            </a:r>
+          </a:p>
+          <a:p>
+            <a:pPr lvl="1"/>
+            <a:r>
+              <a:rPr lang="en-US" dirty="0"/>
+              <a:t>Unified Library</a:t>
+            </a:r>
+          </a:p>
+          <a:p>
+            <a:pPr lvl="1"/>
+            <a:r>
+              <a:rPr lang="en-US" dirty="0"/>
+              <a:t>Board Modularization</a:t>
+            </a:r>
+          </a:p>
+        </p:txBody>
+      </p:sp>
+      <p:sp>
+        <p:nvSpPr>
+          <p:cNvPr id="10" name="Content Placeholder 2">
+            <a:extLst>
+              <a:ext uri="{FF2B5EF4-FFF2-40B4-BE49-F238E27FC236}">
+                <a16:creationId xmlns:a16="http://schemas.microsoft.com/office/drawing/2014/main" id="{5990AE53-6D11-41D4-AB9A-1C8592FB9E5D}"/>
+              </a:ext>
+            </a:extLst>
+          </p:cNvPr>
+          <p:cNvSpPr txBox="1">
+            <a:spLocks/>
+          </p:cNvSpPr>
+          <p:nvPr/>
+        </p:nvSpPr>
+        <p:spPr>
+          <a:xfrm>
+            <a:off x="2589211" y="1451113"/>
+            <a:ext cx="9079327" cy="5068957"/>
+          </a:xfrm>
+          <a:prstGeom prst="rect">
+            <a:avLst/>
+          </a:prstGeom>
+        </p:spPr>
+        <p:txBody>
+          <a:bodyPr vert="horz" lIns="91440" tIns="45720" rIns="91440" bIns="45720" rtlCol="0">
+            <a:normAutofit/>
+          </a:bodyPr>
+          <a:lstStyle>
+            <a:lvl1pPr marL="342900" indent="-342900" algn="l" defTabSz="457200" rtl="0" eaLnBrk="1" latinLnBrk="0" hangingPunct="1">
+              <a:spcBef>
+                <a:spcPts val="1000"/>
+              </a:spcBef>
+              <a:spcAft>
+                <a:spcPts val="0"/>
+              </a:spcAft>
+              <a:buClr>
+                <a:schemeClr val="accent1"/>
+              </a:buClr>
+              <a:buFont typeface="Wingdings 3" charset="2"/>
+              <a:buChar char=""/>
+              <a:defRPr sz="1800" kern="1200">
+                <a:solidFill>
+                  <a:schemeClr val="tx1">
+                    <a:lumMod val="75000"/>
+                    <a:lumOff val="25000"/>
+                  </a:schemeClr>
+                </a:solidFill>
+                <a:latin typeface="+mn-lt"/>
+                <a:ea typeface="+mn-ea"/>
+                <a:cs typeface="+mn-cs"/>
+              </a:defRPr>
+            </a:lvl1pPr>
+            <a:lvl2pPr marL="742950" indent="-285750" algn="l" defTabSz="457200" rtl="0" eaLnBrk="1" latinLnBrk="0" hangingPunct="1">
+              <a:spcBef>
+                <a:spcPts val="1000"/>
+              </a:spcBef>
+              <a:spcAft>
+                <a:spcPts val="0"/>
+              </a:spcAft>
+              <a:buClr>
+                <a:schemeClr val="accent1"/>
+              </a:buClr>
+              <a:buFont typeface="Wingdings 3" charset="2"/>
+              <a:buChar char=""/>
+              <a:defRPr sz="1600" kern="1200">
+                <a:solidFill>
+                  <a:schemeClr val="tx1">
+                    <a:lumMod val="75000"/>
+                    <a:lumOff val="25000"/>
+                  </a:schemeClr>
+                </a:solidFill>
+                <a:latin typeface="+mn-lt"/>
+                <a:ea typeface="+mn-ea"/>
+                <a:cs typeface="+mn-cs"/>
+              </a:defRPr>
+            </a:lvl2pPr>
+            <a:lvl3pPr marL="1143000" indent="-228600" algn="l" defTabSz="457200" rtl="0" eaLnBrk="1" latinLnBrk="0" hangingPunct="1">
+              <a:spcBef>
+                <a:spcPts val="1000"/>
+              </a:spcBef>
+              <a:spcAft>
+                <a:spcPts val="0"/>
+              </a:spcAft>
+              <a:buClr>
+                <a:schemeClr val="accent1"/>
+              </a:buClr>
+              <a:buFont typeface="Wingdings 3" charset="2"/>
+              <a:buChar char=""/>
+              <a:defRPr sz="1400" kern="1200">
+                <a:solidFill>
+                  <a:schemeClr val="tx1">
+                    <a:lumMod val="75000"/>
+                    <a:lumOff val="25000"/>
+                  </a:schemeClr>
+                </a:solidFill>
+                <a:latin typeface="+mn-lt"/>
+                <a:ea typeface="+mn-ea"/>
+                <a:cs typeface="+mn-cs"/>
+              </a:defRPr>
+            </a:lvl3pPr>
+            <a:lvl4pPr marL="1600200" indent="-228600" algn="l" defTabSz="457200" rtl="0" eaLnBrk="1" latinLnBrk="0" hangingPunct="1">
+              <a:spcBef>
+                <a:spcPts val="1000"/>
+              </a:spcBef>
+              <a:spcAft>
+                <a:spcPts val="0"/>
+              </a:spcAft>
+              <a:buClr>
+                <a:schemeClr val="accent1"/>
+              </a:buClr>
+              <a:buFont typeface="Wingdings 3" charset="2"/>
+              <a:buChar char=""/>
+              <a:defRPr sz="1200" kern="1200">
+                <a:solidFill>
+                  <a:schemeClr val="tx1">
+                    <a:lumMod val="75000"/>
+                    <a:lumOff val="25000"/>
+                  </a:schemeClr>
+                </a:solidFill>
+                <a:latin typeface="+mn-lt"/>
+                <a:ea typeface="+mn-ea"/>
+                <a:cs typeface="+mn-cs"/>
+              </a:defRPr>
+            </a:lvl4pPr>
+            <a:lvl5pPr marL="2057400" indent="-228600" algn="l" defTabSz="457200" rtl="0" eaLnBrk="1" latinLnBrk="0" hangingPunct="1">
+              <a:spcBef>
+                <a:spcPts val="1000"/>
+              </a:spcBef>
+              <a:spcAft>
+                <a:spcPts val="0"/>
+              </a:spcAft>
+              <a:buClr>
+                <a:schemeClr val="accent1"/>
+              </a:buClr>
+              <a:buFont typeface="Wingdings 3" charset="2"/>
+              <a:buChar char=""/>
+              <a:defRPr sz="1200" kern="1200">
+                <a:solidFill>
+                  <a:schemeClr val="tx1">
+                    <a:lumMod val="75000"/>
+                    <a:lumOff val="25000"/>
+                  </a:schemeClr>
+                </a:solidFill>
+                <a:latin typeface="+mn-lt"/>
+                <a:ea typeface="+mn-ea"/>
+                <a:cs typeface="+mn-cs"/>
+              </a:defRPr>
+            </a:lvl5pPr>
+            <a:lvl6pPr marL="2514600" indent="-228600" algn="l" defTabSz="457200" rtl="0" eaLnBrk="1" latinLnBrk="0" hangingPunct="1">
+              <a:spcBef>
+                <a:spcPts val="1000"/>
+              </a:spcBef>
+              <a:spcAft>
+                <a:spcPts val="0"/>
+              </a:spcAft>
+              <a:buClr>
+                <a:schemeClr val="accent1"/>
+              </a:buClr>
+              <a:buFont typeface="Wingdings 3" charset="2"/>
+              <a:buChar char=""/>
+              <a:defRPr sz="1200" kern="1200">
+                <a:solidFill>
+                  <a:schemeClr val="tx1">
+                    <a:lumMod val="75000"/>
+                    <a:lumOff val="25000"/>
+                  </a:schemeClr>
+                </a:solidFill>
+                <a:latin typeface="+mn-lt"/>
+                <a:ea typeface="+mn-ea"/>
+                <a:cs typeface="+mn-cs"/>
+              </a:defRPr>
+            </a:lvl6pPr>
+            <a:lvl7pPr marL="2971800" indent="-228600" algn="l" defTabSz="457200" rtl="0" eaLnBrk="1" latinLnBrk="0" hangingPunct="1">
+              <a:spcBef>
+                <a:spcPts val="1000"/>
+              </a:spcBef>
+              <a:spcAft>
+                <a:spcPts val="0"/>
+              </a:spcAft>
+              <a:buClr>
+                <a:schemeClr val="accent1"/>
+              </a:buClr>
+              <a:buFont typeface="Wingdings 3" charset="2"/>
+              <a:buChar char=""/>
+              <a:defRPr sz="1200" kern="1200">
+                <a:solidFill>
+                  <a:schemeClr val="tx1">
+                    <a:lumMod val="75000"/>
+                    <a:lumOff val="25000"/>
+                  </a:schemeClr>
+                </a:solidFill>
+                <a:latin typeface="+mn-lt"/>
+                <a:ea typeface="+mn-ea"/>
+                <a:cs typeface="+mn-cs"/>
+              </a:defRPr>
+            </a:lvl7pPr>
+            <a:lvl8pPr marL="3429000" indent="-228600" algn="l" defTabSz="457200" rtl="0" eaLnBrk="1" latinLnBrk="0" hangingPunct="1">
+              <a:spcBef>
+                <a:spcPts val="1000"/>
+              </a:spcBef>
+              <a:spcAft>
+                <a:spcPts val="0"/>
+              </a:spcAft>
+              <a:buClr>
+                <a:schemeClr val="accent1"/>
+              </a:buClr>
+              <a:buFont typeface="Wingdings 3" charset="2"/>
+              <a:buChar char=""/>
+              <a:defRPr sz="1200" kern="1200">
+                <a:solidFill>
+                  <a:schemeClr val="tx1">
+                    <a:lumMod val="75000"/>
+                    <a:lumOff val="25000"/>
+                  </a:schemeClr>
+                </a:solidFill>
+                <a:latin typeface="+mn-lt"/>
+                <a:ea typeface="+mn-ea"/>
+                <a:cs typeface="+mn-cs"/>
+              </a:defRPr>
+            </a:lvl8pPr>
+            <a:lvl9pPr marL="3886200" indent="-228600" algn="l" defTabSz="457200" rtl="0" eaLnBrk="1" latinLnBrk="0" hangingPunct="1">
+              <a:spcBef>
+                <a:spcPts val="1000"/>
+              </a:spcBef>
+              <a:spcAft>
+                <a:spcPts val="0"/>
+              </a:spcAft>
+              <a:buClr>
+                <a:schemeClr val="accent1"/>
+              </a:buClr>
+              <a:buFont typeface="Wingdings 3" charset="2"/>
+              <a:buChar char=""/>
+              <a:defRPr sz="1200" kern="1200">
+                <a:solidFill>
+                  <a:schemeClr val="tx1">
+                    <a:lumMod val="75000"/>
+                    <a:lumOff val="25000"/>
+                  </a:schemeClr>
+                </a:solidFill>
+                <a:latin typeface="+mn-lt"/>
+                <a:ea typeface="+mn-ea"/>
+                <a:cs typeface="+mn-cs"/>
+              </a:defRPr>
+            </a:lvl9pPr>
+          </a:lstStyle>
+          <a:p>
+            <a:r>
+              <a:rPr lang="en-US" dirty="0"/>
+              <a:t>Design</a:t>
+            </a:r>
+          </a:p>
+          <a:p>
+            <a:pPr lvl="1"/>
+            <a:r>
+              <a:rPr lang="en-US" dirty="0"/>
+              <a:t>Jumpers	</a:t>
+            </a:r>
+          </a:p>
+          <a:p>
+            <a:pPr lvl="1"/>
+            <a:r>
+              <a:rPr lang="en-US" b="1" dirty="0"/>
+              <a:t>Serial Port</a:t>
+            </a:r>
+          </a:p>
+          <a:p>
+            <a:pPr lvl="1"/>
+            <a:r>
+              <a:rPr lang="en-US" dirty="0"/>
+              <a:t>JTAG Port</a:t>
+            </a:r>
+          </a:p>
+          <a:p>
+            <a:pPr marL="457200" lvl="1" indent="0">
+              <a:buFont typeface="Wingdings 3" charset="2"/>
               <a:buNone/>
             </a:pPr>
             <a:endParaRPr lang="en-US" dirty="0"/>
@@ -17218,6 +18047,653 @@
   <p:clrMapOvr>
     <a:masterClrMapping/>
   </p:clrMapOvr>
+  <p:timing>
+    <p:tnLst>
+      <p:par>
+        <p:cTn id="1" dur="indefinite" restart="never" nodeType="tmRoot">
+          <p:childTnLst>
+            <p:seq concurrent="1" nextAc="seek">
+              <p:cTn id="2" dur="indefinite" nodeType="mainSeq">
+                <p:childTnLst>
+                  <p:par>
+                    <p:cTn id="3" fill="hold">
+                      <p:stCondLst>
+                        <p:cond delay="indefinite"/>
+                      </p:stCondLst>
+                      <p:childTnLst>
+                        <p:par>
+                          <p:cTn id="4" fill="hold">
+                            <p:stCondLst>
+                              <p:cond delay="0"/>
+                            </p:stCondLst>
+                            <p:childTnLst>
+                              <p:par>
+                                <p:cTn id="5" presetID="10" presetClass="entr" presetSubtype="0" fill="hold" grpId="0" nodeType="clickEffect">
+                                  <p:stCondLst>
+                                    <p:cond delay="0"/>
+                                  </p:stCondLst>
+                                  <p:childTnLst>
+                                    <p:set>
+                                      <p:cBhvr>
+                                        <p:cTn id="6" dur="1" fill="hold">
+                                          <p:stCondLst>
+                                            <p:cond delay="0"/>
+                                          </p:stCondLst>
+                                        </p:cTn>
+                                        <p:tgtEl>
+                                          <p:spTgt spid="7"/>
+                                        </p:tgtEl>
+                                        <p:attrNameLst>
+                                          <p:attrName>style.visibility</p:attrName>
+                                        </p:attrNameLst>
+                                      </p:cBhvr>
+                                      <p:to>
+                                        <p:strVal val="visible"/>
+                                      </p:to>
+                                    </p:set>
+                                    <p:animEffect transition="in" filter="fade">
+                                      <p:cBhvr>
+                                        <p:cTn id="7" dur="500"/>
+                                        <p:tgtEl>
+                                          <p:spTgt spid="7"/>
+                                        </p:tgtEl>
+                                      </p:cBhvr>
+                                    </p:animEffect>
+                                  </p:childTnLst>
+                                </p:cTn>
+                              </p:par>
+                              <p:par>
+                                <p:cTn id="8" presetID="10" presetClass="entr" presetSubtype="0" fill="hold" grpId="0" nodeType="withEffect">
+                                  <p:stCondLst>
+                                    <p:cond delay="0"/>
+                                  </p:stCondLst>
+                                  <p:childTnLst>
+                                    <p:set>
+                                      <p:cBhvr>
+                                        <p:cTn id="9" dur="1" fill="hold">
+                                          <p:stCondLst>
+                                            <p:cond delay="0"/>
+                                          </p:stCondLst>
+                                        </p:cTn>
+                                        <p:tgtEl>
+                                          <p:spTgt spid="9"/>
+                                        </p:tgtEl>
+                                        <p:attrNameLst>
+                                          <p:attrName>style.visibility</p:attrName>
+                                        </p:attrNameLst>
+                                      </p:cBhvr>
+                                      <p:to>
+                                        <p:strVal val="visible"/>
+                                      </p:to>
+                                    </p:set>
+                                    <p:animEffect transition="in" filter="fade">
+                                      <p:cBhvr>
+                                        <p:cTn id="10" dur="500"/>
+                                        <p:tgtEl>
+                                          <p:spTgt spid="9"/>
+                                        </p:tgtEl>
+                                      </p:cBhvr>
+                                    </p:animEffect>
+                                  </p:childTnLst>
+                                </p:cTn>
+                              </p:par>
+                              <p:par>
+                                <p:cTn id="11" presetID="10" presetClass="exit" presetSubtype="0" fill="hold" grpId="0" nodeType="withEffect">
+                                  <p:stCondLst>
+                                    <p:cond delay="0"/>
+                                  </p:stCondLst>
+                                  <p:childTnLst>
+                                    <p:animEffect transition="out" filter="fade">
+                                      <p:cBhvr>
+                                        <p:cTn id="12" dur="500"/>
+                                        <p:tgtEl>
+                                          <p:spTgt spid="3">
+                                            <p:txEl>
+                                              <p:pRg st="0" end="0"/>
+                                            </p:txEl>
+                                          </p:spTgt>
+                                        </p:tgtEl>
+                                      </p:cBhvr>
+                                    </p:animEffect>
+                                    <p:set>
+                                      <p:cBhvr>
+                                        <p:cTn id="13" dur="1" fill="hold">
+                                          <p:stCondLst>
+                                            <p:cond delay="499"/>
+                                          </p:stCondLst>
+                                        </p:cTn>
+                                        <p:tgtEl>
+                                          <p:spTgt spid="3">
+                                            <p:txEl>
+                                              <p:pRg st="0" end="0"/>
+                                            </p:txEl>
+                                          </p:spTgt>
+                                        </p:tgtEl>
+                                        <p:attrNameLst>
+                                          <p:attrName>style.visibility</p:attrName>
+                                        </p:attrNameLst>
+                                      </p:cBhvr>
+                                      <p:to>
+                                        <p:strVal val="hidden"/>
+                                      </p:to>
+                                    </p:set>
+                                  </p:childTnLst>
+                                </p:cTn>
+                              </p:par>
+                              <p:par>
+                                <p:cTn id="14" presetID="10" presetClass="exit" presetSubtype="0" fill="hold" grpId="0" nodeType="withEffect">
+                                  <p:stCondLst>
+                                    <p:cond delay="0"/>
+                                  </p:stCondLst>
+                                  <p:childTnLst>
+                                    <p:animEffect transition="out" filter="fade">
+                                      <p:cBhvr>
+                                        <p:cTn id="15" dur="500"/>
+                                        <p:tgtEl>
+                                          <p:spTgt spid="3">
+                                            <p:txEl>
+                                              <p:pRg st="1" end="1"/>
+                                            </p:txEl>
+                                          </p:spTgt>
+                                        </p:tgtEl>
+                                      </p:cBhvr>
+                                    </p:animEffect>
+                                    <p:set>
+                                      <p:cBhvr>
+                                        <p:cTn id="16" dur="1" fill="hold">
+                                          <p:stCondLst>
+                                            <p:cond delay="499"/>
+                                          </p:stCondLst>
+                                        </p:cTn>
+                                        <p:tgtEl>
+                                          <p:spTgt spid="3">
+                                            <p:txEl>
+                                              <p:pRg st="1" end="1"/>
+                                            </p:txEl>
+                                          </p:spTgt>
+                                        </p:tgtEl>
+                                        <p:attrNameLst>
+                                          <p:attrName>style.visibility</p:attrName>
+                                        </p:attrNameLst>
+                                      </p:cBhvr>
+                                      <p:to>
+                                        <p:strVal val="hidden"/>
+                                      </p:to>
+                                    </p:set>
+                                  </p:childTnLst>
+                                </p:cTn>
+                              </p:par>
+                              <p:par>
+                                <p:cTn id="17" presetID="10" presetClass="exit" presetSubtype="0" fill="hold" grpId="0" nodeType="withEffect">
+                                  <p:stCondLst>
+                                    <p:cond delay="0"/>
+                                  </p:stCondLst>
+                                  <p:childTnLst>
+                                    <p:animEffect transition="out" filter="fade">
+                                      <p:cBhvr>
+                                        <p:cTn id="18" dur="500"/>
+                                        <p:tgtEl>
+                                          <p:spTgt spid="3">
+                                            <p:txEl>
+                                              <p:pRg st="2" end="2"/>
+                                            </p:txEl>
+                                          </p:spTgt>
+                                        </p:tgtEl>
+                                      </p:cBhvr>
+                                    </p:animEffect>
+                                    <p:set>
+                                      <p:cBhvr>
+                                        <p:cTn id="19" dur="1" fill="hold">
+                                          <p:stCondLst>
+                                            <p:cond delay="499"/>
+                                          </p:stCondLst>
+                                        </p:cTn>
+                                        <p:tgtEl>
+                                          <p:spTgt spid="3">
+                                            <p:txEl>
+                                              <p:pRg st="2" end="2"/>
+                                            </p:txEl>
+                                          </p:spTgt>
+                                        </p:tgtEl>
+                                        <p:attrNameLst>
+                                          <p:attrName>style.visibility</p:attrName>
+                                        </p:attrNameLst>
+                                      </p:cBhvr>
+                                      <p:to>
+                                        <p:strVal val="hidden"/>
+                                      </p:to>
+                                    </p:set>
+                                  </p:childTnLst>
+                                </p:cTn>
+                              </p:par>
+                              <p:par>
+                                <p:cTn id="20" presetID="10" presetClass="exit" presetSubtype="0" fill="hold" grpId="0" nodeType="withEffect">
+                                  <p:stCondLst>
+                                    <p:cond delay="0"/>
+                                  </p:stCondLst>
+                                  <p:childTnLst>
+                                    <p:animEffect transition="out" filter="fade">
+                                      <p:cBhvr>
+                                        <p:cTn id="21" dur="500"/>
+                                        <p:tgtEl>
+                                          <p:spTgt spid="3">
+                                            <p:txEl>
+                                              <p:pRg st="3" end="3"/>
+                                            </p:txEl>
+                                          </p:spTgt>
+                                        </p:tgtEl>
+                                      </p:cBhvr>
+                                    </p:animEffect>
+                                    <p:set>
+                                      <p:cBhvr>
+                                        <p:cTn id="22" dur="1" fill="hold">
+                                          <p:stCondLst>
+                                            <p:cond delay="499"/>
+                                          </p:stCondLst>
+                                        </p:cTn>
+                                        <p:tgtEl>
+                                          <p:spTgt spid="3">
+                                            <p:txEl>
+                                              <p:pRg st="3" end="3"/>
+                                            </p:txEl>
+                                          </p:spTgt>
+                                        </p:tgtEl>
+                                        <p:attrNameLst>
+                                          <p:attrName>style.visibility</p:attrName>
+                                        </p:attrNameLst>
+                                      </p:cBhvr>
+                                      <p:to>
+                                        <p:strVal val="hidden"/>
+                                      </p:to>
+                                    </p:set>
+                                  </p:childTnLst>
+                                </p:cTn>
+                              </p:par>
+                              <p:par>
+                                <p:cTn id="23" presetID="10" presetClass="exit" presetSubtype="0" fill="hold" grpId="0" nodeType="withEffect">
+                                  <p:stCondLst>
+                                    <p:cond delay="0"/>
+                                  </p:stCondLst>
+                                  <p:childTnLst>
+                                    <p:animEffect transition="out" filter="fade">
+                                      <p:cBhvr>
+                                        <p:cTn id="24" dur="500"/>
+                                        <p:tgtEl>
+                                          <p:spTgt spid="3">
+                                            <p:txEl>
+                                              <p:pRg st="5" end="5"/>
+                                            </p:txEl>
+                                          </p:spTgt>
+                                        </p:tgtEl>
+                                      </p:cBhvr>
+                                    </p:animEffect>
+                                    <p:set>
+                                      <p:cBhvr>
+                                        <p:cTn id="25" dur="1" fill="hold">
+                                          <p:stCondLst>
+                                            <p:cond delay="499"/>
+                                          </p:stCondLst>
+                                        </p:cTn>
+                                        <p:tgtEl>
+                                          <p:spTgt spid="3">
+                                            <p:txEl>
+                                              <p:pRg st="5" end="5"/>
+                                            </p:txEl>
+                                          </p:spTgt>
+                                        </p:tgtEl>
+                                        <p:attrNameLst>
+                                          <p:attrName>style.visibility</p:attrName>
+                                        </p:attrNameLst>
+                                      </p:cBhvr>
+                                      <p:to>
+                                        <p:strVal val="hidden"/>
+                                      </p:to>
+                                    </p:set>
+                                  </p:childTnLst>
+                                </p:cTn>
+                              </p:par>
+                              <p:par>
+                                <p:cTn id="26" presetID="10" presetClass="exit" presetSubtype="0" fill="hold" grpId="0" nodeType="withEffect">
+                                  <p:stCondLst>
+                                    <p:cond delay="0"/>
+                                  </p:stCondLst>
+                                  <p:childTnLst>
+                                    <p:animEffect transition="out" filter="fade">
+                                      <p:cBhvr>
+                                        <p:cTn id="27" dur="500"/>
+                                        <p:tgtEl>
+                                          <p:spTgt spid="3">
+                                            <p:txEl>
+                                              <p:pRg st="6" end="6"/>
+                                            </p:txEl>
+                                          </p:spTgt>
+                                        </p:tgtEl>
+                                      </p:cBhvr>
+                                    </p:animEffect>
+                                    <p:set>
+                                      <p:cBhvr>
+                                        <p:cTn id="28" dur="1" fill="hold">
+                                          <p:stCondLst>
+                                            <p:cond delay="499"/>
+                                          </p:stCondLst>
+                                        </p:cTn>
+                                        <p:tgtEl>
+                                          <p:spTgt spid="3">
+                                            <p:txEl>
+                                              <p:pRg st="6" end="6"/>
+                                            </p:txEl>
+                                          </p:spTgt>
+                                        </p:tgtEl>
+                                        <p:attrNameLst>
+                                          <p:attrName>style.visibility</p:attrName>
+                                        </p:attrNameLst>
+                                      </p:cBhvr>
+                                      <p:to>
+                                        <p:strVal val="hidden"/>
+                                      </p:to>
+                                    </p:set>
+                                  </p:childTnLst>
+                                </p:cTn>
+                              </p:par>
+                              <p:par>
+                                <p:cTn id="29" presetID="10" presetClass="exit" presetSubtype="0" fill="hold" grpId="0" nodeType="withEffect">
+                                  <p:stCondLst>
+                                    <p:cond delay="0"/>
+                                  </p:stCondLst>
+                                  <p:childTnLst>
+                                    <p:animEffect transition="out" filter="fade">
+                                      <p:cBhvr>
+                                        <p:cTn id="30" dur="500"/>
+                                        <p:tgtEl>
+                                          <p:spTgt spid="3">
+                                            <p:txEl>
+                                              <p:pRg st="7" end="7"/>
+                                            </p:txEl>
+                                          </p:spTgt>
+                                        </p:tgtEl>
+                                      </p:cBhvr>
+                                    </p:animEffect>
+                                    <p:set>
+                                      <p:cBhvr>
+                                        <p:cTn id="31" dur="1" fill="hold">
+                                          <p:stCondLst>
+                                            <p:cond delay="499"/>
+                                          </p:stCondLst>
+                                        </p:cTn>
+                                        <p:tgtEl>
+                                          <p:spTgt spid="3">
+                                            <p:txEl>
+                                              <p:pRg st="7" end="7"/>
+                                            </p:txEl>
+                                          </p:spTgt>
+                                        </p:tgtEl>
+                                        <p:attrNameLst>
+                                          <p:attrName>style.visibility</p:attrName>
+                                        </p:attrNameLst>
+                                      </p:cBhvr>
+                                      <p:to>
+                                        <p:strVal val="hidden"/>
+                                      </p:to>
+                                    </p:set>
+                                  </p:childTnLst>
+                                </p:cTn>
+                              </p:par>
+                              <p:par>
+                                <p:cTn id="32" presetID="10" presetClass="exit" presetSubtype="0" fill="hold" grpId="0" nodeType="withEffect">
+                                  <p:stCondLst>
+                                    <p:cond delay="0"/>
+                                  </p:stCondLst>
+                                  <p:childTnLst>
+                                    <p:animEffect transition="out" filter="fade">
+                                      <p:cBhvr>
+                                        <p:cTn id="33" dur="500"/>
+                                        <p:tgtEl>
+                                          <p:spTgt spid="3">
+                                            <p:txEl>
+                                              <p:pRg st="8" end="8"/>
+                                            </p:txEl>
+                                          </p:spTgt>
+                                        </p:tgtEl>
+                                      </p:cBhvr>
+                                    </p:animEffect>
+                                    <p:set>
+                                      <p:cBhvr>
+                                        <p:cTn id="34" dur="1" fill="hold">
+                                          <p:stCondLst>
+                                            <p:cond delay="499"/>
+                                          </p:stCondLst>
+                                        </p:cTn>
+                                        <p:tgtEl>
+                                          <p:spTgt spid="3">
+                                            <p:txEl>
+                                              <p:pRg st="8" end="8"/>
+                                            </p:txEl>
+                                          </p:spTgt>
+                                        </p:tgtEl>
+                                        <p:attrNameLst>
+                                          <p:attrName>style.visibility</p:attrName>
+                                        </p:attrNameLst>
+                                      </p:cBhvr>
+                                      <p:to>
+                                        <p:strVal val="hidden"/>
+                                      </p:to>
+                                    </p:set>
+                                  </p:childTnLst>
+                                </p:cTn>
+                              </p:par>
+                            </p:childTnLst>
+                          </p:cTn>
+                        </p:par>
+                      </p:childTnLst>
+                    </p:cTn>
+                  </p:par>
+                  <p:par>
+                    <p:cTn id="35" fill="hold">
+                      <p:stCondLst>
+                        <p:cond delay="indefinite"/>
+                      </p:stCondLst>
+                      <p:childTnLst>
+                        <p:par>
+                          <p:cTn id="36" fill="hold">
+                            <p:stCondLst>
+                              <p:cond delay="0"/>
+                            </p:stCondLst>
+                            <p:childTnLst>
+                              <p:par>
+                                <p:cTn id="37" presetID="10" presetClass="exit" presetSubtype="0" fill="hold" grpId="1" nodeType="clickEffect">
+                                  <p:stCondLst>
+                                    <p:cond delay="0"/>
+                                  </p:stCondLst>
+                                  <p:childTnLst>
+                                    <p:animEffect transition="out" filter="fade">
+                                      <p:cBhvr>
+                                        <p:cTn id="38" dur="500"/>
+                                        <p:tgtEl>
+                                          <p:spTgt spid="7"/>
+                                        </p:tgtEl>
+                                      </p:cBhvr>
+                                    </p:animEffect>
+                                    <p:set>
+                                      <p:cBhvr>
+                                        <p:cTn id="39" dur="1" fill="hold">
+                                          <p:stCondLst>
+                                            <p:cond delay="499"/>
+                                          </p:stCondLst>
+                                        </p:cTn>
+                                        <p:tgtEl>
+                                          <p:spTgt spid="7"/>
+                                        </p:tgtEl>
+                                        <p:attrNameLst>
+                                          <p:attrName>style.visibility</p:attrName>
+                                        </p:attrNameLst>
+                                      </p:cBhvr>
+                                      <p:to>
+                                        <p:strVal val="hidden"/>
+                                      </p:to>
+                                    </p:set>
+                                  </p:childTnLst>
+                                </p:cTn>
+                              </p:par>
+                            </p:childTnLst>
+                          </p:cTn>
+                        </p:par>
+                        <p:par>
+                          <p:cTn id="40" fill="hold">
+                            <p:stCondLst>
+                              <p:cond delay="500"/>
+                            </p:stCondLst>
+                            <p:childTnLst>
+                              <p:par>
+                                <p:cTn id="41" presetID="10" presetClass="entr" presetSubtype="0" fill="hold" grpId="0" nodeType="afterEffect">
+                                  <p:stCondLst>
+                                    <p:cond delay="0"/>
+                                  </p:stCondLst>
+                                  <p:childTnLst>
+                                    <p:set>
+                                      <p:cBhvr>
+                                        <p:cTn id="42" dur="1" fill="hold">
+                                          <p:stCondLst>
+                                            <p:cond delay="0"/>
+                                          </p:stCondLst>
+                                        </p:cTn>
+                                        <p:tgtEl>
+                                          <p:spTgt spid="8"/>
+                                        </p:tgtEl>
+                                        <p:attrNameLst>
+                                          <p:attrName>style.visibility</p:attrName>
+                                        </p:attrNameLst>
+                                      </p:cBhvr>
+                                      <p:to>
+                                        <p:strVal val="visible"/>
+                                      </p:to>
+                                    </p:set>
+                                    <p:animEffect transition="in" filter="fade">
+                                      <p:cBhvr>
+                                        <p:cTn id="43" dur="500"/>
+                                        <p:tgtEl>
+                                          <p:spTgt spid="8"/>
+                                        </p:tgtEl>
+                                      </p:cBhvr>
+                                    </p:animEffect>
+                                  </p:childTnLst>
+                                </p:cTn>
+                              </p:par>
+                            </p:childTnLst>
+                          </p:cTn>
+                        </p:par>
+                        <p:par>
+                          <p:cTn id="44" fill="hold">
+                            <p:stCondLst>
+                              <p:cond delay="1000"/>
+                            </p:stCondLst>
+                            <p:childTnLst>
+                              <p:par>
+                                <p:cTn id="45" presetID="10" presetClass="entr" presetSubtype="0" fill="hold" grpId="0" nodeType="afterEffect">
+                                  <p:stCondLst>
+                                    <p:cond delay="0"/>
+                                  </p:stCondLst>
+                                  <p:childTnLst>
+                                    <p:set>
+                                      <p:cBhvr>
+                                        <p:cTn id="46" dur="1" fill="hold">
+                                          <p:stCondLst>
+                                            <p:cond delay="0"/>
+                                          </p:stCondLst>
+                                        </p:cTn>
+                                        <p:tgtEl>
+                                          <p:spTgt spid="10"/>
+                                        </p:tgtEl>
+                                        <p:attrNameLst>
+                                          <p:attrName>style.visibility</p:attrName>
+                                        </p:attrNameLst>
+                                      </p:cBhvr>
+                                      <p:to>
+                                        <p:strVal val="visible"/>
+                                      </p:to>
+                                    </p:set>
+                                    <p:animEffect transition="in" filter="fade">
+                                      <p:cBhvr>
+                                        <p:cTn id="47" dur="500"/>
+                                        <p:tgtEl>
+                                          <p:spTgt spid="10"/>
+                                        </p:tgtEl>
+                                      </p:cBhvr>
+                                    </p:animEffect>
+                                  </p:childTnLst>
+                                </p:cTn>
+                              </p:par>
+                              <p:par>
+                                <p:cTn id="48" presetID="10" presetClass="exit" presetSubtype="0" fill="hold" grpId="1" nodeType="withEffect">
+                                  <p:stCondLst>
+                                    <p:cond delay="0"/>
+                                  </p:stCondLst>
+                                  <p:childTnLst>
+                                    <p:animEffect transition="out" filter="fade">
+                                      <p:cBhvr>
+                                        <p:cTn id="49" dur="500"/>
+                                        <p:tgtEl>
+                                          <p:spTgt spid="9"/>
+                                        </p:tgtEl>
+                                      </p:cBhvr>
+                                    </p:animEffect>
+                                    <p:set>
+                                      <p:cBhvr>
+                                        <p:cTn id="50" dur="1" fill="hold">
+                                          <p:stCondLst>
+                                            <p:cond delay="499"/>
+                                          </p:stCondLst>
+                                        </p:cTn>
+                                        <p:tgtEl>
+                                          <p:spTgt spid="9"/>
+                                        </p:tgtEl>
+                                        <p:attrNameLst>
+                                          <p:attrName>style.visibility</p:attrName>
+                                        </p:attrNameLst>
+                                      </p:cBhvr>
+                                      <p:to>
+                                        <p:strVal val="hidden"/>
+                                      </p:to>
+                                    </p:set>
+                                  </p:childTnLst>
+                                </p:cTn>
+                              </p:par>
+                            </p:childTnLst>
+                          </p:cTn>
+                        </p:par>
+                      </p:childTnLst>
+                    </p:cTn>
+                  </p:par>
+                </p:childTnLst>
+              </p:cTn>
+              <p:prevCondLst>
+                <p:cond evt="onPrev" delay="0">
+                  <p:tgtEl>
+                    <p:sldTgt/>
+                  </p:tgtEl>
+                </p:cond>
+              </p:prevCondLst>
+              <p:nextCondLst>
+                <p:cond evt="onNext" delay="0">
+                  <p:tgtEl>
+                    <p:sldTgt/>
+                  </p:tgtEl>
+                </p:cond>
+              </p:nextCondLst>
+            </p:seq>
+          </p:childTnLst>
+        </p:cTn>
+      </p:par>
+    </p:tnLst>
+    <p:bldLst>
+      <p:bldP spid="3" grpId="0" build="p"/>
+      <p:bldP spid="7" grpId="0" animBg="1"/>
+      <p:bldP spid="7" grpId="1" animBg="1"/>
+      <p:bldP spid="8" grpId="0" animBg="1"/>
+      <p:bldP spid="9" grpId="0"/>
+      <p:bldP spid="9" grpId="1"/>
+      <p:bldP spid="10" grpId="0"/>
+    </p:bldLst>
+  </p:timing>
 </p:sld>
 </file>
 

</xml_diff>

<commit_message>
(+)    add schematic cleanup slide
</commit_message>
<xml_diff>
--- a/Suppl/Pivotal Presentation - DTECTS.pptx
+++ b/Suppl/Pivotal Presentation - DTECTS.pptx
@@ -5,7 +5,7 @@
     <p:sldMasterId id="2147483648" r:id="rId1"/>
   </p:sldMasterIdLst>
   <p:notesMasterIdLst>
-    <p:notesMasterId r:id="rId25"/>
+    <p:notesMasterId r:id="rId26"/>
   </p:notesMasterIdLst>
   <p:sldIdLst>
     <p:sldId id="302" r:id="rId2"/>
@@ -20,17 +20,18 @@
     <p:sldId id="296" r:id="rId11"/>
     <p:sldId id="298" r:id="rId12"/>
     <p:sldId id="291" r:id="rId13"/>
-    <p:sldId id="295" r:id="rId14"/>
-    <p:sldId id="294" r:id="rId15"/>
-    <p:sldId id="293" r:id="rId16"/>
-    <p:sldId id="292" r:id="rId17"/>
-    <p:sldId id="283" r:id="rId18"/>
-    <p:sldId id="284" r:id="rId19"/>
-    <p:sldId id="286" r:id="rId20"/>
-    <p:sldId id="287" r:id="rId21"/>
-    <p:sldId id="288" r:id="rId22"/>
-    <p:sldId id="290" r:id="rId23"/>
-    <p:sldId id="289" r:id="rId24"/>
+    <p:sldId id="304" r:id="rId14"/>
+    <p:sldId id="295" r:id="rId15"/>
+    <p:sldId id="294" r:id="rId16"/>
+    <p:sldId id="293" r:id="rId17"/>
+    <p:sldId id="292" r:id="rId18"/>
+    <p:sldId id="283" r:id="rId19"/>
+    <p:sldId id="284" r:id="rId20"/>
+    <p:sldId id="286" r:id="rId21"/>
+    <p:sldId id="287" r:id="rId22"/>
+    <p:sldId id="288" r:id="rId23"/>
+    <p:sldId id="290" r:id="rId24"/>
+    <p:sldId id="289" r:id="rId25"/>
   </p:sldIdLst>
   <p:sldSz cx="12192000" cy="6858000"/>
   <p:notesSz cx="6858000" cy="9144000"/>
@@ -1364,7 +1365,7 @@
             </a:pPr>
             <a:r>
               <a:rPr lang="en-US" dirty="0"/>
-              <a:t>Uniform naming schema</a:t>
+              <a:t>Clear segmentation and modularization of design</a:t>
             </a:r>
           </a:p>
           <a:p>
@@ -1374,7 +1375,7 @@
             </a:pPr>
             <a:r>
               <a:rPr lang="en-US" dirty="0"/>
-              <a:t>Consistent, uniform symbols</a:t>
+              <a:t>Uniform, consistent layout</a:t>
             </a:r>
           </a:p>
           <a:p>
@@ -1384,7 +1385,7 @@
             </a:pPr>
             <a:r>
               <a:rPr lang="en-US" dirty="0"/>
-              <a:t>Complete silkscreen &amp; outline markup</a:t>
+              <a:t>Clear labelling with notes</a:t>
             </a:r>
           </a:p>
         </p:txBody>
@@ -1415,7 +1416,7 @@
     </p:spTree>
     <p:extLst>
       <p:ext uri="{BB962C8B-B14F-4D97-AF65-F5344CB8AC3E}">
-        <p14:creationId xmlns:p14="http://schemas.microsoft.com/office/powerpoint/2010/main" val="3592769984"/>
+        <p14:creationId xmlns:p14="http://schemas.microsoft.com/office/powerpoint/2010/main" val="1690426285"/>
       </p:ext>
     </p:extLst>
   </p:cSld>
@@ -1475,7 +1476,7 @@
             </a:pPr>
             <a:r>
               <a:rPr lang="en-US" dirty="0"/>
-              <a:t>Clear segmentation and modularization of design</a:t>
+              <a:t>Uniform naming schema</a:t>
             </a:r>
           </a:p>
           <a:p>
@@ -1485,7 +1486,7 @@
             </a:pPr>
             <a:r>
               <a:rPr lang="en-US" dirty="0"/>
-              <a:t>Consistent part selection</a:t>
+              <a:t>Consistent, uniform symbols</a:t>
             </a:r>
           </a:p>
           <a:p>
@@ -1495,25 +1496,8 @@
             </a:pPr>
             <a:r>
               <a:rPr lang="en-US" dirty="0"/>
-              <a:t>Clean selection and placement for external I/O</a:t>
-            </a:r>
-          </a:p>
-          <a:p>
-            <a:pPr marL="171450" indent="-171450">
-              <a:buFontTx/>
-              <a:buChar char="-"/>
-            </a:pPr>
-            <a:r>
-              <a:rPr lang="en-US" dirty="0"/>
-              <a:t>Design flexibility for future expansion</a:t>
-            </a:r>
-          </a:p>
-          <a:p>
-            <a:pPr marL="171450" indent="-171450">
-              <a:buFontTx/>
-              <a:buChar char="-"/>
-            </a:pPr>
-            <a:endParaRPr lang="en-US" dirty="0"/>
+              <a:t>Complete silkscreen &amp; outline markup</a:t>
+            </a:r>
           </a:p>
         </p:txBody>
       </p:sp>
@@ -1543,7 +1527,7 @@
     </p:spTree>
     <p:extLst>
       <p:ext uri="{BB962C8B-B14F-4D97-AF65-F5344CB8AC3E}">
-        <p14:creationId xmlns:p14="http://schemas.microsoft.com/office/powerpoint/2010/main" val="2959733451"/>
+        <p14:creationId xmlns:p14="http://schemas.microsoft.com/office/powerpoint/2010/main" val="3592769984"/>
       </p:ext>
     </p:extLst>
   </p:cSld>
@@ -1597,9 +1581,49 @@
           <a:bodyPr/>
           <a:lstStyle/>
           <a:p>
-            <a:pPr marL="0" indent="0">
+            <a:pPr marL="171450" indent="-171450">
               <a:buFontTx/>
-              <a:buNone/>
+              <a:buChar char="-"/>
+            </a:pPr>
+            <a:r>
+              <a:rPr lang="en-US" dirty="0"/>
+              <a:t>Clear segmentation and modularization of design</a:t>
+            </a:r>
+          </a:p>
+          <a:p>
+            <a:pPr marL="171450" indent="-171450">
+              <a:buFontTx/>
+              <a:buChar char="-"/>
+            </a:pPr>
+            <a:r>
+              <a:rPr lang="en-US" dirty="0"/>
+              <a:t>Consistent part selection</a:t>
+            </a:r>
+          </a:p>
+          <a:p>
+            <a:pPr marL="171450" indent="-171450">
+              <a:buFontTx/>
+              <a:buChar char="-"/>
+            </a:pPr>
+            <a:r>
+              <a:rPr lang="en-US" dirty="0"/>
+              <a:t>Clean selection and placement for external I/O</a:t>
+            </a:r>
+          </a:p>
+          <a:p>
+            <a:pPr marL="171450" indent="-171450">
+              <a:buFontTx/>
+              <a:buChar char="-"/>
+            </a:pPr>
+            <a:r>
+              <a:rPr lang="en-US" dirty="0"/>
+              <a:t>Design flexibility for future expansion</a:t>
+            </a:r>
+          </a:p>
+          <a:p>
+            <a:pPr marL="171450" indent="-171450">
+              <a:buFontTx/>
+              <a:buChar char="-"/>
             </a:pPr>
             <a:endParaRPr lang="en-US" dirty="0"/>
           </a:p>
@@ -1631,7 +1655,7 @@
     </p:spTree>
     <p:extLst>
       <p:ext uri="{BB962C8B-B14F-4D97-AF65-F5344CB8AC3E}">
-        <p14:creationId xmlns:p14="http://schemas.microsoft.com/office/powerpoint/2010/main" val="3749563727"/>
+        <p14:creationId xmlns:p14="http://schemas.microsoft.com/office/powerpoint/2010/main" val="2959733451"/>
       </p:ext>
     </p:extLst>
   </p:cSld>
@@ -1719,7 +1743,7 @@
     </p:spTree>
     <p:extLst>
       <p:ext uri="{BB962C8B-B14F-4D97-AF65-F5344CB8AC3E}">
-        <p14:creationId xmlns:p14="http://schemas.microsoft.com/office/powerpoint/2010/main" val="1280536660"/>
+        <p14:creationId xmlns:p14="http://schemas.microsoft.com/office/powerpoint/2010/main" val="3749563727"/>
       </p:ext>
     </p:extLst>
   </p:cSld>
@@ -1773,46 +1797,6 @@
           <a:bodyPr/>
           <a:lstStyle/>
           <a:p>
-            <a:pPr marL="171450" indent="-171450">
-              <a:buFontTx/>
-              <a:buChar char="-"/>
-            </a:pPr>
-            <a:r>
-              <a:rPr lang="en-US" dirty="0"/>
-              <a:t>Unmet customer needs</a:t>
-            </a:r>
-          </a:p>
-          <a:p>
-            <a:pPr marL="171450" indent="-171450">
-              <a:buFontTx/>
-              <a:buChar char="-"/>
-            </a:pPr>
-            <a:r>
-              <a:rPr lang="en-US" dirty="0"/>
-              <a:t>Work scope identification</a:t>
-            </a:r>
-          </a:p>
-          <a:p>
-            <a:pPr marL="171450" indent="-171450">
-              <a:buFontTx/>
-              <a:buChar char="-"/>
-            </a:pPr>
-            <a:r>
-              <a:rPr lang="en-US" dirty="0"/>
-              <a:t>Espressif</a:t>
-            </a:r>
-          </a:p>
-          <a:p>
-            <a:pPr marL="171450" indent="-171450">
-              <a:buFontTx/>
-              <a:buChar char="-"/>
-            </a:pPr>
-            <a:r>
-              <a:rPr lang="en-US" dirty="0"/>
-              <a:t>Satisfying ambitious, abstract design needs</a:t>
-            </a:r>
-          </a:p>
-          <a:p>
             <a:pPr marL="0" indent="0">
               <a:buFontTx/>
               <a:buNone/>
@@ -1847,7 +1831,7 @@
     </p:spTree>
     <p:extLst>
       <p:ext uri="{BB962C8B-B14F-4D97-AF65-F5344CB8AC3E}">
-        <p14:creationId xmlns:p14="http://schemas.microsoft.com/office/powerpoint/2010/main" val="3236089897"/>
+        <p14:creationId xmlns:p14="http://schemas.microsoft.com/office/powerpoint/2010/main" val="1280536660"/>
       </p:ext>
     </p:extLst>
   </p:cSld>
@@ -1907,7 +1891,7 @@
             </a:pPr>
             <a:r>
               <a:rPr lang="en-US" dirty="0"/>
-              <a:t>Schematics</a:t>
+              <a:t>Unmet customer needs</a:t>
             </a:r>
           </a:p>
           <a:p>
@@ -1917,7 +1901,7 @@
             </a:pPr>
             <a:r>
               <a:rPr lang="en-US" dirty="0"/>
-              <a:t>Documentation</a:t>
+              <a:t>Work scope identification</a:t>
             </a:r>
           </a:p>
           <a:p>
@@ -1927,7 +1911,7 @@
             </a:pPr>
             <a:r>
               <a:rPr lang="en-US" dirty="0"/>
-              <a:t>Board Design</a:t>
+              <a:t>Espressif</a:t>
             </a:r>
           </a:p>
           <a:p>
@@ -1937,37 +1921,7 @@
             </a:pPr>
             <a:r>
               <a:rPr lang="en-US" dirty="0"/>
-              <a:t>Espressif bare-metal scope</a:t>
-            </a:r>
-          </a:p>
-          <a:p>
-            <a:pPr marL="171450" indent="-171450">
-              <a:buFontTx/>
-              <a:buChar char="-"/>
-            </a:pPr>
-            <a:r>
-              <a:rPr lang="en-US" dirty="0"/>
-              <a:t>Roadmap establish</a:t>
-            </a:r>
-          </a:p>
-          <a:p>
-            <a:pPr marL="171450" indent="-171450">
-              <a:buFontTx/>
-              <a:buChar char="-"/>
-            </a:pPr>
-            <a:r>
-              <a:rPr lang="en-US" dirty="0"/>
-              <a:t>Procedure Reference</a:t>
-            </a:r>
-          </a:p>
-          <a:p>
-            <a:pPr marL="171450" indent="-171450">
-              <a:buFontTx/>
-              <a:buChar char="-"/>
-            </a:pPr>
-            <a:r>
-              <a:rPr lang="en-US" dirty="0"/>
-              <a:t>GitHub</a:t>
+              <a:t>Satisfying ambitious, abstract design needs</a:t>
             </a:r>
           </a:p>
           <a:p>
@@ -2005,7 +1959,7 @@
     </p:spTree>
     <p:extLst>
       <p:ext uri="{BB962C8B-B14F-4D97-AF65-F5344CB8AC3E}">
-        <p14:creationId xmlns:p14="http://schemas.microsoft.com/office/powerpoint/2010/main" val="812602940"/>
+        <p14:creationId xmlns:p14="http://schemas.microsoft.com/office/powerpoint/2010/main" val="3236089897"/>
       </p:ext>
     </p:extLst>
   </p:cSld>
@@ -2065,7 +2019,7 @@
             </a:pPr>
             <a:r>
               <a:rPr lang="en-US" dirty="0"/>
-              <a:t>Communication</a:t>
+              <a:t>Schematics</a:t>
             </a:r>
           </a:p>
           <a:p>
@@ -2075,7 +2029,7 @@
             </a:pPr>
             <a:r>
               <a:rPr lang="en-US" dirty="0"/>
-              <a:t>Needs Identification &amp; Customer Relations</a:t>
+              <a:t>Documentation</a:t>
             </a:r>
           </a:p>
           <a:p>
@@ -2085,7 +2039,7 @@
             </a:pPr>
             <a:r>
               <a:rPr lang="en-US" dirty="0"/>
-              <a:t>Translation of Ambitions to Marketable Results</a:t>
+              <a:t>Board Design</a:t>
             </a:r>
           </a:p>
           <a:p>
@@ -2095,7 +2049,7 @@
             </a:pPr>
             <a:r>
               <a:rPr lang="en-US" dirty="0"/>
-              <a:t>EAGLE Ramp</a:t>
+              <a:t>Espressif bare-metal scope</a:t>
             </a:r>
           </a:p>
           <a:p>
@@ -2105,7 +2059,7 @@
             </a:pPr>
             <a:r>
               <a:rPr lang="en-US" dirty="0"/>
-              <a:t>Espressif Exposure &amp; Practice</a:t>
+              <a:t>Roadmap establish</a:t>
             </a:r>
           </a:p>
           <a:p>
@@ -2115,7 +2069,17 @@
             </a:pPr>
             <a:r>
               <a:rPr lang="en-US" dirty="0"/>
-              <a:t>Relationships</a:t>
+              <a:t>Procedure Reference</a:t>
+            </a:r>
+          </a:p>
+          <a:p>
+            <a:pPr marL="171450" indent="-171450">
+              <a:buFontTx/>
+              <a:buChar char="-"/>
+            </a:pPr>
+            <a:r>
+              <a:rPr lang="en-US" dirty="0"/>
+              <a:t>GitHub</a:t>
             </a:r>
           </a:p>
           <a:p>
@@ -2153,7 +2117,7 @@
     </p:spTree>
     <p:extLst>
       <p:ext uri="{BB962C8B-B14F-4D97-AF65-F5344CB8AC3E}">
-        <p14:creationId xmlns:p14="http://schemas.microsoft.com/office/powerpoint/2010/main" val="264461871"/>
+        <p14:creationId xmlns:p14="http://schemas.microsoft.com/office/powerpoint/2010/main" val="812602940"/>
       </p:ext>
     </p:extLst>
   </p:cSld>
@@ -2669,7 +2633,7 @@
             </a:pPr>
             <a:r>
               <a:rPr lang="en-US" dirty="0"/>
-              <a:t>Strengthened relations with Tomm</a:t>
+              <a:t>Communication</a:t>
             </a:r>
           </a:p>
           <a:p>
@@ -2679,7 +2643,7 @@
             </a:pPr>
             <a:r>
               <a:rPr lang="en-US" dirty="0"/>
-              <a:t>Tyler Brown Opportunity</a:t>
+              <a:t>Needs Identification &amp; Customer Relations</a:t>
             </a:r>
           </a:p>
           <a:p>
@@ -2689,7 +2653,7 @@
             </a:pPr>
             <a:r>
               <a:rPr lang="en-US" dirty="0"/>
-              <a:t>Billy Keogh Opportunity</a:t>
+              <a:t>Translation of Ambitions to Marketable Results</a:t>
             </a:r>
           </a:p>
           <a:p>
@@ -2699,7 +2663,7 @@
             </a:pPr>
             <a:r>
               <a:rPr lang="en-US" dirty="0"/>
-              <a:t>Jmr Opportunity</a:t>
+              <a:t>EAGLE Ramp</a:t>
             </a:r>
           </a:p>
           <a:p>
@@ -2709,7 +2673,7 @@
             </a:pPr>
             <a:r>
               <a:rPr lang="en-US" dirty="0"/>
-              <a:t>Mentor &amp; Network relations</a:t>
+              <a:t>Espressif Exposure &amp; Practice</a:t>
             </a:r>
           </a:p>
           <a:p>
@@ -2719,7 +2683,7 @@
             </a:pPr>
             <a:r>
               <a:rPr lang="en-US" dirty="0"/>
-              <a:t>Xylem &amp; Ergsense relations</a:t>
+              <a:t>Relationships</a:t>
             </a:r>
           </a:p>
           <a:p>
@@ -2757,7 +2721,7 @@
     </p:spTree>
     <p:extLst>
       <p:ext uri="{BB962C8B-B14F-4D97-AF65-F5344CB8AC3E}">
-        <p14:creationId xmlns:p14="http://schemas.microsoft.com/office/powerpoint/2010/main" val="3716442150"/>
+        <p14:creationId xmlns:p14="http://schemas.microsoft.com/office/powerpoint/2010/main" val="264461871"/>
       </p:ext>
     </p:extLst>
   </p:cSld>
@@ -2817,11 +2781,7 @@
             </a:pPr>
             <a:r>
               <a:rPr lang="en-US" dirty="0"/>
-              <a:t>Frame, sketch w/vision</a:t>
-            </a:r>
-            <a:r>
-              <a:rPr lang="en-US" baseline="0" dirty="0"/>
-              <a:t> &amp; intent, draft</a:t>
+              <a:t>Strengthened relations with Tomm</a:t>
             </a:r>
           </a:p>
           <a:p>
@@ -2830,8 +2790,8 @@
               <a:buChar char="-"/>
             </a:pPr>
             <a:r>
-              <a:rPr lang="en-US" baseline="0" dirty="0"/>
-              <a:t>Source control &amp; procedure!</a:t>
+              <a:rPr lang="en-US" dirty="0"/>
+              <a:t>Tyler Brown Opportunity</a:t>
             </a:r>
           </a:p>
           <a:p>
@@ -2840,8 +2800,8 @@
               <a:buChar char="-"/>
             </a:pPr>
             <a:r>
-              <a:rPr lang="en-US" baseline="0" dirty="0"/>
-              <a:t>Help from experience (Tomm, Terry, Father)</a:t>
+              <a:rPr lang="en-US" dirty="0"/>
+              <a:t>Billy Keogh Opportunity</a:t>
             </a:r>
           </a:p>
           <a:p>
@@ -2851,11 +2811,7 @@
             </a:pPr>
             <a:r>
               <a:rPr lang="en-US" dirty="0"/>
-              <a:t>Describe</a:t>
-            </a:r>
-            <a:r>
-              <a:rPr lang="en-US" baseline="0" dirty="0"/>
-              <a:t> procedure of PPT Generation</a:t>
+              <a:t>Jmr Opportunity</a:t>
             </a:r>
           </a:p>
           <a:p>
@@ -2864,8 +2820,8 @@
               <a:buChar char="-"/>
             </a:pPr>
             <a:r>
-              <a:rPr lang="en-US" baseline="0" dirty="0"/>
-              <a:t>    selection &amp; outline</a:t>
+              <a:rPr lang="en-US" dirty="0"/>
+              <a:t>Mentor &amp; Network relations</a:t>
             </a:r>
           </a:p>
           <a:p>
@@ -2874,42 +2830,9 @@
               <a:buChar char="-"/>
             </a:pPr>
             <a:r>
-              <a:rPr lang="en-US" baseline="0" dirty="0"/>
-              <a:t>    customer meeting (Tomm)</a:t>
-            </a:r>
-          </a:p>
-          <a:p>
-            <a:pPr marL="171450" indent="-171450">
-              <a:buFontTx/>
-              <a:buChar char="-"/>
-            </a:pPr>
-            <a:r>
-              <a:rPr lang="en-US" baseline="0" dirty="0"/>
-              <a:t>    mentor advise (Tom, Father)</a:t>
-            </a:r>
-          </a:p>
-          <a:p>
-            <a:pPr marL="171450" indent="-171450">
-              <a:buFontTx/>
-              <a:buChar char="-"/>
-            </a:pPr>
-            <a:r>
-              <a:rPr lang="en-US" baseline="0" dirty="0"/>
-              <a:t>    outline</a:t>
-            </a:r>
-          </a:p>
-          <a:p>
-            <a:pPr marL="171450" indent="-171450">
-              <a:buFontTx/>
-              <a:buChar char="-"/>
-            </a:pPr>
-            <a:r>
-              <a:rPr lang="en-US" baseline="0" dirty="0"/>
-              <a:t>    find template</a:t>
-            </a:r>
-          </a:p>
-          <a:p>
-            <a:endParaRPr lang="en-US" dirty="0"/>
+              <a:rPr lang="en-US" dirty="0"/>
+              <a:t>Xylem &amp; Ergsense relations</a:t>
+            </a:r>
           </a:p>
           <a:p>
             <a:pPr marL="0" indent="0">
@@ -2946,7 +2869,7 @@
     </p:spTree>
     <p:extLst>
       <p:ext uri="{BB962C8B-B14F-4D97-AF65-F5344CB8AC3E}">
-        <p14:creationId xmlns:p14="http://schemas.microsoft.com/office/powerpoint/2010/main" val="648812506"/>
+        <p14:creationId xmlns:p14="http://schemas.microsoft.com/office/powerpoint/2010/main" val="3716442150"/>
       </p:ext>
     </p:extLst>
   </p:cSld>
@@ -3006,7 +2929,11 @@
             </a:pPr>
             <a:r>
               <a:rPr lang="en-US" dirty="0"/>
-              <a:t>Board Design</a:t>
+              <a:t>Frame, sketch w/vision</a:t>
+            </a:r>
+            <a:r>
+              <a:rPr lang="en-US" baseline="0" dirty="0"/>
+              <a:t> &amp; intent, draft</a:t>
             </a:r>
           </a:p>
           <a:p>
@@ -3015,8 +2942,8 @@
               <a:buChar char="-"/>
             </a:pPr>
             <a:r>
-              <a:rPr lang="en-US" dirty="0"/>
-              <a:t>Board Fab &amp; Validate</a:t>
+              <a:rPr lang="en-US" baseline="0" dirty="0"/>
+              <a:t>Source control &amp; procedure!</a:t>
             </a:r>
           </a:p>
           <a:p>
@@ -3025,8 +2952,8 @@
               <a:buChar char="-"/>
             </a:pPr>
             <a:r>
-              <a:rPr lang="en-US" dirty="0"/>
-              <a:t>Firmware</a:t>
+              <a:rPr lang="en-US" baseline="0" dirty="0"/>
+              <a:t>Help from experience (Tomm, Terry, Father)</a:t>
             </a:r>
           </a:p>
           <a:p>
@@ -3036,8 +2963,65 @@
             </a:pPr>
             <a:r>
               <a:rPr lang="en-US" dirty="0"/>
-              <a:t>Rapid Prototyping</a:t>
-            </a:r>
+              <a:t>Describe</a:t>
+            </a:r>
+            <a:r>
+              <a:rPr lang="en-US" baseline="0" dirty="0"/>
+              <a:t> procedure of PPT Generation</a:t>
+            </a:r>
+          </a:p>
+          <a:p>
+            <a:pPr marL="171450" indent="-171450">
+              <a:buFontTx/>
+              <a:buChar char="-"/>
+            </a:pPr>
+            <a:r>
+              <a:rPr lang="en-US" baseline="0" dirty="0"/>
+              <a:t>    selection &amp; outline</a:t>
+            </a:r>
+          </a:p>
+          <a:p>
+            <a:pPr marL="171450" indent="-171450">
+              <a:buFontTx/>
+              <a:buChar char="-"/>
+            </a:pPr>
+            <a:r>
+              <a:rPr lang="en-US" baseline="0" dirty="0"/>
+              <a:t>    customer meeting (Tomm)</a:t>
+            </a:r>
+          </a:p>
+          <a:p>
+            <a:pPr marL="171450" indent="-171450">
+              <a:buFontTx/>
+              <a:buChar char="-"/>
+            </a:pPr>
+            <a:r>
+              <a:rPr lang="en-US" baseline="0" dirty="0"/>
+              <a:t>    mentor advise (Tom, Father)</a:t>
+            </a:r>
+          </a:p>
+          <a:p>
+            <a:pPr marL="171450" indent="-171450">
+              <a:buFontTx/>
+              <a:buChar char="-"/>
+            </a:pPr>
+            <a:r>
+              <a:rPr lang="en-US" baseline="0" dirty="0"/>
+              <a:t>    outline</a:t>
+            </a:r>
+          </a:p>
+          <a:p>
+            <a:pPr marL="171450" indent="-171450">
+              <a:buFontTx/>
+              <a:buChar char="-"/>
+            </a:pPr>
+            <a:r>
+              <a:rPr lang="en-US" baseline="0" dirty="0"/>
+              <a:t>    find template</a:t>
+            </a:r>
+          </a:p>
+          <a:p>
+            <a:endParaRPr lang="en-US" dirty="0"/>
           </a:p>
           <a:p>
             <a:pPr marL="0" indent="0">
@@ -3074,7 +3058,7 @@
     </p:spTree>
     <p:extLst>
       <p:ext uri="{BB962C8B-B14F-4D97-AF65-F5344CB8AC3E}">
-        <p14:creationId xmlns:p14="http://schemas.microsoft.com/office/powerpoint/2010/main" val="3025603983"/>
+        <p14:creationId xmlns:p14="http://schemas.microsoft.com/office/powerpoint/2010/main" val="648812506"/>
       </p:ext>
     </p:extLst>
   </p:cSld>
@@ -3128,21 +3112,44 @@
           <a:bodyPr/>
           <a:lstStyle/>
           <a:p>
-            <a:r>
-              <a:rPr lang="en-US" dirty="0"/>
-              <a:t>*Integrate Tomm Notes</a:t>
-            </a:r>
-          </a:p>
-          <a:p>
-            <a:r>
-              <a:rPr lang="en-US" dirty="0"/>
-              <a:t>*Form</a:t>
-            </a:r>
-            <a:r>
-              <a:rPr lang="en-US" baseline="0" dirty="0"/>
-              <a:t> rules &amp; presentation target</a:t>
-            </a:r>
-            <a:endParaRPr lang="en-US" dirty="0"/>
+            <a:pPr marL="171450" indent="-171450">
+              <a:buFontTx/>
+              <a:buChar char="-"/>
+            </a:pPr>
+            <a:r>
+              <a:rPr lang="en-US" dirty="0"/>
+              <a:t>Board Design</a:t>
+            </a:r>
+          </a:p>
+          <a:p>
+            <a:pPr marL="171450" indent="-171450">
+              <a:buFontTx/>
+              <a:buChar char="-"/>
+            </a:pPr>
+            <a:r>
+              <a:rPr lang="en-US" dirty="0"/>
+              <a:t>Board Fab &amp; Validate</a:t>
+            </a:r>
+          </a:p>
+          <a:p>
+            <a:pPr marL="171450" indent="-171450">
+              <a:buFontTx/>
+              <a:buChar char="-"/>
+            </a:pPr>
+            <a:r>
+              <a:rPr lang="en-US" dirty="0"/>
+              <a:t>Firmware</a:t>
+            </a:r>
+          </a:p>
+          <a:p>
+            <a:pPr marL="171450" indent="-171450">
+              <a:buFontTx/>
+              <a:buChar char="-"/>
+            </a:pPr>
+            <a:r>
+              <a:rPr lang="en-US" dirty="0"/>
+              <a:t>Rapid Prototyping</a:t>
+            </a:r>
           </a:p>
           <a:p>
             <a:pPr marL="0" indent="0">
@@ -3171,6 +3178,111 @@
             <a:fld id="{4AC65D0B-F732-4E21-9A8D-1C6A15A6A84B}" type="slidenum">
               <a:rPr lang="en-US" smtClean="0"/>
               <a:t>23</a:t>
+            </a:fld>
+            <a:endParaRPr lang="en-US" dirty="0"/>
+          </a:p>
+        </p:txBody>
+      </p:sp>
+    </p:spTree>
+    <p:extLst>
+      <p:ext uri="{BB962C8B-B14F-4D97-AF65-F5344CB8AC3E}">
+        <p14:creationId xmlns:p14="http://schemas.microsoft.com/office/powerpoint/2010/main" val="3025603983"/>
+      </p:ext>
+    </p:extLst>
+  </p:cSld>
+  <p:clrMapOvr>
+    <a:masterClrMapping/>
+  </p:clrMapOvr>
+</p:notes>
+</file>
+
+<file path=ppt/notesSlides/notesSlide24.xml><?xml version="1.0" encoding="utf-8"?>
+<p:notes xmlns:a="http://schemas.openxmlformats.org/drawingml/2006/main" xmlns:r="http://schemas.openxmlformats.org/officeDocument/2006/relationships" xmlns:p="http://schemas.openxmlformats.org/presentationml/2006/main">
+  <p:cSld>
+    <p:spTree>
+      <p:nvGrpSpPr>
+        <p:cNvPr id="1" name=""/>
+        <p:cNvGrpSpPr/>
+        <p:nvPr/>
+      </p:nvGrpSpPr>
+      <p:grpSpPr>
+        <a:xfrm>
+          <a:off x="0" y="0"/>
+          <a:ext cx="0" cy="0"/>
+          <a:chOff x="0" y="0"/>
+          <a:chExt cx="0" cy="0"/>
+        </a:xfrm>
+      </p:grpSpPr>
+      <p:sp>
+        <p:nvSpPr>
+          <p:cNvPr id="2" name="Slide Image Placeholder 1"/>
+          <p:cNvSpPr>
+            <a:spLocks noGrp="1" noRot="1" noChangeAspect="1"/>
+          </p:cNvSpPr>
+          <p:nvPr>
+            <p:ph type="sldImg"/>
+          </p:nvPr>
+        </p:nvSpPr>
+        <p:spPr/>
+      </p:sp>
+      <p:sp>
+        <p:nvSpPr>
+          <p:cNvPr id="3" name="Notes Placeholder 2"/>
+          <p:cNvSpPr>
+            <a:spLocks noGrp="1"/>
+          </p:cNvSpPr>
+          <p:nvPr>
+            <p:ph type="body" idx="1"/>
+          </p:nvPr>
+        </p:nvSpPr>
+        <p:spPr/>
+        <p:txBody>
+          <a:bodyPr/>
+          <a:lstStyle/>
+          <a:p>
+            <a:r>
+              <a:rPr lang="en-US" dirty="0"/>
+              <a:t>*Integrate Tomm Notes</a:t>
+            </a:r>
+          </a:p>
+          <a:p>
+            <a:r>
+              <a:rPr lang="en-US" dirty="0"/>
+              <a:t>*Form</a:t>
+            </a:r>
+            <a:r>
+              <a:rPr lang="en-US" baseline="0" dirty="0"/>
+              <a:t> rules &amp; presentation target</a:t>
+            </a:r>
+            <a:endParaRPr lang="en-US" dirty="0"/>
+          </a:p>
+          <a:p>
+            <a:pPr marL="0" indent="0">
+              <a:buFontTx/>
+              <a:buNone/>
+            </a:pPr>
+            <a:endParaRPr lang="en-US" dirty="0"/>
+          </a:p>
+        </p:txBody>
+      </p:sp>
+      <p:sp>
+        <p:nvSpPr>
+          <p:cNvPr id="4" name="Slide Number Placeholder 3"/>
+          <p:cNvSpPr>
+            <a:spLocks noGrp="1"/>
+          </p:cNvSpPr>
+          <p:nvPr>
+            <p:ph type="sldNum" sz="quarter" idx="10"/>
+          </p:nvPr>
+        </p:nvSpPr>
+        <p:spPr/>
+        <p:txBody>
+          <a:bodyPr/>
+          <a:lstStyle/>
+          <a:p>
+            <a:fld id="{4AC65D0B-F732-4E21-9A8D-1C6A15A6A84B}" type="slidenum">
+              <a:rPr lang="en-US" smtClean="0"/>
+              <a:t>24</a:t>
             </a:fld>
             <a:endParaRPr lang="en-US" dirty="0"/>
           </a:p>
@@ -14268,6 +14380,857 @@
       </p:grpSpPr>
       <p:sp>
         <p:nvSpPr>
+          <p:cNvPr id="22" name="TextBox 21">
+            <a:extLst>
+              <a:ext uri="{FF2B5EF4-FFF2-40B4-BE49-F238E27FC236}">
+                <a16:creationId xmlns:a16="http://schemas.microsoft.com/office/drawing/2014/main" id="{0D3E10F2-8CD0-4E5B-BC44-7816720C1F4C}"/>
+              </a:ext>
+            </a:extLst>
+          </p:cNvPr>
+          <p:cNvSpPr txBox="1"/>
+          <p:nvPr/>
+        </p:nvSpPr>
+        <p:spPr>
+          <a:xfrm>
+            <a:off x="6607593" y="1805006"/>
+            <a:ext cx="4488873" cy="1477328"/>
+          </a:xfrm>
+          <a:prstGeom prst="rect">
+            <a:avLst/>
+          </a:prstGeom>
+          <a:noFill/>
+        </p:spPr>
+        <p:txBody>
+          <a:bodyPr wrap="square" rtlCol="0">
+            <a:spAutoFit/>
+          </a:bodyPr>
+          <a:lstStyle/>
+          <a:p>
+            <a:pPr marL="285750" indent="-285750">
+              <a:buFont typeface="Arial" panose="020B0604020202020204" pitchFamily="34" charset="0"/>
+              <a:buChar char="•"/>
+            </a:pPr>
+            <a:r>
+              <a:rPr lang="en-US" dirty="0"/>
+              <a:t>Dense schematic</a:t>
+            </a:r>
+          </a:p>
+          <a:p>
+            <a:pPr marL="285750" indent="-285750">
+              <a:buFont typeface="Arial" panose="020B0604020202020204" pitchFamily="34" charset="0"/>
+              <a:buChar char="•"/>
+            </a:pPr>
+            <a:endParaRPr lang="en-US" dirty="0"/>
+          </a:p>
+          <a:p>
+            <a:pPr marL="285750" indent="-285750">
+              <a:buFont typeface="Arial" panose="020B0604020202020204" pitchFamily="34" charset="0"/>
+              <a:buChar char="•"/>
+            </a:pPr>
+            <a:r>
+              <a:rPr lang="en-US" dirty="0"/>
+              <a:t>Rough Net Name Placement</a:t>
+            </a:r>
+          </a:p>
+          <a:p>
+            <a:pPr marL="285750" indent="-285750">
+              <a:buFont typeface="Arial" panose="020B0604020202020204" pitchFamily="34" charset="0"/>
+              <a:buChar char="•"/>
+            </a:pPr>
+            <a:endParaRPr lang="en-US" dirty="0"/>
+          </a:p>
+          <a:p>
+            <a:pPr marL="285750" indent="-285750">
+              <a:buFont typeface="Arial" panose="020B0604020202020204" pitchFamily="34" charset="0"/>
+              <a:buChar char="•"/>
+            </a:pPr>
+            <a:r>
+              <a:rPr lang="en-US" dirty="0"/>
+              <a:t>Non-modularized</a:t>
+            </a:r>
+          </a:p>
+        </p:txBody>
+      </p:sp>
+      <p:sp>
+        <p:nvSpPr>
+          <p:cNvPr id="2" name="Title 1">
+            <a:extLst>
+              <a:ext uri="{FF2B5EF4-FFF2-40B4-BE49-F238E27FC236}">
+                <a16:creationId xmlns:a16="http://schemas.microsoft.com/office/drawing/2014/main" id="{9C5E42EE-EA5D-4203-B1EC-B96B68D2A8EA}"/>
+              </a:ext>
+            </a:extLst>
+          </p:cNvPr>
+          <p:cNvSpPr>
+            <a:spLocks noGrp="1"/>
+          </p:cNvSpPr>
+          <p:nvPr>
+            <p:ph type="title"/>
+          </p:nvPr>
+        </p:nvSpPr>
+        <p:spPr/>
+        <p:txBody>
+          <a:bodyPr>
+            <a:normAutofit/>
+          </a:bodyPr>
+          <a:lstStyle/>
+          <a:p>
+            <a:pPr rtl="0" eaLnBrk="1" latinLnBrk="0" hangingPunct="1"/>
+            <a:r>
+              <a:rPr lang="en-US" sz="3600" b="0" i="0" kern="1200" baseline="0" dirty="0">
+                <a:solidFill>
+                  <a:schemeClr val="tx1">
+                    <a:lumMod val="85000"/>
+                    <a:lumOff val="15000"/>
+                  </a:schemeClr>
+                </a:solidFill>
+                <a:effectLst/>
+                <a:latin typeface="+mj-lt"/>
+                <a:ea typeface="+mj-ea"/>
+                <a:cs typeface="+mj-cs"/>
+              </a:rPr>
+              <a:t>DTECTS Schematic Cleanup</a:t>
+            </a:r>
+            <a:endParaRPr lang="en-US" sz="4400" dirty="0">
+              <a:effectLst/>
+            </a:endParaRPr>
+          </a:p>
+        </p:txBody>
+      </p:sp>
+      <p:sp>
+        <p:nvSpPr>
+          <p:cNvPr id="8" name="Rectangle: Rounded Corners 7">
+            <a:extLst>
+              <a:ext uri="{FF2B5EF4-FFF2-40B4-BE49-F238E27FC236}">
+                <a16:creationId xmlns:a16="http://schemas.microsoft.com/office/drawing/2014/main" id="{EA6DF3C5-6BAE-43D5-9F54-A88CBD26A09E}"/>
+              </a:ext>
+            </a:extLst>
+          </p:cNvPr>
+          <p:cNvSpPr/>
+          <p:nvPr/>
+        </p:nvSpPr>
+        <p:spPr>
+          <a:xfrm>
+            <a:off x="9583858" y="4425671"/>
+            <a:ext cx="1754702" cy="1515643"/>
+          </a:xfrm>
+          <a:prstGeom prst="roundRect">
+            <a:avLst>
+              <a:gd name="adj" fmla="val 6780"/>
+            </a:avLst>
+          </a:prstGeom>
+          <a:blipFill dpi="0" rotWithShape="1">
+            <a:blip r:embed="rId3">
+              <a:extLst>
+                <a:ext uri="{28A0092B-C50C-407E-A947-70E740481C1C}">
+                  <a14:useLocalDpi xmlns:a14="http://schemas.microsoft.com/office/drawing/2010/main" val="0"/>
+                </a:ext>
+              </a:extLst>
+            </a:blip>
+            <a:srcRect/>
+            <a:stretch>
+              <a:fillRect l="-77518" t="-63726" r="-73271" b="-66708"/>
+            </a:stretch>
+          </a:blipFill>
+          <a:ln>
+            <a:solidFill>
+              <a:schemeClr val="tx1"/>
+            </a:solidFill>
+          </a:ln>
+        </p:spPr>
+        <p:style>
+          <a:lnRef idx="2">
+            <a:schemeClr val="accent1">
+              <a:shade val="50000"/>
+            </a:schemeClr>
+          </a:lnRef>
+          <a:fillRef idx="1">
+            <a:schemeClr val="accent1"/>
+          </a:fillRef>
+          <a:effectRef idx="0">
+            <a:schemeClr val="accent1"/>
+          </a:effectRef>
+          <a:fontRef idx="minor">
+            <a:schemeClr val="lt1"/>
+          </a:fontRef>
+        </p:style>
+        <p:txBody>
+          <a:bodyPr rtlCol="0" anchor="ctr"/>
+          <a:lstStyle/>
+          <a:p>
+            <a:pPr algn="ctr"/>
+            <a:endParaRPr lang="en-US" dirty="0"/>
+          </a:p>
+        </p:txBody>
+      </p:sp>
+      <p:cxnSp>
+        <p:nvCxnSpPr>
+          <p:cNvPr id="16" name="Straight Arrow Connector 15">
+            <a:extLst>
+              <a:ext uri="{FF2B5EF4-FFF2-40B4-BE49-F238E27FC236}">
+                <a16:creationId xmlns:a16="http://schemas.microsoft.com/office/drawing/2014/main" id="{490E3D96-0326-48A3-A678-E8FFC82FA1F9}"/>
+              </a:ext>
+            </a:extLst>
+          </p:cNvPr>
+          <p:cNvCxnSpPr>
+            <a:cxnSpLocks/>
+          </p:cNvCxnSpPr>
+          <p:nvPr/>
+        </p:nvCxnSpPr>
+        <p:spPr>
+          <a:xfrm>
+            <a:off x="5743575" y="2705100"/>
+            <a:ext cx="676275" cy="0"/>
+          </a:xfrm>
+          <a:prstGeom prst="straightConnector1">
+            <a:avLst/>
+          </a:prstGeom>
+          <a:ln>
+            <a:solidFill>
+              <a:schemeClr val="tx1"/>
+            </a:solidFill>
+            <a:tailEnd type="triangle"/>
+          </a:ln>
+        </p:spPr>
+        <p:style>
+          <a:lnRef idx="1">
+            <a:schemeClr val="accent1"/>
+          </a:lnRef>
+          <a:fillRef idx="0">
+            <a:schemeClr val="accent1"/>
+          </a:fillRef>
+          <a:effectRef idx="0">
+            <a:schemeClr val="accent1"/>
+          </a:effectRef>
+          <a:fontRef idx="minor">
+            <a:schemeClr val="tx1"/>
+          </a:fontRef>
+        </p:style>
+      </p:cxnSp>
+      <p:grpSp>
+        <p:nvGrpSpPr>
+          <p:cNvPr id="20" name="Group 19">
+            <a:extLst>
+              <a:ext uri="{FF2B5EF4-FFF2-40B4-BE49-F238E27FC236}">
+                <a16:creationId xmlns:a16="http://schemas.microsoft.com/office/drawing/2014/main" id="{E4A016E9-BC05-4619-A2D7-33B1F5C56592}"/>
+              </a:ext>
+            </a:extLst>
+          </p:cNvPr>
+          <p:cNvGrpSpPr/>
+          <p:nvPr/>
+        </p:nvGrpSpPr>
+        <p:grpSpPr>
+          <a:xfrm>
+            <a:off x="2095499" y="1533525"/>
+            <a:ext cx="3524251" cy="5069697"/>
+            <a:chOff x="2095499" y="1533525"/>
+            <a:chExt cx="3524251" cy="5069697"/>
+          </a:xfrm>
+        </p:grpSpPr>
+        <p:sp>
+          <p:nvSpPr>
+            <p:cNvPr id="5" name="Rectangle: Rounded Corners 4">
+              <a:extLst>
+                <a:ext uri="{FF2B5EF4-FFF2-40B4-BE49-F238E27FC236}">
+                  <a16:creationId xmlns:a16="http://schemas.microsoft.com/office/drawing/2014/main" id="{4CEA9522-DD76-4838-8E1B-B879BE304CFE}"/>
+                </a:ext>
+              </a:extLst>
+            </p:cNvPr>
+            <p:cNvSpPr/>
+            <p:nvPr/>
+          </p:nvSpPr>
+          <p:spPr>
+            <a:xfrm>
+              <a:off x="2095499" y="1533525"/>
+              <a:ext cx="3524251" cy="4629150"/>
+            </a:xfrm>
+            <a:prstGeom prst="roundRect">
+              <a:avLst>
+                <a:gd name="adj" fmla="val 6780"/>
+              </a:avLst>
+            </a:prstGeom>
+            <a:blipFill dpi="0" rotWithShape="1">
+              <a:blip r:embed="rId4">
+                <a:extLst>
+                  <a:ext uri="{28A0092B-C50C-407E-A947-70E740481C1C}">
+                    <a14:useLocalDpi xmlns:a14="http://schemas.microsoft.com/office/drawing/2010/main" val="0"/>
+                  </a:ext>
+                </a:extLst>
+              </a:blip>
+              <a:srcRect/>
+              <a:stretch>
+                <a:fillRect l="-89416" t="-12533" r="-79956" b="-96658"/>
+              </a:stretch>
+            </a:blipFill>
+            <a:ln>
+              <a:solidFill>
+                <a:schemeClr val="tx1"/>
+              </a:solidFill>
+            </a:ln>
+          </p:spPr>
+          <p:style>
+            <a:lnRef idx="2">
+              <a:schemeClr val="accent1">
+                <a:shade val="50000"/>
+              </a:schemeClr>
+            </a:lnRef>
+            <a:fillRef idx="1">
+              <a:schemeClr val="accent1"/>
+            </a:fillRef>
+            <a:effectRef idx="0">
+              <a:schemeClr val="accent1"/>
+            </a:effectRef>
+            <a:fontRef idx="minor">
+              <a:schemeClr val="lt1"/>
+            </a:fontRef>
+          </p:style>
+          <p:txBody>
+            <a:bodyPr rtlCol="0" anchor="ctr"/>
+            <a:lstStyle/>
+            <a:p>
+              <a:pPr algn="ctr"/>
+              <a:endParaRPr lang="en-US"/>
+            </a:p>
+          </p:txBody>
+        </p:sp>
+        <p:sp>
+          <p:nvSpPr>
+            <p:cNvPr id="18" name="TextBox 17">
+              <a:extLst>
+                <a:ext uri="{FF2B5EF4-FFF2-40B4-BE49-F238E27FC236}">
+                  <a16:creationId xmlns:a16="http://schemas.microsoft.com/office/drawing/2014/main" id="{941CE1D7-FC9E-4ED3-A7C1-75BA90F9DF03}"/>
+                </a:ext>
+              </a:extLst>
+            </p:cNvPr>
+            <p:cNvSpPr txBox="1"/>
+            <p:nvPr/>
+          </p:nvSpPr>
+          <p:spPr>
+            <a:xfrm>
+              <a:off x="2592925" y="6233890"/>
+              <a:ext cx="2297424" cy="369332"/>
+            </a:xfrm>
+            <a:prstGeom prst="rect">
+              <a:avLst/>
+            </a:prstGeom>
+            <a:noFill/>
+          </p:spPr>
+          <p:txBody>
+            <a:bodyPr wrap="none" rtlCol="0">
+              <a:spAutoFit/>
+            </a:bodyPr>
+            <a:lstStyle/>
+            <a:p>
+              <a:r>
+                <a:rPr lang="en-US" dirty="0"/>
+                <a:t>DTECTS 0.3C (2016)</a:t>
+              </a:r>
+            </a:p>
+          </p:txBody>
+        </p:sp>
+      </p:grpSp>
+      <p:grpSp>
+        <p:nvGrpSpPr>
+          <p:cNvPr id="21" name="Group 20">
+            <a:extLst>
+              <a:ext uri="{FF2B5EF4-FFF2-40B4-BE49-F238E27FC236}">
+                <a16:creationId xmlns:a16="http://schemas.microsoft.com/office/drawing/2014/main" id="{E122EE57-938E-4370-80EA-ACD40A2F2FC6}"/>
+              </a:ext>
+            </a:extLst>
+          </p:cNvPr>
+          <p:cNvGrpSpPr/>
+          <p:nvPr/>
+        </p:nvGrpSpPr>
+        <p:grpSpPr>
+          <a:xfrm>
+            <a:off x="6519327" y="1533525"/>
+            <a:ext cx="4168993" cy="2895977"/>
+            <a:chOff x="6519327" y="1533525"/>
+            <a:chExt cx="4168993" cy="2895977"/>
+          </a:xfrm>
+        </p:grpSpPr>
+        <p:sp>
+          <p:nvSpPr>
+            <p:cNvPr id="10" name="Rectangle: Rounded Corners 9">
+              <a:extLst>
+                <a:ext uri="{FF2B5EF4-FFF2-40B4-BE49-F238E27FC236}">
+                  <a16:creationId xmlns:a16="http://schemas.microsoft.com/office/drawing/2014/main" id="{E2D0A0FA-19D2-4D0C-8FA2-91CC7B43BAB7}"/>
+                </a:ext>
+              </a:extLst>
+            </p:cNvPr>
+            <p:cNvSpPr/>
+            <p:nvPr/>
+          </p:nvSpPr>
+          <p:spPr>
+            <a:xfrm>
+              <a:off x="6519327" y="1533525"/>
+              <a:ext cx="4168993" cy="2530475"/>
+            </a:xfrm>
+            <a:prstGeom prst="roundRect">
+              <a:avLst>
+                <a:gd name="adj" fmla="val 6780"/>
+              </a:avLst>
+            </a:prstGeom>
+            <a:blipFill dpi="0" rotWithShape="1">
+              <a:blip r:embed="rId5">
+                <a:extLst>
+                  <a:ext uri="{28A0092B-C50C-407E-A947-70E740481C1C}">
+                    <a14:useLocalDpi xmlns:a14="http://schemas.microsoft.com/office/drawing/2010/main" val="0"/>
+                  </a:ext>
+                </a:extLst>
+              </a:blip>
+              <a:srcRect/>
+              <a:stretch>
+                <a:fillRect l="-23444" t="-27185" r="-47659" b="-29874"/>
+              </a:stretch>
+            </a:blipFill>
+            <a:ln>
+              <a:solidFill>
+                <a:schemeClr val="tx1"/>
+              </a:solidFill>
+            </a:ln>
+          </p:spPr>
+          <p:style>
+            <a:lnRef idx="2">
+              <a:schemeClr val="accent1">
+                <a:shade val="50000"/>
+              </a:schemeClr>
+            </a:lnRef>
+            <a:fillRef idx="1">
+              <a:schemeClr val="accent1"/>
+            </a:fillRef>
+            <a:effectRef idx="0">
+              <a:schemeClr val="accent1"/>
+            </a:effectRef>
+            <a:fontRef idx="minor">
+              <a:schemeClr val="lt1"/>
+            </a:fontRef>
+          </p:style>
+          <p:txBody>
+            <a:bodyPr rtlCol="0" anchor="ctr"/>
+            <a:lstStyle/>
+            <a:p>
+              <a:pPr algn="ctr"/>
+              <a:endParaRPr lang="en-US"/>
+            </a:p>
+          </p:txBody>
+        </p:sp>
+        <p:sp>
+          <p:nvSpPr>
+            <p:cNvPr id="19" name="TextBox 18">
+              <a:extLst>
+                <a:ext uri="{FF2B5EF4-FFF2-40B4-BE49-F238E27FC236}">
+                  <a16:creationId xmlns:a16="http://schemas.microsoft.com/office/drawing/2014/main" id="{9F9DC648-D826-45C9-A957-9654FB25919E}"/>
+                </a:ext>
+              </a:extLst>
+            </p:cNvPr>
+            <p:cNvSpPr txBox="1"/>
+            <p:nvPr/>
+          </p:nvSpPr>
+          <p:spPr>
+            <a:xfrm>
+              <a:off x="7187440" y="4060170"/>
+              <a:ext cx="2297424" cy="369332"/>
+            </a:xfrm>
+            <a:prstGeom prst="rect">
+              <a:avLst/>
+            </a:prstGeom>
+            <a:noFill/>
+          </p:spPr>
+          <p:txBody>
+            <a:bodyPr wrap="none" rtlCol="0">
+              <a:spAutoFit/>
+            </a:bodyPr>
+            <a:lstStyle/>
+            <a:p>
+              <a:r>
+                <a:rPr lang="en-US" dirty="0"/>
+                <a:t>DTECTS 1.0C (2017)</a:t>
+              </a:r>
+            </a:p>
+          </p:txBody>
+        </p:sp>
+      </p:grpSp>
+      <p:sp>
+        <p:nvSpPr>
+          <p:cNvPr id="14" name="Arrow: Striped Right 13">
+            <a:extLst>
+              <a:ext uri="{FF2B5EF4-FFF2-40B4-BE49-F238E27FC236}">
+                <a16:creationId xmlns:a16="http://schemas.microsoft.com/office/drawing/2014/main" id="{87AA04C8-574A-42A5-BC21-89AE4E6F3F47}"/>
+              </a:ext>
+            </a:extLst>
+          </p:cNvPr>
+          <p:cNvSpPr/>
+          <p:nvPr/>
+        </p:nvSpPr>
+        <p:spPr>
+          <a:xfrm rot="3540344">
+            <a:off x="9509603" y="4134085"/>
+            <a:ext cx="493243" cy="105848"/>
+          </a:xfrm>
+          <a:prstGeom prst="stripedRightArrow">
+            <a:avLst/>
+          </a:prstGeom>
+          <a:solidFill>
+            <a:schemeClr val="accent5">
+              <a:lumMod val="60000"/>
+              <a:lumOff val="40000"/>
+            </a:schemeClr>
+          </a:solidFill>
+          <a:ln>
+            <a:solidFill>
+              <a:schemeClr val="accent5">
+                <a:lumMod val="75000"/>
+              </a:schemeClr>
+            </a:solidFill>
+          </a:ln>
+        </p:spPr>
+        <p:style>
+          <a:lnRef idx="2">
+            <a:schemeClr val="accent1">
+              <a:shade val="50000"/>
+            </a:schemeClr>
+          </a:lnRef>
+          <a:fillRef idx="1">
+            <a:schemeClr val="accent1"/>
+          </a:fillRef>
+          <a:effectRef idx="0">
+            <a:schemeClr val="accent1"/>
+          </a:effectRef>
+          <a:fontRef idx="minor">
+            <a:schemeClr val="lt1"/>
+          </a:fontRef>
+        </p:style>
+        <p:txBody>
+          <a:bodyPr rtlCol="0" anchor="ctr"/>
+          <a:lstStyle/>
+          <a:p>
+            <a:pPr algn="ctr"/>
+            <a:endParaRPr lang="en-US"/>
+          </a:p>
+        </p:txBody>
+      </p:sp>
+    </p:spTree>
+    <p:extLst>
+      <p:ext uri="{BB962C8B-B14F-4D97-AF65-F5344CB8AC3E}">
+        <p14:creationId xmlns:p14="http://schemas.microsoft.com/office/powerpoint/2010/main" val="3842013884"/>
+      </p:ext>
+    </p:extLst>
+  </p:cSld>
+  <p:clrMapOvr>
+    <a:masterClrMapping/>
+  </p:clrMapOvr>
+  <p:timing>
+    <p:tnLst>
+      <p:par>
+        <p:cTn id="1" dur="indefinite" restart="never" nodeType="tmRoot">
+          <p:childTnLst>
+            <p:seq concurrent="1" nextAc="seek">
+              <p:cTn id="2" dur="indefinite" nodeType="mainSeq">
+                <p:childTnLst>
+                  <p:par>
+                    <p:cTn id="3" fill="hold">
+                      <p:stCondLst>
+                        <p:cond delay="indefinite"/>
+                      </p:stCondLst>
+                      <p:childTnLst>
+                        <p:par>
+                          <p:cTn id="4" fill="hold">
+                            <p:stCondLst>
+                              <p:cond delay="0"/>
+                            </p:stCondLst>
+                            <p:childTnLst>
+                              <p:par>
+                                <p:cTn id="5" presetID="10" presetClass="entr" presetSubtype="0" fill="hold" nodeType="clickEffect">
+                                  <p:stCondLst>
+                                    <p:cond delay="0"/>
+                                  </p:stCondLst>
+                                  <p:childTnLst>
+                                    <p:set>
+                                      <p:cBhvr>
+                                        <p:cTn id="6" dur="1" fill="hold">
+                                          <p:stCondLst>
+                                            <p:cond delay="0"/>
+                                          </p:stCondLst>
+                                        </p:cTn>
+                                        <p:tgtEl>
+                                          <p:spTgt spid="20"/>
+                                        </p:tgtEl>
+                                        <p:attrNameLst>
+                                          <p:attrName>style.visibility</p:attrName>
+                                        </p:attrNameLst>
+                                      </p:cBhvr>
+                                      <p:to>
+                                        <p:strVal val="visible"/>
+                                      </p:to>
+                                    </p:set>
+                                    <p:animEffect transition="in" filter="fade">
+                                      <p:cBhvr>
+                                        <p:cTn id="7" dur="500"/>
+                                        <p:tgtEl>
+                                          <p:spTgt spid="20"/>
+                                        </p:tgtEl>
+                                      </p:cBhvr>
+                                    </p:animEffect>
+                                  </p:childTnLst>
+                                </p:cTn>
+                              </p:par>
+                              <p:par>
+                                <p:cTn id="8" presetID="10" presetClass="entr" presetSubtype="0" fill="hold" grpId="0" nodeType="withEffect">
+                                  <p:stCondLst>
+                                    <p:cond delay="0"/>
+                                  </p:stCondLst>
+                                  <p:childTnLst>
+                                    <p:set>
+                                      <p:cBhvr>
+                                        <p:cTn id="9" dur="1" fill="hold">
+                                          <p:stCondLst>
+                                            <p:cond delay="0"/>
+                                          </p:stCondLst>
+                                        </p:cTn>
+                                        <p:tgtEl>
+                                          <p:spTgt spid="22"/>
+                                        </p:tgtEl>
+                                        <p:attrNameLst>
+                                          <p:attrName>style.visibility</p:attrName>
+                                        </p:attrNameLst>
+                                      </p:cBhvr>
+                                      <p:to>
+                                        <p:strVal val="visible"/>
+                                      </p:to>
+                                    </p:set>
+                                    <p:animEffect transition="in" filter="fade">
+                                      <p:cBhvr>
+                                        <p:cTn id="10" dur="500"/>
+                                        <p:tgtEl>
+                                          <p:spTgt spid="22"/>
+                                        </p:tgtEl>
+                                      </p:cBhvr>
+                                    </p:animEffect>
+                                  </p:childTnLst>
+                                </p:cTn>
+                              </p:par>
+                            </p:childTnLst>
+                          </p:cTn>
+                        </p:par>
+                      </p:childTnLst>
+                    </p:cTn>
+                  </p:par>
+                  <p:par>
+                    <p:cTn id="11" fill="hold">
+                      <p:stCondLst>
+                        <p:cond delay="indefinite"/>
+                      </p:stCondLst>
+                      <p:childTnLst>
+                        <p:par>
+                          <p:cTn id="12" fill="hold">
+                            <p:stCondLst>
+                              <p:cond delay="0"/>
+                            </p:stCondLst>
+                            <p:childTnLst>
+                              <p:par>
+                                <p:cTn id="13" presetID="10" presetClass="entr" presetSubtype="0" fill="hold" nodeType="clickEffect">
+                                  <p:stCondLst>
+                                    <p:cond delay="0"/>
+                                  </p:stCondLst>
+                                  <p:childTnLst>
+                                    <p:set>
+                                      <p:cBhvr>
+                                        <p:cTn id="14" dur="1" fill="hold">
+                                          <p:stCondLst>
+                                            <p:cond delay="0"/>
+                                          </p:stCondLst>
+                                        </p:cTn>
+                                        <p:tgtEl>
+                                          <p:spTgt spid="16"/>
+                                        </p:tgtEl>
+                                        <p:attrNameLst>
+                                          <p:attrName>style.visibility</p:attrName>
+                                        </p:attrNameLst>
+                                      </p:cBhvr>
+                                      <p:to>
+                                        <p:strVal val="visible"/>
+                                      </p:to>
+                                    </p:set>
+                                    <p:animEffect transition="in" filter="fade">
+                                      <p:cBhvr>
+                                        <p:cTn id="15" dur="500"/>
+                                        <p:tgtEl>
+                                          <p:spTgt spid="16"/>
+                                        </p:tgtEl>
+                                      </p:cBhvr>
+                                    </p:animEffect>
+                                  </p:childTnLst>
+                                </p:cTn>
+                              </p:par>
+                              <p:par>
+                                <p:cTn id="16" presetID="10" presetClass="entr" presetSubtype="0" fill="hold" nodeType="withEffect">
+                                  <p:stCondLst>
+                                    <p:cond delay="0"/>
+                                  </p:stCondLst>
+                                  <p:childTnLst>
+                                    <p:set>
+                                      <p:cBhvr>
+                                        <p:cTn id="17" dur="1" fill="hold">
+                                          <p:stCondLst>
+                                            <p:cond delay="0"/>
+                                          </p:stCondLst>
+                                        </p:cTn>
+                                        <p:tgtEl>
+                                          <p:spTgt spid="21"/>
+                                        </p:tgtEl>
+                                        <p:attrNameLst>
+                                          <p:attrName>style.visibility</p:attrName>
+                                        </p:attrNameLst>
+                                      </p:cBhvr>
+                                      <p:to>
+                                        <p:strVal val="visible"/>
+                                      </p:to>
+                                    </p:set>
+                                    <p:animEffect transition="in" filter="fade">
+                                      <p:cBhvr>
+                                        <p:cTn id="18" dur="500"/>
+                                        <p:tgtEl>
+                                          <p:spTgt spid="21"/>
+                                        </p:tgtEl>
+                                      </p:cBhvr>
+                                    </p:animEffect>
+                                  </p:childTnLst>
+                                </p:cTn>
+                              </p:par>
+                            </p:childTnLst>
+                          </p:cTn>
+                        </p:par>
+                        <p:par>
+                          <p:cTn id="19" fill="hold">
+                            <p:stCondLst>
+                              <p:cond delay="500"/>
+                            </p:stCondLst>
+                            <p:childTnLst>
+                              <p:par>
+                                <p:cTn id="20" presetID="10" presetClass="entr" presetSubtype="0" fill="hold" grpId="0" nodeType="afterEffect">
+                                  <p:stCondLst>
+                                    <p:cond delay="500"/>
+                                  </p:stCondLst>
+                                  <p:childTnLst>
+                                    <p:set>
+                                      <p:cBhvr>
+                                        <p:cTn id="21" dur="1" fill="hold">
+                                          <p:stCondLst>
+                                            <p:cond delay="0"/>
+                                          </p:stCondLst>
+                                        </p:cTn>
+                                        <p:tgtEl>
+                                          <p:spTgt spid="14"/>
+                                        </p:tgtEl>
+                                        <p:attrNameLst>
+                                          <p:attrName>style.visibility</p:attrName>
+                                        </p:attrNameLst>
+                                      </p:cBhvr>
+                                      <p:to>
+                                        <p:strVal val="visible"/>
+                                      </p:to>
+                                    </p:set>
+                                    <p:animEffect transition="in" filter="fade">
+                                      <p:cBhvr>
+                                        <p:cTn id="22" dur="1000"/>
+                                        <p:tgtEl>
+                                          <p:spTgt spid="14"/>
+                                        </p:tgtEl>
+                                      </p:cBhvr>
+                                    </p:animEffect>
+                                  </p:childTnLst>
+                                </p:cTn>
+                              </p:par>
+                              <p:par>
+                                <p:cTn id="23" presetID="10" presetClass="entr" presetSubtype="0" fill="hold" grpId="0" nodeType="withEffect">
+                                  <p:stCondLst>
+                                    <p:cond delay="500"/>
+                                  </p:stCondLst>
+                                  <p:childTnLst>
+                                    <p:set>
+                                      <p:cBhvr>
+                                        <p:cTn id="24" dur="1" fill="hold">
+                                          <p:stCondLst>
+                                            <p:cond delay="0"/>
+                                          </p:stCondLst>
+                                        </p:cTn>
+                                        <p:tgtEl>
+                                          <p:spTgt spid="8"/>
+                                        </p:tgtEl>
+                                        <p:attrNameLst>
+                                          <p:attrName>style.visibility</p:attrName>
+                                        </p:attrNameLst>
+                                      </p:cBhvr>
+                                      <p:to>
+                                        <p:strVal val="visible"/>
+                                      </p:to>
+                                    </p:set>
+                                    <p:animEffect transition="in" filter="fade">
+                                      <p:cBhvr>
+                                        <p:cTn id="25" dur="500"/>
+                                        <p:tgtEl>
+                                          <p:spTgt spid="8"/>
+                                        </p:tgtEl>
+                                      </p:cBhvr>
+                                    </p:animEffect>
+                                  </p:childTnLst>
+                                </p:cTn>
+                              </p:par>
+                            </p:childTnLst>
+                          </p:cTn>
+                        </p:par>
+                      </p:childTnLst>
+                    </p:cTn>
+                  </p:par>
+                </p:childTnLst>
+              </p:cTn>
+              <p:prevCondLst>
+                <p:cond evt="onPrev" delay="0">
+                  <p:tgtEl>
+                    <p:sldTgt/>
+                  </p:tgtEl>
+                </p:cond>
+              </p:prevCondLst>
+              <p:nextCondLst>
+                <p:cond evt="onNext" delay="0">
+                  <p:tgtEl>
+                    <p:sldTgt/>
+                  </p:tgtEl>
+                </p:cond>
+              </p:nextCondLst>
+            </p:seq>
+          </p:childTnLst>
+        </p:cTn>
+      </p:par>
+    </p:tnLst>
+    <p:bldLst>
+      <p:bldP spid="22" grpId="0"/>
+      <p:bldP spid="8" grpId="0" animBg="1"/>
+      <p:bldP spid="14" grpId="0" animBg="1"/>
+    </p:bldLst>
+  </p:timing>
+</p:sld>
+</file>
+
+<file path=ppt/slides/slide14.xml><?xml version="1.0" encoding="utf-8"?>
+<p:sld xmlns:a="http://schemas.openxmlformats.org/drawingml/2006/main" xmlns:r="http://schemas.openxmlformats.org/officeDocument/2006/relationships" xmlns:p="http://schemas.openxmlformats.org/presentationml/2006/main">
+  <p:cSld>
+    <p:spTree>
+      <p:nvGrpSpPr>
+        <p:cNvPr id="1" name=""/>
+        <p:cNvGrpSpPr/>
+        <p:nvPr/>
+      </p:nvGrpSpPr>
+      <p:grpSpPr>
+        <a:xfrm>
+          <a:off x="0" y="0"/>
+          <a:ext cx="0" cy="0"/>
+          <a:chOff x="0" y="0"/>
+          <a:chExt cx="0" cy="0"/>
+        </a:xfrm>
+      </p:grpSpPr>
+      <p:sp>
+        <p:nvSpPr>
           <p:cNvPr id="2" name="Title 1">
             <a:extLst>
               <a:ext uri="{FF2B5EF4-FFF2-40B4-BE49-F238E27FC236}">
@@ -14384,7 +15347,7 @@
 </p:sld>
 </file>
 
-<file path=ppt/slides/slide14.xml><?xml version="1.0" encoding="utf-8"?>
+<file path=ppt/slides/slide15.xml><?xml version="1.0" encoding="utf-8"?>
 <p:sld xmlns:a="http://schemas.openxmlformats.org/drawingml/2006/main" xmlns:r="http://schemas.openxmlformats.org/officeDocument/2006/relationships" xmlns:p="http://schemas.openxmlformats.org/presentationml/2006/main">
   <p:cSld>
     <p:spTree>
@@ -14489,7 +15452,7 @@
 </p:sld>
 </file>
 
-<file path=ppt/slides/slide15.xml><?xml version="1.0" encoding="utf-8"?>
+<file path=ppt/slides/slide16.xml><?xml version="1.0" encoding="utf-8"?>
 <p:sld xmlns:a="http://schemas.openxmlformats.org/drawingml/2006/main" xmlns:r="http://schemas.openxmlformats.org/officeDocument/2006/relationships" xmlns:p="http://schemas.openxmlformats.org/presentationml/2006/main">
   <p:cSld>
     <p:spTree>
@@ -14594,7 +15557,7 @@
 </p:sld>
 </file>
 
-<file path=ppt/slides/slide16.xml><?xml version="1.0" encoding="utf-8"?>
+<file path=ppt/slides/slide17.xml><?xml version="1.0" encoding="utf-8"?>
 <p:sld xmlns:a="http://schemas.openxmlformats.org/drawingml/2006/main" xmlns:r="http://schemas.openxmlformats.org/officeDocument/2006/relationships" xmlns:p="http://schemas.openxmlformats.org/presentationml/2006/main">
   <p:cSld>
     <p:spTree>
@@ -14742,111 +15705,6 @@
 </p:sld>
 </file>
 
-<file path=ppt/slides/slide17.xml><?xml version="1.0" encoding="utf-8"?>
-<p:sld xmlns:a="http://schemas.openxmlformats.org/drawingml/2006/main" xmlns:r="http://schemas.openxmlformats.org/officeDocument/2006/relationships" xmlns:p="http://schemas.openxmlformats.org/presentationml/2006/main">
-  <p:cSld>
-    <p:spTree>
-      <p:nvGrpSpPr>
-        <p:cNvPr id="1" name=""/>
-        <p:cNvGrpSpPr/>
-        <p:nvPr/>
-      </p:nvGrpSpPr>
-      <p:grpSpPr>
-        <a:xfrm>
-          <a:off x="0" y="0"/>
-          <a:ext cx="0" cy="0"/>
-          <a:chOff x="0" y="0"/>
-          <a:chExt cx="0" cy="0"/>
-        </a:xfrm>
-      </p:grpSpPr>
-      <p:sp>
-        <p:nvSpPr>
-          <p:cNvPr id="2" name="Title 1">
-            <a:extLst>
-              <a:ext uri="{FF2B5EF4-FFF2-40B4-BE49-F238E27FC236}">
-                <a16:creationId xmlns:a16="http://schemas.microsoft.com/office/drawing/2014/main" id="{9C5E42EE-EA5D-4203-B1EC-B96B68D2A8EA}"/>
-              </a:ext>
-            </a:extLst>
-          </p:cNvPr>
-          <p:cNvSpPr>
-            <a:spLocks noGrp="1"/>
-          </p:cNvSpPr>
-          <p:nvPr>
-            <p:ph type="title"/>
-          </p:nvPr>
-        </p:nvSpPr>
-        <p:spPr/>
-        <p:txBody>
-          <a:bodyPr>
-            <a:normAutofit/>
-          </a:bodyPr>
-          <a:lstStyle/>
-          <a:p>
-            <a:pPr rtl="0" eaLnBrk="1" latinLnBrk="0" hangingPunct="1"/>
-            <a:r>
-              <a:rPr lang="en-US" sz="3600" b="0" i="0" kern="1200" baseline="0" dirty="0">
-                <a:solidFill>
-                  <a:schemeClr val="tx1">
-                    <a:lumMod val="85000"/>
-                    <a:lumOff val="15000"/>
-                  </a:schemeClr>
-                </a:solidFill>
-                <a:effectLst/>
-                <a:latin typeface="+mj-lt"/>
-                <a:ea typeface="+mj-ea"/>
-                <a:cs typeface="+mj-cs"/>
-              </a:rPr>
-              <a:t>Overcome Challenges</a:t>
-            </a:r>
-            <a:endParaRPr lang="en-US" sz="4400" dirty="0">
-              <a:effectLst/>
-            </a:endParaRPr>
-          </a:p>
-        </p:txBody>
-      </p:sp>
-      <p:sp>
-        <p:nvSpPr>
-          <p:cNvPr id="3" name="Content Placeholder 2">
-            <a:extLst>
-              <a:ext uri="{FF2B5EF4-FFF2-40B4-BE49-F238E27FC236}">
-                <a16:creationId xmlns:a16="http://schemas.microsoft.com/office/drawing/2014/main" id="{044B4F6E-A639-47F4-91A5-68807265D618}"/>
-              </a:ext>
-            </a:extLst>
-          </p:cNvPr>
-          <p:cNvSpPr>
-            <a:spLocks noGrp="1"/>
-          </p:cNvSpPr>
-          <p:nvPr>
-            <p:ph idx="1"/>
-          </p:nvPr>
-        </p:nvSpPr>
-        <p:spPr>
-          <a:xfrm>
-            <a:off x="2589211" y="1451113"/>
-            <a:ext cx="9079327" cy="5068957"/>
-          </a:xfrm>
-        </p:spPr>
-        <p:txBody>
-          <a:bodyPr/>
-          <a:lstStyle/>
-          <a:p>
-            <a:endParaRPr lang="en-US" dirty="0"/>
-          </a:p>
-        </p:txBody>
-      </p:sp>
-    </p:spTree>
-    <p:extLst>
-      <p:ext uri="{BB962C8B-B14F-4D97-AF65-F5344CB8AC3E}">
-        <p14:creationId xmlns:p14="http://schemas.microsoft.com/office/powerpoint/2010/main" val="2805820393"/>
-      </p:ext>
-    </p:extLst>
-  </p:cSld>
-  <p:clrMapOvr>
-    <a:masterClrMapping/>
-  </p:clrMapOvr>
-</p:sld>
-</file>
-
 <file path=ppt/slides/slide18.xml><?xml version="1.0" encoding="utf-8"?>
 <p:sld xmlns:a="http://schemas.openxmlformats.org/drawingml/2006/main" xmlns:r="http://schemas.openxmlformats.org/officeDocument/2006/relationships" xmlns:p="http://schemas.openxmlformats.org/presentationml/2006/main">
   <p:cSld>
@@ -14887,6 +15745,7 @@
           </a:bodyPr>
           <a:lstStyle/>
           <a:p>
+            <a:pPr rtl="0" eaLnBrk="1" latinLnBrk="0" hangingPunct="1"/>
             <a:r>
               <a:rPr lang="en-US" sz="3600" b="0" i="0" kern="1200" baseline="0" dirty="0">
                 <a:solidFill>
@@ -14900,9 +15759,11 @@
                 <a:ea typeface="+mj-ea"/>
                 <a:cs typeface="+mj-cs"/>
               </a:rPr>
-              <a:t>Deliverable &amp; Results (2)</a:t>
-            </a:r>
-            <a:endParaRPr lang="en-US" sz="2800" dirty="0"/>
+              <a:t>Overcome Challenges</a:t>
+            </a:r>
+            <a:endParaRPr lang="en-US" sz="4400" dirty="0">
+              <a:effectLst/>
+            </a:endParaRPr>
           </a:p>
         </p:txBody>
       </p:sp>
@@ -14939,7 +15800,7 @@
     </p:spTree>
     <p:extLst>
       <p:ext uri="{BB962C8B-B14F-4D97-AF65-F5344CB8AC3E}">
-        <p14:creationId xmlns:p14="http://schemas.microsoft.com/office/powerpoint/2010/main" val="821675052"/>
+        <p14:creationId xmlns:p14="http://schemas.microsoft.com/office/powerpoint/2010/main" val="2805820393"/>
       </p:ext>
     </p:extLst>
   </p:cSld>
@@ -14989,7 +15850,6 @@
           </a:bodyPr>
           <a:lstStyle/>
           <a:p>
-            <a:pPr rtl="0" eaLnBrk="1" latinLnBrk="0" hangingPunct="1"/>
             <a:r>
               <a:rPr lang="en-US" sz="3600" b="0" i="0" kern="1200" baseline="0" dirty="0">
                 <a:solidFill>
@@ -15003,11 +15863,9 @@
                 <a:ea typeface="+mj-ea"/>
                 <a:cs typeface="+mj-cs"/>
               </a:rPr>
-              <a:t>Learnings &amp; Growths</a:t>
-            </a:r>
-            <a:endParaRPr lang="en-US" sz="4400" dirty="0">
-              <a:effectLst/>
-            </a:endParaRPr>
+              <a:t>Deliverable &amp; Results (2)</a:t>
+            </a:r>
+            <a:endParaRPr lang="en-US" sz="2800" dirty="0"/>
           </a:p>
         </p:txBody>
       </p:sp>
@@ -15044,7 +15902,7 @@
     </p:spTree>
     <p:extLst>
       <p:ext uri="{BB962C8B-B14F-4D97-AF65-F5344CB8AC3E}">
-        <p14:creationId xmlns:p14="http://schemas.microsoft.com/office/powerpoint/2010/main" val="3042754836"/>
+        <p14:creationId xmlns:p14="http://schemas.microsoft.com/office/powerpoint/2010/main" val="821675052"/>
       </p:ext>
     </p:extLst>
   </p:cSld>
@@ -15823,7 +16681,7 @@
                 <a:ea typeface="+mj-ea"/>
                 <a:cs typeface="+mj-cs"/>
               </a:rPr>
-              <a:t>Outcomes</a:t>
+              <a:t>Learnings &amp; Growths</a:t>
             </a:r>
             <a:endParaRPr lang="en-US" sz="4400" dirty="0">
               <a:effectLst/>
@@ -15864,7 +16722,7 @@
     </p:spTree>
     <p:extLst>
       <p:ext uri="{BB962C8B-B14F-4D97-AF65-F5344CB8AC3E}">
-        <p14:creationId xmlns:p14="http://schemas.microsoft.com/office/powerpoint/2010/main" val="2229688103"/>
+        <p14:creationId xmlns:p14="http://schemas.microsoft.com/office/powerpoint/2010/main" val="3042754836"/>
       </p:ext>
     </p:extLst>
   </p:cSld>
@@ -15928,7 +16786,7 @@
                 <a:ea typeface="+mj-ea"/>
                 <a:cs typeface="+mj-cs"/>
               </a:rPr>
-              <a:t>Procedure</a:t>
+              <a:t>Outcomes</a:t>
             </a:r>
             <a:endParaRPr lang="en-US" sz="4400" dirty="0">
               <a:effectLst/>
@@ -15969,7 +16827,7 @@
     </p:spTree>
     <p:extLst>
       <p:ext uri="{BB962C8B-B14F-4D97-AF65-F5344CB8AC3E}">
-        <p14:creationId xmlns:p14="http://schemas.microsoft.com/office/powerpoint/2010/main" val="3600086102"/>
+        <p14:creationId xmlns:p14="http://schemas.microsoft.com/office/powerpoint/2010/main" val="2229688103"/>
       </p:ext>
     </p:extLst>
   </p:cSld>
@@ -16033,6 +16891,111 @@
                 <a:ea typeface="+mj-ea"/>
                 <a:cs typeface="+mj-cs"/>
               </a:rPr>
+              <a:t>Procedure</a:t>
+            </a:r>
+            <a:endParaRPr lang="en-US" sz="4400" dirty="0">
+              <a:effectLst/>
+            </a:endParaRPr>
+          </a:p>
+        </p:txBody>
+      </p:sp>
+      <p:sp>
+        <p:nvSpPr>
+          <p:cNvPr id="3" name="Content Placeholder 2">
+            <a:extLst>
+              <a:ext uri="{FF2B5EF4-FFF2-40B4-BE49-F238E27FC236}">
+                <a16:creationId xmlns:a16="http://schemas.microsoft.com/office/drawing/2014/main" id="{044B4F6E-A639-47F4-91A5-68807265D618}"/>
+              </a:ext>
+            </a:extLst>
+          </p:cNvPr>
+          <p:cNvSpPr>
+            <a:spLocks noGrp="1"/>
+          </p:cNvSpPr>
+          <p:nvPr>
+            <p:ph idx="1"/>
+          </p:nvPr>
+        </p:nvSpPr>
+        <p:spPr>
+          <a:xfrm>
+            <a:off x="2589211" y="1451113"/>
+            <a:ext cx="9079327" cy="5068957"/>
+          </a:xfrm>
+        </p:spPr>
+        <p:txBody>
+          <a:bodyPr/>
+          <a:lstStyle/>
+          <a:p>
+            <a:endParaRPr lang="en-US" dirty="0"/>
+          </a:p>
+        </p:txBody>
+      </p:sp>
+    </p:spTree>
+    <p:extLst>
+      <p:ext uri="{BB962C8B-B14F-4D97-AF65-F5344CB8AC3E}">
+        <p14:creationId xmlns:p14="http://schemas.microsoft.com/office/powerpoint/2010/main" val="3600086102"/>
+      </p:ext>
+    </p:extLst>
+  </p:cSld>
+  <p:clrMapOvr>
+    <a:masterClrMapping/>
+  </p:clrMapOvr>
+</p:sld>
+</file>
+
+<file path=ppt/slides/slide23.xml><?xml version="1.0" encoding="utf-8"?>
+<p:sld xmlns:a="http://schemas.openxmlformats.org/drawingml/2006/main" xmlns:r="http://schemas.openxmlformats.org/officeDocument/2006/relationships" xmlns:p="http://schemas.openxmlformats.org/presentationml/2006/main">
+  <p:cSld>
+    <p:spTree>
+      <p:nvGrpSpPr>
+        <p:cNvPr id="1" name=""/>
+        <p:cNvGrpSpPr/>
+        <p:nvPr/>
+      </p:nvGrpSpPr>
+      <p:grpSpPr>
+        <a:xfrm>
+          <a:off x="0" y="0"/>
+          <a:ext cx="0" cy="0"/>
+          <a:chOff x="0" y="0"/>
+          <a:chExt cx="0" cy="0"/>
+        </a:xfrm>
+      </p:grpSpPr>
+      <p:sp>
+        <p:nvSpPr>
+          <p:cNvPr id="2" name="Title 1">
+            <a:extLst>
+              <a:ext uri="{FF2B5EF4-FFF2-40B4-BE49-F238E27FC236}">
+                <a16:creationId xmlns:a16="http://schemas.microsoft.com/office/drawing/2014/main" id="{9C5E42EE-EA5D-4203-B1EC-B96B68D2A8EA}"/>
+              </a:ext>
+            </a:extLst>
+          </p:cNvPr>
+          <p:cNvSpPr>
+            <a:spLocks noGrp="1"/>
+          </p:cNvSpPr>
+          <p:nvPr>
+            <p:ph type="title"/>
+          </p:nvPr>
+        </p:nvSpPr>
+        <p:spPr/>
+        <p:txBody>
+          <a:bodyPr>
+            <a:normAutofit/>
+          </a:bodyPr>
+          <a:lstStyle/>
+          <a:p>
+            <a:pPr rtl="0" eaLnBrk="1" latinLnBrk="0" hangingPunct="1"/>
+            <a:r>
+              <a:rPr lang="en-US" sz="3600" b="0" i="0" kern="1200" baseline="0" dirty="0">
+                <a:solidFill>
+                  <a:schemeClr val="tx1">
+                    <a:lumMod val="85000"/>
+                    <a:lumOff val="15000"/>
+                  </a:schemeClr>
+                </a:solidFill>
+                <a:effectLst/>
+                <a:latin typeface="+mj-lt"/>
+                <a:ea typeface="+mj-ea"/>
+                <a:cs typeface="+mj-cs"/>
+              </a:rPr>
               <a:t>Pivotal Value Statement </a:t>
             </a:r>
             <a:endParaRPr lang="en-US" sz="4400" dirty="0">
@@ -16084,7 +17047,7 @@
 </p:sld>
 </file>
 
-<file path=ppt/slides/slide23.xml><?xml version="1.0" encoding="utf-8"?>
+<file path=ppt/slides/slide24.xml><?xml version="1.0" encoding="utf-8"?>
 <p:sld xmlns:a="http://schemas.openxmlformats.org/drawingml/2006/main" xmlns:r="http://schemas.openxmlformats.org/officeDocument/2006/relationships" xmlns:p="http://schemas.openxmlformats.org/presentationml/2006/main">
   <p:cSld>
     <p:spTree>
@@ -16296,15 +17259,7 @@
             <a:pPr algn="ctr"/>
             <a:r>
               <a:rPr lang="en-US" dirty="0"/>
-              <a:t>The edge analytics solution, for continuous commissioning and monitoring of fault detection </a:t>
-            </a:r>
-            <a:r>
-              <a:rPr lang="en-US" dirty="0" err="1"/>
-              <a:t>forf</a:t>
-            </a:r>
-            <a:r>
-              <a:rPr lang="en-US" dirty="0"/>
-              <a:t> electric motor &amp; power transformer assets</a:t>
+              <a:t>The edge analytics solution, for continuous commissioning and monitoring of fault detection for electric motor &amp; power transformer assets</a:t>
             </a:r>
           </a:p>
         </p:txBody>
@@ -16557,28 +17512,28 @@
           <a:p>
             <a:r>
               <a:rPr lang="en-US" dirty="0"/>
-              <a:t>Stabilization &amp; path forward</a:t>
+              <a:t>Embedded Design Work</a:t>
             </a:r>
           </a:p>
           <a:p>
             <a:pPr lvl="1"/>
             <a:r>
               <a:rPr lang="en-US" dirty="0"/>
-              <a:t>Firmware Architecture &amp; Path to Market</a:t>
+              <a:t>Board Revisions</a:t>
             </a:r>
           </a:p>
           <a:p>
             <a:pPr lvl="1"/>
             <a:r>
               <a:rPr lang="en-US" dirty="0"/>
-              <a:t>Board Revisions</a:t>
+              <a:t>Feature Integration</a:t>
             </a:r>
           </a:p>
           <a:p>
             <a:pPr lvl="1"/>
             <a:r>
               <a:rPr lang="en-US" dirty="0"/>
-              <a:t>Feature Integration &amp; Design Simplification</a:t>
+              <a:t>Firmware Architecture</a:t>
             </a:r>
           </a:p>
           <a:p>
@@ -16586,6 +17541,26 @@
               <a:buNone/>
             </a:pPr>
             <a:endParaRPr lang="en-US" dirty="0"/>
+          </a:p>
+          <a:p>
+            <a:r>
+              <a:rPr lang="en-US" dirty="0"/>
+              <a:t>Stabilization</a:t>
+            </a:r>
+          </a:p>
+          <a:p>
+            <a:pPr lvl="1"/>
+            <a:r>
+              <a:rPr lang="en-US" dirty="0"/>
+              <a:t>Design Simplification</a:t>
+            </a:r>
+          </a:p>
+          <a:p>
+            <a:pPr lvl="1"/>
+            <a:r>
+              <a:rPr lang="en-US" dirty="0"/>
+              <a:t>Path to Market</a:t>
+            </a:r>
           </a:p>
         </p:txBody>
       </p:sp>
@@ -18033,6 +19008,41 @@
             <a:r>
               <a:rPr lang="en-US" dirty="0"/>
               <a:t>Board Modularization</a:t>
+            </a:r>
+          </a:p>
+        </p:txBody>
+      </p:sp>
+      <p:sp>
+        <p:nvSpPr>
+          <p:cNvPr id="4" name="TextBox 3">
+            <a:extLst>
+              <a:ext uri="{FF2B5EF4-FFF2-40B4-BE49-F238E27FC236}">
+                <a16:creationId xmlns:a16="http://schemas.microsoft.com/office/drawing/2014/main" id="{9770E7A6-2142-40F2-9A2C-569620533CB7}"/>
+              </a:ext>
+            </a:extLst>
+          </p:cNvPr>
+          <p:cNvSpPr txBox="1"/>
+          <p:nvPr/>
+        </p:nvSpPr>
+        <p:spPr>
+          <a:xfrm>
+            <a:off x="7922383" y="4746924"/>
+            <a:ext cx="2109873" cy="369332"/>
+          </a:xfrm>
+          <a:prstGeom prst="rect">
+            <a:avLst/>
+          </a:prstGeom>
+          <a:noFill/>
+        </p:spPr>
+        <p:txBody>
+          <a:bodyPr wrap="none" rtlCol="0">
+            <a:spAutoFit/>
+          </a:bodyPr>
+          <a:lstStyle/>
+          <a:p>
+            <a:r>
+              <a:rPr lang="en-US" dirty="0"/>
+              <a:t>DTECTS 1.0 (2017)</a:t>
             </a:r>
           </a:p>
         </p:txBody>

</xml_diff>